<commit_message>
Update slides for cartesian product problem and use passDistinctThrough query hint
</commit_message>
<xml_diff>
--- a/slides.pptx
+++ b/slides.pptx
@@ -6,10 +6,10 @@
     <p:sldMasterId id="2147483669" r:id="rId5"/>
   </p:sldMasterIdLst>
   <p:notesMasterIdLst>
-    <p:notesMasterId r:id="rId61"/>
+    <p:notesMasterId r:id="rId63"/>
   </p:notesMasterIdLst>
   <p:handoutMasterIdLst>
-    <p:handoutMasterId r:id="rId62"/>
+    <p:handoutMasterId r:id="rId64"/>
   </p:handoutMasterIdLst>
   <p:sldIdLst>
     <p:sldId id="256" r:id="rId6"/>
@@ -49,24 +49,26 @@
     <p:sldId id="277" r:id="rId40"/>
     <p:sldId id="287" r:id="rId41"/>
     <p:sldId id="289" r:id="rId42"/>
-    <p:sldId id="327" r:id="rId43"/>
-    <p:sldId id="291" r:id="rId44"/>
-    <p:sldId id="293" r:id="rId45"/>
-    <p:sldId id="294" r:id="rId46"/>
-    <p:sldId id="295" r:id="rId47"/>
-    <p:sldId id="296" r:id="rId48"/>
-    <p:sldId id="297" r:id="rId49"/>
-    <p:sldId id="298" r:id="rId50"/>
-    <p:sldId id="299" r:id="rId51"/>
-    <p:sldId id="300" r:id="rId52"/>
-    <p:sldId id="302" r:id="rId53"/>
-    <p:sldId id="303" r:id="rId54"/>
-    <p:sldId id="309" r:id="rId55"/>
-    <p:sldId id="324" r:id="rId56"/>
-    <p:sldId id="305" r:id="rId57"/>
-    <p:sldId id="318" r:id="rId58"/>
-    <p:sldId id="319" r:id="rId59"/>
-    <p:sldId id="320" r:id="rId60"/>
+    <p:sldId id="329" r:id="rId43"/>
+    <p:sldId id="327" r:id="rId44"/>
+    <p:sldId id="328" r:id="rId45"/>
+    <p:sldId id="291" r:id="rId46"/>
+    <p:sldId id="293" r:id="rId47"/>
+    <p:sldId id="294" r:id="rId48"/>
+    <p:sldId id="295" r:id="rId49"/>
+    <p:sldId id="296" r:id="rId50"/>
+    <p:sldId id="297" r:id="rId51"/>
+    <p:sldId id="298" r:id="rId52"/>
+    <p:sldId id="299" r:id="rId53"/>
+    <p:sldId id="300" r:id="rId54"/>
+    <p:sldId id="302" r:id="rId55"/>
+    <p:sldId id="303" r:id="rId56"/>
+    <p:sldId id="309" r:id="rId57"/>
+    <p:sldId id="324" r:id="rId58"/>
+    <p:sldId id="305" r:id="rId59"/>
+    <p:sldId id="318" r:id="rId60"/>
+    <p:sldId id="319" r:id="rId61"/>
+    <p:sldId id="320" r:id="rId62"/>
   </p:sldIdLst>
   <p:sldSz cx="12192000" cy="6858000"/>
   <p:notesSz cx="6858000" cy="9144000"/>
@@ -281,7 +283,7 @@
           <a:p>
             <a:fld id="{3532B83F-F844-4C18-98E8-7C33F4B39DE0}" type="datetimeFigureOut">
               <a:rPr lang="nl-NL" smtClean="0"/>
-              <a:t>29-4-2022</a:t>
+              <a:t>2-5-2022</a:t>
             </a:fld>
             <a:endParaRPr lang="nl-NL"/>
           </a:p>
@@ -458,7 +460,7 @@
           <a:p>
             <a:fld id="{27396D34-C2B8-41FF-AE69-48AE3B3D8E8B}" type="datetimeFigureOut">
               <a:rPr lang="nl-NL" smtClean="0"/>
-              <a:t>29-4-2022</a:t>
+              <a:t>2-5-2022</a:t>
             </a:fld>
             <a:endParaRPr lang="nl-NL"/>
           </a:p>
@@ -1245,7 +1247,343 @@
           <a:p>
             <a:fld id="{4970B036-1422-4C36-8158-C30E1C0769EB}" type="slidenum">
               <a:rPr lang="nl-NL" smtClean="0"/>
-              <a:t>55</a:t>
+              <a:t>36</a:t>
+            </a:fld>
+            <a:endParaRPr lang="nl-NL"/>
+          </a:p>
+        </p:txBody>
+      </p:sp>
+    </p:spTree>
+    <p:extLst>
+      <p:ext uri="{BB962C8B-B14F-4D97-AF65-F5344CB8AC3E}">
+        <p14:creationId xmlns:p14="http://schemas.microsoft.com/office/powerpoint/2010/main" val="1846876427"/>
+      </p:ext>
+    </p:extLst>
+  </p:cSld>
+  <p:clrMapOvr>
+    <a:masterClrMapping/>
+  </p:clrMapOvr>
+</p:notes>
+</file>
+
+<file path=ppt/notesSlides/notesSlide6.xml><?xml version="1.0" encoding="utf-8"?>
+<p:notes xmlns:a="http://schemas.openxmlformats.org/drawingml/2006/main" xmlns:r="http://schemas.openxmlformats.org/officeDocument/2006/relationships" xmlns:p="http://schemas.openxmlformats.org/presentationml/2006/main">
+  <p:cSld>
+    <p:spTree>
+      <p:nvGrpSpPr>
+        <p:cNvPr id="1" name=""/>
+        <p:cNvGrpSpPr/>
+        <p:nvPr/>
+      </p:nvGrpSpPr>
+      <p:grpSpPr>
+        <a:xfrm>
+          <a:off x="0" y="0"/>
+          <a:ext cx="0" cy="0"/>
+          <a:chOff x="0" y="0"/>
+          <a:chExt cx="0" cy="0"/>
+        </a:xfrm>
+      </p:grpSpPr>
+      <p:sp>
+        <p:nvSpPr>
+          <p:cNvPr id="2" name="Tijdelijke aanduiding voor dia-afbeelding 1"/>
+          <p:cNvSpPr>
+            <a:spLocks noGrp="1" noRot="1" noChangeAspect="1"/>
+          </p:cNvSpPr>
+          <p:nvPr>
+            <p:ph type="sldImg"/>
+          </p:nvPr>
+        </p:nvSpPr>
+        <p:spPr/>
+      </p:sp>
+      <p:sp>
+        <p:nvSpPr>
+          <p:cNvPr id="3" name="Tijdelijke aanduiding voor notities 2"/>
+          <p:cNvSpPr>
+            <a:spLocks noGrp="1"/>
+          </p:cNvSpPr>
+          <p:nvPr>
+            <p:ph type="body" idx="1"/>
+          </p:nvPr>
+        </p:nvSpPr>
+        <p:spPr/>
+        <p:txBody>
+          <a:bodyPr/>
+          <a:lstStyle/>
+          <a:p>
+            <a:endParaRPr lang="nl-NL" dirty="0"/>
+          </a:p>
+        </p:txBody>
+      </p:sp>
+      <p:sp>
+        <p:nvSpPr>
+          <p:cNvPr id="4" name="Tijdelijke aanduiding voor dianummer 3"/>
+          <p:cNvSpPr>
+            <a:spLocks noGrp="1"/>
+          </p:cNvSpPr>
+          <p:nvPr>
+            <p:ph type="sldNum" sz="quarter" idx="5"/>
+          </p:nvPr>
+        </p:nvSpPr>
+        <p:spPr/>
+        <p:txBody>
+          <a:bodyPr/>
+          <a:lstStyle/>
+          <a:p>
+            <a:fld id="{4970B036-1422-4C36-8158-C30E1C0769EB}" type="slidenum">
+              <a:rPr lang="nl-NL" smtClean="0"/>
+              <a:t>37</a:t>
+            </a:fld>
+            <a:endParaRPr lang="nl-NL"/>
+          </a:p>
+        </p:txBody>
+      </p:sp>
+    </p:spTree>
+    <p:extLst>
+      <p:ext uri="{BB962C8B-B14F-4D97-AF65-F5344CB8AC3E}">
+        <p14:creationId xmlns:p14="http://schemas.microsoft.com/office/powerpoint/2010/main" val="3570609962"/>
+      </p:ext>
+    </p:extLst>
+  </p:cSld>
+  <p:clrMapOvr>
+    <a:masterClrMapping/>
+  </p:clrMapOvr>
+</p:notes>
+</file>
+
+<file path=ppt/notesSlides/notesSlide7.xml><?xml version="1.0" encoding="utf-8"?>
+<p:notes xmlns:a="http://schemas.openxmlformats.org/drawingml/2006/main" xmlns:r="http://schemas.openxmlformats.org/officeDocument/2006/relationships" xmlns:p="http://schemas.openxmlformats.org/presentationml/2006/main">
+  <p:cSld>
+    <p:spTree>
+      <p:nvGrpSpPr>
+        <p:cNvPr id="1" name=""/>
+        <p:cNvGrpSpPr/>
+        <p:nvPr/>
+      </p:nvGrpSpPr>
+      <p:grpSpPr>
+        <a:xfrm>
+          <a:off x="0" y="0"/>
+          <a:ext cx="0" cy="0"/>
+          <a:chOff x="0" y="0"/>
+          <a:chExt cx="0" cy="0"/>
+        </a:xfrm>
+      </p:grpSpPr>
+      <p:sp>
+        <p:nvSpPr>
+          <p:cNvPr id="2" name="Tijdelijke aanduiding voor dia-afbeelding 1"/>
+          <p:cNvSpPr>
+            <a:spLocks noGrp="1" noRot="1" noChangeAspect="1"/>
+          </p:cNvSpPr>
+          <p:nvPr>
+            <p:ph type="sldImg"/>
+          </p:nvPr>
+        </p:nvSpPr>
+        <p:spPr/>
+      </p:sp>
+      <p:sp>
+        <p:nvSpPr>
+          <p:cNvPr id="3" name="Tijdelijke aanduiding voor notities 2"/>
+          <p:cNvSpPr>
+            <a:spLocks noGrp="1"/>
+          </p:cNvSpPr>
+          <p:nvPr>
+            <p:ph type="body" idx="1"/>
+          </p:nvPr>
+        </p:nvSpPr>
+        <p:spPr/>
+        <p:txBody>
+          <a:bodyPr/>
+          <a:lstStyle/>
+          <a:p>
+            <a:endParaRPr lang="nl-NL" dirty="0"/>
+          </a:p>
+        </p:txBody>
+      </p:sp>
+      <p:sp>
+        <p:nvSpPr>
+          <p:cNvPr id="4" name="Tijdelijke aanduiding voor dianummer 3"/>
+          <p:cNvSpPr>
+            <a:spLocks noGrp="1"/>
+          </p:cNvSpPr>
+          <p:nvPr>
+            <p:ph type="sldNum" sz="quarter" idx="5"/>
+          </p:nvPr>
+        </p:nvSpPr>
+        <p:spPr/>
+        <p:txBody>
+          <a:bodyPr/>
+          <a:lstStyle/>
+          <a:p>
+            <a:fld id="{4970B036-1422-4C36-8158-C30E1C0769EB}" type="slidenum">
+              <a:rPr lang="nl-NL" smtClean="0"/>
+              <a:t>38</a:t>
+            </a:fld>
+            <a:endParaRPr lang="nl-NL"/>
+          </a:p>
+        </p:txBody>
+      </p:sp>
+    </p:spTree>
+    <p:extLst>
+      <p:ext uri="{BB962C8B-B14F-4D97-AF65-F5344CB8AC3E}">
+        <p14:creationId xmlns:p14="http://schemas.microsoft.com/office/powerpoint/2010/main" val="2448514518"/>
+      </p:ext>
+    </p:extLst>
+  </p:cSld>
+  <p:clrMapOvr>
+    <a:masterClrMapping/>
+  </p:clrMapOvr>
+</p:notes>
+</file>
+
+<file path=ppt/notesSlides/notesSlide8.xml><?xml version="1.0" encoding="utf-8"?>
+<p:notes xmlns:a="http://schemas.openxmlformats.org/drawingml/2006/main" xmlns:r="http://schemas.openxmlformats.org/officeDocument/2006/relationships" xmlns:p="http://schemas.openxmlformats.org/presentationml/2006/main">
+  <p:cSld>
+    <p:spTree>
+      <p:nvGrpSpPr>
+        <p:cNvPr id="1" name=""/>
+        <p:cNvGrpSpPr/>
+        <p:nvPr/>
+      </p:nvGrpSpPr>
+      <p:grpSpPr>
+        <a:xfrm>
+          <a:off x="0" y="0"/>
+          <a:ext cx="0" cy="0"/>
+          <a:chOff x="0" y="0"/>
+          <a:chExt cx="0" cy="0"/>
+        </a:xfrm>
+      </p:grpSpPr>
+      <p:sp>
+        <p:nvSpPr>
+          <p:cNvPr id="2" name="Tijdelijke aanduiding voor dia-afbeelding 1"/>
+          <p:cNvSpPr>
+            <a:spLocks noGrp="1" noRot="1" noChangeAspect="1"/>
+          </p:cNvSpPr>
+          <p:nvPr>
+            <p:ph type="sldImg"/>
+          </p:nvPr>
+        </p:nvSpPr>
+        <p:spPr/>
+      </p:sp>
+      <p:sp>
+        <p:nvSpPr>
+          <p:cNvPr id="3" name="Tijdelijke aanduiding voor notities 2"/>
+          <p:cNvSpPr>
+            <a:spLocks noGrp="1"/>
+          </p:cNvSpPr>
+          <p:nvPr>
+            <p:ph type="body" idx="1"/>
+          </p:nvPr>
+        </p:nvSpPr>
+        <p:spPr/>
+        <p:txBody>
+          <a:bodyPr/>
+          <a:lstStyle/>
+          <a:p>
+            <a:endParaRPr lang="nl-NL" dirty="0"/>
+          </a:p>
+        </p:txBody>
+      </p:sp>
+      <p:sp>
+        <p:nvSpPr>
+          <p:cNvPr id="4" name="Tijdelijke aanduiding voor dianummer 3"/>
+          <p:cNvSpPr>
+            <a:spLocks noGrp="1"/>
+          </p:cNvSpPr>
+          <p:nvPr>
+            <p:ph type="sldNum" sz="quarter" idx="5"/>
+          </p:nvPr>
+        </p:nvSpPr>
+        <p:spPr/>
+        <p:txBody>
+          <a:bodyPr/>
+          <a:lstStyle/>
+          <a:p>
+            <a:fld id="{4970B036-1422-4C36-8158-C30E1C0769EB}" type="slidenum">
+              <a:rPr lang="nl-NL" smtClean="0"/>
+              <a:t>39</a:t>
+            </a:fld>
+            <a:endParaRPr lang="nl-NL"/>
+          </a:p>
+        </p:txBody>
+      </p:sp>
+    </p:spTree>
+    <p:extLst>
+      <p:ext uri="{BB962C8B-B14F-4D97-AF65-F5344CB8AC3E}">
+        <p14:creationId xmlns:p14="http://schemas.microsoft.com/office/powerpoint/2010/main" val="3795590368"/>
+      </p:ext>
+    </p:extLst>
+  </p:cSld>
+  <p:clrMapOvr>
+    <a:masterClrMapping/>
+  </p:clrMapOvr>
+</p:notes>
+</file>
+
+<file path=ppt/notesSlides/notesSlide9.xml><?xml version="1.0" encoding="utf-8"?>
+<p:notes xmlns:a="http://schemas.openxmlformats.org/drawingml/2006/main" xmlns:r="http://schemas.openxmlformats.org/officeDocument/2006/relationships" xmlns:p="http://schemas.openxmlformats.org/presentationml/2006/main">
+  <p:cSld>
+    <p:spTree>
+      <p:nvGrpSpPr>
+        <p:cNvPr id="1" name=""/>
+        <p:cNvGrpSpPr/>
+        <p:nvPr/>
+      </p:nvGrpSpPr>
+      <p:grpSpPr>
+        <a:xfrm>
+          <a:off x="0" y="0"/>
+          <a:ext cx="0" cy="0"/>
+          <a:chOff x="0" y="0"/>
+          <a:chExt cx="0" cy="0"/>
+        </a:xfrm>
+      </p:grpSpPr>
+      <p:sp>
+        <p:nvSpPr>
+          <p:cNvPr id="2" name="Tijdelijke aanduiding voor dia-afbeelding 1"/>
+          <p:cNvSpPr>
+            <a:spLocks noGrp="1" noRot="1" noChangeAspect="1"/>
+          </p:cNvSpPr>
+          <p:nvPr>
+            <p:ph type="sldImg"/>
+          </p:nvPr>
+        </p:nvSpPr>
+        <p:spPr/>
+      </p:sp>
+      <p:sp>
+        <p:nvSpPr>
+          <p:cNvPr id="3" name="Tijdelijke aanduiding voor notities 2"/>
+          <p:cNvSpPr>
+            <a:spLocks noGrp="1"/>
+          </p:cNvSpPr>
+          <p:nvPr>
+            <p:ph type="body" idx="1"/>
+          </p:nvPr>
+        </p:nvSpPr>
+        <p:spPr/>
+        <p:txBody>
+          <a:bodyPr/>
+          <a:lstStyle/>
+          <a:p>
+            <a:endParaRPr lang="nl-NL" dirty="0"/>
+          </a:p>
+        </p:txBody>
+      </p:sp>
+      <p:sp>
+        <p:nvSpPr>
+          <p:cNvPr id="4" name="Tijdelijke aanduiding voor dianummer 3"/>
+          <p:cNvSpPr>
+            <a:spLocks noGrp="1"/>
+          </p:cNvSpPr>
+          <p:nvPr>
+            <p:ph type="sldNum" sz="quarter" idx="5"/>
+          </p:nvPr>
+        </p:nvSpPr>
+        <p:spPr/>
+        <p:txBody>
+          <a:bodyPr/>
+          <a:lstStyle/>
+          <a:p>
+            <a:fld id="{4970B036-1422-4C36-8158-C30E1C0769EB}" type="slidenum">
+              <a:rPr lang="nl-NL" smtClean="0"/>
+              <a:t>57</a:t>
             </a:fld>
             <a:endParaRPr lang="nl-NL"/>
           </a:p>
@@ -28768,14 +29106,14 @@
           <a:p>
             <a:r>
               <a:rPr lang="en-US" dirty="0"/>
-              <a:t>Solution 5: custom query with HQL </a:t>
+              <a:t>Solution 5: custom query with JPQL </a:t>
             </a:r>
             <a:r>
               <a:rPr lang="en-US" dirty="0">
                 <a:latin typeface="Courier New" panose="02070309020205020404" pitchFamily="49" charset="0"/>
                 <a:cs typeface="Courier New" panose="02070309020205020404" pitchFamily="49" charset="0"/>
               </a:rPr>
-              <a:t>FETCH</a:t>
+              <a:t>JOIN FETCH</a:t>
             </a:r>
           </a:p>
         </p:txBody>
@@ -28925,11 +29263,11 @@
                 <a:latin typeface="Courier New" panose="02070309020205020404" pitchFamily="49" charset="0"/>
                 <a:cs typeface="Courier New" panose="02070309020205020404" pitchFamily="49" charset="0"/>
               </a:rPr>
-              <a:t>FETCH </a:t>
+              <a:t>JOIN FETCH </a:t>
             </a:r>
             <a:r>
               <a:rPr lang="en-US" dirty="0"/>
-              <a:t>with DTO projections</a:t>
+              <a:t>with projections</a:t>
             </a:r>
             <a:endParaRPr lang="en-US" dirty="0">
               <a:latin typeface="Courier New" panose="02070309020205020404" pitchFamily="49" charset="0"/>
@@ -28982,6 +29320,17 @@
             <a:r>
               <a:rPr lang="en-US" dirty="0"/>
               <a:t>for read-only datasets.</a:t>
+            </a:r>
+          </a:p>
+          <a:p>
+            <a:pPr>
+              <a:spcAft>
+                <a:spcPts val="600"/>
+              </a:spcAft>
+            </a:pPr>
+            <a:r>
+              <a:rPr lang="en-US" dirty="0"/>
+              <a:t>DTO = Data Transfer Object</a:t>
             </a:r>
           </a:p>
           <a:p>
@@ -29429,7 +29778,7 @@
         </p:spPr>
         <p:txBody>
           <a:bodyPr>
-            <a:normAutofit fontScale="92500" lnSpcReduction="10000"/>
+            <a:normAutofit/>
           </a:bodyPr>
           <a:lstStyle/>
           <a:p>
@@ -29451,7 +29800,7 @@
             </a:pPr>
             <a:r>
               <a:rPr lang="en-US" sz="2800" dirty="0"/>
-              <a:t>The incremental scripts can be tested on a QA server before being applied in production.</a:t>
+              <a:t>The incremental scripts can be included in your test setup.</a:t>
             </a:r>
           </a:p>
           <a:p>
@@ -29463,17 +29812,6 @@
             <a:r>
               <a:rPr lang="en-US" sz="2800" dirty="0"/>
               <a:t>Flexibility of writing your own migration logic.</a:t>
-            </a:r>
-          </a:p>
-          <a:p>
-            <a:pPr>
-              <a:spcAft>
-                <a:spcPts val="600"/>
-              </a:spcAft>
-            </a:pPr>
-            <a:r>
-              <a:rPr lang="en-US" sz="2800" dirty="0"/>
-              <a:t>There is no need for manual intervention since the scripts can be run by Flyway/Liquibase, hence it reduces the possibility of human error associated with running scripts manually.</a:t>
             </a:r>
           </a:p>
         </p:txBody>
@@ -30533,7 +30871,12 @@
             <p:ph type="body" sz="quarter" idx="10"/>
           </p:nvPr>
         </p:nvSpPr>
-        <p:spPr/>
+        <p:spPr>
+          <a:xfrm>
+            <a:off x="1296000" y="2016000"/>
+            <a:ext cx="9864000" cy="2524738"/>
+          </a:xfrm>
+        </p:spPr>
         <p:txBody>
           <a:bodyPr/>
           <a:lstStyle/>
@@ -30562,12 +30905,6 @@
               <a:rPr lang="en-US" dirty="0"/>
               <a:t>Lazy loading is prone to this issue.</a:t>
             </a:r>
-          </a:p>
-          <a:p>
-            <a:pPr marL="0" indent="0">
-              <a:buNone/>
-            </a:pPr>
-            <a:endParaRPr lang="nl-NL" dirty="0"/>
           </a:p>
         </p:txBody>
       </p:sp>
@@ -30681,7 +31018,7 @@
                 <a:latin typeface="Courier New" panose="02070309020205020404" pitchFamily="49" charset="0"/>
                 <a:cs typeface="Courier New" panose="02070309020205020404" pitchFamily="49" charset="0"/>
               </a:rPr>
-              <a:t>FETCH</a:t>
+              <a:t>JOIN FETCH</a:t>
             </a:r>
             <a:r>
               <a:rPr lang="en-US" dirty="0"/>
@@ -30709,7 +31046,7 @@
         <p:spPr>
           <a:xfrm>
             <a:off x="1296000" y="1566420"/>
-            <a:ext cx="9864000" cy="5458848"/>
+            <a:ext cx="9864000" cy="4631180"/>
           </a:xfrm>
         </p:spPr>
         <p:txBody>
@@ -30747,43 +31084,13 @@
             </a:pPr>
             <a:r>
               <a:rPr lang="en-US" sz="2800" dirty="0"/>
-              <a:t>When using </a:t>
+              <a:t>Careful! If you forget to “</a:t>
             </a:r>
             <a:r>
               <a:rPr lang="en-US" sz="2800" dirty="0">
                 <a:latin typeface="Courier New" panose="02070309020205020404" pitchFamily="49" charset="0"/>
                 <a:cs typeface="Courier New" panose="02070309020205020404" pitchFamily="49" charset="0"/>
               </a:rPr>
-              <a:t>FETCH JOIN </a:t>
-            </a:r>
-            <a:r>
-              <a:rPr lang="en-US" sz="2800" dirty="0"/>
-              <a:t>we generate a new problem: </a:t>
-            </a:r>
-            <a:r>
-              <a:rPr lang="en-US" sz="2800" i="1" dirty="0"/>
-              <a:t>The cartesian product problem</a:t>
-            </a:r>
-            <a:r>
-              <a:rPr lang="en-US" sz="2800" dirty="0"/>
-              <a:t>.</a:t>
-            </a:r>
-          </a:p>
-          <a:p>
-            <a:pPr>
-              <a:spcAft>
-                <a:spcPts val="600"/>
-              </a:spcAft>
-            </a:pPr>
-            <a:r>
-              <a:rPr lang="en-US" sz="2800" dirty="0"/>
-              <a:t>If you forget to “</a:t>
-            </a:r>
-            <a:r>
-              <a:rPr lang="en-US" sz="2800" dirty="0">
-                <a:latin typeface="Courier New" panose="02070309020205020404" pitchFamily="49" charset="0"/>
-                <a:cs typeface="Courier New" panose="02070309020205020404" pitchFamily="49" charset="0"/>
-              </a:rPr>
               <a:t>JOIN FETCH</a:t>
             </a:r>
             <a:r>
@@ -30798,13 +31105,6 @@
               <a:rPr lang="en-US" sz="2800" dirty="0"/>
               <a:t>).</a:t>
             </a:r>
-          </a:p>
-          <a:p>
-            <a:pPr>
-              <a:spcAft>
-                <a:spcPts val="600"/>
-              </a:spcAft>
-            </a:pPr>
             <a:endParaRPr lang="en-US" sz="2800" dirty="0">
               <a:solidFill>
                 <a:srgbClr val="FF0000"/>
@@ -30817,7 +31117,29 @@
                 <a:spcPts val="600"/>
               </a:spcAft>
             </a:pPr>
-            <a:endParaRPr lang="en-US" sz="2800" dirty="0"/>
+            <a:r>
+              <a:rPr lang="en-US" sz="2800" dirty="0"/>
+              <a:t>When using </a:t>
+            </a:r>
+            <a:r>
+              <a:rPr lang="en-US" sz="2800" dirty="0">
+                <a:latin typeface="Courier New" panose="02070309020205020404" pitchFamily="49" charset="0"/>
+                <a:cs typeface="Courier New" panose="02070309020205020404" pitchFamily="49" charset="0"/>
+              </a:rPr>
+              <a:t>JOIN FETCH </a:t>
+            </a:r>
+            <a:r>
+              <a:rPr lang="en-US" sz="2800" dirty="0"/>
+              <a:t>we create a new problem: </a:t>
+            </a:r>
+            <a:r>
+              <a:rPr lang="en-US" sz="2800" i="1" dirty="0"/>
+              <a:t>The cartesian product problem</a:t>
+            </a:r>
+            <a:r>
+              <a:rPr lang="en-US" sz="2800" dirty="0"/>
+              <a:t>.</a:t>
+            </a:r>
           </a:p>
         </p:txBody>
       </p:sp>
@@ -30836,7 +31158,7 @@
           <p:nvPr/>
         </p:nvPicPr>
         <p:blipFill>
-          <a:blip r:embed="rId2">
+          <a:blip r:embed="rId3">
             <a:extLst>
               <a:ext uri="{28A0092B-C50C-407E-A947-70E740481C1C}">
                 <a14:useLocalDpi xmlns:a14="http://schemas.microsoft.com/office/drawing/2010/main" val="0"/>
@@ -30952,7 +31274,7 @@
         <p:spPr>
           <a:xfrm>
             <a:off x="1296000" y="1566420"/>
-            <a:ext cx="9864000" cy="4171440"/>
+            <a:ext cx="9864000" cy="4571580"/>
           </a:xfrm>
         </p:spPr>
         <p:txBody>
@@ -30967,10 +31289,6 @@
               </a:spcAft>
             </a:pPr>
             <a:r>
-              <a:rPr lang="en-US" sz="2800" dirty="0"/>
-              <a:t>Too many </a:t>
-            </a:r>
-            <a:r>
               <a:rPr lang="en-US" sz="2800" dirty="0">
                 <a:latin typeface="Courier New" panose="02070309020205020404" pitchFamily="49" charset="0"/>
                 <a:cs typeface="Courier New" panose="02070309020205020404" pitchFamily="49" charset="0"/>
@@ -30979,7 +31297,7 @@
             </a:r>
             <a:r>
               <a:rPr lang="en-US" sz="2800" dirty="0"/>
-              <a:t>s lead to big datasets and duplicate results.</a:t>
+              <a:t>s lead to big datasets.</a:t>
             </a:r>
           </a:p>
           <a:p>
@@ -30989,38 +31307,135 @@
               </a:spcAft>
             </a:pPr>
             <a:r>
+              <a:rPr lang="en-US" sz="2800" dirty="0">
+                <a:latin typeface="Courier New" panose="02070309020205020404" pitchFamily="49" charset="0"/>
+                <a:cs typeface="Courier New" panose="02070309020205020404" pitchFamily="49" charset="0"/>
+              </a:rPr>
+              <a:t>JOIN</a:t>
+            </a:r>
+            <a:r>
+              <a:rPr lang="en-US" dirty="0"/>
+              <a:t>s</a:t>
+            </a:r>
+            <a:r>
               <a:rPr lang="en-US" sz="2800" dirty="0"/>
-              <a:t>Performance problems: Hibernate needs to read and</a:t>
-            </a:r>
-            <a:br>
-              <a:rPr lang="en-US" sz="2800" dirty="0"/>
-            </a:br>
-            <a:r>
-              <a:rPr lang="en-US" sz="2800" dirty="0"/>
-              <a:t>de-duplicate all data.</a:t>
-            </a:r>
-          </a:p>
-          <a:p>
-            <a:pPr>
+              <a:t> lead to a data set with duplicates.</a:t>
+            </a:r>
+          </a:p>
+          <a:p>
+            <a:pPr lvl="1">
               <a:spcAft>
                 <a:spcPts val="600"/>
               </a:spcAft>
             </a:pPr>
             <a:r>
-              <a:rPr lang="en-US" sz="2800" dirty="0"/>
-              <a:t>Solution: Fetch associations independently (be careful for the N+1 problem) or use </a:t>
-            </a:r>
-            <a:r>
-              <a:rPr lang="en-US" sz="2800" dirty="0">
+              <a:rPr lang="en-US" sz="2400" dirty="0"/>
+              <a:t>Solution 1: </a:t>
+            </a:r>
+            <a:r>
+              <a:rPr lang="en-US" sz="2200" dirty="0"/>
+              <a:t>Fetch associations independently.</a:t>
+            </a:r>
+          </a:p>
+          <a:p>
+            <a:pPr lvl="2">
+              <a:spcAft>
+                <a:spcPts val="600"/>
+              </a:spcAft>
+            </a:pPr>
+            <a:r>
+              <a:rPr lang="en-US" sz="2200" dirty="0"/>
+              <a:t>Downside: the N+1 problem is back.</a:t>
+            </a:r>
+          </a:p>
+          <a:p>
+            <a:pPr lvl="1">
+              <a:spcAft>
+                <a:spcPts val="600"/>
+              </a:spcAft>
+            </a:pPr>
+            <a:r>
+              <a:rPr lang="en-US" sz="2400" dirty="0"/>
+              <a:t>Solution 2: Use </a:t>
+            </a:r>
+            <a:r>
+              <a:rPr lang="en-US" sz="2400" dirty="0">
                 <a:latin typeface="Courier New" panose="02070309020205020404" pitchFamily="49" charset="0"/>
                 <a:cs typeface="Courier New" panose="02070309020205020404" pitchFamily="49" charset="0"/>
               </a:rPr>
               <a:t>DISTINCT</a:t>
             </a:r>
             <a:r>
-              <a:rPr lang="en-US" sz="2800" dirty="0"/>
+              <a:rPr lang="en-US" dirty="0"/>
               <a:t>.</a:t>
             </a:r>
+            <a:endParaRPr lang="en-US" sz="2400" dirty="0"/>
+          </a:p>
+          <a:p>
+            <a:pPr lvl="2">
+              <a:spcAft>
+                <a:spcPts val="600"/>
+              </a:spcAft>
+            </a:pPr>
+            <a:r>
+              <a:rPr lang="en-US" sz="2200" dirty="0"/>
+              <a:t>Downside: Hibernate will de-duplicate all data in memory (</a:t>
+            </a:r>
+            <a:r>
+              <a:rPr lang="en-US" sz="2200" dirty="0" err="1">
+                <a:latin typeface="Courier New" panose="02070309020205020404" pitchFamily="49" charset="0"/>
+                <a:cs typeface="Courier New" panose="02070309020205020404" pitchFamily="49" charset="0"/>
+              </a:rPr>
+              <a:t>QueryTranslatorImpl</a:t>
+            </a:r>
+            <a:r>
+              <a:rPr lang="en-US" sz="2200" dirty="0">
+                <a:latin typeface="Courier New" panose="02070309020205020404" pitchFamily="49" charset="0"/>
+                <a:cs typeface="Courier New" panose="02070309020205020404" pitchFamily="49" charset="0"/>
+              </a:rPr>
+              <a:t> </a:t>
+            </a:r>
+            <a:r>
+              <a:rPr lang="en-US" sz="2200" dirty="0" err="1">
+                <a:latin typeface="Courier New" panose="02070309020205020404" pitchFamily="49" charset="0"/>
+                <a:cs typeface="Courier New" panose="02070309020205020404" pitchFamily="49" charset="0"/>
+              </a:rPr>
+              <a:t>needsDistincting</a:t>
+            </a:r>
+            <a:r>
+              <a:rPr lang="en-US" sz="2200" dirty="0"/>
+              <a:t>).</a:t>
+            </a:r>
+          </a:p>
+          <a:p>
+            <a:pPr lvl="2">
+              <a:spcAft>
+                <a:spcPts val="600"/>
+              </a:spcAft>
+            </a:pPr>
+            <a:r>
+              <a:rPr lang="en-US" sz="2200" dirty="0"/>
+              <a:t>Downside: Hibernate will pass </a:t>
+            </a:r>
+            <a:r>
+              <a:rPr lang="en-US" sz="2200" dirty="0">
+                <a:latin typeface="Courier New" panose="02070309020205020404" pitchFamily="49" charset="0"/>
+                <a:cs typeface="Courier New" panose="02070309020205020404" pitchFamily="49" charset="0"/>
+              </a:rPr>
+              <a:t>DISTINCT</a:t>
+            </a:r>
+            <a:r>
+              <a:rPr lang="en-US" sz="2200" dirty="0"/>
+              <a:t> through to the SQL query even when not needed.</a:t>
+            </a:r>
+          </a:p>
+          <a:p>
+            <a:pPr lvl="2">
+              <a:spcAft>
+                <a:spcPts val="600"/>
+              </a:spcAft>
+            </a:pPr>
+            <a:endParaRPr lang="en-US" sz="2200" dirty="0"/>
           </a:p>
           <a:p>
             <a:pPr lvl="1">
@@ -31038,53 +31453,6 @@
             <a:extLst>
               <a:ext uri="{FF2B5EF4-FFF2-40B4-BE49-F238E27FC236}">
                 <a16:creationId xmlns:a16="http://schemas.microsoft.com/office/drawing/2014/main" id="{ED64D180-0547-4366-BB5C-0393EF8728AB}"/>
-              </a:ext>
-            </a:extLst>
-          </p:cNvPr>
-          <p:cNvPicPr>
-            <a:picLocks noChangeAspect="1" noChangeArrowheads="1"/>
-          </p:cNvPicPr>
-          <p:nvPr/>
-        </p:nvPicPr>
-        <p:blipFill>
-          <a:blip r:embed="rId2">
-            <a:extLst>
-              <a:ext uri="{28A0092B-C50C-407E-A947-70E740481C1C}">
-                <a14:useLocalDpi xmlns:a14="http://schemas.microsoft.com/office/drawing/2010/main" val="0"/>
-              </a:ext>
-            </a:extLst>
-          </a:blip>
-          <a:srcRect/>
-          <a:stretch>
-            <a:fillRect/>
-          </a:stretch>
-        </p:blipFill>
-        <p:spPr bwMode="auto">
-          <a:xfrm>
-            <a:off x="10059668" y="5661520"/>
-            <a:ext cx="1923011" cy="952959"/>
-          </a:xfrm>
-          <a:prstGeom prst="rect">
-            <a:avLst/>
-          </a:prstGeom>
-          <a:noFill/>
-          <a:extLst>
-            <a:ext uri="{909E8E84-426E-40DD-AFC4-6F175D3DCCD1}">
-              <a14:hiddenFill xmlns:a14="http://schemas.microsoft.com/office/drawing/2010/main">
-                <a:solidFill>
-                  <a:srgbClr val="FFFFFF"/>
-                </a:solidFill>
-              </a14:hiddenFill>
-            </a:ext>
-          </a:extLst>
-        </p:spPr>
-      </p:pic>
-      <p:pic>
-        <p:nvPicPr>
-          <p:cNvPr id="1026" name="Picture 2" descr="Table with records presenting Cartesian Product result">
-            <a:extLst>
-              <a:ext uri="{FF2B5EF4-FFF2-40B4-BE49-F238E27FC236}">
-                <a16:creationId xmlns:a16="http://schemas.microsoft.com/office/drawing/2014/main" id="{2B2D789C-6ADA-4B39-9E16-90179605B616}"/>
               </a:ext>
             </a:extLst>
           </p:cNvPr>
@@ -31108,8 +31476,8 @@
         </p:blipFill>
         <p:spPr bwMode="auto">
           <a:xfrm>
-            <a:off x="4539301" y="4341453"/>
-            <a:ext cx="3380057" cy="2323789"/>
+            <a:off x="10059668" y="5661520"/>
+            <a:ext cx="1923011" cy="952959"/>
           </a:xfrm>
           <a:prstGeom prst="rect">
             <a:avLst/>
@@ -31158,10 +31526,10 @@
       </p:grpSpPr>
       <p:sp>
         <p:nvSpPr>
-          <p:cNvPr id="2" name="Titel 1">
+          <p:cNvPr id="11" name="Title 1">
             <a:extLst>
               <a:ext uri="{FF2B5EF4-FFF2-40B4-BE49-F238E27FC236}">
-                <a16:creationId xmlns:a16="http://schemas.microsoft.com/office/drawing/2014/main" id="{05B55862-4B05-4C16-B01F-3FA0CB002DB3}"/>
+                <a16:creationId xmlns:a16="http://schemas.microsoft.com/office/drawing/2014/main" id="{51612DA1-DB43-7E72-A4EA-4B95C807605F}"/>
               </a:ext>
             </a:extLst>
           </p:cNvPr>
@@ -31172,74 +31540,512 @@
             <p:ph type="title"/>
           </p:nvPr>
         </p:nvSpPr>
-        <p:spPr/>
+        <p:spPr>
+          <a:xfrm>
+            <a:off x="1296000" y="720000"/>
+            <a:ext cx="9864000" cy="681480"/>
+          </a:xfrm>
+        </p:spPr>
         <p:txBody>
-          <a:bodyPr/>
+          <a:bodyPr anchor="t">
+            <a:normAutofit fontScale="90000"/>
+          </a:bodyPr>
           <a:lstStyle/>
           <a:p>
             <a:r>
-              <a:rPr lang="nl-BE" dirty="0" err="1"/>
-              <a:t>Cartesian</a:t>
-            </a:r>
-            <a:r>
-              <a:rPr lang="nl-BE" dirty="0"/>
-              <a:t> product </a:t>
-            </a:r>
-            <a:r>
-              <a:rPr lang="nl-BE" dirty="0" err="1"/>
-              <a:t>problem</a:t>
-            </a:r>
-            <a:endParaRPr lang="nl-NL" dirty="0"/>
+              <a:rPr lang="en-US" sz="4000" dirty="0"/>
+              <a:t>Hibernate will pass </a:t>
+            </a:r>
+            <a:r>
+              <a:rPr lang="en-US" sz="4000" dirty="0">
+                <a:latin typeface="Courier New" panose="02070309020205020404" pitchFamily="49" charset="0"/>
+                <a:cs typeface="Courier New" panose="02070309020205020404" pitchFamily="49" charset="0"/>
+              </a:rPr>
+              <a:t>DISTINCT</a:t>
+            </a:r>
+            <a:r>
+              <a:rPr lang="en-US" sz="4000" dirty="0"/>
+              <a:t> through to the query even when not needed</a:t>
+            </a:r>
+            <a:br>
+              <a:rPr lang="en-US" sz="4000" dirty="0"/>
+            </a:br>
+            <a:endParaRPr lang="en-US" dirty="0"/>
           </a:p>
         </p:txBody>
       </p:sp>
+      <p:pic>
+        <p:nvPicPr>
+          <p:cNvPr id="4" name="Picture 2" descr="22,947 Demo Foto's, Afbeeldingen en Stock Fotografie - 123RF">
+            <a:extLst>
+              <a:ext uri="{FF2B5EF4-FFF2-40B4-BE49-F238E27FC236}">
+                <a16:creationId xmlns:a16="http://schemas.microsoft.com/office/drawing/2014/main" id="{ED64D180-0547-4366-BB5C-0393EF8728AB}"/>
+              </a:ext>
+            </a:extLst>
+          </p:cNvPr>
+          <p:cNvPicPr>
+            <a:picLocks noChangeAspect="1" noChangeArrowheads="1"/>
+          </p:cNvPicPr>
+          <p:nvPr/>
+        </p:nvPicPr>
+        <p:blipFill>
+          <a:blip r:embed="rId3">
+            <a:extLst>
+              <a:ext uri="{28A0092B-C50C-407E-A947-70E740481C1C}">
+                <a14:useLocalDpi xmlns:a14="http://schemas.microsoft.com/office/drawing/2010/main" val="0"/>
+              </a:ext>
+            </a:extLst>
+          </a:blip>
+          <a:srcRect/>
+          <a:stretch>
+            <a:fillRect/>
+          </a:stretch>
+        </p:blipFill>
+        <p:spPr bwMode="auto">
+          <a:xfrm>
+            <a:off x="10059668" y="5661520"/>
+            <a:ext cx="1923011" cy="952959"/>
+          </a:xfrm>
+          <a:prstGeom prst="rect">
+            <a:avLst/>
+          </a:prstGeom>
+          <a:noFill/>
+          <a:extLst>
+            <a:ext uri="{909E8E84-426E-40DD-AFC4-6F175D3DCCD1}">
+              <a14:hiddenFill xmlns:a14="http://schemas.microsoft.com/office/drawing/2010/main">
+                <a:solidFill>
+                  <a:srgbClr val="FFFFFF"/>
+                </a:solidFill>
+              </a14:hiddenFill>
+            </a:ext>
+          </a:extLst>
+        </p:spPr>
+      </p:pic>
       <p:sp>
         <p:nvSpPr>
-          <p:cNvPr id="3" name="Tijdelijke aanduiding voor tekst 2">
+          <p:cNvPr id="5" name="Rectangle 2">
             <a:extLst>
               <a:ext uri="{FF2B5EF4-FFF2-40B4-BE49-F238E27FC236}">
-                <a16:creationId xmlns:a16="http://schemas.microsoft.com/office/drawing/2014/main" id="{8B3F77EB-4E55-4CD2-91C4-1539E78AB8B6}"/>
+                <a16:creationId xmlns:a16="http://schemas.microsoft.com/office/drawing/2014/main" id="{3FA394F8-B537-4470-AB3A-05A8225E80CA}"/>
               </a:ext>
             </a:extLst>
           </p:cNvPr>
           <p:cNvSpPr>
-            <a:spLocks noGrp="1"/>
+            <a:spLocks noChangeArrowheads="1"/>
           </p:cNvSpPr>
-          <p:nvPr>
-            <p:ph type="body" sz="quarter" idx="10"/>
-          </p:nvPr>
+          <p:nvPr/>
         </p:nvSpPr>
-        <p:spPr/>
+        <p:spPr bwMode="auto">
+          <a:xfrm>
+            <a:off x="986228" y="2551837"/>
+            <a:ext cx="9237564" cy="1754326"/>
+          </a:xfrm>
+          <a:prstGeom prst="rect">
+            <a:avLst/>
+          </a:prstGeom>
+          <a:solidFill>
+            <a:srgbClr val="FFFFFF"/>
+          </a:solidFill>
+          <a:ln>
+            <a:noFill/>
+          </a:ln>
+          <a:effectLst/>
+          <a:extLst>
+            <a:ext uri="{91240B29-F687-4F45-9708-019B960494DF}">
+              <a14:hiddenLine xmlns:a14="http://schemas.microsoft.com/office/drawing/2010/main" w="9525">
+                <a:solidFill>
+                  <a:schemeClr val="tx1"/>
+                </a:solidFill>
+                <a:miter lim="800000"/>
+                <a:headEnd/>
+                <a:tailEnd/>
+              </a14:hiddenLine>
+            </a:ext>
+            <a:ext uri="{AF507438-7753-43E0-B8FC-AC1667EBCBE1}">
+              <a14:hiddenEffects xmlns:a14="http://schemas.microsoft.com/office/drawing/2010/main">
+                <a:effectLst>
+                  <a:outerShdw dist="35921" dir="2700000" algn="ctr" rotWithShape="0">
+                    <a:schemeClr val="bg2"/>
+                  </a:outerShdw>
+                </a:effectLst>
+              </a14:hiddenEffects>
+            </a:ext>
+          </a:extLst>
+        </p:spPr>
         <p:txBody>
-          <a:bodyPr/>
+          <a:bodyPr vert="horz" wrap="square" lIns="91440" tIns="45720" rIns="91440" bIns="45720" numCol="1" anchor="ctr" anchorCtr="0" compatLnSpc="1">
+            <a:prstTxWarp prst="textNoShape">
+              <a:avLst/>
+            </a:prstTxWarp>
+            <a:spAutoFit/>
+          </a:bodyPr>
           <a:lstStyle/>
           <a:p>
-            <a:r>
-              <a:rPr lang="nl-BE" dirty="0"/>
-              <a:t>For more info </a:t>
-            </a:r>
-            <a:r>
-              <a:rPr lang="nl-BE" dirty="0" err="1"/>
-              <a:t>see</a:t>
-            </a:r>
-            <a:r>
-              <a:rPr lang="nl-BE" dirty="0"/>
-              <a:t>:</a:t>
-            </a:r>
-          </a:p>
-          <a:p>
-            <a:pPr lvl="1"/>
-            <a:r>
-              <a:rPr lang="nl-BE" dirty="0"/>
-              <a:t>https://developer.jboss.org/docs/DOC-15782#jive_content_id_Hibernate_does_not_return_distinct_results_for_a_query_with_outer_join_fetching_enabled_for_a_collection_even_if_I_use_the_distinct_keyword</a:t>
-            </a:r>
+            <a:pPr marL="0" marR="0" lvl="0" indent="0" algn="l" defTabSz="914400" rtl="0" eaLnBrk="0" fontAlgn="base" latinLnBrk="0" hangingPunct="0">
+              <a:lnSpc>
+                <a:spcPct val="100000"/>
+              </a:lnSpc>
+              <a:spcBef>
+                <a:spcPct val="0"/>
+              </a:spcBef>
+              <a:spcAft>
+                <a:spcPct val="0"/>
+              </a:spcAft>
+              <a:buClrTx/>
+              <a:buSzTx/>
+              <a:buFontTx/>
+              <a:buNone/>
+              <a:tabLst/>
+            </a:pPr>
+            <a:r>
+              <a:rPr kumimoji="0" lang="nl-NL" altLang="nl-NL" b="0" i="0" u="none" strike="noStrike" cap="none" normalizeH="0" baseline="0" dirty="0">
+                <a:ln>
+                  <a:noFill/>
+                </a:ln>
+                <a:solidFill>
+                  <a:srgbClr val="9E880D"/>
+                </a:solidFill>
+                <a:effectLst/>
+                <a:latin typeface="Courier New" panose="02070309020205020404" pitchFamily="49" charset="0"/>
+                <a:cs typeface="Courier New" panose="02070309020205020404" pitchFamily="49" charset="0"/>
+              </a:rPr>
+              <a:t>@QueryHints</a:t>
+            </a:r>
+            <a:r>
+              <a:rPr kumimoji="0" lang="nl-NL" altLang="nl-NL" b="0" i="0" u="none" strike="noStrike" cap="none" normalizeH="0" baseline="0" dirty="0">
+                <a:ln>
+                  <a:noFill/>
+                </a:ln>
+                <a:solidFill>
+                  <a:srgbClr val="080808"/>
+                </a:solidFill>
+                <a:effectLst/>
+                <a:latin typeface="Courier New" panose="02070309020205020404" pitchFamily="49" charset="0"/>
+                <a:cs typeface="Courier New" panose="02070309020205020404" pitchFamily="49" charset="0"/>
+              </a:rPr>
+              <a:t>({</a:t>
+            </a:r>
+            <a:br>
+              <a:rPr kumimoji="0" lang="nl-NL" altLang="nl-NL" b="0" i="0" u="none" strike="noStrike" cap="none" normalizeH="0" baseline="0" dirty="0">
+                <a:ln>
+                  <a:noFill/>
+                </a:ln>
+                <a:solidFill>
+                  <a:srgbClr val="080808"/>
+                </a:solidFill>
+                <a:effectLst/>
+                <a:latin typeface="Courier New" panose="02070309020205020404" pitchFamily="49" charset="0"/>
+                <a:cs typeface="Courier New" panose="02070309020205020404" pitchFamily="49" charset="0"/>
+              </a:rPr>
+            </a:br>
+            <a:r>
+              <a:rPr kumimoji="0" lang="nl-NL" altLang="nl-NL" b="0" i="0" u="none" strike="noStrike" cap="none" normalizeH="0" baseline="0" dirty="0">
+                <a:ln>
+                  <a:noFill/>
+                </a:ln>
+                <a:solidFill>
+                  <a:srgbClr val="080808"/>
+                </a:solidFill>
+                <a:effectLst/>
+                <a:latin typeface="Courier New" panose="02070309020205020404" pitchFamily="49" charset="0"/>
+                <a:cs typeface="Courier New" panose="02070309020205020404" pitchFamily="49" charset="0"/>
+              </a:rPr>
+              <a:t>    </a:t>
+            </a:r>
+            <a:r>
+              <a:rPr kumimoji="0" lang="nl-NL" altLang="nl-NL" b="0" i="0" u="none" strike="noStrike" cap="none" normalizeH="0" baseline="0" dirty="0">
+                <a:ln>
+                  <a:noFill/>
+                </a:ln>
+                <a:solidFill>
+                  <a:srgbClr val="9E880D"/>
+                </a:solidFill>
+                <a:effectLst/>
+                <a:latin typeface="Courier New" panose="02070309020205020404" pitchFamily="49" charset="0"/>
+                <a:cs typeface="Courier New" panose="02070309020205020404" pitchFamily="49" charset="0"/>
+              </a:rPr>
+              <a:t>@QueryHint</a:t>
+            </a:r>
+            <a:r>
+              <a:rPr kumimoji="0" lang="nl-NL" altLang="nl-NL" b="0" i="0" u="none" strike="noStrike" cap="none" normalizeH="0" baseline="0" dirty="0">
+                <a:ln>
+                  <a:noFill/>
+                </a:ln>
+                <a:solidFill>
+                  <a:srgbClr val="080808"/>
+                </a:solidFill>
+                <a:effectLst/>
+                <a:latin typeface="Courier New" panose="02070309020205020404" pitchFamily="49" charset="0"/>
+                <a:cs typeface="Courier New" panose="02070309020205020404" pitchFamily="49" charset="0"/>
+              </a:rPr>
+              <a:t>(</a:t>
+            </a:r>
+            <a:br>
+              <a:rPr kumimoji="0" lang="nl-NL" altLang="nl-NL" b="0" i="0" u="none" strike="noStrike" cap="none" normalizeH="0" baseline="0" dirty="0">
+                <a:ln>
+                  <a:noFill/>
+                </a:ln>
+                <a:solidFill>
+                  <a:srgbClr val="080808"/>
+                </a:solidFill>
+                <a:effectLst/>
+                <a:latin typeface="Courier New" panose="02070309020205020404" pitchFamily="49" charset="0"/>
+                <a:cs typeface="Courier New" panose="02070309020205020404" pitchFamily="49" charset="0"/>
+              </a:rPr>
+            </a:br>
+            <a:r>
+              <a:rPr kumimoji="0" lang="nl-NL" altLang="nl-NL" b="0" i="0" u="none" strike="noStrike" cap="none" normalizeH="0" baseline="0" dirty="0">
+                <a:ln>
+                  <a:noFill/>
+                </a:ln>
+                <a:solidFill>
+                  <a:srgbClr val="080808"/>
+                </a:solidFill>
+                <a:effectLst/>
+                <a:latin typeface="Courier New" panose="02070309020205020404" pitchFamily="49" charset="0"/>
+                <a:cs typeface="Courier New" panose="02070309020205020404" pitchFamily="49" charset="0"/>
+              </a:rPr>
+              <a:t>        name = </a:t>
+            </a:r>
+            <a:r>
+              <a:rPr kumimoji="0" lang="nl-NL" altLang="nl-NL" b="0" i="0" u="none" strike="noStrike" cap="none" normalizeH="0" baseline="0" dirty="0">
+                <a:ln>
+                  <a:noFill/>
+                </a:ln>
+                <a:solidFill>
+                  <a:srgbClr val="067D17"/>
+                </a:solidFill>
+                <a:effectLst/>
+                <a:latin typeface="Courier New" panose="02070309020205020404" pitchFamily="49" charset="0"/>
+                <a:cs typeface="Courier New" panose="02070309020205020404" pitchFamily="49" charset="0"/>
+              </a:rPr>
+              <a:t>"</a:t>
+            </a:r>
+            <a:r>
+              <a:rPr kumimoji="0" lang="nl-NL" altLang="nl-NL" b="0" i="0" u="none" strike="noStrike" cap="none" normalizeH="0" baseline="0" dirty="0" err="1">
+                <a:ln>
+                  <a:noFill/>
+                </a:ln>
+                <a:solidFill>
+                  <a:srgbClr val="067D17"/>
+                </a:solidFill>
+                <a:effectLst/>
+                <a:latin typeface="Courier New" panose="02070309020205020404" pitchFamily="49" charset="0"/>
+                <a:cs typeface="Courier New" panose="02070309020205020404" pitchFamily="49" charset="0"/>
+              </a:rPr>
+              <a:t>hibernate.query.passDistinctThrough</a:t>
+            </a:r>
+            <a:r>
+              <a:rPr kumimoji="0" lang="nl-NL" altLang="nl-NL" b="0" i="0" u="none" strike="noStrike" cap="none" normalizeH="0" baseline="0" dirty="0">
+                <a:ln>
+                  <a:noFill/>
+                </a:ln>
+                <a:solidFill>
+                  <a:srgbClr val="067D17"/>
+                </a:solidFill>
+                <a:effectLst/>
+                <a:latin typeface="Courier New" panose="02070309020205020404" pitchFamily="49" charset="0"/>
+                <a:cs typeface="Courier New" panose="02070309020205020404" pitchFamily="49" charset="0"/>
+              </a:rPr>
+              <a:t>"</a:t>
+            </a:r>
+            <a:r>
+              <a:rPr kumimoji="0" lang="nl-NL" altLang="nl-NL" b="0" i="0" u="none" strike="noStrike" cap="none" normalizeH="0" baseline="0" dirty="0">
+                <a:ln>
+                  <a:noFill/>
+                </a:ln>
+                <a:solidFill>
+                  <a:srgbClr val="080808"/>
+                </a:solidFill>
+                <a:effectLst/>
+                <a:latin typeface="Courier New" panose="02070309020205020404" pitchFamily="49" charset="0"/>
+                <a:cs typeface="Courier New" panose="02070309020205020404" pitchFamily="49" charset="0"/>
+              </a:rPr>
+              <a:t>,</a:t>
+            </a:r>
+            <a:br>
+              <a:rPr kumimoji="0" lang="nl-NL" altLang="nl-NL" b="0" i="0" u="none" strike="noStrike" cap="none" normalizeH="0" baseline="0" dirty="0">
+                <a:ln>
+                  <a:noFill/>
+                </a:ln>
+                <a:solidFill>
+                  <a:srgbClr val="080808"/>
+                </a:solidFill>
+                <a:effectLst/>
+                <a:latin typeface="Courier New" panose="02070309020205020404" pitchFamily="49" charset="0"/>
+                <a:cs typeface="Courier New" panose="02070309020205020404" pitchFamily="49" charset="0"/>
+              </a:rPr>
+            </a:br>
+            <a:r>
+              <a:rPr kumimoji="0" lang="nl-NL" altLang="nl-NL" b="0" i="0" u="none" strike="noStrike" cap="none" normalizeH="0" baseline="0" dirty="0">
+                <a:ln>
+                  <a:noFill/>
+                </a:ln>
+                <a:solidFill>
+                  <a:srgbClr val="080808"/>
+                </a:solidFill>
+                <a:effectLst/>
+                <a:latin typeface="Courier New" panose="02070309020205020404" pitchFamily="49" charset="0"/>
+                <a:cs typeface="Courier New" panose="02070309020205020404" pitchFamily="49" charset="0"/>
+              </a:rPr>
+              <a:t>        </a:t>
+            </a:r>
+            <a:r>
+              <a:rPr kumimoji="0" lang="nl-NL" altLang="nl-NL" b="0" i="0" u="none" strike="noStrike" cap="none" normalizeH="0" baseline="0" dirty="0" err="1">
+                <a:ln>
+                  <a:noFill/>
+                </a:ln>
+                <a:solidFill>
+                  <a:srgbClr val="080808"/>
+                </a:solidFill>
+                <a:effectLst/>
+                <a:latin typeface="Courier New" panose="02070309020205020404" pitchFamily="49" charset="0"/>
+                <a:cs typeface="Courier New" panose="02070309020205020404" pitchFamily="49" charset="0"/>
+              </a:rPr>
+              <a:t>value</a:t>
+            </a:r>
+            <a:r>
+              <a:rPr kumimoji="0" lang="nl-NL" altLang="nl-NL" b="0" i="0" u="none" strike="noStrike" cap="none" normalizeH="0" baseline="0" dirty="0">
+                <a:ln>
+                  <a:noFill/>
+                </a:ln>
+                <a:solidFill>
+                  <a:srgbClr val="080808"/>
+                </a:solidFill>
+                <a:effectLst/>
+                <a:latin typeface="Courier New" panose="02070309020205020404" pitchFamily="49" charset="0"/>
+                <a:cs typeface="Courier New" panose="02070309020205020404" pitchFamily="49" charset="0"/>
+              </a:rPr>
+              <a:t> = </a:t>
+            </a:r>
+            <a:r>
+              <a:rPr kumimoji="0" lang="nl-NL" altLang="nl-NL" b="0" i="0" u="none" strike="noStrike" cap="none" normalizeH="0" baseline="0" dirty="0">
+                <a:ln>
+                  <a:noFill/>
+                </a:ln>
+                <a:solidFill>
+                  <a:srgbClr val="067D17"/>
+                </a:solidFill>
+                <a:effectLst/>
+                <a:latin typeface="Courier New" panose="02070309020205020404" pitchFamily="49" charset="0"/>
+                <a:cs typeface="Courier New" panose="02070309020205020404" pitchFamily="49" charset="0"/>
+              </a:rPr>
+              <a:t>"</a:t>
+            </a:r>
+            <a:r>
+              <a:rPr kumimoji="0" lang="nl-NL" altLang="nl-NL" b="0" i="0" u="none" strike="noStrike" cap="none" normalizeH="0" baseline="0" dirty="0" err="1">
+                <a:ln>
+                  <a:noFill/>
+                </a:ln>
+                <a:solidFill>
+                  <a:srgbClr val="067D17"/>
+                </a:solidFill>
+                <a:effectLst/>
+                <a:latin typeface="Courier New" panose="02070309020205020404" pitchFamily="49" charset="0"/>
+                <a:cs typeface="Courier New" panose="02070309020205020404" pitchFamily="49" charset="0"/>
+              </a:rPr>
+              <a:t>false</a:t>
+            </a:r>
+            <a:r>
+              <a:rPr kumimoji="0" lang="nl-NL" altLang="nl-NL" b="0" i="0" u="none" strike="noStrike" cap="none" normalizeH="0" baseline="0" dirty="0">
+                <a:ln>
+                  <a:noFill/>
+                </a:ln>
+                <a:solidFill>
+                  <a:srgbClr val="067D17"/>
+                </a:solidFill>
+                <a:effectLst/>
+                <a:latin typeface="Courier New" panose="02070309020205020404" pitchFamily="49" charset="0"/>
+                <a:cs typeface="Courier New" panose="02070309020205020404" pitchFamily="49" charset="0"/>
+              </a:rPr>
+              <a:t>"</a:t>
+            </a:r>
+            <a:br>
+              <a:rPr kumimoji="0" lang="nl-NL" altLang="nl-NL" b="0" i="0" u="none" strike="noStrike" cap="none" normalizeH="0" baseline="0" dirty="0">
+                <a:ln>
+                  <a:noFill/>
+                </a:ln>
+                <a:solidFill>
+                  <a:srgbClr val="067D17"/>
+                </a:solidFill>
+                <a:effectLst/>
+                <a:latin typeface="Courier New" panose="02070309020205020404" pitchFamily="49" charset="0"/>
+                <a:cs typeface="Courier New" panose="02070309020205020404" pitchFamily="49" charset="0"/>
+              </a:rPr>
+            </a:br>
+            <a:r>
+              <a:rPr kumimoji="0" lang="nl-NL" altLang="nl-NL" b="0" i="0" u="none" strike="noStrike" cap="none" normalizeH="0" baseline="0" dirty="0">
+                <a:ln>
+                  <a:noFill/>
+                </a:ln>
+                <a:solidFill>
+                  <a:srgbClr val="067D17"/>
+                </a:solidFill>
+                <a:effectLst/>
+                <a:latin typeface="Courier New" panose="02070309020205020404" pitchFamily="49" charset="0"/>
+                <a:cs typeface="Courier New" panose="02070309020205020404" pitchFamily="49" charset="0"/>
+              </a:rPr>
+              <a:t>    </a:t>
+            </a:r>
+            <a:r>
+              <a:rPr kumimoji="0" lang="nl-NL" altLang="nl-NL" b="0" i="0" u="none" strike="noStrike" cap="none" normalizeH="0" baseline="0" dirty="0">
+                <a:ln>
+                  <a:noFill/>
+                </a:ln>
+                <a:solidFill>
+                  <a:srgbClr val="080808"/>
+                </a:solidFill>
+                <a:effectLst/>
+                <a:latin typeface="Courier New" panose="02070309020205020404" pitchFamily="49" charset="0"/>
+                <a:cs typeface="Courier New" panose="02070309020205020404" pitchFamily="49" charset="0"/>
+              </a:rPr>
+              <a:t>)</a:t>
+            </a:r>
+            <a:br>
+              <a:rPr kumimoji="0" lang="nl-NL" altLang="nl-NL" b="0" i="0" u="none" strike="noStrike" cap="none" normalizeH="0" baseline="0" dirty="0">
+                <a:ln>
+                  <a:noFill/>
+                </a:ln>
+                <a:solidFill>
+                  <a:srgbClr val="080808"/>
+                </a:solidFill>
+                <a:effectLst/>
+                <a:latin typeface="Courier New" panose="02070309020205020404" pitchFamily="49" charset="0"/>
+                <a:cs typeface="Courier New" panose="02070309020205020404" pitchFamily="49" charset="0"/>
+              </a:rPr>
+            </a:br>
+            <a:r>
+              <a:rPr kumimoji="0" lang="nl-NL" altLang="nl-NL" b="0" i="0" u="none" strike="noStrike" cap="none" normalizeH="0" baseline="0" dirty="0">
+                <a:ln>
+                  <a:noFill/>
+                </a:ln>
+                <a:solidFill>
+                  <a:srgbClr val="080808"/>
+                </a:solidFill>
+                <a:effectLst/>
+                <a:latin typeface="Courier New" panose="02070309020205020404" pitchFamily="49" charset="0"/>
+                <a:cs typeface="Courier New" panose="02070309020205020404" pitchFamily="49" charset="0"/>
+              </a:rPr>
+              <a:t>})</a:t>
+            </a:r>
+            <a:endParaRPr kumimoji="0" lang="nl-NL" altLang="nl-NL" sz="4000" b="0" i="0" u="none" strike="noStrike" cap="none" normalizeH="0" baseline="0" dirty="0">
+              <a:ln>
+                <a:noFill/>
+              </a:ln>
+              <a:solidFill>
+                <a:schemeClr val="tx1"/>
+              </a:solidFill>
+              <a:effectLst/>
+              <a:latin typeface="Courier New" panose="02070309020205020404" pitchFamily="49" charset="0"/>
+              <a:cs typeface="Courier New" panose="02070309020205020404" pitchFamily="49" charset="0"/>
+            </a:endParaRPr>
           </a:p>
         </p:txBody>
       </p:sp>
     </p:spTree>
     <p:extLst>
       <p:ext uri="{BB962C8B-B14F-4D97-AF65-F5344CB8AC3E}">
-        <p14:creationId xmlns:p14="http://schemas.microsoft.com/office/powerpoint/2010/main" val="3090134708"/>
+        <p14:creationId xmlns:p14="http://schemas.microsoft.com/office/powerpoint/2010/main" val="438314157"/>
       </p:ext>
     </p:extLst>
   </p:cSld>
@@ -31268,10 +32074,10 @@
       </p:grpSpPr>
       <p:sp>
         <p:nvSpPr>
-          <p:cNvPr id="10" name="Title 2">
+          <p:cNvPr id="2" name="Titel 1">
             <a:extLst>
               <a:ext uri="{FF2B5EF4-FFF2-40B4-BE49-F238E27FC236}">
-                <a16:creationId xmlns:a16="http://schemas.microsoft.com/office/drawing/2014/main" id="{49AB3702-1810-764C-3BE9-C338CDB6A62F}"/>
+                <a16:creationId xmlns:a16="http://schemas.microsoft.com/office/drawing/2014/main" id="{05B55862-4B05-4C16-B01F-3FA0CB002DB3}"/>
               </a:ext>
             </a:extLst>
           </p:cNvPr>
@@ -31284,31 +32090,216 @@
         </p:nvSpPr>
         <p:spPr>
           <a:xfrm>
-            <a:off x="792000" y="1324801"/>
-            <a:ext cx="10165560" cy="2358200"/>
+            <a:off x="1296000" y="720000"/>
+            <a:ext cx="9864000" cy="866153"/>
           </a:xfrm>
         </p:spPr>
         <p:txBody>
-          <a:bodyPr anchor="t">
+          <a:bodyPr/>
+          <a:lstStyle/>
+          <a:p>
+            <a:r>
+              <a:rPr lang="nl-BE" dirty="0"/>
+              <a:t>The </a:t>
+            </a:r>
+            <a:r>
+              <a:rPr lang="nl-BE" dirty="0" err="1"/>
+              <a:t>cartesian</a:t>
+            </a:r>
+            <a:r>
+              <a:rPr lang="nl-BE" dirty="0"/>
+              <a:t> product </a:t>
+            </a:r>
+            <a:r>
+              <a:rPr lang="nl-BE" dirty="0" err="1"/>
+              <a:t>problem</a:t>
+            </a:r>
+            <a:r>
+              <a:rPr lang="nl-BE" dirty="0"/>
+              <a:t> is a database </a:t>
+            </a:r>
+            <a:r>
+              <a:rPr lang="nl-BE" dirty="0" err="1"/>
+              <a:t>problem</a:t>
+            </a:r>
+            <a:endParaRPr lang="nl-NL" dirty="0"/>
+          </a:p>
+        </p:txBody>
+      </p:sp>
+      <p:sp>
+        <p:nvSpPr>
+          <p:cNvPr id="3" name="Tijdelijke aanduiding voor tekst 2">
+            <a:extLst>
+              <a:ext uri="{FF2B5EF4-FFF2-40B4-BE49-F238E27FC236}">
+                <a16:creationId xmlns:a16="http://schemas.microsoft.com/office/drawing/2014/main" id="{8B3F77EB-4E55-4CD2-91C4-1539E78AB8B6}"/>
+              </a:ext>
+            </a:extLst>
+          </p:cNvPr>
+          <p:cNvSpPr>
+            <a:spLocks noGrp="1"/>
+          </p:cNvSpPr>
+          <p:nvPr>
+            <p:ph type="body" sz="quarter" idx="10"/>
+          </p:nvPr>
+        </p:nvSpPr>
+        <p:spPr>
+          <a:xfrm>
+            <a:off x="1295999" y="3506569"/>
+            <a:ext cx="9864000" cy="2709415"/>
+          </a:xfrm>
+        </p:spPr>
+        <p:txBody>
+          <a:bodyPr>
             <a:normAutofit/>
           </a:bodyPr>
           <a:lstStyle/>
           <a:p>
-            <a:r>
-              <a:rPr lang="en-US" dirty="0"/>
-              <a:t>Performance tips and common mistakes</a:t>
-            </a:r>
-            <a:endParaRPr lang="en-US" dirty="0">
-              <a:latin typeface="Courier New" panose="02070309020205020404" pitchFamily="49" charset="0"/>
-              <a:cs typeface="Courier New" panose="02070309020205020404" pitchFamily="49" charset="0"/>
+            <a:pPr marL="0" indent="0">
+              <a:buNone/>
+            </a:pPr>
+            <a:r>
+              <a:rPr lang="nl-BE" sz="1800" dirty="0"/>
+              <a:t>More info: </a:t>
+            </a:r>
+            <a:endParaRPr lang="nl-BE" sz="1800" b="1" dirty="0">
+              <a:highlight>
+                <a:srgbClr val="FFFF00"/>
+              </a:highlight>
             </a:endParaRPr>
+          </a:p>
+          <a:p>
+            <a:pPr lvl="1"/>
+            <a:r>
+              <a:rPr lang="nl-BE" sz="1800" dirty="0">
+                <a:hlinkClick r:id="rId3"/>
+              </a:rPr>
+              <a:t>https://jakarta.ee/specifications/persistence/3.0/jakarta-persistence-spec-3.0.html#a4931</a:t>
+            </a:r>
+            <a:endParaRPr lang="nl-BE" sz="1800" dirty="0"/>
+          </a:p>
+          <a:p>
+            <a:pPr lvl="1"/>
+            <a:r>
+              <a:rPr lang="nl-BE" sz="1800" dirty="0">
+                <a:hlinkClick r:id="rId4"/>
+              </a:rPr>
+              <a:t>https://developer.jboss.org/docs/DOC-15782#jive_content_id_Hibernate_does_not_return_distinct_results_for_a_query_with_outer_join_fetching_enabled_for_a_collection_even_if_I_use_the_distinct_keyword</a:t>
+            </a:r>
+            <a:endParaRPr lang="nl-BE" sz="1800" dirty="0"/>
+          </a:p>
+          <a:p>
+            <a:pPr lvl="1"/>
+            <a:r>
+              <a:rPr lang="nl-BE" sz="1800" dirty="0">
+                <a:hlinkClick r:id="rId5"/>
+              </a:rPr>
+              <a:t>https://vladmihalcea.com/jpql-distinct-jpa-hibernate/</a:t>
+            </a:r>
+            <a:endParaRPr lang="nl-BE" sz="1800" dirty="0"/>
+          </a:p>
+          <a:p>
+            <a:pPr lvl="1"/>
+            <a:r>
+              <a:rPr lang="nl-BE" sz="1800" dirty="0">
+                <a:hlinkClick r:id="rId6"/>
+              </a:rPr>
+              <a:t>https://in.relation.to/2016/08/04/introducing-distinct-pass-through-query-hint/</a:t>
+            </a:r>
+            <a:endParaRPr lang="nl-BE" sz="1800" dirty="0"/>
+          </a:p>
+          <a:p>
+            <a:pPr lvl="1"/>
+            <a:r>
+              <a:rPr lang="nl-BE" sz="1800" dirty="0">
+                <a:hlinkClick r:id="rId7"/>
+              </a:rPr>
+              <a:t>https://thorben-janssen.com/hibernate-tips-apply-distinct-to-jpql-but-not-sql-query/</a:t>
+            </a:r>
+            <a:endParaRPr lang="nl-BE" sz="1800" dirty="0"/>
           </a:p>
         </p:txBody>
       </p:sp>
+      <p:pic>
+        <p:nvPicPr>
+          <p:cNvPr id="5" name="Picture 2" descr="22,947 Demo Foto's, Afbeeldingen en Stock Fotografie - 123RF">
+            <a:extLst>
+              <a:ext uri="{FF2B5EF4-FFF2-40B4-BE49-F238E27FC236}">
+                <a16:creationId xmlns:a16="http://schemas.microsoft.com/office/drawing/2014/main" id="{95B0A73F-6D16-4E98-926F-40FC964455BD}"/>
+              </a:ext>
+            </a:extLst>
+          </p:cNvPr>
+          <p:cNvPicPr>
+            <a:picLocks noChangeAspect="1" noChangeArrowheads="1"/>
+          </p:cNvPicPr>
+          <p:nvPr/>
+        </p:nvPicPr>
+        <p:blipFill>
+          <a:blip r:embed="rId8">
+            <a:extLst>
+              <a:ext uri="{28A0092B-C50C-407E-A947-70E740481C1C}">
+                <a14:useLocalDpi xmlns:a14="http://schemas.microsoft.com/office/drawing/2010/main" val="0"/>
+              </a:ext>
+            </a:extLst>
+          </a:blip>
+          <a:srcRect/>
+          <a:stretch>
+            <a:fillRect/>
+          </a:stretch>
+        </p:blipFill>
+        <p:spPr bwMode="auto">
+          <a:xfrm>
+            <a:off x="10160000" y="5711240"/>
+            <a:ext cx="1822679" cy="903239"/>
+          </a:xfrm>
+          <a:prstGeom prst="rect">
+            <a:avLst/>
+          </a:prstGeom>
+          <a:noFill/>
+          <a:extLst>
+            <a:ext uri="{909E8E84-426E-40DD-AFC4-6F175D3DCCD1}">
+              <a14:hiddenFill xmlns:a14="http://schemas.microsoft.com/office/drawing/2010/main">
+                <a:solidFill>
+                  <a:srgbClr val="FFFFFF"/>
+                </a:solidFill>
+              </a14:hiddenFill>
+            </a:ext>
+          </a:extLst>
+        </p:spPr>
+      </p:pic>
+      <p:pic>
+        <p:nvPicPr>
+          <p:cNvPr id="7" name="Afbeelding 6">
+            <a:extLst>
+              <a:ext uri="{FF2B5EF4-FFF2-40B4-BE49-F238E27FC236}">
+                <a16:creationId xmlns:a16="http://schemas.microsoft.com/office/drawing/2014/main" id="{852748A4-766B-4D58-8E95-3421775E2523}"/>
+              </a:ext>
+            </a:extLst>
+          </p:cNvPr>
+          <p:cNvPicPr>
+            <a:picLocks noChangeAspect="1"/>
+          </p:cNvPicPr>
+          <p:nvPr/>
+        </p:nvPicPr>
+        <p:blipFill>
+          <a:blip r:embed="rId9"/>
+          <a:stretch>
+            <a:fillRect/>
+          </a:stretch>
+        </p:blipFill>
+        <p:spPr>
+          <a:xfrm>
+            <a:off x="1178414" y="2047261"/>
+            <a:ext cx="10099171" cy="1304171"/>
+          </a:xfrm>
+          <a:prstGeom prst="rect">
+            <a:avLst/>
+          </a:prstGeom>
+        </p:spPr>
+      </p:pic>
     </p:spTree>
     <p:extLst>
       <p:ext uri="{BB962C8B-B14F-4D97-AF65-F5344CB8AC3E}">
-        <p14:creationId xmlns:p14="http://schemas.microsoft.com/office/powerpoint/2010/main" val="1036875611"/>
+        <p14:creationId xmlns:p14="http://schemas.microsoft.com/office/powerpoint/2010/main" val="3090134708"/>
       </p:ext>
     </p:extLst>
   </p:cSld>
@@ -31455,13 +32446,24 @@
         </p:spPr>
         <p:txBody>
           <a:bodyPr anchor="t">
-            <a:normAutofit fontScale="90000"/>
+            <a:normAutofit/>
           </a:bodyPr>
           <a:lstStyle/>
           <a:p>
             <a:r>
               <a:rPr lang="en-US" dirty="0"/>
-              <a:t>Mistake 1: Using entities for read-only operations.</a:t>
+              <a:t>Types of </a:t>
+            </a:r>
+            <a:r>
+              <a:rPr lang="en-US" dirty="0">
+                <a:latin typeface="Courier New" panose="02070309020205020404" pitchFamily="49" charset="0"/>
+                <a:cs typeface="Courier New" panose="02070309020205020404" pitchFamily="49" charset="0"/>
+              </a:rPr>
+              <a:t>JOIN</a:t>
+            </a:r>
+            <a:r>
+              <a:rPr lang="en-US" dirty="0"/>
+              <a:t>s in JPQL</a:t>
             </a:r>
           </a:p>
         </p:txBody>
@@ -31484,8 +32486,8 @@
         </p:nvSpPr>
         <p:spPr>
           <a:xfrm>
-            <a:off x="1296000" y="2105696"/>
-            <a:ext cx="9864000" cy="3632163"/>
+            <a:off x="1296000" y="1566420"/>
+            <a:ext cx="9864000" cy="5170442"/>
           </a:xfrm>
         </p:spPr>
         <p:txBody>
@@ -31500,8 +32502,26 @@
               </a:spcAft>
             </a:pPr>
             <a:r>
-              <a:rPr lang="en-US" sz="2800" dirty="0"/>
-              <a:t>Entities come with a lot of overhead.</a:t>
+              <a:rPr lang="en-US" dirty="0"/>
+              <a:t>(</a:t>
+            </a:r>
+            <a:r>
+              <a:rPr lang="en-US" sz="2800" dirty="0">
+                <a:latin typeface="Courier New" panose="02070309020205020404" pitchFamily="49" charset="0"/>
+                <a:cs typeface="Courier New" panose="02070309020205020404" pitchFamily="49" charset="0"/>
+              </a:rPr>
+              <a:t>INNER</a:t>
+            </a:r>
+            <a:r>
+              <a:rPr lang="en-US" dirty="0"/>
+              <a:t>)</a:t>
+            </a:r>
+            <a:r>
+              <a:rPr lang="en-US" sz="2800" dirty="0">
+                <a:latin typeface="Courier New" panose="02070309020205020404" pitchFamily="49" charset="0"/>
+                <a:cs typeface="Courier New" panose="02070309020205020404" pitchFamily="49" charset="0"/>
+              </a:rPr>
+              <a:t> JOIN</a:t>
             </a:r>
           </a:p>
           <a:p>
@@ -31511,16 +32531,141 @@
               </a:spcAft>
             </a:pPr>
             <a:r>
-              <a:rPr lang="en-US" sz="2800" dirty="0"/>
-              <a:t>Use DTO projections if possible.</a:t>
-            </a:r>
+              <a:rPr lang="en-US" sz="2800" dirty="0">
+                <a:latin typeface="Courier New" panose="02070309020205020404" pitchFamily="49" charset="0"/>
+                <a:cs typeface="Courier New" panose="02070309020205020404" pitchFamily="49" charset="0"/>
+              </a:rPr>
+              <a:t>LEFT </a:t>
+            </a:r>
+            <a:r>
+              <a:rPr lang="en-US" dirty="0"/>
+              <a:t>(</a:t>
+            </a:r>
+            <a:r>
+              <a:rPr lang="en-US" sz="2800" dirty="0">
+                <a:latin typeface="Courier New" panose="02070309020205020404" pitchFamily="49" charset="0"/>
+                <a:cs typeface="Courier New" panose="02070309020205020404" pitchFamily="49" charset="0"/>
+              </a:rPr>
+              <a:t>OUTER</a:t>
+            </a:r>
+            <a:r>
+              <a:rPr lang="en-US" dirty="0"/>
+              <a:t>)</a:t>
+            </a:r>
+            <a:r>
+              <a:rPr lang="en-US" sz="2800" dirty="0">
+                <a:latin typeface="Courier New" panose="02070309020205020404" pitchFamily="49" charset="0"/>
+                <a:cs typeface="Courier New" panose="02070309020205020404" pitchFamily="49" charset="0"/>
+              </a:rPr>
+              <a:t> JOIN</a:t>
+            </a:r>
+            <a:r>
+              <a:rPr lang="en-US" dirty="0"/>
+              <a:t> </a:t>
+            </a:r>
+          </a:p>
+          <a:p>
+            <a:pPr>
+              <a:spcAft>
+                <a:spcPts val="600"/>
+              </a:spcAft>
+            </a:pPr>
+            <a:r>
+              <a:rPr lang="en-US" sz="2800" dirty="0">
+                <a:latin typeface="Courier New" panose="02070309020205020404" pitchFamily="49" charset="0"/>
+                <a:cs typeface="Courier New" panose="02070309020205020404" pitchFamily="49" charset="0"/>
+              </a:rPr>
+              <a:t>RIGHT </a:t>
+            </a:r>
+            <a:r>
+              <a:rPr lang="en-US" dirty="0"/>
+              <a:t>(</a:t>
+            </a:r>
+            <a:r>
+              <a:rPr lang="en-US" sz="2800" dirty="0">
+                <a:latin typeface="Courier New" panose="02070309020205020404" pitchFamily="49" charset="0"/>
+                <a:cs typeface="Courier New" panose="02070309020205020404" pitchFamily="49" charset="0"/>
+              </a:rPr>
+              <a:t>OUTER</a:t>
+            </a:r>
+            <a:r>
+              <a:rPr lang="en-US" dirty="0"/>
+              <a:t>)</a:t>
+            </a:r>
+            <a:r>
+              <a:rPr lang="en-US" sz="2800" dirty="0">
+                <a:latin typeface="Courier New" panose="02070309020205020404" pitchFamily="49" charset="0"/>
+                <a:cs typeface="Courier New" panose="02070309020205020404" pitchFamily="49" charset="0"/>
+              </a:rPr>
+              <a:t> JOIN</a:t>
+            </a:r>
+          </a:p>
+          <a:p>
+            <a:pPr>
+              <a:spcAft>
+                <a:spcPts val="600"/>
+              </a:spcAft>
+            </a:pPr>
+            <a:r>
+              <a:rPr lang="en-US" dirty="0"/>
+              <a:t>Every type of </a:t>
+            </a:r>
+            <a:r>
+              <a:rPr lang="en-US" dirty="0">
+                <a:latin typeface="Courier New" panose="02070309020205020404" pitchFamily="49" charset="0"/>
+                <a:cs typeface="Courier New" panose="02070309020205020404" pitchFamily="49" charset="0"/>
+              </a:rPr>
+              <a:t>JOIN</a:t>
+            </a:r>
+            <a:r>
+              <a:rPr lang="en-US" dirty="0"/>
+              <a:t> can be </a:t>
+            </a:r>
+            <a:r>
+              <a:rPr lang="en-US" dirty="0" err="1">
+                <a:latin typeface="Courier New" panose="02070309020205020404" pitchFamily="49" charset="0"/>
+                <a:cs typeface="Courier New" panose="02070309020205020404" pitchFamily="49" charset="0"/>
+              </a:rPr>
+              <a:t>FETCH</a:t>
+            </a:r>
+            <a:r>
+              <a:rPr lang="en-US" dirty="0" err="1"/>
+              <a:t>’ed</a:t>
+            </a:r>
+            <a:r>
+              <a:rPr lang="en-US" dirty="0"/>
+              <a:t> to initialize the association.</a:t>
+            </a:r>
+          </a:p>
+          <a:p>
+            <a:pPr marL="0" indent="0">
+              <a:spcAft>
+                <a:spcPts val="600"/>
+              </a:spcAft>
+              <a:buNone/>
+            </a:pPr>
+            <a:endParaRPr lang="en-US" sz="2800" dirty="0">
+              <a:latin typeface="Courier New" panose="02070309020205020404" pitchFamily="49" charset="0"/>
+              <a:cs typeface="Courier New" panose="02070309020205020404" pitchFamily="49" charset="0"/>
+            </a:endParaRPr>
+          </a:p>
+          <a:p>
+            <a:pPr>
+              <a:spcAft>
+                <a:spcPts val="600"/>
+              </a:spcAft>
+            </a:pPr>
+            <a:endParaRPr lang="en-US" sz="2800" dirty="0">
+              <a:latin typeface="Courier New" panose="02070309020205020404" pitchFamily="49" charset="0"/>
+              <a:cs typeface="Courier New" panose="02070309020205020404" pitchFamily="49" charset="0"/>
+            </a:endParaRPr>
           </a:p>
         </p:txBody>
       </p:sp>
     </p:spTree>
     <p:extLst>
       <p:ext uri="{BB962C8B-B14F-4D97-AF65-F5344CB8AC3E}">
-        <p14:creationId xmlns:p14="http://schemas.microsoft.com/office/powerpoint/2010/main" val="613316660"/>
+        <p14:creationId xmlns:p14="http://schemas.microsoft.com/office/powerpoint/2010/main" val="1889153101"/>
       </p:ext>
     </p:extLst>
   </p:cSld>
@@ -31549,10 +32694,10 @@
       </p:grpSpPr>
       <p:sp>
         <p:nvSpPr>
-          <p:cNvPr id="11" name="Title 1">
+          <p:cNvPr id="10" name="Title 2">
             <a:extLst>
               <a:ext uri="{FF2B5EF4-FFF2-40B4-BE49-F238E27FC236}">
-                <a16:creationId xmlns:a16="http://schemas.microsoft.com/office/drawing/2014/main" id="{51612DA1-DB43-7E72-A4EA-4B95C807605F}"/>
+                <a16:creationId xmlns:a16="http://schemas.microsoft.com/office/drawing/2014/main" id="{49AB3702-1810-764C-3BE9-C338CDB6A62F}"/>
               </a:ext>
             </a:extLst>
           </p:cNvPr>
@@ -31565,8 +32710,8 @@
         </p:nvSpPr>
         <p:spPr>
           <a:xfrm>
-            <a:off x="1296000" y="720000"/>
-            <a:ext cx="9864000" cy="681480"/>
+            <a:off x="792000" y="1324801"/>
+            <a:ext cx="10165560" cy="2358200"/>
           </a:xfrm>
         </p:spPr>
         <p:txBody>
@@ -31576,166 +32721,20 @@
           <a:lstStyle/>
           <a:p>
             <a:r>
-              <a:rPr lang="en-US" sz="3600" dirty="0"/>
-              <a:t>Mistake 2: Using </a:t>
-            </a:r>
-            <a:r>
-              <a:rPr lang="en-US" sz="3600" dirty="0" err="1">
-                <a:latin typeface="Courier New" panose="02070309020205020404" pitchFamily="49" charset="0"/>
-                <a:cs typeface="Courier New" panose="02070309020205020404" pitchFamily="49" charset="0"/>
-              </a:rPr>
-              <a:t>hibernate.show_sql</a:t>
-            </a:r>
-            <a:endParaRPr lang="en-US" sz="3600" dirty="0">
+              <a:rPr lang="en-US" dirty="0"/>
+              <a:t>Performance tips and common mistakes</a:t>
+            </a:r>
+            <a:endParaRPr lang="en-US" dirty="0">
               <a:latin typeface="Courier New" panose="02070309020205020404" pitchFamily="49" charset="0"/>
               <a:cs typeface="Courier New" panose="02070309020205020404" pitchFamily="49" charset="0"/>
             </a:endParaRPr>
-          </a:p>
-        </p:txBody>
-      </p:sp>
-      <p:sp>
-        <p:nvSpPr>
-          <p:cNvPr id="13" name="Text Placeholder 2">
-            <a:extLst>
-              <a:ext uri="{FF2B5EF4-FFF2-40B4-BE49-F238E27FC236}">
-                <a16:creationId xmlns:a16="http://schemas.microsoft.com/office/drawing/2014/main" id="{5AFACC08-6E7F-14DD-D1E6-54973126E7AF}"/>
-              </a:ext>
-            </a:extLst>
-          </p:cNvPr>
-          <p:cNvSpPr>
-            <a:spLocks noGrp="1"/>
-          </p:cNvSpPr>
-          <p:nvPr>
-            <p:ph type="body" sz="quarter" idx="10"/>
-          </p:nvPr>
-        </p:nvSpPr>
-        <p:spPr>
-          <a:xfrm>
-            <a:off x="1296000" y="2105696"/>
-            <a:ext cx="9864000" cy="3632163"/>
-          </a:xfrm>
-        </p:spPr>
-        <p:txBody>
-          <a:bodyPr>
-            <a:normAutofit/>
-          </a:bodyPr>
-          <a:lstStyle/>
-          <a:p>
-            <a:pPr>
-              <a:spcAft>
-                <a:spcPts val="600"/>
-              </a:spcAft>
-            </a:pPr>
-            <a:r>
-              <a:rPr lang="en-US" sz="2800" dirty="0"/>
-              <a:t>Statements are always logged to console.</a:t>
-            </a:r>
-          </a:p>
-          <a:p>
-            <a:pPr>
-              <a:spcAft>
-                <a:spcPts val="600"/>
-              </a:spcAft>
-            </a:pPr>
-            <a:r>
-              <a:rPr lang="en-US" sz="2800" dirty="0"/>
-              <a:t>Use the logger framework instead:</a:t>
-            </a:r>
-          </a:p>
-          <a:p>
-            <a:pPr marL="252000" lvl="1" indent="0">
-              <a:spcAft>
-                <a:spcPts val="600"/>
-              </a:spcAft>
-              <a:buNone/>
-            </a:pPr>
-            <a:r>
-              <a:rPr lang="en-US" sz="2400" dirty="0">
-                <a:latin typeface="Courier New" panose="02070309020205020404" pitchFamily="49" charset="0"/>
-                <a:cs typeface="Courier New" panose="02070309020205020404" pitchFamily="49" charset="0"/>
-              </a:rPr>
-              <a:t>logging:</a:t>
-            </a:r>
-          </a:p>
-          <a:p>
-            <a:pPr marL="252000" lvl="1" indent="0">
-              <a:spcAft>
-                <a:spcPts val="600"/>
-              </a:spcAft>
-              <a:buNone/>
-            </a:pPr>
-            <a:r>
-              <a:rPr lang="en-US" sz="2400" dirty="0">
-                <a:latin typeface="Courier New" panose="02070309020205020404" pitchFamily="49" charset="0"/>
-                <a:cs typeface="Courier New" panose="02070309020205020404" pitchFamily="49" charset="0"/>
-              </a:rPr>
-              <a:t>  level:</a:t>
-            </a:r>
-          </a:p>
-          <a:p>
-            <a:pPr marL="252000" lvl="1" indent="0">
-              <a:spcAft>
-                <a:spcPts val="600"/>
-              </a:spcAft>
-              <a:buNone/>
-            </a:pPr>
-            <a:r>
-              <a:rPr lang="en-US" sz="2400" dirty="0">
-                <a:latin typeface="Courier New" panose="02070309020205020404" pitchFamily="49" charset="0"/>
-                <a:cs typeface="Courier New" panose="02070309020205020404" pitchFamily="49" charset="0"/>
-              </a:rPr>
-              <a:t>    </a:t>
-            </a:r>
-            <a:r>
-              <a:rPr lang="en-US" sz="2400" dirty="0" err="1">
-                <a:latin typeface="Courier New" panose="02070309020205020404" pitchFamily="49" charset="0"/>
-                <a:cs typeface="Courier New" panose="02070309020205020404" pitchFamily="49" charset="0"/>
-              </a:rPr>
-              <a:t>org.hibernate.SQL</a:t>
-            </a:r>
-            <a:r>
-              <a:rPr lang="en-US" sz="2400" dirty="0">
-                <a:latin typeface="Courier New" panose="02070309020205020404" pitchFamily="49" charset="0"/>
-                <a:cs typeface="Courier New" panose="02070309020205020404" pitchFamily="49" charset="0"/>
-              </a:rPr>
-              <a:t>: debug</a:t>
-            </a:r>
-          </a:p>
-          <a:p>
-            <a:pPr marL="252000" lvl="1" indent="0">
-              <a:spcAft>
-                <a:spcPts val="600"/>
-              </a:spcAft>
-              <a:buNone/>
-            </a:pPr>
-            <a:r>
-              <a:rPr lang="en-US" sz="2400" dirty="0">
-                <a:latin typeface="Courier New" panose="02070309020205020404" pitchFamily="49" charset="0"/>
-                <a:cs typeface="Courier New" panose="02070309020205020404" pitchFamily="49" charset="0"/>
-              </a:rPr>
-              <a:t>    </a:t>
-            </a:r>
-            <a:r>
-              <a:rPr lang="en-US" sz="2400" dirty="0" err="1">
-                <a:latin typeface="Courier New" panose="02070309020205020404" pitchFamily="49" charset="0"/>
-                <a:cs typeface="Courier New" panose="02070309020205020404" pitchFamily="49" charset="0"/>
-              </a:rPr>
-              <a:t>org.hibernate.type.descriptor.sql</a:t>
-            </a:r>
-            <a:r>
-              <a:rPr lang="en-US" sz="2400" dirty="0">
-                <a:latin typeface="Courier New" panose="02070309020205020404" pitchFamily="49" charset="0"/>
-                <a:cs typeface="Courier New" panose="02070309020205020404" pitchFamily="49" charset="0"/>
-              </a:rPr>
-              <a:t>: trace</a:t>
-            </a:r>
           </a:p>
         </p:txBody>
       </p:sp>
     </p:spTree>
     <p:extLst>
       <p:ext uri="{BB962C8B-B14F-4D97-AF65-F5344CB8AC3E}">
-        <p14:creationId xmlns:p14="http://schemas.microsoft.com/office/powerpoint/2010/main" val="36027474"/>
+        <p14:creationId xmlns:p14="http://schemas.microsoft.com/office/powerpoint/2010/main" val="1036875611"/>
       </p:ext>
     </p:extLst>
   </p:cSld>
@@ -31792,23 +32791,8 @@
           <a:p>
             <a:r>
               <a:rPr lang="en-US" dirty="0"/>
-              <a:t>Mistake 3: Using </a:t>
-            </a:r>
-            <a:r>
-              <a:rPr lang="en-US" dirty="0">
-                <a:latin typeface="Courier New" panose="02070309020205020404" pitchFamily="49" charset="0"/>
-                <a:cs typeface="Courier New" panose="02070309020205020404" pitchFamily="49" charset="0"/>
-              </a:rPr>
-              <a:t>@Transactional </a:t>
-            </a:r>
-            <a:r>
-              <a:rPr lang="en-US" dirty="0"/>
-              <a:t>in tests</a:t>
-            </a:r>
-            <a:endParaRPr lang="en-US" dirty="0">
-              <a:latin typeface="Courier New" panose="02070309020205020404" pitchFamily="49" charset="0"/>
-              <a:cs typeface="Courier New" panose="02070309020205020404" pitchFamily="49" charset="0"/>
-            </a:endParaRPr>
+              <a:t>Mistake 1: Using entities for read-only operations.</a:t>
+            </a:r>
           </a:p>
         </p:txBody>
       </p:sp>
@@ -31846,30 +32830,8 @@
               </a:spcAft>
             </a:pPr>
             <a:r>
-              <a:rPr lang="en-US" dirty="0"/>
-              <a:t>Why would you use </a:t>
-            </a:r>
-            <a:r>
-              <a:rPr lang="en-US" dirty="0">
-                <a:latin typeface="Courier New" panose="02070309020205020404" pitchFamily="49" charset="0"/>
-                <a:cs typeface="Courier New" panose="02070309020205020404" pitchFamily="49" charset="0"/>
-              </a:rPr>
-              <a:t>@Transactional </a:t>
-            </a:r>
-            <a:r>
-              <a:rPr lang="en-US" dirty="0"/>
-              <a:t>in a test?</a:t>
-            </a:r>
-          </a:p>
-          <a:p>
-            <a:pPr lvl="1">
-              <a:spcAft>
-                <a:spcPts val="600"/>
-              </a:spcAft>
-            </a:pPr>
-            <a:r>
-              <a:rPr lang="en-US" dirty="0"/>
-              <a:t>To clean up data and ensure a deterministic test suite.</a:t>
+              <a:rPr lang="en-US" sz="2800" dirty="0"/>
+              <a:t>Entities come with a lot of overhead.</a:t>
             </a:r>
           </a:p>
           <a:p>
@@ -31879,126 +32841,16 @@
               </a:spcAft>
             </a:pPr>
             <a:r>
-              <a:rPr lang="en-US" dirty="0"/>
-              <a:t>What is the biggest problem when doing this?</a:t>
-            </a:r>
-          </a:p>
-          <a:p>
-            <a:pPr lvl="1">
-              <a:spcAft>
-                <a:spcPts val="600"/>
-              </a:spcAft>
-            </a:pPr>
-            <a:r>
-              <a:rPr lang="en-US" dirty="0"/>
-              <a:t>Using </a:t>
-            </a:r>
-            <a:r>
-              <a:rPr lang="en-US" dirty="0">
-                <a:latin typeface="Courier New" panose="02070309020205020404" pitchFamily="49" charset="0"/>
-                <a:cs typeface="Courier New" panose="02070309020205020404" pitchFamily="49" charset="0"/>
-              </a:rPr>
-              <a:t>@Transactional </a:t>
-            </a:r>
-            <a:r>
-              <a:rPr lang="en-US" dirty="0"/>
-              <a:t>in tests is dangerous as it can hide production issues.</a:t>
-            </a:r>
-          </a:p>
-          <a:p>
-            <a:pPr>
-              <a:spcAft>
-                <a:spcPts val="600"/>
-              </a:spcAft>
-            </a:pPr>
-            <a:r>
-              <a:rPr lang="en-US" dirty="0"/>
-              <a:t>Solution:</a:t>
-            </a:r>
-          </a:p>
-          <a:p>
-            <a:pPr lvl="1">
-              <a:spcAft>
-                <a:spcPts val="600"/>
-              </a:spcAft>
-            </a:pPr>
-            <a:r>
-              <a:rPr lang="en-US" dirty="0"/>
-              <a:t>Clean up manually (</a:t>
-            </a:r>
-            <a:r>
-              <a:rPr lang="en-US" dirty="0">
-                <a:latin typeface="Courier New" panose="02070309020205020404" pitchFamily="49" charset="0"/>
-                <a:cs typeface="Courier New" panose="02070309020205020404" pitchFamily="49" charset="0"/>
-              </a:rPr>
-              <a:t>@AfterEach</a:t>
-            </a:r>
-            <a:r>
-              <a:rPr lang="en-US" dirty="0"/>
-              <a:t>).</a:t>
-            </a:r>
-          </a:p>
-          <a:p>
-            <a:pPr>
-              <a:spcAft>
-                <a:spcPts val="600"/>
-              </a:spcAft>
-            </a:pPr>
-            <a:endParaRPr lang="en-US" dirty="0"/>
+              <a:rPr lang="en-US" sz="2800" dirty="0"/>
+              <a:t>Use DTO projections if possible.</a:t>
+            </a:r>
           </a:p>
         </p:txBody>
       </p:sp>
-      <p:pic>
-        <p:nvPicPr>
-          <p:cNvPr id="4" name="Picture 2" descr="22,947 Demo Foto's, Afbeeldingen en Stock Fotografie - 123RF">
-            <a:extLst>
-              <a:ext uri="{FF2B5EF4-FFF2-40B4-BE49-F238E27FC236}">
-                <a16:creationId xmlns:a16="http://schemas.microsoft.com/office/drawing/2014/main" id="{3078C261-1290-4C96-B0F3-7F5867671363}"/>
-              </a:ext>
-            </a:extLst>
-          </p:cNvPr>
-          <p:cNvPicPr>
-            <a:picLocks noChangeAspect="1" noChangeArrowheads="1"/>
-          </p:cNvPicPr>
-          <p:nvPr/>
-        </p:nvPicPr>
-        <p:blipFill>
-          <a:blip r:embed="rId2">
-            <a:extLst>
-              <a:ext uri="{28A0092B-C50C-407E-A947-70E740481C1C}">
-                <a14:useLocalDpi xmlns:a14="http://schemas.microsoft.com/office/drawing/2010/main" val="0"/>
-              </a:ext>
-            </a:extLst>
-          </a:blip>
-          <a:srcRect/>
-          <a:stretch>
-            <a:fillRect/>
-          </a:stretch>
-        </p:blipFill>
-        <p:spPr bwMode="auto">
-          <a:xfrm>
-            <a:off x="10059668" y="5661520"/>
-            <a:ext cx="1923011" cy="952959"/>
-          </a:xfrm>
-          <a:prstGeom prst="rect">
-            <a:avLst/>
-          </a:prstGeom>
-          <a:noFill/>
-          <a:extLst>
-            <a:ext uri="{909E8E84-426E-40DD-AFC4-6F175D3DCCD1}">
-              <a14:hiddenFill xmlns:a14="http://schemas.microsoft.com/office/drawing/2010/main">
-                <a:solidFill>
-                  <a:srgbClr val="FFFFFF"/>
-                </a:solidFill>
-              </a14:hiddenFill>
-            </a:ext>
-          </a:extLst>
-        </p:spPr>
-      </p:pic>
     </p:spTree>
     <p:extLst>
       <p:ext uri="{BB962C8B-B14F-4D97-AF65-F5344CB8AC3E}">
-        <p14:creationId xmlns:p14="http://schemas.microsoft.com/office/powerpoint/2010/main" val="3022796713"/>
+        <p14:creationId xmlns:p14="http://schemas.microsoft.com/office/powerpoint/2010/main" val="613316660"/>
       </p:ext>
     </p:extLst>
   </p:cSld>
@@ -32043,24 +32895,21 @@
         </p:nvSpPr>
         <p:spPr>
           <a:xfrm>
-            <a:off x="1296000" y="719999"/>
-            <a:ext cx="9864000" cy="1057285"/>
+            <a:off x="1296000" y="720000"/>
+            <a:ext cx="9864000" cy="681480"/>
           </a:xfrm>
         </p:spPr>
         <p:txBody>
           <a:bodyPr anchor="t">
-            <a:normAutofit fontScale="90000"/>
+            <a:normAutofit/>
           </a:bodyPr>
           <a:lstStyle/>
           <a:p>
             <a:r>
-              <a:rPr lang="en-US" dirty="0"/>
-              <a:t>Mistake 4: Updating or removing entities one-by-one</a:t>
-            </a:r>
-            <a:endParaRPr lang="en-US" dirty="0">
-              <a:solidFill>
-                <a:srgbClr val="FF0000"/>
-              </a:solidFill>
+              <a:rPr lang="en-US" sz="3600" dirty="0"/>
+              <a:t>Mistake 2: Not reading SQL logs</a:t>
+            </a:r>
+            <a:endParaRPr lang="en-US" sz="3600" dirty="0">
               <a:latin typeface="Courier New" panose="02070309020205020404" pitchFamily="49" charset="0"/>
               <a:cs typeface="Courier New" panose="02070309020205020404" pitchFamily="49" charset="0"/>
             </a:endParaRPr>
@@ -32091,7 +32940,7 @@
         </p:spPr>
         <p:txBody>
           <a:bodyPr>
-            <a:normAutofit/>
+            <a:normAutofit lnSpcReduction="10000"/>
           </a:bodyPr>
           <a:lstStyle/>
           <a:p>
@@ -32101,8 +32950,30 @@
               </a:spcAft>
             </a:pPr>
             <a:r>
-              <a:rPr lang="en-US" dirty="0"/>
-              <a:t>Anti-pattern: retrieving entities and updating/deleting them one by one.</a:t>
+              <a:rPr lang="en-US" sz="2800" dirty="0"/>
+              <a:t>Don’t use </a:t>
+            </a:r>
+            <a:r>
+              <a:rPr lang="en-US" sz="2800" dirty="0" err="1">
+                <a:latin typeface="Courier New" panose="02070309020205020404" pitchFamily="49" charset="0"/>
+                <a:cs typeface="Courier New" panose="02070309020205020404" pitchFamily="49" charset="0"/>
+              </a:rPr>
+              <a:t>hibernate.show_sql</a:t>
+            </a:r>
+            <a:endParaRPr lang="en-US" sz="2800" dirty="0">
+              <a:latin typeface="Courier New" panose="02070309020205020404" pitchFamily="49" charset="0"/>
+              <a:cs typeface="Courier New" panose="02070309020205020404" pitchFamily="49" charset="0"/>
+            </a:endParaRPr>
+          </a:p>
+          <a:p>
+            <a:pPr lvl="1">
+              <a:spcAft>
+                <a:spcPts val="600"/>
+              </a:spcAft>
+            </a:pPr>
+            <a:r>
+              <a:rPr lang="en-US" sz="2400" dirty="0"/>
+              <a:t>Statements are always logged to console.</a:t>
             </a:r>
           </a:p>
           <a:p>
@@ -32112,30 +32983,96 @@
               </a:spcAft>
             </a:pPr>
             <a:r>
-              <a:rPr lang="en-US" dirty="0"/>
-              <a:t>Try to create an update/delete query for all relevant rows.</a:t>
-            </a:r>
-          </a:p>
-          <a:p>
-            <a:pPr>
+              <a:rPr lang="en-US" sz="2800" dirty="0"/>
+              <a:t>Use the logger framework instead:</a:t>
+            </a:r>
+          </a:p>
+          <a:p>
+            <a:pPr marL="252000" lvl="1" indent="0">
               <a:spcAft>
                 <a:spcPts val="600"/>
               </a:spcAft>
-            </a:pPr>
-            <a:r>
-              <a:rPr lang="en-US" dirty="0"/>
-              <a:t>If not possible to write a general query: think about batch processing and Hibernate memory usage.</a:t>
-            </a:r>
-          </a:p>
-          <a:p>
-            <a:pPr lvl="1">
+              <a:buNone/>
+            </a:pPr>
+            <a:r>
+              <a:rPr lang="en-US" sz="2400" dirty="0">
+                <a:latin typeface="Courier New" panose="02070309020205020404" pitchFamily="49" charset="0"/>
+                <a:cs typeface="Courier New" panose="02070309020205020404" pitchFamily="49" charset="0"/>
+              </a:rPr>
+              <a:t>logging:</a:t>
+            </a:r>
+          </a:p>
+          <a:p>
+            <a:pPr marL="252000" lvl="1" indent="0">
               <a:spcAft>
                 <a:spcPts val="600"/>
               </a:spcAft>
-            </a:pPr>
-            <a:r>
-              <a:rPr lang="en-US" dirty="0"/>
-              <a:t>https://docs.jboss.org/hibernate/core/3.6/reference/en-US/html_single/#batch</a:t>
+              <a:buNone/>
+            </a:pPr>
+            <a:r>
+              <a:rPr lang="en-US" sz="2400" dirty="0">
+                <a:latin typeface="Courier New" panose="02070309020205020404" pitchFamily="49" charset="0"/>
+                <a:cs typeface="Courier New" panose="02070309020205020404" pitchFamily="49" charset="0"/>
+              </a:rPr>
+              <a:t>  level:</a:t>
+            </a:r>
+          </a:p>
+          <a:p>
+            <a:pPr marL="252000" lvl="1" indent="0">
+              <a:spcAft>
+                <a:spcPts val="600"/>
+              </a:spcAft>
+              <a:buNone/>
+            </a:pPr>
+            <a:r>
+              <a:rPr lang="en-US" sz="2400" dirty="0">
+                <a:latin typeface="Courier New" panose="02070309020205020404" pitchFamily="49" charset="0"/>
+                <a:cs typeface="Courier New" panose="02070309020205020404" pitchFamily="49" charset="0"/>
+              </a:rPr>
+              <a:t>    </a:t>
+            </a:r>
+            <a:r>
+              <a:rPr lang="en-US" sz="2400" dirty="0" err="1">
+                <a:latin typeface="Courier New" panose="02070309020205020404" pitchFamily="49" charset="0"/>
+                <a:cs typeface="Courier New" panose="02070309020205020404" pitchFamily="49" charset="0"/>
+              </a:rPr>
+              <a:t>org.hibernate.SQL</a:t>
+            </a:r>
+            <a:r>
+              <a:rPr lang="en-US" sz="2400" dirty="0">
+                <a:latin typeface="Courier New" panose="02070309020205020404" pitchFamily="49" charset="0"/>
+                <a:cs typeface="Courier New" panose="02070309020205020404" pitchFamily="49" charset="0"/>
+              </a:rPr>
+              <a:t>: debug</a:t>
+            </a:r>
+          </a:p>
+          <a:p>
+            <a:pPr marL="252000" lvl="1" indent="0">
+              <a:spcAft>
+                <a:spcPts val="600"/>
+              </a:spcAft>
+              <a:buNone/>
+            </a:pPr>
+            <a:r>
+              <a:rPr lang="en-US" sz="2400" dirty="0">
+                <a:latin typeface="Courier New" panose="02070309020205020404" pitchFamily="49" charset="0"/>
+                <a:cs typeface="Courier New" panose="02070309020205020404" pitchFamily="49" charset="0"/>
+              </a:rPr>
+              <a:t>    </a:t>
+            </a:r>
+            <a:r>
+              <a:rPr lang="en-US" sz="2400" dirty="0" err="1">
+                <a:latin typeface="Courier New" panose="02070309020205020404" pitchFamily="49" charset="0"/>
+                <a:cs typeface="Courier New" panose="02070309020205020404" pitchFamily="49" charset="0"/>
+              </a:rPr>
+              <a:t>org.hibernate.type.descriptor.sql</a:t>
+            </a:r>
+            <a:r>
+              <a:rPr lang="en-US" sz="2400" dirty="0">
+                <a:latin typeface="Courier New" panose="02070309020205020404" pitchFamily="49" charset="0"/>
+                <a:cs typeface="Courier New" panose="02070309020205020404" pitchFamily="49" charset="0"/>
+              </a:rPr>
+              <a:t>: trace</a:t>
             </a:r>
           </a:p>
         </p:txBody>
@@ -32143,7 +33080,7 @@
     </p:spTree>
     <p:extLst>
       <p:ext uri="{BB962C8B-B14F-4D97-AF65-F5344CB8AC3E}">
-        <p14:creationId xmlns:p14="http://schemas.microsoft.com/office/powerpoint/2010/main" val="3338901119"/>
+        <p14:creationId xmlns:p14="http://schemas.microsoft.com/office/powerpoint/2010/main" val="36027474"/>
       </p:ext>
     </p:extLst>
   </p:cSld>
@@ -32200,8 +33137,23 @@
           <a:p>
             <a:r>
               <a:rPr lang="en-US" dirty="0"/>
-              <a:t>Mistake 5: Using association fetching anti-patterns</a:t>
-            </a:r>
+              <a:t>Mistake 3: Using </a:t>
+            </a:r>
+            <a:r>
+              <a:rPr lang="en-US" dirty="0">
+                <a:latin typeface="Courier New" panose="02070309020205020404" pitchFamily="49" charset="0"/>
+                <a:cs typeface="Courier New" panose="02070309020205020404" pitchFamily="49" charset="0"/>
+              </a:rPr>
+              <a:t>@Transactional </a:t>
+            </a:r>
+            <a:r>
+              <a:rPr lang="en-US" dirty="0"/>
+              <a:t>in tests</a:t>
+            </a:r>
+            <a:endParaRPr lang="en-US" dirty="0">
+              <a:latin typeface="Courier New" panose="02070309020205020404" pitchFamily="49" charset="0"/>
+              <a:cs typeface="Courier New" panose="02070309020205020404" pitchFamily="49" charset="0"/>
+            </a:endParaRPr>
           </a:p>
         </p:txBody>
       </p:sp>
@@ -32224,7 +33176,7 @@
         <p:spPr>
           <a:xfrm>
             <a:off x="1296000" y="2105696"/>
-            <a:ext cx="9864000" cy="3632163"/>
+            <a:ext cx="9864000" cy="4279473"/>
           </a:xfrm>
         </p:spPr>
         <p:txBody>
@@ -32239,13 +33191,83 @@
               </a:spcAft>
             </a:pPr>
             <a:r>
-              <a:rPr lang="en-US" sz="2800" dirty="0"/>
-              <a:t>Open session in view</a:t>
-            </a:r>
-            <a:endParaRPr lang="en-US" sz="2800" dirty="0">
-              <a:latin typeface="Courier New" panose="02070309020205020404" pitchFamily="49" charset="0"/>
-              <a:cs typeface="Courier New" panose="02070309020205020404" pitchFamily="49" charset="0"/>
-            </a:endParaRPr>
+              <a:rPr lang="en-US" dirty="0"/>
+              <a:t>Why would you use </a:t>
+            </a:r>
+            <a:r>
+              <a:rPr lang="en-US" dirty="0">
+                <a:latin typeface="Courier New" panose="02070309020205020404" pitchFamily="49" charset="0"/>
+                <a:cs typeface="Courier New" panose="02070309020205020404" pitchFamily="49" charset="0"/>
+              </a:rPr>
+              <a:t>@Transactional </a:t>
+            </a:r>
+            <a:r>
+              <a:rPr lang="en-US" dirty="0"/>
+              <a:t>in a test?</a:t>
+            </a:r>
+          </a:p>
+          <a:p>
+            <a:pPr lvl="1">
+              <a:spcAft>
+                <a:spcPts val="600"/>
+              </a:spcAft>
+            </a:pPr>
+            <a:r>
+              <a:rPr lang="en-US" dirty="0"/>
+              <a:t>To clean up data and ensure a deterministic test suite.</a:t>
+            </a:r>
+          </a:p>
+          <a:p>
+            <a:pPr lvl="1">
+              <a:spcAft>
+                <a:spcPts val="600"/>
+              </a:spcAft>
+            </a:pPr>
+            <a:r>
+              <a:rPr lang="en-US" dirty="0"/>
+              <a:t>Behavior of </a:t>
+            </a:r>
+            <a:r>
+              <a:rPr lang="en-US" dirty="0">
+                <a:latin typeface="Courier New" panose="02070309020205020404" pitchFamily="49" charset="0"/>
+                <a:cs typeface="Courier New" panose="02070309020205020404" pitchFamily="49" charset="0"/>
+              </a:rPr>
+              <a:t>@Transactional </a:t>
+            </a:r>
+            <a:r>
+              <a:rPr lang="en-US" dirty="0"/>
+              <a:t>in tests = rollback</a:t>
+            </a:r>
+          </a:p>
+          <a:p>
+            <a:pPr lvl="2">
+              <a:spcAft>
+                <a:spcPts val="600"/>
+              </a:spcAft>
+            </a:pPr>
+            <a:r>
+              <a:rPr lang="en-US" dirty="0"/>
+              <a:t>In the </a:t>
+            </a:r>
+            <a:r>
+              <a:rPr lang="en-US" dirty="0" err="1"/>
+              <a:t>TestContext</a:t>
+            </a:r>
+            <a:r>
+              <a:rPr lang="en-US" dirty="0"/>
+              <a:t> framework, transactions are managed by the </a:t>
+            </a:r>
+            <a:r>
+              <a:rPr lang="en-US" dirty="0" err="1">
+                <a:latin typeface="Courier New" panose="02070309020205020404" pitchFamily="49" charset="0"/>
+                <a:cs typeface="Courier New" panose="02070309020205020404" pitchFamily="49" charset="0"/>
+              </a:rPr>
+              <a:t>TransactionalTestExecutionListener</a:t>
+            </a:r>
+            <a:r>
+              <a:rPr lang="en-US" dirty="0"/>
+              <a:t>.</a:t>
+            </a:r>
           </a:p>
           <a:p>
             <a:pPr>
@@ -32254,16 +33276,31 @@
               </a:spcAft>
             </a:pPr>
             <a:r>
-              <a:rPr lang="en-US" sz="2800" dirty="0" err="1">
+              <a:rPr lang="en-US" dirty="0"/>
+              <a:t>What is the biggest problem when doing this?</a:t>
+            </a:r>
+          </a:p>
+          <a:p>
+            <a:pPr lvl="1">
+              <a:spcAft>
+                <a:spcPts val="600"/>
+              </a:spcAft>
+            </a:pPr>
+            <a:r>
+              <a:rPr lang="en-US" dirty="0"/>
+              <a:t>Using </a:t>
+            </a:r>
+            <a:r>
+              <a:rPr lang="en-US" dirty="0">
                 <a:latin typeface="Courier New" panose="02070309020205020404" pitchFamily="49" charset="0"/>
                 <a:cs typeface="Courier New" panose="02070309020205020404" pitchFamily="49" charset="0"/>
               </a:rPr>
-              <a:t>enable_lazy_load_no_trans</a:t>
-            </a:r>
-            <a:endParaRPr lang="en-US" sz="2800" dirty="0">
-              <a:latin typeface="Courier New" panose="02070309020205020404" pitchFamily="49" charset="0"/>
-              <a:cs typeface="Courier New" panose="02070309020205020404" pitchFamily="49" charset="0"/>
-            </a:endParaRPr>
+              <a:t>@Transactional </a:t>
+            </a:r>
+            <a:r>
+              <a:rPr lang="en-US" dirty="0"/>
+              <a:t>in tests is dangerous as it can hide production issues.</a:t>
+            </a:r>
           </a:p>
           <a:p>
             <a:pPr>
@@ -32272,16 +33309,9 @@
               </a:spcAft>
             </a:pPr>
             <a:r>
-              <a:rPr lang="en-US" sz="2800" dirty="0" err="1">
-                <a:latin typeface="Courier New" panose="02070309020205020404" pitchFamily="49" charset="0"/>
-                <a:cs typeface="Courier New" panose="02070309020205020404" pitchFamily="49" charset="0"/>
-              </a:rPr>
-              <a:t>FetchType.EAGER</a:t>
-            </a:r>
-            <a:endParaRPr lang="en-US" sz="2800" dirty="0">
-              <a:latin typeface="Courier New" panose="02070309020205020404" pitchFamily="49" charset="0"/>
-              <a:cs typeface="Courier New" panose="02070309020205020404" pitchFamily="49" charset="0"/>
-            </a:endParaRPr>
+              <a:rPr lang="en-US" dirty="0"/>
+              <a:t>Solution:</a:t>
+            </a:r>
           </a:p>
           <a:p>
             <a:pPr lvl="1">
@@ -32291,7 +33321,18 @@
             </a:pPr>
             <a:r>
               <a:rPr lang="en-US" dirty="0"/>
-              <a:t>Including the default for all-to-one associations.</a:t>
+              <a:t>Clean up manually (</a:t>
+            </a:r>
+            <a:r>
+              <a:rPr lang="en-US" dirty="0">
+                <a:latin typeface="Courier New" panose="02070309020205020404" pitchFamily="49" charset="0"/>
+                <a:cs typeface="Courier New" panose="02070309020205020404" pitchFamily="49" charset="0"/>
+              </a:rPr>
+              <a:t>@AfterEach</a:t>
+            </a:r>
+            <a:r>
+              <a:rPr lang="en-US" dirty="0"/>
+              <a:t>).</a:t>
             </a:r>
           </a:p>
           <a:p>
@@ -32300,28 +33341,61 @@
                 <a:spcPts val="600"/>
               </a:spcAft>
             </a:pPr>
-            <a:r>
-              <a:rPr lang="en-US" dirty="0"/>
-              <a:t>Not using </a:t>
-            </a:r>
-            <a:r>
-              <a:rPr lang="en-US" dirty="0">
-                <a:latin typeface="Courier New" panose="02070309020205020404" pitchFamily="49" charset="0"/>
-                <a:cs typeface="Courier New" panose="02070309020205020404" pitchFamily="49" charset="0"/>
-              </a:rPr>
-              <a:t>JOIN FETCH </a:t>
-            </a:r>
-            <a:r>
-              <a:rPr lang="en-US" dirty="0"/>
-              <a:t>directive if necessary to avoid the N+1 problem.</a:t>
-            </a:r>
+            <a:endParaRPr lang="en-US" dirty="0"/>
           </a:p>
         </p:txBody>
       </p:sp>
+      <p:pic>
+        <p:nvPicPr>
+          <p:cNvPr id="4" name="Picture 2" descr="22,947 Demo Foto's, Afbeeldingen en Stock Fotografie - 123RF">
+            <a:extLst>
+              <a:ext uri="{FF2B5EF4-FFF2-40B4-BE49-F238E27FC236}">
+                <a16:creationId xmlns:a16="http://schemas.microsoft.com/office/drawing/2014/main" id="{3078C261-1290-4C96-B0F3-7F5867671363}"/>
+              </a:ext>
+            </a:extLst>
+          </p:cNvPr>
+          <p:cNvPicPr>
+            <a:picLocks noChangeAspect="1" noChangeArrowheads="1"/>
+          </p:cNvPicPr>
+          <p:nvPr/>
+        </p:nvPicPr>
+        <p:blipFill>
+          <a:blip r:embed="rId2">
+            <a:extLst>
+              <a:ext uri="{28A0092B-C50C-407E-A947-70E740481C1C}">
+                <a14:useLocalDpi xmlns:a14="http://schemas.microsoft.com/office/drawing/2010/main" val="0"/>
+              </a:ext>
+            </a:extLst>
+          </a:blip>
+          <a:srcRect/>
+          <a:stretch>
+            <a:fillRect/>
+          </a:stretch>
+        </p:blipFill>
+        <p:spPr bwMode="auto">
+          <a:xfrm>
+            <a:off x="10059668" y="5661520"/>
+            <a:ext cx="1923011" cy="952959"/>
+          </a:xfrm>
+          <a:prstGeom prst="rect">
+            <a:avLst/>
+          </a:prstGeom>
+          <a:noFill/>
+          <a:extLst>
+            <a:ext uri="{909E8E84-426E-40DD-AFC4-6F175D3DCCD1}">
+              <a14:hiddenFill xmlns:a14="http://schemas.microsoft.com/office/drawing/2010/main">
+                <a:solidFill>
+                  <a:srgbClr val="FFFFFF"/>
+                </a:solidFill>
+              </a14:hiddenFill>
+            </a:ext>
+          </a:extLst>
+        </p:spPr>
+      </p:pic>
     </p:spTree>
     <p:extLst>
       <p:ext uri="{BB962C8B-B14F-4D97-AF65-F5344CB8AC3E}">
-        <p14:creationId xmlns:p14="http://schemas.microsoft.com/office/powerpoint/2010/main" val="865283392"/>
+        <p14:creationId xmlns:p14="http://schemas.microsoft.com/office/powerpoint/2010/main" val="3022796713"/>
       </p:ext>
     </p:extLst>
   </p:cSld>
@@ -32366,8 +33440,8 @@
         </p:nvSpPr>
         <p:spPr>
           <a:xfrm>
-            <a:off x="1296000" y="720000"/>
-            <a:ext cx="9864000" cy="681480"/>
+            <a:off x="1296000" y="719999"/>
+            <a:ext cx="9864000" cy="1057285"/>
           </a:xfrm>
         </p:spPr>
         <p:txBody>
@@ -32378,8 +33452,15 @@
           <a:p>
             <a:r>
               <a:rPr lang="en-US" dirty="0"/>
-              <a:t>Mistake 6: Not offloading enough to the database</a:t>
-            </a:r>
+              <a:t>Mistake 4: Updating or removing entities one-by-one</a:t>
+            </a:r>
+            <a:endParaRPr lang="en-US" dirty="0">
+              <a:solidFill>
+                <a:srgbClr val="FF0000"/>
+              </a:solidFill>
+              <a:latin typeface="Courier New" panose="02070309020205020404" pitchFamily="49" charset="0"/>
+              <a:cs typeface="Courier New" panose="02070309020205020404" pitchFamily="49" charset="0"/>
+            </a:endParaRPr>
           </a:p>
         </p:txBody>
       </p:sp>
@@ -32417,8 +33498,8 @@
               </a:spcAft>
             </a:pPr>
             <a:r>
-              <a:rPr lang="en-US" sz="2800" dirty="0"/>
-              <a:t>The database is here to work for you!</a:t>
+              <a:rPr lang="en-US" dirty="0"/>
+              <a:t>Anti-pattern: retrieving entities and updating/deleting them one by one.</a:t>
             </a:r>
           </a:p>
           <a:p>
@@ -32428,8 +33509,30 @@
               </a:spcAft>
             </a:pPr>
             <a:r>
-              <a:rPr lang="en-US" sz="2800" dirty="0"/>
-              <a:t>Don’t be afraid to use views, procedures, etc. with Hibernate.</a:t>
+              <a:rPr lang="en-US" dirty="0"/>
+              <a:t>Try to create an update/delete query for all relevant rows.</a:t>
+            </a:r>
+          </a:p>
+          <a:p>
+            <a:pPr>
+              <a:spcAft>
+                <a:spcPts val="600"/>
+              </a:spcAft>
+            </a:pPr>
+            <a:r>
+              <a:rPr lang="en-US" dirty="0"/>
+              <a:t>If not possible to write a general query: think about batch processing and Hibernate memory usage.</a:t>
+            </a:r>
+          </a:p>
+          <a:p>
+            <a:pPr lvl="1">
+              <a:spcAft>
+                <a:spcPts val="600"/>
+              </a:spcAft>
+            </a:pPr>
+            <a:r>
+              <a:rPr lang="en-US" dirty="0"/>
+              <a:t>https://docs.jboss.org/hibernate/core/3.6/reference/en-US/html_single/#batch</a:t>
             </a:r>
           </a:p>
         </p:txBody>
@@ -32437,7 +33540,7 @@
     </p:spTree>
     <p:extLst>
       <p:ext uri="{BB962C8B-B14F-4D97-AF65-F5344CB8AC3E}">
-        <p14:creationId xmlns:p14="http://schemas.microsoft.com/office/powerpoint/2010/main" val="4240503186"/>
+        <p14:creationId xmlns:p14="http://schemas.microsoft.com/office/powerpoint/2010/main" val="3338901119"/>
       </p:ext>
     </p:extLst>
   </p:cSld>
@@ -32483,7 +33586,7 @@
         <p:spPr>
           <a:xfrm>
             <a:off x="1296000" y="720000"/>
-            <a:ext cx="9864000" cy="1165950"/>
+            <a:ext cx="9864000" cy="681480"/>
           </a:xfrm>
         </p:spPr>
         <p:txBody>
@@ -32494,7 +33597,7 @@
           <a:p>
             <a:r>
               <a:rPr lang="en-US" dirty="0"/>
-              <a:t>Mistake 7: Using a different database system in your tests</a:t>
+              <a:t>Mistake 5: Using association fetching anti-patterns</a:t>
             </a:r>
           </a:p>
         </p:txBody>
@@ -32534,16 +33637,12 @@
             </a:pPr>
             <a:r>
               <a:rPr lang="en-US" sz="2800" dirty="0"/>
-              <a:t>No need for H2, use </a:t>
-            </a:r>
-            <a:r>
-              <a:rPr lang="en-US" sz="2800" i="1" dirty="0" err="1"/>
-              <a:t>Testcontainers</a:t>
-            </a:r>
-            <a:r>
-              <a:rPr lang="en-US" sz="2800" dirty="0"/>
-              <a:t> for integration tests.</a:t>
-            </a:r>
+              <a:t>Open session in view</a:t>
+            </a:r>
+            <a:endParaRPr lang="en-US" sz="2800" dirty="0">
+              <a:latin typeface="Courier New" panose="02070309020205020404" pitchFamily="49" charset="0"/>
+              <a:cs typeface="Courier New" panose="02070309020205020404" pitchFamily="49" charset="0"/>
+            </a:endParaRPr>
           </a:p>
           <a:p>
             <a:pPr>
@@ -32552,8 +33651,55 @@
               </a:spcAft>
             </a:pPr>
             <a:r>
+              <a:rPr lang="en-US" sz="2800" dirty="0" err="1">
+                <a:latin typeface="Courier New" panose="02070309020205020404" pitchFamily="49" charset="0"/>
+                <a:cs typeface="Courier New" panose="02070309020205020404" pitchFamily="49" charset="0"/>
+              </a:rPr>
+              <a:t>enable_lazy_load_no_trans</a:t>
+            </a:r>
+            <a:endParaRPr lang="en-US" sz="2800" dirty="0">
+              <a:latin typeface="Courier New" panose="02070309020205020404" pitchFamily="49" charset="0"/>
+              <a:cs typeface="Courier New" panose="02070309020205020404" pitchFamily="49" charset="0"/>
+            </a:endParaRPr>
+          </a:p>
+          <a:p>
+            <a:pPr>
+              <a:spcAft>
+                <a:spcPts val="600"/>
+              </a:spcAft>
+            </a:pPr>
+            <a:r>
+              <a:rPr lang="en-US" sz="2800" dirty="0" err="1">
+                <a:latin typeface="Courier New" panose="02070309020205020404" pitchFamily="49" charset="0"/>
+                <a:cs typeface="Courier New" panose="02070309020205020404" pitchFamily="49" charset="0"/>
+              </a:rPr>
+              <a:t>FetchType.EAGER</a:t>
+            </a:r>
+            <a:endParaRPr lang="en-US" sz="2800" dirty="0">
+              <a:latin typeface="Courier New" panose="02070309020205020404" pitchFamily="49" charset="0"/>
+              <a:cs typeface="Courier New" panose="02070309020205020404" pitchFamily="49" charset="0"/>
+            </a:endParaRPr>
+          </a:p>
+          <a:p>
+            <a:pPr>
+              <a:spcAft>
+                <a:spcPts val="600"/>
+              </a:spcAft>
+            </a:pPr>
+            <a:r>
               <a:rPr lang="en-US" sz="2800" dirty="0"/>
-              <a:t>Ensures that your tests are representative for production.</a:t>
+              <a:t>Not using </a:t>
+            </a:r>
+            <a:r>
+              <a:rPr lang="en-US" sz="2800" dirty="0">
+                <a:latin typeface="Courier New" panose="02070309020205020404" pitchFamily="49" charset="0"/>
+                <a:cs typeface="Courier New" panose="02070309020205020404" pitchFamily="49" charset="0"/>
+              </a:rPr>
+              <a:t>JOIN FETCH </a:t>
+            </a:r>
+            <a:r>
+              <a:rPr lang="en-US" sz="2800" dirty="0"/>
+              <a:t>directive if necessary to avoid the N+1 problem.</a:t>
             </a:r>
           </a:p>
         </p:txBody>
@@ -32561,7 +33707,7 @@
     </p:spTree>
     <p:extLst>
       <p:ext uri="{BB962C8B-B14F-4D97-AF65-F5344CB8AC3E}">
-        <p14:creationId xmlns:p14="http://schemas.microsoft.com/office/powerpoint/2010/main" val="2812624236"/>
+        <p14:creationId xmlns:p14="http://schemas.microsoft.com/office/powerpoint/2010/main" val="865283392"/>
       </p:ext>
     </p:extLst>
   </p:cSld>
@@ -32612,30 +33758,14 @@
         </p:spPr>
         <p:txBody>
           <a:bodyPr anchor="t">
-            <a:normAutofit/>
+            <a:normAutofit fontScale="90000"/>
           </a:bodyPr>
           <a:lstStyle/>
           <a:p>
             <a:r>
               <a:rPr lang="en-US" dirty="0"/>
-              <a:t>Mistake 8: Using </a:t>
-            </a:r>
-            <a:r>
-              <a:rPr lang="en-US" dirty="0">
-                <a:latin typeface="Courier New" panose="02070309020205020404" pitchFamily="49" charset="0"/>
-                <a:cs typeface="Courier New" panose="02070309020205020404" pitchFamily="49" charset="0"/>
-              </a:rPr>
-              <a:t>flush </a:t>
-            </a:r>
-            <a:r>
-              <a:rPr lang="en-US" dirty="0"/>
-              <a:t>without reason</a:t>
-            </a:r>
-            <a:endParaRPr lang="en-US" dirty="0">
-              <a:solidFill>
-                <a:srgbClr val="FF0000"/>
-              </a:solidFill>
-            </a:endParaRPr>
+              <a:t>Mistake 6: Not offloading enough to the database</a:t>
+            </a:r>
           </a:p>
         </p:txBody>
       </p:sp>
@@ -32674,7 +33804,7 @@
             </a:pPr>
             <a:r>
               <a:rPr lang="en-US" sz="2800" dirty="0"/>
-              <a:t>It forces Hibernate to perform dirty checking and writing updates to the database early.</a:t>
+              <a:t>The database is here to work for you!</a:t>
             </a:r>
           </a:p>
           <a:p>
@@ -32685,18 +33815,7 @@
             </a:pPr>
             <a:r>
               <a:rPr lang="en-US" sz="2800" dirty="0"/>
-              <a:t>Let Hibernate combine updates into 1 SQL update, bundle multiple identical statements into a batch call, etc.</a:t>
-            </a:r>
-          </a:p>
-          <a:p>
-            <a:pPr>
-              <a:spcAft>
-                <a:spcPts val="600"/>
-              </a:spcAft>
-            </a:pPr>
-            <a:r>
-              <a:rPr lang="en-US" sz="2800" dirty="0"/>
-              <a:t>Rare exception: batch updates.</a:t>
+              <a:t>Don’t be afraid to use views, procedures, etc. with Hibernate.</a:t>
             </a:r>
           </a:p>
         </p:txBody>
@@ -32704,7 +33823,7 @@
     </p:spTree>
     <p:extLst>
       <p:ext uri="{BB962C8B-B14F-4D97-AF65-F5344CB8AC3E}">
-        <p14:creationId xmlns:p14="http://schemas.microsoft.com/office/powerpoint/2010/main" val="2389961084"/>
+        <p14:creationId xmlns:p14="http://schemas.microsoft.com/office/powerpoint/2010/main" val="4240503186"/>
       </p:ext>
     </p:extLst>
   </p:cSld>
@@ -32750,7 +33869,7 @@
         <p:spPr>
           <a:xfrm>
             <a:off x="1296000" y="720000"/>
-            <a:ext cx="9864000" cy="681480"/>
+            <a:ext cx="9864000" cy="1165950"/>
           </a:xfrm>
         </p:spPr>
         <p:txBody>
@@ -32761,18 +33880,7 @@
           <a:p>
             <a:r>
               <a:rPr lang="en-US" dirty="0"/>
-              <a:t>Mistake 9: Not understanding </a:t>
-            </a:r>
-            <a:r>
-              <a:rPr lang="en-US" dirty="0">
-                <a:latin typeface="Courier New" panose="02070309020205020404" pitchFamily="49" charset="0"/>
-                <a:cs typeface="Courier New" panose="02070309020205020404" pitchFamily="49" charset="0"/>
-              </a:rPr>
-              <a:t>@Transactional </a:t>
-            </a:r>
-            <a:r>
-              <a:rPr lang="en-US" dirty="0"/>
-              <a:t>semantics</a:t>
+              <a:t>Mistake 7: Using a different database system in your tests</a:t>
             </a:r>
           </a:p>
         </p:txBody>
@@ -32812,89 +33920,34 @@
             </a:pPr>
             <a:r>
               <a:rPr lang="en-US" sz="2800" dirty="0"/>
-              <a:t>Spot the problems:</a:t>
-            </a:r>
-          </a:p>
-          <a:p>
-            <a:pPr lvl="1">
+              <a:t>No need for H2, use </a:t>
+            </a:r>
+            <a:r>
+              <a:rPr lang="en-US" sz="2800" i="1" dirty="0" err="1"/>
+              <a:t>Testcontainers</a:t>
+            </a:r>
+            <a:r>
+              <a:rPr lang="en-US" sz="2800" dirty="0"/>
+              <a:t> for integration tests.</a:t>
+            </a:r>
+          </a:p>
+          <a:p>
+            <a:pPr>
               <a:spcAft>
                 <a:spcPts val="600"/>
               </a:spcAft>
             </a:pPr>
             <a:r>
-              <a:rPr lang="en-US" sz="2400" dirty="0"/>
-              <a:t>Demo: retrieve all comments</a:t>
-            </a:r>
-          </a:p>
-          <a:p>
-            <a:pPr lvl="1">
-              <a:spcAft>
-                <a:spcPts val="600"/>
-              </a:spcAft>
-            </a:pPr>
-            <a:r>
-              <a:rPr lang="en-US" sz="2400" dirty="0"/>
-              <a:t>Demo: give managers a raise</a:t>
-            </a:r>
-            <a:endParaRPr lang="en-US" sz="2400" dirty="0">
-              <a:solidFill>
-                <a:srgbClr val="FF0000"/>
-              </a:solidFill>
-            </a:endParaRPr>
+              <a:rPr lang="en-US" sz="2800" dirty="0"/>
+              <a:t>Ensures that your tests are representative for production.</a:t>
+            </a:r>
           </a:p>
         </p:txBody>
       </p:sp>
-      <p:pic>
-        <p:nvPicPr>
-          <p:cNvPr id="4" name="Picture 2" descr="22,947 Demo Foto's, Afbeeldingen en Stock Fotografie - 123RF">
-            <a:extLst>
-              <a:ext uri="{FF2B5EF4-FFF2-40B4-BE49-F238E27FC236}">
-                <a16:creationId xmlns:a16="http://schemas.microsoft.com/office/drawing/2014/main" id="{87FF1B22-1B3E-4538-B78C-F1254AD75764}"/>
-              </a:ext>
-            </a:extLst>
-          </p:cNvPr>
-          <p:cNvPicPr>
-            <a:picLocks noChangeAspect="1" noChangeArrowheads="1"/>
-          </p:cNvPicPr>
-          <p:nvPr/>
-        </p:nvPicPr>
-        <p:blipFill>
-          <a:blip r:embed="rId2">
-            <a:extLst>
-              <a:ext uri="{28A0092B-C50C-407E-A947-70E740481C1C}">
-                <a14:useLocalDpi xmlns:a14="http://schemas.microsoft.com/office/drawing/2010/main" val="0"/>
-              </a:ext>
-            </a:extLst>
-          </a:blip>
-          <a:srcRect/>
-          <a:stretch>
-            <a:fillRect/>
-          </a:stretch>
-        </p:blipFill>
-        <p:spPr bwMode="auto">
-          <a:xfrm>
-            <a:off x="10059668" y="5661520"/>
-            <a:ext cx="1923011" cy="952959"/>
-          </a:xfrm>
-          <a:prstGeom prst="rect">
-            <a:avLst/>
-          </a:prstGeom>
-          <a:noFill/>
-          <a:extLst>
-            <a:ext uri="{909E8E84-426E-40DD-AFC4-6F175D3DCCD1}">
-              <a14:hiddenFill xmlns:a14="http://schemas.microsoft.com/office/drawing/2010/main">
-                <a:solidFill>
-                  <a:srgbClr val="FFFFFF"/>
-                </a:solidFill>
-              </a14:hiddenFill>
-            </a:ext>
-          </a:extLst>
-        </p:spPr>
-      </p:pic>
     </p:spTree>
     <p:extLst>
       <p:ext uri="{BB962C8B-B14F-4D97-AF65-F5344CB8AC3E}">
-        <p14:creationId xmlns:p14="http://schemas.microsoft.com/office/powerpoint/2010/main" val="730571193"/>
+        <p14:creationId xmlns:p14="http://schemas.microsoft.com/office/powerpoint/2010/main" val="2812624236"/>
       </p:ext>
     </p:extLst>
   </p:cSld>
@@ -32945,79 +33998,99 @@
         </p:spPr>
         <p:txBody>
           <a:bodyPr anchor="t">
-            <a:normAutofit fontScale="90000"/>
+            <a:normAutofit/>
           </a:bodyPr>
           <a:lstStyle/>
           <a:p>
             <a:r>
               <a:rPr lang="en-US" dirty="0"/>
-              <a:t>Mistake 9: Not understanding </a:t>
+              <a:t>Mistake 8: Using </a:t>
             </a:r>
             <a:r>
               <a:rPr lang="en-US" dirty="0">
                 <a:latin typeface="Courier New" panose="02070309020205020404" pitchFamily="49" charset="0"/>
                 <a:cs typeface="Courier New" panose="02070309020205020404" pitchFamily="49" charset="0"/>
               </a:rPr>
-              <a:t>@Transactional </a:t>
+              <a:t>flush </a:t>
             </a:r>
             <a:r>
               <a:rPr lang="en-US" dirty="0"/>
-              <a:t>semantics</a:t>
-            </a:r>
+              <a:t>without reason</a:t>
+            </a:r>
+            <a:endParaRPr lang="en-US" dirty="0">
+              <a:solidFill>
+                <a:srgbClr val="FF0000"/>
+              </a:solidFill>
+            </a:endParaRPr>
           </a:p>
         </p:txBody>
       </p:sp>
-      <p:pic>
-        <p:nvPicPr>
-          <p:cNvPr id="2050" name="Picture 2" descr="A beginner's guide to entity state transitions with JPA and Hibernate -  Vlad Mihalcea">
+      <p:sp>
+        <p:nvSpPr>
+          <p:cNvPr id="13" name="Text Placeholder 2">
             <a:extLst>
               <a:ext uri="{FF2B5EF4-FFF2-40B4-BE49-F238E27FC236}">
-                <a16:creationId xmlns:a16="http://schemas.microsoft.com/office/drawing/2014/main" id="{381D251D-9E80-43FA-9B7D-273D35E1892C}"/>
+                <a16:creationId xmlns:a16="http://schemas.microsoft.com/office/drawing/2014/main" id="{5AFACC08-6E7F-14DD-D1E6-54973126E7AF}"/>
               </a:ext>
             </a:extLst>
           </p:cNvPr>
-          <p:cNvPicPr>
-            <a:picLocks noChangeAspect="1" noChangeArrowheads="1"/>
-          </p:cNvPicPr>
-          <p:nvPr/>
-        </p:nvPicPr>
-        <p:blipFill>
-          <a:blip r:embed="rId2">
-            <a:extLst>
-              <a:ext uri="{28A0092B-C50C-407E-A947-70E740481C1C}">
-                <a14:useLocalDpi xmlns:a14="http://schemas.microsoft.com/office/drawing/2010/main" val="0"/>
-              </a:ext>
-            </a:extLst>
-          </a:blip>
-          <a:srcRect/>
-          <a:stretch>
-            <a:fillRect/>
-          </a:stretch>
-        </p:blipFill>
-        <p:spPr bwMode="auto">
+          <p:cNvSpPr>
+            <a:spLocks noGrp="1"/>
+          </p:cNvSpPr>
+          <p:nvPr>
+            <p:ph type="body" sz="quarter" idx="10"/>
+          </p:nvPr>
+        </p:nvSpPr>
+        <p:spPr>
           <a:xfrm>
-            <a:off x="2690812" y="2108869"/>
-            <a:ext cx="6810375" cy="4333875"/>
+            <a:off x="1296000" y="2105696"/>
+            <a:ext cx="9864000" cy="3632163"/>
           </a:xfrm>
-          <a:prstGeom prst="rect">
-            <a:avLst/>
-          </a:prstGeom>
-          <a:noFill/>
-          <a:extLst>
-            <a:ext uri="{909E8E84-426E-40DD-AFC4-6F175D3DCCD1}">
-              <a14:hiddenFill xmlns:a14="http://schemas.microsoft.com/office/drawing/2010/main">
-                <a:solidFill>
-                  <a:srgbClr val="FFFFFF"/>
-                </a:solidFill>
-              </a14:hiddenFill>
-            </a:ext>
-          </a:extLst>
         </p:spPr>
-      </p:pic>
+        <p:txBody>
+          <a:bodyPr>
+            <a:normAutofit/>
+          </a:bodyPr>
+          <a:lstStyle/>
+          <a:p>
+            <a:pPr>
+              <a:spcAft>
+                <a:spcPts val="600"/>
+              </a:spcAft>
+            </a:pPr>
+            <a:r>
+              <a:rPr lang="en-US" sz="2800" dirty="0"/>
+              <a:t>It forces Hibernate to perform dirty checking and writing updates to the database early.</a:t>
+            </a:r>
+          </a:p>
+          <a:p>
+            <a:pPr>
+              <a:spcAft>
+                <a:spcPts val="600"/>
+              </a:spcAft>
+            </a:pPr>
+            <a:r>
+              <a:rPr lang="en-US" sz="2800" dirty="0"/>
+              <a:t>Let Hibernate combine updates into 1 SQL update, bundle multiple identical statements into a batch call, etc.</a:t>
+            </a:r>
+          </a:p>
+          <a:p>
+            <a:pPr>
+              <a:spcAft>
+                <a:spcPts val="600"/>
+              </a:spcAft>
+            </a:pPr>
+            <a:r>
+              <a:rPr lang="en-US" sz="2800" dirty="0"/>
+              <a:t>Rare exception: batch updates.</a:t>
+            </a:r>
+          </a:p>
+        </p:txBody>
+      </p:sp>
     </p:spTree>
     <p:extLst>
       <p:ext uri="{BB962C8B-B14F-4D97-AF65-F5344CB8AC3E}">
-        <p14:creationId xmlns:p14="http://schemas.microsoft.com/office/powerpoint/2010/main" val="1820933201"/>
+        <p14:creationId xmlns:p14="http://schemas.microsoft.com/office/powerpoint/2010/main" val="2389961084"/>
       </p:ext>
     </p:extLst>
   </p:cSld>
@@ -33114,7 +34187,30 @@
             </a:pPr>
             <a:r>
               <a:rPr lang="en-US" sz="2400" dirty="0"/>
-              <a:t>JPA</a:t>
+              <a:t>JPA </a:t>
+            </a:r>
+            <a:endParaRPr lang="en-US" i="1" dirty="0"/>
+          </a:p>
+          <a:p>
+            <a:pPr lvl="1">
+              <a:spcAft>
+                <a:spcPts val="600"/>
+              </a:spcAft>
+            </a:pPr>
+            <a:r>
+              <a:rPr lang="en-US" dirty="0"/>
+              <a:t>Java Persistence API</a:t>
+            </a:r>
+          </a:p>
+          <a:p>
+            <a:pPr lvl="1">
+              <a:spcAft>
+                <a:spcPts val="600"/>
+              </a:spcAft>
+            </a:pPr>
+            <a:r>
+              <a:rPr lang="en-US" dirty="0"/>
+              <a:t>Now named: Jakarta Persistence API</a:t>
             </a:r>
           </a:p>
           <a:p>
@@ -33239,13 +34335,24 @@
         </p:spPr>
         <p:txBody>
           <a:bodyPr anchor="t">
-            <a:normAutofit/>
+            <a:normAutofit fontScale="90000"/>
           </a:bodyPr>
           <a:lstStyle/>
           <a:p>
             <a:r>
               <a:rPr lang="en-US" dirty="0"/>
-              <a:t>Mistake 10: Leaking entities to web layer</a:t>
+              <a:t>Mistake 9: Not understanding </a:t>
+            </a:r>
+            <a:r>
+              <a:rPr lang="en-US" dirty="0">
+                <a:latin typeface="Courier New" panose="02070309020205020404" pitchFamily="49" charset="0"/>
+                <a:cs typeface="Courier New" panose="02070309020205020404" pitchFamily="49" charset="0"/>
+              </a:rPr>
+              <a:t>@Transactional </a:t>
+            </a:r>
+            <a:r>
+              <a:rPr lang="en-US" dirty="0"/>
+              <a:t>semantics</a:t>
             </a:r>
           </a:p>
         </p:txBody>
@@ -33284,27 +34391,90 @@
               </a:spcAft>
             </a:pPr>
             <a:r>
-              <a:rPr lang="en-US" dirty="0"/>
-              <a:t>Always map entities to a data transfer object (DTO).</a:t>
-            </a:r>
-          </a:p>
-          <a:p>
-            <a:pPr>
+              <a:rPr lang="en-US" sz="2800" dirty="0"/>
+              <a:t>Spot the problems:</a:t>
+            </a:r>
+          </a:p>
+          <a:p>
+            <a:pPr lvl="1">
               <a:spcAft>
                 <a:spcPts val="600"/>
               </a:spcAft>
             </a:pPr>
             <a:r>
-              <a:rPr lang="en-US" dirty="0"/>
-              <a:t>Avoid security leaks and have a separation between the database model and the web model.</a:t>
-            </a:r>
+              <a:rPr lang="en-US" sz="2400" dirty="0"/>
+              <a:t>Demo: retrieve all comments</a:t>
+            </a:r>
+          </a:p>
+          <a:p>
+            <a:pPr lvl="1">
+              <a:spcAft>
+                <a:spcPts val="600"/>
+              </a:spcAft>
+            </a:pPr>
+            <a:r>
+              <a:rPr lang="en-US" sz="2400" dirty="0"/>
+              <a:t>Demo: give managers a raise</a:t>
+            </a:r>
+            <a:endParaRPr lang="en-US" sz="2400" dirty="0">
+              <a:solidFill>
+                <a:srgbClr val="FF0000"/>
+              </a:solidFill>
+            </a:endParaRPr>
           </a:p>
         </p:txBody>
       </p:sp>
+      <p:pic>
+        <p:nvPicPr>
+          <p:cNvPr id="4" name="Picture 2" descr="22,947 Demo Foto's, Afbeeldingen en Stock Fotografie - 123RF">
+            <a:extLst>
+              <a:ext uri="{FF2B5EF4-FFF2-40B4-BE49-F238E27FC236}">
+                <a16:creationId xmlns:a16="http://schemas.microsoft.com/office/drawing/2014/main" id="{87FF1B22-1B3E-4538-B78C-F1254AD75764}"/>
+              </a:ext>
+            </a:extLst>
+          </p:cNvPr>
+          <p:cNvPicPr>
+            <a:picLocks noChangeAspect="1" noChangeArrowheads="1"/>
+          </p:cNvPicPr>
+          <p:nvPr/>
+        </p:nvPicPr>
+        <p:blipFill>
+          <a:blip r:embed="rId2">
+            <a:extLst>
+              <a:ext uri="{28A0092B-C50C-407E-A947-70E740481C1C}">
+                <a14:useLocalDpi xmlns:a14="http://schemas.microsoft.com/office/drawing/2010/main" val="0"/>
+              </a:ext>
+            </a:extLst>
+          </a:blip>
+          <a:srcRect/>
+          <a:stretch>
+            <a:fillRect/>
+          </a:stretch>
+        </p:blipFill>
+        <p:spPr bwMode="auto">
+          <a:xfrm>
+            <a:off x="10059668" y="5661520"/>
+            <a:ext cx="1923011" cy="952959"/>
+          </a:xfrm>
+          <a:prstGeom prst="rect">
+            <a:avLst/>
+          </a:prstGeom>
+          <a:noFill/>
+          <a:extLst>
+            <a:ext uri="{909E8E84-426E-40DD-AFC4-6F175D3DCCD1}">
+              <a14:hiddenFill xmlns:a14="http://schemas.microsoft.com/office/drawing/2010/main">
+                <a:solidFill>
+                  <a:srgbClr val="FFFFFF"/>
+                </a:solidFill>
+              </a14:hiddenFill>
+            </a:ext>
+          </a:extLst>
+        </p:spPr>
+      </p:pic>
     </p:spTree>
     <p:extLst>
       <p:ext uri="{BB962C8B-B14F-4D97-AF65-F5344CB8AC3E}">
-        <p14:creationId xmlns:p14="http://schemas.microsoft.com/office/powerpoint/2010/main" val="3288774039"/>
+        <p14:creationId xmlns:p14="http://schemas.microsoft.com/office/powerpoint/2010/main" val="730571193"/>
       </p:ext>
     </p:extLst>
   </p:cSld>
@@ -33361,161 +34531,73 @@
           <a:p>
             <a:r>
               <a:rPr lang="en-US" dirty="0"/>
-              <a:t>Mistake 11: Including lazy associations in </a:t>
-            </a:r>
-            <a:r>
-              <a:rPr lang="en-US" dirty="0" err="1">
-                <a:latin typeface="Courier New" panose="02070309020205020404" pitchFamily="49" charset="0"/>
-                <a:cs typeface="Courier New" panose="02070309020205020404" pitchFamily="49" charset="0"/>
-              </a:rPr>
-              <a:t>toString</a:t>
+              <a:t>Mistake 9: Not understanding </a:t>
             </a:r>
             <a:r>
               <a:rPr lang="en-US" dirty="0">
                 <a:latin typeface="Courier New" panose="02070309020205020404" pitchFamily="49" charset="0"/>
                 <a:cs typeface="Courier New" panose="02070309020205020404" pitchFamily="49" charset="0"/>
               </a:rPr>
-              <a:t>()</a:t>
+              <a:t>@Transactional </a:t>
             </a:r>
             <a:r>
               <a:rPr lang="en-US" dirty="0"/>
-              <a:t> of an entity</a:t>
-            </a:r>
-            <a:endParaRPr lang="en-US" dirty="0">
-              <a:latin typeface="Courier New" panose="02070309020205020404" pitchFamily="49" charset="0"/>
-              <a:cs typeface="Courier New" panose="02070309020205020404" pitchFamily="49" charset="0"/>
-            </a:endParaRPr>
+              <a:t>semantics</a:t>
+            </a:r>
           </a:p>
         </p:txBody>
       </p:sp>
-      <p:sp>
-        <p:nvSpPr>
-          <p:cNvPr id="13" name="Text Placeholder 2">
+      <p:pic>
+        <p:nvPicPr>
+          <p:cNvPr id="2050" name="Picture 2" descr="A beginner's guide to entity state transitions with JPA and Hibernate -  Vlad Mihalcea">
             <a:extLst>
               <a:ext uri="{FF2B5EF4-FFF2-40B4-BE49-F238E27FC236}">
-                <a16:creationId xmlns:a16="http://schemas.microsoft.com/office/drawing/2014/main" id="{5AFACC08-6E7F-14DD-D1E6-54973126E7AF}"/>
+                <a16:creationId xmlns:a16="http://schemas.microsoft.com/office/drawing/2014/main" id="{381D251D-9E80-43FA-9B7D-273D35E1892C}"/>
               </a:ext>
             </a:extLst>
           </p:cNvPr>
-          <p:cNvSpPr>
-            <a:spLocks noGrp="1"/>
-          </p:cNvSpPr>
-          <p:nvPr>
-            <p:ph type="body" sz="quarter" idx="10"/>
-          </p:nvPr>
-        </p:nvSpPr>
-        <p:spPr>
+          <p:cNvPicPr>
+            <a:picLocks noChangeAspect="1" noChangeArrowheads="1"/>
+          </p:cNvPicPr>
+          <p:nvPr/>
+        </p:nvPicPr>
+        <p:blipFill>
+          <a:blip r:embed="rId2">
+            <a:extLst>
+              <a:ext uri="{28A0092B-C50C-407E-A947-70E740481C1C}">
+                <a14:useLocalDpi xmlns:a14="http://schemas.microsoft.com/office/drawing/2010/main" val="0"/>
+              </a:ext>
+            </a:extLst>
+          </a:blip>
+          <a:srcRect/>
+          <a:stretch>
+            <a:fillRect/>
+          </a:stretch>
+        </p:blipFill>
+        <p:spPr bwMode="auto">
           <a:xfrm>
-            <a:off x="1296000" y="2105696"/>
-            <a:ext cx="9864000" cy="3632163"/>
+            <a:off x="2690812" y="2108869"/>
+            <a:ext cx="6810375" cy="4333875"/>
           </a:xfrm>
+          <a:prstGeom prst="rect">
+            <a:avLst/>
+          </a:prstGeom>
+          <a:noFill/>
+          <a:extLst>
+            <a:ext uri="{909E8E84-426E-40DD-AFC4-6F175D3DCCD1}">
+              <a14:hiddenFill xmlns:a14="http://schemas.microsoft.com/office/drawing/2010/main">
+                <a:solidFill>
+                  <a:srgbClr val="FFFFFF"/>
+                </a:solidFill>
+              </a14:hiddenFill>
+            </a:ext>
+          </a:extLst>
         </p:spPr>
-        <p:txBody>
-          <a:bodyPr>
-            <a:normAutofit/>
-          </a:bodyPr>
-          <a:lstStyle/>
-          <a:p>
-            <a:pPr>
-              <a:spcAft>
-                <a:spcPts val="600"/>
-              </a:spcAft>
-            </a:pPr>
-            <a:r>
-              <a:rPr lang="en-US" dirty="0"/>
-              <a:t>It forces Hibernate to retrieve (an otherwise lazy collection) whenever </a:t>
-            </a:r>
-            <a:r>
-              <a:rPr lang="en-US" dirty="0" err="1">
-                <a:latin typeface="Courier New" panose="02070309020205020404" pitchFamily="49" charset="0"/>
-                <a:cs typeface="Courier New" panose="02070309020205020404" pitchFamily="49" charset="0"/>
-              </a:rPr>
-              <a:t>toString</a:t>
-            </a:r>
-            <a:r>
-              <a:rPr lang="en-US" dirty="0">
-                <a:latin typeface="Courier New" panose="02070309020205020404" pitchFamily="49" charset="0"/>
-                <a:cs typeface="Courier New" panose="02070309020205020404" pitchFamily="49" charset="0"/>
-              </a:rPr>
-              <a:t>() </a:t>
-            </a:r>
-            <a:r>
-              <a:rPr lang="en-US" dirty="0"/>
-              <a:t>is called.</a:t>
-            </a:r>
-          </a:p>
-          <a:p>
-            <a:pPr>
-              <a:spcAft>
-                <a:spcPts val="600"/>
-              </a:spcAft>
-            </a:pPr>
-            <a:r>
-              <a:rPr lang="en-US" dirty="0"/>
-              <a:t>With </a:t>
-            </a:r>
-            <a:r>
-              <a:rPr lang="en-US" i="1" dirty="0"/>
-              <a:t>Lombok</a:t>
-            </a:r>
-            <a:r>
-              <a:rPr lang="en-US" dirty="0"/>
-              <a:t> it’s easy to run into this with </a:t>
-            </a:r>
-            <a:r>
-              <a:rPr lang="en-US" dirty="0">
-                <a:latin typeface="Courier New" panose="02070309020205020404" pitchFamily="49" charset="0"/>
-                <a:cs typeface="Courier New" panose="02070309020205020404" pitchFamily="49" charset="0"/>
-              </a:rPr>
-              <a:t>@ToString</a:t>
-            </a:r>
-            <a:r>
-              <a:rPr lang="en-US" dirty="0"/>
-              <a:t>.</a:t>
-            </a:r>
-          </a:p>
-          <a:p>
-            <a:pPr lvl="1">
-              <a:spcAft>
-                <a:spcPts val="600"/>
-              </a:spcAft>
-            </a:pPr>
-            <a:r>
-              <a:rPr lang="en-US" dirty="0"/>
-              <a:t>Use </a:t>
-            </a:r>
-            <a:r>
-              <a:rPr lang="en-US" dirty="0">
-                <a:latin typeface="Courier New" panose="02070309020205020404" pitchFamily="49" charset="0"/>
-                <a:cs typeface="Courier New" panose="02070309020205020404" pitchFamily="49" charset="0"/>
-              </a:rPr>
-              <a:t>@ToString.Exclude </a:t>
-            </a:r>
-            <a:r>
-              <a:rPr lang="en-US" dirty="0"/>
-              <a:t>on the lazy associations.</a:t>
-            </a:r>
-          </a:p>
-          <a:p>
-            <a:pPr lvl="1">
-              <a:spcAft>
-                <a:spcPts val="600"/>
-              </a:spcAft>
-            </a:pPr>
-            <a:r>
-              <a:rPr lang="en-US" dirty="0">
-                <a:hlinkClick r:id="rId2"/>
-              </a:rPr>
-              <a:t>https://projectlombok.org/features/ToString</a:t>
-            </a:r>
-            <a:endParaRPr lang="en-US" dirty="0"/>
-          </a:p>
-        </p:txBody>
-      </p:sp>
+      </p:pic>
     </p:spTree>
     <p:extLst>
       <p:ext uri="{BB962C8B-B14F-4D97-AF65-F5344CB8AC3E}">
-        <p14:creationId xmlns:p14="http://schemas.microsoft.com/office/powerpoint/2010/main" val="2468397319"/>
+        <p14:creationId xmlns:p14="http://schemas.microsoft.com/office/powerpoint/2010/main" val="1820933201"/>
       </p:ext>
     </p:extLst>
   </p:cSld>
@@ -33572,6 +34654,341 @@
           <a:p>
             <a:r>
               <a:rPr lang="en-US" dirty="0"/>
+              <a:t>Mistake 10: Leaking entities to web layer</a:t>
+            </a:r>
+          </a:p>
+        </p:txBody>
+      </p:sp>
+      <p:sp>
+        <p:nvSpPr>
+          <p:cNvPr id="13" name="Text Placeholder 2">
+            <a:extLst>
+              <a:ext uri="{FF2B5EF4-FFF2-40B4-BE49-F238E27FC236}">
+                <a16:creationId xmlns:a16="http://schemas.microsoft.com/office/drawing/2014/main" id="{5AFACC08-6E7F-14DD-D1E6-54973126E7AF}"/>
+              </a:ext>
+            </a:extLst>
+          </p:cNvPr>
+          <p:cNvSpPr>
+            <a:spLocks noGrp="1"/>
+          </p:cNvSpPr>
+          <p:nvPr>
+            <p:ph type="body" sz="quarter" idx="10"/>
+          </p:nvPr>
+        </p:nvSpPr>
+        <p:spPr>
+          <a:xfrm>
+            <a:off x="1296000" y="2105696"/>
+            <a:ext cx="9864000" cy="3632163"/>
+          </a:xfrm>
+        </p:spPr>
+        <p:txBody>
+          <a:bodyPr>
+            <a:normAutofit/>
+          </a:bodyPr>
+          <a:lstStyle/>
+          <a:p>
+            <a:pPr>
+              <a:spcAft>
+                <a:spcPts val="600"/>
+              </a:spcAft>
+            </a:pPr>
+            <a:r>
+              <a:rPr lang="en-US" dirty="0"/>
+              <a:t>Always map entities to a </a:t>
+            </a:r>
+            <a:r>
+              <a:rPr lang="en-US" i="1" dirty="0"/>
+              <a:t>data transfer object </a:t>
+            </a:r>
+            <a:r>
+              <a:rPr lang="en-US" dirty="0"/>
+              <a:t>(DTO).</a:t>
+            </a:r>
+          </a:p>
+          <a:p>
+            <a:pPr>
+              <a:spcAft>
+                <a:spcPts val="600"/>
+              </a:spcAft>
+            </a:pPr>
+            <a:r>
+              <a:rPr lang="en-US" dirty="0"/>
+              <a:t>Avoid security leaks and have a separation between the database model and the web model.</a:t>
+            </a:r>
+          </a:p>
+        </p:txBody>
+      </p:sp>
+    </p:spTree>
+    <p:extLst>
+      <p:ext uri="{BB962C8B-B14F-4D97-AF65-F5344CB8AC3E}">
+        <p14:creationId xmlns:p14="http://schemas.microsoft.com/office/powerpoint/2010/main" val="3288774039"/>
+      </p:ext>
+    </p:extLst>
+  </p:cSld>
+  <p:clrMapOvr>
+    <a:masterClrMapping/>
+  </p:clrMapOvr>
+</p:sld>
+</file>
+
+<file path=ppt/slides/slide53.xml><?xml version="1.0" encoding="utf-8"?>
+<p:sld xmlns:a="http://schemas.openxmlformats.org/drawingml/2006/main" xmlns:r="http://schemas.openxmlformats.org/officeDocument/2006/relationships" xmlns:p="http://schemas.openxmlformats.org/presentationml/2006/main">
+  <p:cSld>
+    <p:spTree>
+      <p:nvGrpSpPr>
+        <p:cNvPr id="1" name=""/>
+        <p:cNvGrpSpPr/>
+        <p:nvPr/>
+      </p:nvGrpSpPr>
+      <p:grpSpPr>
+        <a:xfrm>
+          <a:off x="0" y="0"/>
+          <a:ext cx="0" cy="0"/>
+          <a:chOff x="0" y="0"/>
+          <a:chExt cx="0" cy="0"/>
+        </a:xfrm>
+      </p:grpSpPr>
+      <p:sp>
+        <p:nvSpPr>
+          <p:cNvPr id="11" name="Title 1">
+            <a:extLst>
+              <a:ext uri="{FF2B5EF4-FFF2-40B4-BE49-F238E27FC236}">
+                <a16:creationId xmlns:a16="http://schemas.microsoft.com/office/drawing/2014/main" id="{51612DA1-DB43-7E72-A4EA-4B95C807605F}"/>
+              </a:ext>
+            </a:extLst>
+          </p:cNvPr>
+          <p:cNvSpPr>
+            <a:spLocks noGrp="1"/>
+          </p:cNvSpPr>
+          <p:nvPr>
+            <p:ph type="title"/>
+          </p:nvPr>
+        </p:nvSpPr>
+        <p:spPr>
+          <a:xfrm>
+            <a:off x="1296000" y="720000"/>
+            <a:ext cx="9864000" cy="681480"/>
+          </a:xfrm>
+        </p:spPr>
+        <p:txBody>
+          <a:bodyPr anchor="t">
+            <a:normAutofit fontScale="90000"/>
+          </a:bodyPr>
+          <a:lstStyle/>
+          <a:p>
+            <a:r>
+              <a:rPr lang="en-US" dirty="0"/>
+              <a:t>Mistake 11: Including lazy associations in </a:t>
+            </a:r>
+            <a:r>
+              <a:rPr lang="en-US" dirty="0" err="1">
+                <a:latin typeface="Courier New" panose="02070309020205020404" pitchFamily="49" charset="0"/>
+                <a:cs typeface="Courier New" panose="02070309020205020404" pitchFamily="49" charset="0"/>
+              </a:rPr>
+              <a:t>toString</a:t>
+            </a:r>
+            <a:r>
+              <a:rPr lang="en-US" dirty="0">
+                <a:latin typeface="Courier New" panose="02070309020205020404" pitchFamily="49" charset="0"/>
+                <a:cs typeface="Courier New" panose="02070309020205020404" pitchFamily="49" charset="0"/>
+              </a:rPr>
+              <a:t>()</a:t>
+            </a:r>
+            <a:r>
+              <a:rPr lang="en-US" dirty="0"/>
+              <a:t> of an entity</a:t>
+            </a:r>
+            <a:endParaRPr lang="en-US" dirty="0">
+              <a:latin typeface="Courier New" panose="02070309020205020404" pitchFamily="49" charset="0"/>
+              <a:cs typeface="Courier New" panose="02070309020205020404" pitchFamily="49" charset="0"/>
+            </a:endParaRPr>
+          </a:p>
+        </p:txBody>
+      </p:sp>
+      <p:sp>
+        <p:nvSpPr>
+          <p:cNvPr id="13" name="Text Placeholder 2">
+            <a:extLst>
+              <a:ext uri="{FF2B5EF4-FFF2-40B4-BE49-F238E27FC236}">
+                <a16:creationId xmlns:a16="http://schemas.microsoft.com/office/drawing/2014/main" id="{5AFACC08-6E7F-14DD-D1E6-54973126E7AF}"/>
+              </a:ext>
+            </a:extLst>
+          </p:cNvPr>
+          <p:cNvSpPr>
+            <a:spLocks noGrp="1"/>
+          </p:cNvSpPr>
+          <p:nvPr>
+            <p:ph type="body" sz="quarter" idx="10"/>
+          </p:nvPr>
+        </p:nvSpPr>
+        <p:spPr>
+          <a:xfrm>
+            <a:off x="1296000" y="2105696"/>
+            <a:ext cx="9864000" cy="3632163"/>
+          </a:xfrm>
+        </p:spPr>
+        <p:txBody>
+          <a:bodyPr>
+            <a:normAutofit/>
+          </a:bodyPr>
+          <a:lstStyle/>
+          <a:p>
+            <a:pPr>
+              <a:spcAft>
+                <a:spcPts val="600"/>
+              </a:spcAft>
+            </a:pPr>
+            <a:r>
+              <a:rPr lang="en-US" dirty="0"/>
+              <a:t>It forces Hibernate to retrieve (an otherwise lazy collection) whenever </a:t>
+            </a:r>
+            <a:r>
+              <a:rPr lang="en-US" dirty="0" err="1">
+                <a:latin typeface="Courier New" panose="02070309020205020404" pitchFamily="49" charset="0"/>
+                <a:cs typeface="Courier New" panose="02070309020205020404" pitchFamily="49" charset="0"/>
+              </a:rPr>
+              <a:t>toString</a:t>
+            </a:r>
+            <a:r>
+              <a:rPr lang="en-US" dirty="0">
+                <a:latin typeface="Courier New" panose="02070309020205020404" pitchFamily="49" charset="0"/>
+                <a:cs typeface="Courier New" panose="02070309020205020404" pitchFamily="49" charset="0"/>
+              </a:rPr>
+              <a:t>() </a:t>
+            </a:r>
+            <a:r>
+              <a:rPr lang="en-US" dirty="0"/>
+              <a:t>is called.</a:t>
+            </a:r>
+          </a:p>
+          <a:p>
+            <a:pPr>
+              <a:spcAft>
+                <a:spcPts val="600"/>
+              </a:spcAft>
+            </a:pPr>
+            <a:r>
+              <a:rPr lang="en-US" dirty="0"/>
+              <a:t>With </a:t>
+            </a:r>
+            <a:r>
+              <a:rPr lang="en-US" i="1" dirty="0"/>
+              <a:t>Lombok</a:t>
+            </a:r>
+            <a:r>
+              <a:rPr lang="en-US" dirty="0"/>
+              <a:t> it’s easy to run into this with </a:t>
+            </a:r>
+            <a:r>
+              <a:rPr lang="en-US" dirty="0">
+                <a:latin typeface="Courier New" panose="02070309020205020404" pitchFamily="49" charset="0"/>
+                <a:cs typeface="Courier New" panose="02070309020205020404" pitchFamily="49" charset="0"/>
+              </a:rPr>
+              <a:t>@ToString</a:t>
+            </a:r>
+            <a:r>
+              <a:rPr lang="en-US" dirty="0"/>
+              <a:t>.</a:t>
+            </a:r>
+          </a:p>
+          <a:p>
+            <a:pPr lvl="1">
+              <a:spcAft>
+                <a:spcPts val="600"/>
+              </a:spcAft>
+            </a:pPr>
+            <a:r>
+              <a:rPr lang="en-US" dirty="0"/>
+              <a:t>Use </a:t>
+            </a:r>
+            <a:r>
+              <a:rPr lang="en-US" dirty="0">
+                <a:latin typeface="Courier New" panose="02070309020205020404" pitchFamily="49" charset="0"/>
+                <a:cs typeface="Courier New" panose="02070309020205020404" pitchFamily="49" charset="0"/>
+              </a:rPr>
+              <a:t>@ToString.Exclude </a:t>
+            </a:r>
+            <a:r>
+              <a:rPr lang="en-US" dirty="0"/>
+              <a:t>on the lazy associations.</a:t>
+            </a:r>
+          </a:p>
+          <a:p>
+            <a:pPr lvl="1">
+              <a:spcAft>
+                <a:spcPts val="600"/>
+              </a:spcAft>
+            </a:pPr>
+            <a:r>
+              <a:rPr lang="en-US" dirty="0">
+                <a:hlinkClick r:id="rId2"/>
+              </a:rPr>
+              <a:t>https://projectlombok.org/features/ToString</a:t>
+            </a:r>
+            <a:endParaRPr lang="en-US" dirty="0"/>
+          </a:p>
+        </p:txBody>
+      </p:sp>
+    </p:spTree>
+    <p:extLst>
+      <p:ext uri="{BB962C8B-B14F-4D97-AF65-F5344CB8AC3E}">
+        <p14:creationId xmlns:p14="http://schemas.microsoft.com/office/powerpoint/2010/main" val="2468397319"/>
+      </p:ext>
+    </p:extLst>
+  </p:cSld>
+  <p:clrMapOvr>
+    <a:masterClrMapping/>
+  </p:clrMapOvr>
+</p:sld>
+</file>
+
+<file path=ppt/slides/slide54.xml><?xml version="1.0" encoding="utf-8"?>
+<p:sld xmlns:a="http://schemas.openxmlformats.org/drawingml/2006/main" xmlns:r="http://schemas.openxmlformats.org/officeDocument/2006/relationships" xmlns:p="http://schemas.openxmlformats.org/presentationml/2006/main">
+  <p:cSld>
+    <p:spTree>
+      <p:nvGrpSpPr>
+        <p:cNvPr id="1" name=""/>
+        <p:cNvGrpSpPr/>
+        <p:nvPr/>
+      </p:nvGrpSpPr>
+      <p:grpSpPr>
+        <a:xfrm>
+          <a:off x="0" y="0"/>
+          <a:ext cx="0" cy="0"/>
+          <a:chOff x="0" y="0"/>
+          <a:chExt cx="0" cy="0"/>
+        </a:xfrm>
+      </p:grpSpPr>
+      <p:sp>
+        <p:nvSpPr>
+          <p:cNvPr id="11" name="Title 1">
+            <a:extLst>
+              <a:ext uri="{FF2B5EF4-FFF2-40B4-BE49-F238E27FC236}">
+                <a16:creationId xmlns:a16="http://schemas.microsoft.com/office/drawing/2014/main" id="{51612DA1-DB43-7E72-A4EA-4B95C807605F}"/>
+              </a:ext>
+            </a:extLst>
+          </p:cNvPr>
+          <p:cNvSpPr>
+            <a:spLocks noGrp="1"/>
+          </p:cNvSpPr>
+          <p:nvPr>
+            <p:ph type="title"/>
+          </p:nvPr>
+        </p:nvSpPr>
+        <p:spPr>
+          <a:xfrm>
+            <a:off x="1296000" y="720000"/>
+            <a:ext cx="9864000" cy="681480"/>
+          </a:xfrm>
+        </p:spPr>
+        <p:txBody>
+          <a:bodyPr anchor="t">
+            <a:normAutofit/>
+          </a:bodyPr>
+          <a:lstStyle/>
+          <a:p>
+            <a:r>
+              <a:rPr lang="en-US" dirty="0"/>
               <a:t>Mistake 12: Trusting Stack Overflow blindly</a:t>
             </a:r>
           </a:p>
@@ -33590,7 +35007,7 @@
 </p:sld>
 </file>
 
-<file path=ppt/slides/slide53.xml><?xml version="1.0" encoding="utf-8"?>
+<file path=ppt/slides/slide55.xml><?xml version="1.0" encoding="utf-8"?>
 <p:sld xmlns:a="http://schemas.openxmlformats.org/drawingml/2006/main" xmlns:r="http://schemas.openxmlformats.org/officeDocument/2006/relationships" xmlns:p="http://schemas.openxmlformats.org/presentationml/2006/main">
   <p:cSld>
     <p:spTree>
@@ -33659,7 +35076,7 @@
 </p:sld>
 </file>
 
-<file path=ppt/slides/slide54.xml><?xml version="1.0" encoding="utf-8"?>
+<file path=ppt/slides/slide56.xml><?xml version="1.0" encoding="utf-8"?>
 <p:sld xmlns:a="http://schemas.openxmlformats.org/drawingml/2006/main" xmlns:r="http://schemas.openxmlformats.org/officeDocument/2006/relationships" xmlns:p="http://schemas.openxmlformats.org/presentationml/2006/main">
   <p:cSld>
     <p:spTree>
@@ -33720,9 +35137,16 @@
             <p:ph type="body" sz="quarter" idx="10"/>
           </p:nvPr>
         </p:nvSpPr>
-        <p:spPr/>
+        <p:spPr>
+          <a:xfrm>
+            <a:off x="1296000" y="1612154"/>
+            <a:ext cx="9864000" cy="4541108"/>
+          </a:xfrm>
+        </p:spPr>
         <p:txBody>
-          <a:bodyPr/>
+          <a:bodyPr>
+            <a:normAutofit fontScale="92500" lnSpcReduction="10000"/>
+          </a:bodyPr>
           <a:lstStyle/>
           <a:p>
             <a:r>
@@ -33787,7 +35211,7 @@
           <a:p>
             <a:r>
               <a:rPr lang="en-US" dirty="0"/>
-              <a:t>How does Spring Transactional work?</a:t>
+              <a:t>JPA specification</a:t>
             </a:r>
           </a:p>
           <a:p>
@@ -33796,11 +35220,40 @@
               <a:rPr lang="en-US" dirty="0">
                 <a:hlinkClick r:id="rId6"/>
               </a:rPr>
+              <a:t>https://jakarta.ee/specifications/persistence/3.0/jakarta-persistence-spec-3.0.html</a:t>
+            </a:r>
+            <a:endParaRPr lang="en-US" dirty="0"/>
+          </a:p>
+          <a:p>
+            <a:r>
+              <a:rPr lang="en-US" dirty="0"/>
+              <a:t>How does Spring Transactional work?</a:t>
+            </a:r>
+          </a:p>
+          <a:p>
+            <a:pPr lvl="1"/>
+            <a:r>
+              <a:rPr lang="en-US" dirty="0">
+                <a:hlinkClick r:id="rId7"/>
+              </a:rPr>
               <a:t>https://dzone.com/articles/how-does-spring-transactional</a:t>
             </a:r>
             <a:endParaRPr lang="en-US" dirty="0"/>
           </a:p>
           <a:p>
+            <a:r>
+              <a:rPr lang="en-US" dirty="0"/>
+              <a:t>JPA Join Types</a:t>
+            </a:r>
+          </a:p>
+          <a:p>
+            <a:pPr lvl="1"/>
+            <a:r>
+              <a:rPr lang="en-US" dirty="0">
+                <a:hlinkClick r:id="rId8"/>
+              </a:rPr>
+              <a:t>https://www.baeldung.com/jpa-join-types</a:t>
+            </a:r>
             <a:endParaRPr lang="en-US" dirty="0"/>
           </a:p>
         </p:txBody>
@@ -33818,7 +35271,7 @@
 </p:sld>
 </file>
 
-<file path=ppt/slides/slide55.xml><?xml version="1.0" encoding="utf-8"?>
+<file path=ppt/slides/slide57.xml><?xml version="1.0" encoding="utf-8"?>
 <p:sld xmlns:a="http://schemas.openxmlformats.org/drawingml/2006/main" xmlns:r="http://schemas.openxmlformats.org/officeDocument/2006/relationships" xmlns:p="http://schemas.openxmlformats.org/presentationml/2006/main">
   <p:cSld>
     <p:spTree>
@@ -35726,21 +37179,6 @@
 </file>
 
 <file path=customXml/item1.xml><?xml version="1.0" encoding="utf-8"?>
-<?mso-contentType ?>
-<FormTemplates xmlns="http://schemas.microsoft.com/sharepoint/v3/contenttype/forms">
-  <Display>DocumentLibraryForm</Display>
-  <Edit>DocumentLibraryForm</Edit>
-  <New>DocumentLibraryForm</New>
-</FormTemplates>
-</file>
-
-<file path=customXml/item2.xml><?xml version="1.0" encoding="utf-8"?>
-<p:properties xmlns:p="http://schemas.microsoft.com/office/2006/metadata/properties" xmlns:xsi="http://www.w3.org/2001/XMLSchema-instance" xmlns:pc="http://schemas.microsoft.com/office/infopath/2007/PartnerControls">
-  <documentManagement/>
-</p:properties>
-</file>
-
-<file path=customXml/item3.xml><?xml version="1.0" encoding="utf-8"?>
 <ct:contentTypeSchema xmlns:ct="http://schemas.microsoft.com/office/2006/metadata/contentType" xmlns:ma="http://schemas.microsoft.com/office/2006/metadata/properties/metaAttributes" ct:_="" ma:_="" ma:contentTypeName="Document" ma:contentTypeID="0x0101000858805C9A31ED4698AA5994F7540466" ma:contentTypeVersion="1" ma:contentTypeDescription="Een nieuw document maken." ma:contentTypeScope="" ma:versionID="5cab34e6f8d54d32c51f192539e9981c">
   <xsd:schema xmlns:xsd="http://www.w3.org/2001/XMLSchema" xmlns:xs="http://www.w3.org/2001/XMLSchema" xmlns:p="http://schemas.microsoft.com/office/2006/metadata/properties" xmlns:ns2="a73fd6a0-a740-4ca0-a47f-6beba88ccc77" targetNamespace="http://schemas.microsoft.com/office/2006/metadata/properties" ma:root="true" ma:fieldsID="10b3ae9c115bae24efdfd9076c93080b" ns2:_="">
     <xsd:import namespace="a73fd6a0-a740-4ca0-a47f-6beba88ccc77"/>
@@ -35880,31 +37318,22 @@
 </ct:contentTypeSchema>
 </file>
 
-<file path=customXml/itemProps1.xml><?xml version="1.0" encoding="utf-8"?>
-<ds:datastoreItem xmlns:ds="http://schemas.openxmlformats.org/officeDocument/2006/customXml" ds:itemID="{4522A51C-073F-4C45-9170-ECE5951F4DEA}">
-  <ds:schemaRefs>
-    <ds:schemaRef ds:uri="http://schemas.microsoft.com/sharepoint/v3/contenttype/forms"/>
-  </ds:schemaRefs>
-</ds:datastoreItem>
+<file path=customXml/item2.xml><?xml version="1.0" encoding="utf-8"?>
+<?mso-contentType ?>
+<FormTemplates xmlns="http://schemas.microsoft.com/sharepoint/v3/contenttype/forms">
+  <Display>DocumentLibraryForm</Display>
+  <Edit>DocumentLibraryForm</Edit>
+  <New>DocumentLibraryForm</New>
+</FormTemplates>
 </file>
 
-<file path=customXml/itemProps2.xml><?xml version="1.0" encoding="utf-8"?>
-<ds:datastoreItem xmlns:ds="http://schemas.openxmlformats.org/officeDocument/2006/customXml" ds:itemID="{F8AE8C2F-0717-4D42-B44A-CAECCF122A1A}">
-  <ds:schemaRefs>
-    <ds:schemaRef ds:uri="http://purl.org/dc/elements/1.1/"/>
-    <ds:schemaRef ds:uri="http://schemas.microsoft.com/office/2006/metadata/properties"/>
-    <ds:schemaRef ds:uri="http://schemas.microsoft.com/office/2006/documentManagement/types"/>
-    <ds:schemaRef ds:uri="http://purl.org/dc/terms/"/>
-    <ds:schemaRef ds:uri="http://schemas.openxmlformats.org/package/2006/metadata/core-properties"/>
-    <ds:schemaRef ds:uri="http://purl.org/dc/dcmitype/"/>
-    <ds:schemaRef ds:uri="http://schemas.microsoft.com/office/infopath/2007/PartnerControls"/>
-    <ds:schemaRef ds:uri="a73fd6a0-a740-4ca0-a47f-6beba88ccc77"/>
-    <ds:schemaRef ds:uri="http://www.w3.org/XML/1998/namespace"/>
-  </ds:schemaRefs>
-</ds:datastoreItem>
+<file path=customXml/item3.xml><?xml version="1.0" encoding="utf-8"?>
+<p:properties xmlns:p="http://schemas.microsoft.com/office/2006/metadata/properties" xmlns:xsi="http://www.w3.org/2001/XMLSchema-instance" xmlns:pc="http://schemas.microsoft.com/office/infopath/2007/PartnerControls">
+  <documentManagement/>
+</p:properties>
 </file>
 
-<file path=customXml/itemProps3.xml><?xml version="1.0" encoding="utf-8"?>
+<file path=customXml/itemProps1.xml><?xml version="1.0" encoding="utf-8"?>
 <ds:datastoreItem xmlns:ds="http://schemas.openxmlformats.org/officeDocument/2006/customXml" ds:itemID="{9AC0CDE9-3E35-44FD-A63A-9795CF527D47}">
   <ds:schemaRefs>
     <ds:schemaRef ds:uri="http://schemas.microsoft.com/office/2006/metadata/contentType"/>
@@ -35920,4 +37349,28 @@
     <ds:schemaRef ds:uri="http://schemas.microsoft.com/internal/obd"/>
   </ds:schemaRefs>
 </ds:datastoreItem>
+</file>
+
+<file path=customXml/itemProps2.xml><?xml version="1.0" encoding="utf-8"?>
+<ds:datastoreItem xmlns:ds="http://schemas.openxmlformats.org/officeDocument/2006/customXml" ds:itemID="{4522A51C-073F-4C45-9170-ECE5951F4DEA}">
+  <ds:schemaRefs>
+    <ds:schemaRef ds:uri="http://schemas.microsoft.com/sharepoint/v3/contenttype/forms"/>
+  </ds:schemaRefs>
+</ds:datastoreItem>
+</file>
+
+<file path=customXml/itemProps3.xml><?xml version="1.0" encoding="utf-8"?>
+<ds:datastoreItem xmlns:ds="http://schemas.openxmlformats.org/officeDocument/2006/customXml" ds:itemID="{F8AE8C2F-0717-4D42-B44A-CAECCF122A1A}">
+  <ds:schemaRefs>
+    <ds:schemaRef ds:uri="http://www.w3.org/XML/1998/namespace"/>
+    <ds:schemaRef ds:uri="http://purl.org/dc/elements/1.1/"/>
+    <ds:schemaRef ds:uri="a73fd6a0-a740-4ca0-a47f-6beba88ccc77"/>
+    <ds:schemaRef ds:uri="http://schemas.microsoft.com/office/2006/metadata/properties"/>
+    <ds:schemaRef ds:uri="http://purl.org/dc/dcmitype/"/>
+    <ds:schemaRef ds:uri="http://schemas.microsoft.com/office/2006/documentManagement/types"/>
+    <ds:schemaRef ds:uri="http://purl.org/dc/terms/"/>
+    <ds:schemaRef ds:uri="http://schemas.microsoft.com/office/infopath/2007/PartnerControls"/>
+    <ds:schemaRef ds:uri="http://schemas.openxmlformats.org/package/2006/metadata/core-properties"/>
+  </ds:schemaRefs>
+</ds:datastoreItem>
 </file>
</xml_diff>

<commit_message>
Replace mistake 8 ("flushing unnecessarily") with "Not using read-only transactions". Fixes #1
</commit_message>
<xml_diff>
--- a/slides.pptx
+++ b/slides.pptx
@@ -283,7 +283,7 @@
           <a:p>
             <a:fld id="{3532B83F-F844-4C18-98E8-7C33F4B39DE0}" type="datetimeFigureOut">
               <a:rPr lang="nl-NL" smtClean="0"/>
-              <a:t>2-5-2022</a:t>
+              <a:t>11-10-2022</a:t>
             </a:fld>
             <a:endParaRPr lang="nl-NL"/>
           </a:p>
@@ -460,7 +460,7 @@
           <a:p>
             <a:fld id="{27396D34-C2B8-41FF-AE69-48AE3B3D8E8B}" type="datetimeFigureOut">
               <a:rPr lang="nl-NL" smtClean="0"/>
-              <a:t>2-5-2022</a:t>
+              <a:t>11-10-2022</a:t>
             </a:fld>
             <a:endParaRPr lang="nl-NL"/>
           </a:p>
@@ -34004,18 +34004,7 @@
           <a:p>
             <a:r>
               <a:rPr lang="en-US" dirty="0"/>
-              <a:t>Mistake 8: Using </a:t>
-            </a:r>
-            <a:r>
-              <a:rPr lang="en-US" dirty="0">
-                <a:latin typeface="Courier New" panose="02070309020205020404" pitchFamily="49" charset="0"/>
-                <a:cs typeface="Courier New" panose="02070309020205020404" pitchFamily="49" charset="0"/>
-              </a:rPr>
-              <a:t>flush </a:t>
-            </a:r>
-            <a:r>
-              <a:rPr lang="en-US" dirty="0"/>
-              <a:t>without reason</a:t>
+              <a:t>Mistake 8: Not using read-only transactions</a:t>
             </a:r>
             <a:endParaRPr lang="en-US" dirty="0">
               <a:solidFill>
@@ -34060,7 +34049,14 @@
             </a:pPr>
             <a:r>
               <a:rPr lang="en-US" sz="2800" dirty="0"/>
-              <a:t>It forces Hibernate to perform dirty checking and writing updates to the database early.</a:t>
+              <a:t>If your use-case doesn’t require propagating changes to the database, use </a:t>
+            </a:r>
+            <a:r>
+              <a:rPr lang="en-US" sz="2800" dirty="0">
+                <a:latin typeface="Courier New" panose="02070309020205020404" pitchFamily="49" charset="0"/>
+                <a:cs typeface="Courier New" panose="02070309020205020404" pitchFamily="49" charset="0"/>
+              </a:rPr>
+              <a:t>@Transactional(readOnly=true)</a:t>
             </a:r>
           </a:p>
           <a:p>
@@ -34071,7 +34067,7 @@
             </a:pPr>
             <a:r>
               <a:rPr lang="en-US" sz="2800" dirty="0"/>
-              <a:t>Let Hibernate combine updates into 1 SQL update, bundle multiple identical statements into a batch call, etc.</a:t>
+              <a:t>It eliminates dirty-checking.</a:t>
             </a:r>
           </a:p>
           <a:p>
@@ -34082,7 +34078,7 @@
             </a:pPr>
             <a:r>
               <a:rPr lang="en-US" sz="2800" dirty="0"/>
-              <a:t>Rare exception: batch updates.</a:t>
+              <a:t>It eliminates loading the entity in the persistence context.</a:t>
             </a:r>
           </a:p>
         </p:txBody>
@@ -37179,6 +37175,21 @@
 </file>
 
 <file path=customXml/item1.xml><?xml version="1.0" encoding="utf-8"?>
+<?mso-contentType ?>
+<FormTemplates xmlns="http://schemas.microsoft.com/sharepoint/v3/contenttype/forms">
+  <Display>DocumentLibraryForm</Display>
+  <Edit>DocumentLibraryForm</Edit>
+  <New>DocumentLibraryForm</New>
+</FormTemplates>
+</file>
+
+<file path=customXml/item2.xml><?xml version="1.0" encoding="utf-8"?>
+<p:properties xmlns:p="http://schemas.microsoft.com/office/2006/metadata/properties" xmlns:xsi="http://www.w3.org/2001/XMLSchema-instance" xmlns:pc="http://schemas.microsoft.com/office/infopath/2007/PartnerControls">
+  <documentManagement/>
+</p:properties>
+</file>
+
+<file path=customXml/item3.xml><?xml version="1.0" encoding="utf-8"?>
 <ct:contentTypeSchema xmlns:ct="http://schemas.microsoft.com/office/2006/metadata/contentType" xmlns:ma="http://schemas.microsoft.com/office/2006/metadata/properties/metaAttributes" ct:_="" ma:_="" ma:contentTypeName="Document" ma:contentTypeID="0x0101000858805C9A31ED4698AA5994F7540466" ma:contentTypeVersion="1" ma:contentTypeDescription="Een nieuw document maken." ma:contentTypeScope="" ma:versionID="5cab34e6f8d54d32c51f192539e9981c">
   <xsd:schema xmlns:xsd="http://www.w3.org/2001/XMLSchema" xmlns:xs="http://www.w3.org/2001/XMLSchema" xmlns:p="http://schemas.microsoft.com/office/2006/metadata/properties" xmlns:ns2="a73fd6a0-a740-4ca0-a47f-6beba88ccc77" targetNamespace="http://schemas.microsoft.com/office/2006/metadata/properties" ma:root="true" ma:fieldsID="10b3ae9c115bae24efdfd9076c93080b" ns2:_="">
     <xsd:import namespace="a73fd6a0-a740-4ca0-a47f-6beba88ccc77"/>
@@ -37318,22 +37329,31 @@
 </ct:contentTypeSchema>
 </file>
 
-<file path=customXml/item2.xml><?xml version="1.0" encoding="utf-8"?>
-<?mso-contentType ?>
-<FormTemplates xmlns="http://schemas.microsoft.com/sharepoint/v3/contenttype/forms">
-  <Display>DocumentLibraryForm</Display>
-  <Edit>DocumentLibraryForm</Edit>
-  <New>DocumentLibraryForm</New>
-</FormTemplates>
+<file path=customXml/itemProps1.xml><?xml version="1.0" encoding="utf-8"?>
+<ds:datastoreItem xmlns:ds="http://schemas.openxmlformats.org/officeDocument/2006/customXml" ds:itemID="{4522A51C-073F-4C45-9170-ECE5951F4DEA}">
+  <ds:schemaRefs>
+    <ds:schemaRef ds:uri="http://schemas.microsoft.com/sharepoint/v3/contenttype/forms"/>
+  </ds:schemaRefs>
+</ds:datastoreItem>
 </file>
 
-<file path=customXml/item3.xml><?xml version="1.0" encoding="utf-8"?>
-<p:properties xmlns:p="http://schemas.microsoft.com/office/2006/metadata/properties" xmlns:xsi="http://www.w3.org/2001/XMLSchema-instance" xmlns:pc="http://schemas.microsoft.com/office/infopath/2007/PartnerControls">
-  <documentManagement/>
-</p:properties>
+<file path=customXml/itemProps2.xml><?xml version="1.0" encoding="utf-8"?>
+<ds:datastoreItem xmlns:ds="http://schemas.openxmlformats.org/officeDocument/2006/customXml" ds:itemID="{F8AE8C2F-0717-4D42-B44A-CAECCF122A1A}">
+  <ds:schemaRefs>
+    <ds:schemaRef ds:uri="http://www.w3.org/XML/1998/namespace"/>
+    <ds:schemaRef ds:uri="http://purl.org/dc/elements/1.1/"/>
+    <ds:schemaRef ds:uri="a73fd6a0-a740-4ca0-a47f-6beba88ccc77"/>
+    <ds:schemaRef ds:uri="http://schemas.microsoft.com/office/2006/metadata/properties"/>
+    <ds:schemaRef ds:uri="http://purl.org/dc/dcmitype/"/>
+    <ds:schemaRef ds:uri="http://schemas.microsoft.com/office/2006/documentManagement/types"/>
+    <ds:schemaRef ds:uri="http://purl.org/dc/terms/"/>
+    <ds:schemaRef ds:uri="http://schemas.microsoft.com/office/infopath/2007/PartnerControls"/>
+    <ds:schemaRef ds:uri="http://schemas.openxmlformats.org/package/2006/metadata/core-properties"/>
+  </ds:schemaRefs>
+</ds:datastoreItem>
 </file>
 
-<file path=customXml/itemProps1.xml><?xml version="1.0" encoding="utf-8"?>
+<file path=customXml/itemProps3.xml><?xml version="1.0" encoding="utf-8"?>
 <ds:datastoreItem xmlns:ds="http://schemas.openxmlformats.org/officeDocument/2006/customXml" ds:itemID="{9AC0CDE9-3E35-44FD-A63A-9795CF527D47}">
   <ds:schemaRefs>
     <ds:schemaRef ds:uri="http://schemas.microsoft.com/office/2006/metadata/contentType"/>
@@ -37349,28 +37369,4 @@
     <ds:schemaRef ds:uri="http://schemas.microsoft.com/internal/obd"/>
   </ds:schemaRefs>
 </ds:datastoreItem>
-</file>
-
-<file path=customXml/itemProps2.xml><?xml version="1.0" encoding="utf-8"?>
-<ds:datastoreItem xmlns:ds="http://schemas.openxmlformats.org/officeDocument/2006/customXml" ds:itemID="{4522A51C-073F-4C45-9170-ECE5951F4DEA}">
-  <ds:schemaRefs>
-    <ds:schemaRef ds:uri="http://schemas.microsoft.com/sharepoint/v3/contenttype/forms"/>
-  </ds:schemaRefs>
-</ds:datastoreItem>
-</file>
-
-<file path=customXml/itemProps3.xml><?xml version="1.0" encoding="utf-8"?>
-<ds:datastoreItem xmlns:ds="http://schemas.openxmlformats.org/officeDocument/2006/customXml" ds:itemID="{F8AE8C2F-0717-4D42-B44A-CAECCF122A1A}">
-  <ds:schemaRefs>
-    <ds:schemaRef ds:uri="http://www.w3.org/XML/1998/namespace"/>
-    <ds:schemaRef ds:uri="http://purl.org/dc/elements/1.1/"/>
-    <ds:schemaRef ds:uri="a73fd6a0-a740-4ca0-a47f-6beba88ccc77"/>
-    <ds:schemaRef ds:uri="http://schemas.microsoft.com/office/2006/metadata/properties"/>
-    <ds:schemaRef ds:uri="http://purl.org/dc/dcmitype/"/>
-    <ds:schemaRef ds:uri="http://schemas.microsoft.com/office/2006/documentManagement/types"/>
-    <ds:schemaRef ds:uri="http://purl.org/dc/terms/"/>
-    <ds:schemaRef ds:uri="http://schemas.microsoft.com/office/infopath/2007/PartnerControls"/>
-    <ds:schemaRef ds:uri="http://schemas.openxmlformats.org/package/2006/metadata/core-properties"/>
-  </ds:schemaRefs>
-</ds:datastoreItem>
 </file>
</xml_diff>

<commit_message>
Use "Tip" language instead of "Mistake" on "Performance tips and common mistakes"
</commit_message>
<xml_diff>
--- a/slides.pptx
+++ b/slides.pptx
@@ -32791,7 +32791,7 @@
           <a:p>
             <a:r>
               <a:rPr lang="en-US" dirty="0"/>
-              <a:t>Mistake 1: Using entities for read-only operations.</a:t>
+              <a:t>Tip 1: Don’t use entities for read only operations</a:t>
             </a:r>
           </a:p>
         </p:txBody>
@@ -32907,7 +32907,7 @@
           <a:p>
             <a:r>
               <a:rPr lang="en-US" sz="3600" dirty="0"/>
-              <a:t>Mistake 2: Not reading SQL logs</a:t>
+              <a:t>Tip 2: Read SQL logs</a:t>
             </a:r>
             <a:endParaRPr lang="en-US" sz="3600" dirty="0">
               <a:latin typeface="Courier New" panose="02070309020205020404" pitchFamily="49" charset="0"/>
@@ -33131,13 +33131,13 @@
         </p:spPr>
         <p:txBody>
           <a:bodyPr anchor="t">
-            <a:normAutofit fontScale="90000"/>
+            <a:normAutofit/>
           </a:bodyPr>
           <a:lstStyle/>
           <a:p>
             <a:r>
               <a:rPr lang="en-US" dirty="0"/>
-              <a:t>Mistake 3: Using </a:t>
+              <a:t>Tip 3: Don’t use </a:t>
             </a:r>
             <a:r>
               <a:rPr lang="en-US" dirty="0">
@@ -33446,13 +33446,13 @@
         </p:spPr>
         <p:txBody>
           <a:bodyPr anchor="t">
-            <a:normAutofit fontScale="90000"/>
+            <a:normAutofit/>
           </a:bodyPr>
           <a:lstStyle/>
           <a:p>
             <a:r>
               <a:rPr lang="en-US" dirty="0"/>
-              <a:t>Mistake 4: Updating or removing entities one-by-one</a:t>
+              <a:t>Tip 4: Use bulk operations</a:t>
             </a:r>
             <a:endParaRPr lang="en-US" dirty="0">
               <a:solidFill>
@@ -33597,7 +33597,7 @@
           <a:p>
             <a:r>
               <a:rPr lang="en-US" dirty="0"/>
-              <a:t>Mistake 5: Using association fetching anti-patterns</a:t>
+              <a:t>Tip 5: Avoid association fetching anti-patterns</a:t>
             </a:r>
           </a:p>
         </p:txBody>
@@ -33758,13 +33758,21 @@
         </p:spPr>
         <p:txBody>
           <a:bodyPr anchor="t">
-            <a:normAutofit fontScale="90000"/>
+            <a:normAutofit/>
           </a:bodyPr>
           <a:lstStyle/>
           <a:p>
             <a:r>
               <a:rPr lang="en-US" dirty="0"/>
-              <a:t>Mistake 6: Not offloading enough to the database</a:t>
+              <a:t>Tip 6: </a:t>
+            </a:r>
+            <a:r>
+              <a:rPr lang="en-US" u="sng" dirty="0"/>
+              <a:t>Use</a:t>
+            </a:r>
+            <a:r>
+              <a:rPr lang="en-US" dirty="0"/>
+              <a:t> your database!</a:t>
             </a:r>
           </a:p>
         </p:txBody>
@@ -33880,7 +33888,7 @@
           <a:p>
             <a:r>
               <a:rPr lang="en-US" dirty="0"/>
-              <a:t>Mistake 7: Using a different database system in your tests</a:t>
+              <a:t>Tip 7: Use the same database system in your tests</a:t>
             </a:r>
           </a:p>
         </p:txBody>
@@ -34004,7 +34012,7 @@
           <a:p>
             <a:r>
               <a:rPr lang="en-US" dirty="0"/>
-              <a:t>Mistake 8: Not using read-only transactions</a:t>
+              <a:t>Tip 8: Use read-only transactions</a:t>
             </a:r>
             <a:endParaRPr lang="en-US" dirty="0">
               <a:solidFill>
@@ -34337,7 +34345,7 @@
           <a:p>
             <a:r>
               <a:rPr lang="en-US" dirty="0"/>
-              <a:t>Mistake 9: Not understanding </a:t>
+              <a:t>Tip 9: Understand </a:t>
             </a:r>
             <a:r>
               <a:rPr lang="en-US" dirty="0">
@@ -34527,7 +34535,7 @@
           <a:p>
             <a:r>
               <a:rPr lang="en-US" dirty="0"/>
-              <a:t>Mistake 9: Not understanding </a:t>
+              <a:t>Tip 9: Understand </a:t>
             </a:r>
             <a:r>
               <a:rPr lang="en-US" dirty="0">
@@ -34644,13 +34652,13 @@
         </p:spPr>
         <p:txBody>
           <a:bodyPr anchor="t">
-            <a:normAutofit/>
+            <a:normAutofit fontScale="90000"/>
           </a:bodyPr>
           <a:lstStyle/>
           <a:p>
             <a:r>
               <a:rPr lang="en-US" dirty="0"/>
-              <a:t>Mistake 10: Leaking entities to web layer</a:t>
+              <a:t>Tip 10: Use DTOs in the web layer, not entities</a:t>
             </a:r>
           </a:p>
         </p:txBody>
@@ -34774,30 +34782,15 @@
           <a:p>
             <a:r>
               <a:rPr lang="en-US" dirty="0"/>
-              <a:t>Mistake 11: Including lazy associations in </a:t>
-            </a:r>
-            <a:r>
-              <a:rPr lang="en-US" dirty="0" err="1">
-                <a:latin typeface="Courier New" panose="02070309020205020404" pitchFamily="49" charset="0"/>
-                <a:cs typeface="Courier New" panose="02070309020205020404" pitchFamily="49" charset="0"/>
-              </a:rPr>
-              <a:t>toString</a:t>
+              <a:t>Tip 11: Don’t include associations in </a:t>
             </a:r>
             <a:r>
               <a:rPr lang="en-US" dirty="0">
                 <a:latin typeface="Courier New" panose="02070309020205020404" pitchFamily="49" charset="0"/>
                 <a:cs typeface="Courier New" panose="02070309020205020404" pitchFamily="49" charset="0"/>
               </a:rPr>
-              <a:t>()</a:t>
-            </a:r>
-            <a:r>
-              <a:rPr lang="en-US" dirty="0"/>
-              <a:t> of an entity</a:t>
-            </a:r>
-            <a:endParaRPr lang="en-US" dirty="0">
-              <a:latin typeface="Courier New" panose="02070309020205020404" pitchFamily="49" charset="0"/>
-              <a:cs typeface="Courier New" panose="02070309020205020404" pitchFamily="49" charset="0"/>
-            </a:endParaRPr>
+              <a:t>@ToString</a:t>
+            </a:r>
           </a:p>
         </p:txBody>
       </p:sp>
@@ -34985,11 +34978,58 @@
           <a:p>
             <a:r>
               <a:rPr lang="en-US" dirty="0"/>
-              <a:t>Mistake 12: Trusting Stack Overflow blindly</a:t>
+              <a:t>Tip 12: Don’t trust Stack Overflow blindly</a:t>
             </a:r>
           </a:p>
         </p:txBody>
       </p:sp>
+      <p:pic>
+        <p:nvPicPr>
+          <p:cNvPr id="1026" name="Picture 2" descr="25 More StackOverflow Programming Memes That All Devs Can Relate To | by  Sheetal | JavaScript in Plain English">
+            <a:extLst>
+              <a:ext uri="{FF2B5EF4-FFF2-40B4-BE49-F238E27FC236}">
+                <a16:creationId xmlns:a16="http://schemas.microsoft.com/office/drawing/2014/main" id="{7E158610-EAEB-45B5-58B8-E63CBFCCC40C}"/>
+              </a:ext>
+            </a:extLst>
+          </p:cNvPr>
+          <p:cNvPicPr>
+            <a:picLocks noChangeAspect="1" noChangeArrowheads="1"/>
+          </p:cNvPicPr>
+          <p:nvPr/>
+        </p:nvPicPr>
+        <p:blipFill>
+          <a:blip r:embed="rId2">
+            <a:extLst>
+              <a:ext uri="{28A0092B-C50C-407E-A947-70E740481C1C}">
+                <a14:useLocalDpi xmlns:a14="http://schemas.microsoft.com/office/drawing/2010/main" val="0"/>
+              </a:ext>
+            </a:extLst>
+          </a:blip>
+          <a:srcRect/>
+          <a:stretch>
+            <a:fillRect/>
+          </a:stretch>
+        </p:blipFill>
+        <p:spPr bwMode="auto">
+          <a:xfrm>
+            <a:off x="4125156" y="1734397"/>
+            <a:ext cx="3941687" cy="4403603"/>
+          </a:xfrm>
+          <a:prstGeom prst="rect">
+            <a:avLst/>
+          </a:prstGeom>
+          <a:noFill/>
+          <a:extLst>
+            <a:ext uri="{909E8E84-426E-40DD-AFC4-6F175D3DCCD1}">
+              <a14:hiddenFill xmlns:a14="http://schemas.microsoft.com/office/drawing/2010/main">
+                <a:solidFill>
+                  <a:srgbClr val="FFFFFF"/>
+                </a:solidFill>
+              </a14:hiddenFill>
+            </a:ext>
+          </a:extLst>
+        </p:spPr>
+      </p:pic>
     </p:spTree>
     <p:extLst>
       <p:ext uri="{BB962C8B-B14F-4D97-AF65-F5344CB8AC3E}">
@@ -37340,15 +37380,15 @@
 <file path=customXml/itemProps2.xml><?xml version="1.0" encoding="utf-8"?>
 <ds:datastoreItem xmlns:ds="http://schemas.openxmlformats.org/officeDocument/2006/customXml" ds:itemID="{F8AE8C2F-0717-4D42-B44A-CAECCF122A1A}">
   <ds:schemaRefs>
+    <ds:schemaRef ds:uri="http://schemas.microsoft.com/office/2006/documentManagement/types"/>
+    <ds:schemaRef ds:uri="http://schemas.openxmlformats.org/package/2006/metadata/core-properties"/>
+    <ds:schemaRef ds:uri="http://schemas.microsoft.com/office/2006/metadata/properties"/>
     <ds:schemaRef ds:uri="http://www.w3.org/XML/1998/namespace"/>
+    <ds:schemaRef ds:uri="http://purl.org/dc/dcmitype/"/>
+    <ds:schemaRef ds:uri="http://purl.org/dc/terms/"/>
     <ds:schemaRef ds:uri="http://purl.org/dc/elements/1.1/"/>
+    <ds:schemaRef ds:uri="http://schemas.microsoft.com/office/infopath/2007/PartnerControls"/>
     <ds:schemaRef ds:uri="a73fd6a0-a740-4ca0-a47f-6beba88ccc77"/>
-    <ds:schemaRef ds:uri="http://schemas.microsoft.com/office/2006/metadata/properties"/>
-    <ds:schemaRef ds:uri="http://purl.org/dc/dcmitype/"/>
-    <ds:schemaRef ds:uri="http://schemas.microsoft.com/office/2006/documentManagement/types"/>
-    <ds:schemaRef ds:uri="http://purl.org/dc/terms/"/>
-    <ds:schemaRef ds:uri="http://schemas.microsoft.com/office/infopath/2007/PartnerControls"/>
-    <ds:schemaRef ds:uri="http://schemas.openxmlformats.org/package/2006/metadata/core-properties"/>
   </ds:schemaRefs>
 </ds:datastoreItem>
 </file>

</xml_diff>

<commit_message>
Replace Tip 11 ("don't use relationships in ToString") with info about getById/findById. Fixes #2
</commit_message>
<xml_diff>
--- a/slides.pptx
+++ b/slides.pptx
@@ -811,6 +811,90 @@
 </p:notes>
 </file>
 
+<file path=ppt/notesSlides/notesSlide10.xml><?xml version="1.0" encoding="utf-8"?>
+<p:notes xmlns:a="http://schemas.openxmlformats.org/drawingml/2006/main" xmlns:r="http://schemas.openxmlformats.org/officeDocument/2006/relationships" xmlns:p="http://schemas.openxmlformats.org/presentationml/2006/main">
+  <p:cSld>
+    <p:spTree>
+      <p:nvGrpSpPr>
+        <p:cNvPr id="1" name=""/>
+        <p:cNvGrpSpPr/>
+        <p:nvPr/>
+      </p:nvGrpSpPr>
+      <p:grpSpPr>
+        <a:xfrm>
+          <a:off x="0" y="0"/>
+          <a:ext cx="0" cy="0"/>
+          <a:chOff x="0" y="0"/>
+          <a:chExt cx="0" cy="0"/>
+        </a:xfrm>
+      </p:grpSpPr>
+      <p:sp>
+        <p:nvSpPr>
+          <p:cNvPr id="2" name="Tijdelijke aanduiding voor dia-afbeelding 1"/>
+          <p:cNvSpPr>
+            <a:spLocks noGrp="1" noRot="1" noChangeAspect="1"/>
+          </p:cNvSpPr>
+          <p:nvPr>
+            <p:ph type="sldImg"/>
+          </p:nvPr>
+        </p:nvSpPr>
+        <p:spPr/>
+      </p:sp>
+      <p:sp>
+        <p:nvSpPr>
+          <p:cNvPr id="3" name="Tijdelijke aanduiding voor notities 2"/>
+          <p:cNvSpPr>
+            <a:spLocks noGrp="1"/>
+          </p:cNvSpPr>
+          <p:nvPr>
+            <p:ph type="body" idx="1"/>
+          </p:nvPr>
+        </p:nvSpPr>
+        <p:spPr/>
+        <p:txBody>
+          <a:bodyPr/>
+          <a:lstStyle/>
+          <a:p>
+            <a:endParaRPr lang="nl-NL" dirty="0"/>
+          </a:p>
+        </p:txBody>
+      </p:sp>
+      <p:sp>
+        <p:nvSpPr>
+          <p:cNvPr id="4" name="Tijdelijke aanduiding voor dianummer 3"/>
+          <p:cNvSpPr>
+            <a:spLocks noGrp="1"/>
+          </p:cNvSpPr>
+          <p:nvPr>
+            <p:ph type="sldNum" sz="quarter" idx="5"/>
+          </p:nvPr>
+        </p:nvSpPr>
+        <p:spPr/>
+        <p:txBody>
+          <a:bodyPr/>
+          <a:lstStyle/>
+          <a:p>
+            <a:fld id="{4970B036-1422-4C36-8158-C30E1C0769EB}" type="slidenum">
+              <a:rPr lang="nl-NL" smtClean="0"/>
+              <a:t>57</a:t>
+            </a:fld>
+            <a:endParaRPr lang="nl-NL"/>
+          </a:p>
+        </p:txBody>
+      </p:sp>
+    </p:spTree>
+    <p:extLst>
+      <p:ext uri="{BB962C8B-B14F-4D97-AF65-F5344CB8AC3E}">
+        <p14:creationId xmlns:p14="http://schemas.microsoft.com/office/powerpoint/2010/main" val="1781968148"/>
+      </p:ext>
+    </p:extLst>
+  </p:cSld>
+  <p:clrMapOvr>
+    <a:masterClrMapping/>
+  </p:clrMapOvr>
+</p:notes>
+</file>
+
 <file path=ppt/notesSlides/notesSlide2.xml><?xml version="1.0" encoding="utf-8"?>
 <p:notes xmlns:a="http://schemas.openxmlformats.org/drawingml/2006/main" xmlns:r="http://schemas.openxmlformats.org/officeDocument/2006/relationships" xmlns:p="http://schemas.openxmlformats.org/presentationml/2006/main">
   <p:cSld>
@@ -1583,7 +1667,7 @@
           <a:p>
             <a:fld id="{4970B036-1422-4C36-8158-C30E1C0769EB}" type="slidenum">
               <a:rPr lang="nl-NL" smtClean="0"/>
-              <a:t>57</a:t>
+              <a:t>53</a:t>
             </a:fld>
             <a:endParaRPr lang="nl-NL"/>
           </a:p>
@@ -1592,7 +1676,7 @@
     </p:spTree>
     <p:extLst>
       <p:ext uri="{BB962C8B-B14F-4D97-AF65-F5344CB8AC3E}">
-        <p14:creationId xmlns:p14="http://schemas.microsoft.com/office/powerpoint/2010/main" val="1781968148"/>
+        <p14:creationId xmlns:p14="http://schemas.microsoft.com/office/powerpoint/2010/main" val="2321177061"/>
       </p:ext>
     </p:extLst>
   </p:cSld>
@@ -34770,8 +34854,8 @@
         </p:nvSpPr>
         <p:spPr>
           <a:xfrm>
-            <a:off x="1296000" y="720000"/>
-            <a:ext cx="9864000" cy="681480"/>
+            <a:off x="1296000" y="719999"/>
+            <a:ext cx="9864000" cy="1226031"/>
           </a:xfrm>
         </p:spPr>
         <p:txBody>
@@ -34782,15 +34866,34 @@
           <a:p>
             <a:r>
               <a:rPr lang="en-US" dirty="0"/>
-              <a:t>Tip 11: Don’t include associations in </a:t>
-            </a:r>
-            <a:r>
-              <a:rPr lang="en-US" dirty="0">
+              <a:t>Tip 11: Use </a:t>
+            </a:r>
+            <a:r>
+              <a:rPr lang="en-US" dirty="0" err="1">
                 <a:latin typeface="Courier New" panose="02070309020205020404" pitchFamily="49" charset="0"/>
                 <a:cs typeface="Courier New" panose="02070309020205020404" pitchFamily="49" charset="0"/>
               </a:rPr>
-              <a:t>@ToString</a:t>
-            </a:r>
+              <a:t>getById</a:t>
+            </a:r>
+            <a:r>
+              <a:rPr lang="en-US" dirty="0"/>
+              <a:t> instead of </a:t>
+            </a:r>
+            <a:r>
+              <a:rPr lang="en-US" dirty="0" err="1">
+                <a:latin typeface="Courier New" panose="02070309020205020404" pitchFamily="49" charset="0"/>
+                <a:cs typeface="Courier New" panose="02070309020205020404" pitchFamily="49" charset="0"/>
+              </a:rPr>
+              <a:t>findById</a:t>
+            </a:r>
+            <a:r>
+              <a:rPr lang="en-US" dirty="0"/>
+              <a:t> if you don’t need the entity contents</a:t>
+            </a:r>
+            <a:endParaRPr lang="en-US" dirty="0">
+              <a:latin typeface="Courier New" panose="02070309020205020404" pitchFamily="49" charset="0"/>
+              <a:cs typeface="Courier New" panose="02070309020205020404" pitchFamily="49" charset="0"/>
+            </a:endParaRPr>
           </a:p>
         </p:txBody>
       </p:sp>
@@ -34828,26 +34931,23 @@
               </a:spcAft>
             </a:pPr>
             <a:r>
-              <a:rPr lang="en-US" dirty="0"/>
-              <a:t>It forces Hibernate to retrieve (an otherwise lazy collection) whenever </a:t>
-            </a:r>
-            <a:r>
               <a:rPr lang="en-US" dirty="0" err="1">
                 <a:latin typeface="Courier New" panose="02070309020205020404" pitchFamily="49" charset="0"/>
                 <a:cs typeface="Courier New" panose="02070309020205020404" pitchFamily="49" charset="0"/>
               </a:rPr>
-              <a:t>toString</a:t>
-            </a:r>
-            <a:r>
-              <a:rPr lang="en-US" dirty="0">
-                <a:latin typeface="Courier New" panose="02070309020205020404" pitchFamily="49" charset="0"/>
-                <a:cs typeface="Courier New" panose="02070309020205020404" pitchFamily="49" charset="0"/>
-              </a:rPr>
-              <a:t>() </a:t>
+              <a:t>getById</a:t>
             </a:r>
             <a:r>
               <a:rPr lang="en-US" dirty="0"/>
-              <a:t>is called.</a:t>
+              <a:t> returns a proxied </a:t>
+            </a:r>
+            <a:r>
+              <a:rPr lang="en-US" i="1" dirty="0"/>
+              <a:t>reference</a:t>
+            </a:r>
+            <a:r>
+              <a:rPr lang="en-US" dirty="0"/>
+              <a:t> to an entity, it doesn’t go to the database.</a:t>
             </a:r>
           </a:p>
           <a:p>
@@ -34858,26 +34958,18 @@
             </a:pPr>
             <a:r>
               <a:rPr lang="en-US" dirty="0"/>
-              <a:t>With </a:t>
-            </a:r>
-            <a:r>
-              <a:rPr lang="en-US" i="1" dirty="0"/>
-              <a:t>Lombok</a:t>
-            </a:r>
+              <a:t>You can use getters on the proxied reference, but this triggers lazy loading.</a:t>
+            </a:r>
+          </a:p>
+          <a:p>
+            <a:pPr>
+              <a:spcAft>
+                <a:spcPts val="600"/>
+              </a:spcAft>
+            </a:pPr>
             <a:r>
               <a:rPr lang="en-US" dirty="0"/>
-              <a:t> it’s easy to run into this with </a:t>
-            </a:r>
-            <a:r>
-              <a:rPr lang="en-US" dirty="0">
-                <a:latin typeface="Courier New" panose="02070309020205020404" pitchFamily="49" charset="0"/>
-                <a:cs typeface="Courier New" panose="02070309020205020404" pitchFamily="49" charset="0"/>
-              </a:rPr>
-              <a:t>@ToString</a:t>
-            </a:r>
-            <a:r>
-              <a:rPr lang="en-US" dirty="0"/>
-              <a:t>.</a:t>
+              <a:t>Perfect when you only need the entity for establishing a relationship.</a:t>
             </a:r>
           </a:p>
           <a:p>
@@ -34888,36 +34980,80 @@
             </a:pPr>
             <a:r>
               <a:rPr lang="en-US" dirty="0"/>
-              <a:t>Use </a:t>
+              <a:t>Example: Inserting a </a:t>
+            </a:r>
+            <a:r>
+              <a:rPr lang="en-US" dirty="0" err="1">
+                <a:latin typeface="Courier New" panose="02070309020205020404" pitchFamily="49" charset="0"/>
+                <a:cs typeface="Courier New" panose="02070309020205020404" pitchFamily="49" charset="0"/>
+              </a:rPr>
+              <a:t>PostComment</a:t>
+            </a:r>
+            <a:r>
+              <a:rPr lang="en-US" dirty="0"/>
+              <a:t> for a </a:t>
             </a:r>
             <a:r>
               <a:rPr lang="en-US" dirty="0">
                 <a:latin typeface="Courier New" panose="02070309020205020404" pitchFamily="49" charset="0"/>
                 <a:cs typeface="Courier New" panose="02070309020205020404" pitchFamily="49" charset="0"/>
               </a:rPr>
-              <a:t>@ToString.Exclude </a:t>
+              <a:t>Post</a:t>
             </a:r>
             <a:r>
               <a:rPr lang="en-US" dirty="0"/>
-              <a:t>on the lazy associations.</a:t>
-            </a:r>
-          </a:p>
-          <a:p>
-            <a:pPr lvl="1">
-              <a:spcAft>
-                <a:spcPts val="600"/>
-              </a:spcAft>
-            </a:pPr>
-            <a:r>
-              <a:rPr lang="en-US" dirty="0">
-                <a:hlinkClick r:id="rId2"/>
-              </a:rPr>
-              <a:t>https://projectlombok.org/features/ToString</a:t>
-            </a:r>
-            <a:endParaRPr lang="en-US" dirty="0"/>
+              <a:t>.</a:t>
+            </a:r>
           </a:p>
         </p:txBody>
       </p:sp>
+      <p:pic>
+        <p:nvPicPr>
+          <p:cNvPr id="2" name="Picture 2" descr="22,947 Demo Foto's, Afbeeldingen en Stock Fotografie - 123RF">
+            <a:extLst>
+              <a:ext uri="{FF2B5EF4-FFF2-40B4-BE49-F238E27FC236}">
+                <a16:creationId xmlns:a16="http://schemas.microsoft.com/office/drawing/2014/main" id="{91D385B1-3DE8-9E8A-3E89-F4FC39CE1F93}"/>
+              </a:ext>
+            </a:extLst>
+          </p:cNvPr>
+          <p:cNvPicPr>
+            <a:picLocks noChangeAspect="1" noChangeArrowheads="1"/>
+          </p:cNvPicPr>
+          <p:nvPr/>
+        </p:nvPicPr>
+        <p:blipFill>
+          <a:blip r:embed="rId3">
+            <a:extLst>
+              <a:ext uri="{28A0092B-C50C-407E-A947-70E740481C1C}">
+                <a14:useLocalDpi xmlns:a14="http://schemas.microsoft.com/office/drawing/2010/main" val="0"/>
+              </a:ext>
+            </a:extLst>
+          </a:blip>
+          <a:srcRect/>
+          <a:stretch>
+            <a:fillRect/>
+          </a:stretch>
+        </p:blipFill>
+        <p:spPr bwMode="auto">
+          <a:xfrm>
+            <a:off x="10059668" y="5661520"/>
+            <a:ext cx="1923011" cy="952959"/>
+          </a:xfrm>
+          <a:prstGeom prst="rect">
+            <a:avLst/>
+          </a:prstGeom>
+          <a:noFill/>
+          <a:extLst>
+            <a:ext uri="{909E8E84-426E-40DD-AFC4-6F175D3DCCD1}">
+              <a14:hiddenFill xmlns:a14="http://schemas.microsoft.com/office/drawing/2010/main">
+                <a:solidFill>
+                  <a:srgbClr val="FFFFFF"/>
+                </a:solidFill>
+              </a14:hiddenFill>
+            </a:ext>
+          </a:extLst>
+        </p:spPr>
+      </p:pic>
     </p:spTree>
     <p:extLst>
       <p:ext uri="{BB962C8B-B14F-4D97-AF65-F5344CB8AC3E}">

</xml_diff>

<commit_message>
Small corrections to the slides
</commit_message>
<xml_diff>
--- a/slides.pptx
+++ b/slides.pptx
@@ -26746,15 +26746,7 @@
           <a:p>
             <a:r>
               <a:rPr lang="en-US" dirty="0"/>
-              <a:t>Loading </a:t>
-            </a:r>
-            <a:r>
-              <a:rPr lang="en-US" dirty="0" err="1"/>
-              <a:t>assocations</a:t>
-            </a:r>
-            <a:r>
-              <a:rPr lang="en-US" dirty="0"/>
-              <a:t>: best practices</a:t>
+              <a:t>Loading associations: best practices</a:t>
             </a:r>
           </a:p>
         </p:txBody>
@@ -33331,7 +33323,7 @@
             </a:pPr>
             <a:r>
               <a:rPr lang="en-US" dirty="0"/>
-              <a:t>In the </a:t>
+              <a:t>In the Spring </a:t>
             </a:r>
             <a:r>
               <a:rPr lang="en-US" dirty="0" err="1"/>
@@ -33615,9 +33607,12 @@
               </a:spcAft>
             </a:pPr>
             <a:r>
-              <a:rPr lang="en-US" dirty="0"/>
+              <a:rPr lang="en-US" dirty="0">
+                <a:hlinkClick r:id="rId2"/>
+              </a:rPr>
               <a:t>https://docs.jboss.org/hibernate/core/3.6/reference/en-US/html_single/#batch</a:t>
             </a:r>
+            <a:endParaRPr lang="en-US" dirty="0"/>
           </a:p>
         </p:txBody>
       </p:sp>
@@ -34033,6 +34028,26 @@
               <a:rPr lang="en-US" sz="2800" dirty="0"/>
               <a:t>Ensures that your tests are representative for production.</a:t>
             </a:r>
+          </a:p>
+          <a:p>
+            <a:pPr>
+              <a:spcAft>
+                <a:spcPts val="600"/>
+              </a:spcAft>
+            </a:pPr>
+            <a:r>
+              <a:rPr lang="en-US" sz="2800" dirty="0"/>
+              <a:t>Allows you to use more database specific features.</a:t>
+            </a:r>
+          </a:p>
+          <a:p>
+            <a:pPr marL="0" indent="0">
+              <a:spcAft>
+                <a:spcPts val="600"/>
+              </a:spcAft>
+              <a:buNone/>
+            </a:pPr>
+            <a:endParaRPr lang="en-US" sz="2800" dirty="0"/>
           </a:p>
         </p:txBody>
       </p:sp>
@@ -37351,21 +37366,12 @@
 </file>
 
 <file path=customXml/item1.xml><?xml version="1.0" encoding="utf-8"?>
-<?mso-contentType ?>
-<FormTemplates xmlns="http://schemas.microsoft.com/sharepoint/v3/contenttype/forms">
-  <Display>DocumentLibraryForm</Display>
-  <Edit>DocumentLibraryForm</Edit>
-  <New>DocumentLibraryForm</New>
-</FormTemplates>
-</file>
-
-<file path=customXml/item2.xml><?xml version="1.0" encoding="utf-8"?>
 <p:properties xmlns:p="http://schemas.microsoft.com/office/2006/metadata/properties" xmlns:xsi="http://www.w3.org/2001/XMLSchema-instance" xmlns:pc="http://schemas.microsoft.com/office/infopath/2007/PartnerControls">
   <documentManagement/>
 </p:properties>
 </file>
 
-<file path=customXml/item3.xml><?xml version="1.0" encoding="utf-8"?>
+<file path=customXml/item2.xml><?xml version="1.0" encoding="utf-8"?>
 <ct:contentTypeSchema xmlns:ct="http://schemas.microsoft.com/office/2006/metadata/contentType" xmlns:ma="http://schemas.microsoft.com/office/2006/metadata/properties/metaAttributes" ct:_="" ma:_="" ma:contentTypeName="Document" ma:contentTypeID="0x0101000858805C9A31ED4698AA5994F7540466" ma:contentTypeVersion="1" ma:contentTypeDescription="Een nieuw document maken." ma:contentTypeScope="" ma:versionID="5cab34e6f8d54d32c51f192539e9981c">
   <xsd:schema xmlns:xsd="http://www.w3.org/2001/XMLSchema" xmlns:xs="http://www.w3.org/2001/XMLSchema" xmlns:p="http://schemas.microsoft.com/office/2006/metadata/properties" xmlns:ns2="a73fd6a0-a740-4ca0-a47f-6beba88ccc77" targetNamespace="http://schemas.microsoft.com/office/2006/metadata/properties" ma:root="true" ma:fieldsID="10b3ae9c115bae24efdfd9076c93080b" ns2:_="">
     <xsd:import namespace="a73fd6a0-a740-4ca0-a47f-6beba88ccc77"/>
@@ -37505,15 +37511,16 @@
 </ct:contentTypeSchema>
 </file>
 
-<file path=customXml/itemProps1.xml><?xml version="1.0" encoding="utf-8"?>
-<ds:datastoreItem xmlns:ds="http://schemas.openxmlformats.org/officeDocument/2006/customXml" ds:itemID="{4522A51C-073F-4C45-9170-ECE5951F4DEA}">
-  <ds:schemaRefs>
-    <ds:schemaRef ds:uri="http://schemas.microsoft.com/sharepoint/v3/contenttype/forms"/>
-  </ds:schemaRefs>
-</ds:datastoreItem>
+<file path=customXml/item3.xml><?xml version="1.0" encoding="utf-8"?>
+<?mso-contentType ?>
+<FormTemplates xmlns="http://schemas.microsoft.com/sharepoint/v3/contenttype/forms">
+  <Display>DocumentLibraryForm</Display>
+  <Edit>DocumentLibraryForm</Edit>
+  <New>DocumentLibraryForm</New>
+</FormTemplates>
 </file>
 
-<file path=customXml/itemProps2.xml><?xml version="1.0" encoding="utf-8"?>
+<file path=customXml/itemProps1.xml><?xml version="1.0" encoding="utf-8"?>
 <ds:datastoreItem xmlns:ds="http://schemas.openxmlformats.org/officeDocument/2006/customXml" ds:itemID="{F8AE8C2F-0717-4D42-B44A-CAECCF122A1A}">
   <ds:schemaRefs>
     <ds:schemaRef ds:uri="http://schemas.microsoft.com/office/2006/documentManagement/types"/>
@@ -37529,7 +37536,7 @@
 </ds:datastoreItem>
 </file>
 
-<file path=customXml/itemProps3.xml><?xml version="1.0" encoding="utf-8"?>
+<file path=customXml/itemProps2.xml><?xml version="1.0" encoding="utf-8"?>
 <ds:datastoreItem xmlns:ds="http://schemas.openxmlformats.org/officeDocument/2006/customXml" ds:itemID="{9AC0CDE9-3E35-44FD-A63A-9795CF527D47}">
   <ds:schemaRefs>
     <ds:schemaRef ds:uri="http://schemas.microsoft.com/office/2006/metadata/contentType"/>
@@ -37545,4 +37552,12 @@
     <ds:schemaRef ds:uri="http://schemas.microsoft.com/internal/obd"/>
   </ds:schemaRefs>
 </ds:datastoreItem>
+</file>
+
+<file path=customXml/itemProps3.xml><?xml version="1.0" encoding="utf-8"?>
+<ds:datastoreItem xmlns:ds="http://schemas.openxmlformats.org/officeDocument/2006/customXml" ds:itemID="{4522A51C-073F-4C45-9170-ECE5951F4DEA}">
+  <ds:schemaRefs>
+    <ds:schemaRef ds:uri="http://schemas.microsoft.com/sharepoint/v3/contenttype/forms"/>
+  </ds:schemaRefs>
+</ds:datastoreItem>
 </file>
</xml_diff>

<commit_message>
Update Spring and update slides to reflect usage of auto-deduplication. Fixes #4
</commit_message>
<xml_diff>
--- a/slides.pptx
+++ b/slides.pptx
@@ -6,10 +6,10 @@
     <p:sldMasterId id="2147483669" r:id="rId5"/>
   </p:sldMasterIdLst>
   <p:notesMasterIdLst>
-    <p:notesMasterId r:id="rId66"/>
+    <p:notesMasterId r:id="rId65"/>
   </p:notesMasterIdLst>
   <p:handoutMasterIdLst>
-    <p:handoutMasterId r:id="rId67"/>
+    <p:handoutMasterId r:id="rId66"/>
   </p:handoutMasterIdLst>
   <p:sldIdLst>
     <p:sldId id="256" r:id="rId6"/>
@@ -53,25 +53,24 @@
     <p:sldId id="287" r:id="rId44"/>
     <p:sldId id="289" r:id="rId45"/>
     <p:sldId id="336" r:id="rId46"/>
-    <p:sldId id="327" r:id="rId47"/>
-    <p:sldId id="291" r:id="rId48"/>
-    <p:sldId id="293" r:id="rId49"/>
-    <p:sldId id="300" r:id="rId50"/>
-    <p:sldId id="334" r:id="rId51"/>
-    <p:sldId id="294" r:id="rId52"/>
-    <p:sldId id="295" r:id="rId53"/>
-    <p:sldId id="296" r:id="rId54"/>
-    <p:sldId id="297" r:id="rId55"/>
-    <p:sldId id="299" r:id="rId56"/>
-    <p:sldId id="302" r:id="rId57"/>
-    <p:sldId id="303" r:id="rId58"/>
-    <p:sldId id="309" r:id="rId59"/>
-    <p:sldId id="324" r:id="rId60"/>
-    <p:sldId id="305" r:id="rId61"/>
-    <p:sldId id="335" r:id="rId62"/>
-    <p:sldId id="318" r:id="rId63"/>
-    <p:sldId id="340" r:id="rId64"/>
-    <p:sldId id="319" r:id="rId65"/>
+    <p:sldId id="291" r:id="rId47"/>
+    <p:sldId id="293" r:id="rId48"/>
+    <p:sldId id="300" r:id="rId49"/>
+    <p:sldId id="334" r:id="rId50"/>
+    <p:sldId id="294" r:id="rId51"/>
+    <p:sldId id="295" r:id="rId52"/>
+    <p:sldId id="296" r:id="rId53"/>
+    <p:sldId id="297" r:id="rId54"/>
+    <p:sldId id="299" r:id="rId55"/>
+    <p:sldId id="302" r:id="rId56"/>
+    <p:sldId id="303" r:id="rId57"/>
+    <p:sldId id="309" r:id="rId58"/>
+    <p:sldId id="324" r:id="rId59"/>
+    <p:sldId id="305" r:id="rId60"/>
+    <p:sldId id="335" r:id="rId61"/>
+    <p:sldId id="318" r:id="rId62"/>
+    <p:sldId id="340" r:id="rId63"/>
+    <p:sldId id="319" r:id="rId64"/>
   </p:sldIdLst>
   <p:sldSz cx="12192000" cy="6858000"/>
   <p:notesSz cx="6858000" cy="9144000"/>
@@ -1502,91 +1501,7 @@
           <a:p>
             <a:fld id="{4970B036-1422-4C36-8158-C30E1C0769EB}" type="slidenum">
               <a:rPr lang="nl-NL" smtClean="0"/>
-              <a:t>42</a:t>
-            </a:fld>
-            <a:endParaRPr lang="nl-NL"/>
-          </a:p>
-        </p:txBody>
-      </p:sp>
-    </p:spTree>
-    <p:extLst>
-      <p:ext uri="{BB962C8B-B14F-4D97-AF65-F5344CB8AC3E}">
-        <p14:creationId xmlns:p14="http://schemas.microsoft.com/office/powerpoint/2010/main" val="3795590368"/>
-      </p:ext>
-    </p:extLst>
-  </p:cSld>
-  <p:clrMapOvr>
-    <a:masterClrMapping/>
-  </p:clrMapOvr>
-</p:notes>
-</file>
-
-<file path=ppt/notesSlides/notesSlide9.xml><?xml version="1.0" encoding="utf-8"?>
-<p:notes xmlns:a="http://schemas.openxmlformats.org/drawingml/2006/main" xmlns:r="http://schemas.openxmlformats.org/officeDocument/2006/relationships" xmlns:p="http://schemas.openxmlformats.org/presentationml/2006/main">
-  <p:cSld>
-    <p:spTree>
-      <p:nvGrpSpPr>
-        <p:cNvPr id="1" name=""/>
-        <p:cNvGrpSpPr/>
-        <p:nvPr/>
-      </p:nvGrpSpPr>
-      <p:grpSpPr>
-        <a:xfrm>
-          <a:off x="0" y="0"/>
-          <a:ext cx="0" cy="0"/>
-          <a:chOff x="0" y="0"/>
-          <a:chExt cx="0" cy="0"/>
-        </a:xfrm>
-      </p:grpSpPr>
-      <p:sp>
-        <p:nvSpPr>
-          <p:cNvPr id="2" name="Tijdelijke aanduiding voor dia-afbeelding 1"/>
-          <p:cNvSpPr>
-            <a:spLocks noGrp="1" noRot="1" noChangeAspect="1"/>
-          </p:cNvSpPr>
-          <p:nvPr>
-            <p:ph type="sldImg"/>
-          </p:nvPr>
-        </p:nvSpPr>
-        <p:spPr/>
-      </p:sp>
-      <p:sp>
-        <p:nvSpPr>
-          <p:cNvPr id="3" name="Tijdelijke aanduiding voor notities 2"/>
-          <p:cNvSpPr>
-            <a:spLocks noGrp="1"/>
-          </p:cNvSpPr>
-          <p:nvPr>
-            <p:ph type="body" idx="1"/>
-          </p:nvPr>
-        </p:nvSpPr>
-        <p:spPr/>
-        <p:txBody>
-          <a:bodyPr/>
-          <a:lstStyle/>
-          <a:p>
-            <a:endParaRPr lang="nl-NL" dirty="0"/>
-          </a:p>
-        </p:txBody>
-      </p:sp>
-      <p:sp>
-        <p:nvSpPr>
-          <p:cNvPr id="4" name="Tijdelijke aanduiding voor dianummer 3"/>
-          <p:cNvSpPr>
-            <a:spLocks noGrp="1"/>
-          </p:cNvSpPr>
-          <p:nvPr>
-            <p:ph type="sldNum" sz="quarter" idx="5"/>
-          </p:nvPr>
-        </p:nvSpPr>
-        <p:spPr/>
-        <p:txBody>
-          <a:bodyPr/>
-          <a:lstStyle/>
-          <a:p>
-            <a:fld id="{4970B036-1422-4C36-8158-C30E1C0769EB}" type="slidenum">
-              <a:rPr lang="nl-NL" smtClean="0"/>
-              <a:t>55</a:t>
+              <a:t>54</a:t>
             </a:fld>
             <a:endParaRPr lang="nl-NL"/>
           </a:p>
@@ -33764,163 +33679,12 @@
               </a:spcAft>
             </a:pPr>
             <a:r>
-              <a:rPr lang="en-US" sz="2800" dirty="0">
-                <a:latin typeface="Courier New" panose="02070309020205020404" pitchFamily="49" charset="0"/>
-                <a:cs typeface="Courier New" panose="02070309020205020404" pitchFamily="49" charset="0"/>
-              </a:rPr>
-              <a:t>JOIN</a:t>
-            </a:r>
-            <a:r>
-              <a:rPr lang="en-US" dirty="0"/>
-              <a:t>s</a:t>
-            </a:r>
-            <a:r>
               <a:rPr lang="en-US" sz="2800" dirty="0"/>
-              <a:t> lead to a data set with duplicates.</a:t>
-            </a:r>
-          </a:p>
-          <a:p>
-            <a:pPr lvl="1">
-              <a:spcAft>
-                <a:spcPts val="600"/>
-              </a:spcAft>
-            </a:pPr>
-            <a:r>
-              <a:rPr lang="en-US" sz="2400" dirty="0"/>
-              <a:t>Solution 1: </a:t>
-            </a:r>
-            <a:r>
-              <a:rPr lang="en-US" sz="2200" dirty="0"/>
-              <a:t>Fetch associations independently.</a:t>
-            </a:r>
-          </a:p>
-          <a:p>
-            <a:pPr lvl="2">
-              <a:spcAft>
-                <a:spcPts val="600"/>
-              </a:spcAft>
-            </a:pPr>
-            <a:r>
-              <a:rPr lang="en-US" sz="2200" dirty="0"/>
-              <a:t>Downside: the N+1 problem is back.</a:t>
-            </a:r>
-          </a:p>
-          <a:p>
-            <a:pPr lvl="1">
-              <a:spcAft>
-                <a:spcPts val="600"/>
-              </a:spcAft>
-            </a:pPr>
-            <a:r>
-              <a:rPr lang="en-US" sz="2400" dirty="0"/>
-              <a:t>Solution 2: Use </a:t>
-            </a:r>
-            <a:r>
-              <a:rPr lang="en-US" sz="2400" dirty="0">
-                <a:latin typeface="Courier New" panose="02070309020205020404" pitchFamily="49" charset="0"/>
-                <a:cs typeface="Courier New" panose="02070309020205020404" pitchFamily="49" charset="0"/>
-              </a:rPr>
-              <a:t>DISTINCT</a:t>
-            </a:r>
-            <a:r>
-              <a:rPr lang="en-US" dirty="0"/>
-              <a:t>.</a:t>
-            </a:r>
-            <a:endParaRPr lang="en-US" sz="2400" dirty="0"/>
-          </a:p>
-          <a:p>
-            <a:pPr lvl="2">
-              <a:spcAft>
-                <a:spcPts val="600"/>
-              </a:spcAft>
-            </a:pPr>
-            <a:r>
-              <a:rPr lang="en-US" sz="2200" dirty="0"/>
-              <a:t>Downside: Hibernate will de-duplicate all data in memory (</a:t>
-            </a:r>
-            <a:r>
-              <a:rPr lang="en-US" sz="2200" dirty="0" err="1">
-                <a:latin typeface="Courier New" panose="02070309020205020404" pitchFamily="49" charset="0"/>
-                <a:cs typeface="Courier New" panose="02070309020205020404" pitchFamily="49" charset="0"/>
-              </a:rPr>
-              <a:t>QueryTranslatorImpl</a:t>
-            </a:r>
-            <a:r>
-              <a:rPr lang="en-US" sz="2200" dirty="0">
-                <a:latin typeface="Courier New" panose="02070309020205020404" pitchFamily="49" charset="0"/>
-                <a:cs typeface="Courier New" panose="02070309020205020404" pitchFamily="49" charset="0"/>
-              </a:rPr>
-              <a:t> </a:t>
-            </a:r>
-            <a:r>
-              <a:rPr lang="en-US" sz="2200" dirty="0" err="1">
-                <a:latin typeface="Courier New" panose="02070309020205020404" pitchFamily="49" charset="0"/>
-                <a:cs typeface="Courier New" panose="02070309020205020404" pitchFamily="49" charset="0"/>
-              </a:rPr>
-              <a:t>needsDistincting</a:t>
-            </a:r>
-            <a:r>
-              <a:rPr lang="en-US" sz="2200" dirty="0"/>
-              <a:t>).</a:t>
-            </a:r>
-          </a:p>
-          <a:p>
-            <a:pPr lvl="1">
-              <a:spcAft>
-                <a:spcPts val="600"/>
-              </a:spcAft>
-            </a:pPr>
-            <a:endParaRPr lang="en-US" sz="2400" dirty="0"/>
+              <a:t>Hibernate needs to de-duplicate in-memory: could cause performance issues.</a:t>
+            </a:r>
           </a:p>
         </p:txBody>
       </p:sp>
-      <p:pic>
-        <p:nvPicPr>
-          <p:cNvPr id="4" name="Picture 2" descr="22,947 Demo Foto's, Afbeeldingen en Stock Fotografie - 123RF">
-            <a:extLst>
-              <a:ext uri="{FF2B5EF4-FFF2-40B4-BE49-F238E27FC236}">
-                <a16:creationId xmlns:a16="http://schemas.microsoft.com/office/drawing/2014/main" id="{ED64D180-0547-4366-BB5C-0393EF8728AB}"/>
-              </a:ext>
-            </a:extLst>
-          </p:cNvPr>
-          <p:cNvPicPr>
-            <a:picLocks noChangeAspect="1" noChangeArrowheads="1"/>
-          </p:cNvPicPr>
-          <p:nvPr/>
-        </p:nvPicPr>
-        <p:blipFill>
-          <a:blip r:embed="rId3">
-            <a:extLst>
-              <a:ext uri="{28A0092B-C50C-407E-A947-70E740481C1C}">
-                <a14:useLocalDpi xmlns:a14="http://schemas.microsoft.com/office/drawing/2010/main" val="0"/>
-              </a:ext>
-            </a:extLst>
-          </a:blip>
-          <a:srcRect/>
-          <a:stretch>
-            <a:fillRect/>
-          </a:stretch>
-        </p:blipFill>
-        <p:spPr bwMode="auto">
-          <a:xfrm>
-            <a:off x="10059668" y="5661520"/>
-            <a:ext cx="1923011" cy="952959"/>
-          </a:xfrm>
-          <a:prstGeom prst="rect">
-            <a:avLst/>
-          </a:prstGeom>
-          <a:noFill/>
-          <a:extLst>
-            <a:ext uri="{909E8E84-426E-40DD-AFC4-6F175D3DCCD1}">
-              <a14:hiddenFill xmlns:a14="http://schemas.microsoft.com/office/drawing/2010/main">
-                <a:solidFill>
-                  <a:srgbClr val="FFFFFF"/>
-                </a:solidFill>
-              </a14:hiddenFill>
-            </a:ext>
-          </a:extLst>
-        </p:spPr>
-      </p:pic>
     </p:spTree>
     <p:extLst>
       <p:ext uri="{BB962C8B-B14F-4D97-AF65-F5344CB8AC3E}">
@@ -34032,27 +33796,27 @@
             </a:pPr>
             <a:r>
               <a:rPr lang="en-US" sz="2800" dirty="0"/>
-              <a:t>Fetching associations with lazy loading causes more database traffic and latency but can be faster than deduplicating a massive result set with </a:t>
-            </a:r>
-            <a:r>
-              <a:rPr lang="en-US" sz="2800" dirty="0">
-                <a:latin typeface="Courier New" panose="02070309020205020404" pitchFamily="49" charset="0"/>
-                <a:cs typeface="Courier New" panose="02070309020205020404" pitchFamily="49" charset="0"/>
-              </a:rPr>
-              <a:t>DISTINCT</a:t>
-            </a:r>
-            <a:r>
-              <a:rPr lang="en-US" sz="2800" dirty="0"/>
-              <a:t>.</a:t>
-            </a:r>
-            <a:endParaRPr lang="en-US" sz="2200" dirty="0"/>
-          </a:p>
-          <a:p>
-            <a:pPr lvl="1">
+              <a:t>Could avoid the JOIN and use lazy loading.</a:t>
+            </a:r>
+          </a:p>
+          <a:p>
+            <a:pPr>
               <a:spcAft>
                 <a:spcPts val="600"/>
               </a:spcAft>
             </a:pPr>
+            <a:r>
+              <a:rPr lang="en-US" sz="2800" dirty="0"/>
+              <a:t>Fetching associations with lazy loading causes more database traffic and latency but </a:t>
+            </a:r>
+            <a:r>
+              <a:rPr lang="en-US" sz="2800" i="1" dirty="0"/>
+              <a:t>could</a:t>
+            </a:r>
+            <a:r>
+              <a:rPr lang="en-US" sz="2800" dirty="0"/>
+              <a:t> be faster than deduplicating a massive result set.</a:t>
+            </a:r>
             <a:endParaRPr lang="en-US" sz="2400" dirty="0"/>
           </a:p>
         </p:txBody>
@@ -34071,213 +33835,6 @@
 </file>
 
 <file path=ppt/slides/slide42.xml><?xml version="1.0" encoding="utf-8"?>
-<p:sld xmlns:a="http://schemas.openxmlformats.org/drawingml/2006/main" xmlns:r="http://schemas.openxmlformats.org/officeDocument/2006/relationships" xmlns:p="http://schemas.openxmlformats.org/presentationml/2006/main">
-  <p:cSld>
-    <p:spTree>
-      <p:nvGrpSpPr>
-        <p:cNvPr id="1" name=""/>
-        <p:cNvGrpSpPr/>
-        <p:nvPr/>
-      </p:nvGrpSpPr>
-      <p:grpSpPr>
-        <a:xfrm>
-          <a:off x="0" y="0"/>
-          <a:ext cx="0" cy="0"/>
-          <a:chOff x="0" y="0"/>
-          <a:chExt cx="0" cy="0"/>
-        </a:xfrm>
-      </p:grpSpPr>
-      <p:sp>
-        <p:nvSpPr>
-          <p:cNvPr id="2" name="Titel 1">
-            <a:extLst>
-              <a:ext uri="{FF2B5EF4-FFF2-40B4-BE49-F238E27FC236}">
-                <a16:creationId xmlns:a16="http://schemas.microsoft.com/office/drawing/2014/main" id="{05B55862-4B05-4C16-B01F-3FA0CB002DB3}"/>
-              </a:ext>
-            </a:extLst>
-          </p:cNvPr>
-          <p:cNvSpPr>
-            <a:spLocks noGrp="1"/>
-          </p:cNvSpPr>
-          <p:nvPr>
-            <p:ph type="title"/>
-          </p:nvPr>
-        </p:nvSpPr>
-        <p:spPr>
-          <a:xfrm>
-            <a:off x="1296000" y="720000"/>
-            <a:ext cx="9864000" cy="866153"/>
-          </a:xfrm>
-        </p:spPr>
-        <p:txBody>
-          <a:bodyPr/>
-          <a:lstStyle/>
-          <a:p>
-            <a:r>
-              <a:rPr lang="nl-BE" dirty="0"/>
-              <a:t>The </a:t>
-            </a:r>
-            <a:r>
-              <a:rPr lang="nl-BE" dirty="0" err="1"/>
-              <a:t>cartesian</a:t>
-            </a:r>
-            <a:r>
-              <a:rPr lang="nl-BE" dirty="0"/>
-              <a:t> product </a:t>
-            </a:r>
-            <a:r>
-              <a:rPr lang="nl-BE" dirty="0" err="1"/>
-              <a:t>problem</a:t>
-            </a:r>
-            <a:r>
-              <a:rPr lang="nl-BE" dirty="0"/>
-              <a:t> is a database </a:t>
-            </a:r>
-            <a:r>
-              <a:rPr lang="nl-BE" dirty="0" err="1"/>
-              <a:t>problem</a:t>
-            </a:r>
-            <a:endParaRPr lang="nl-NL" dirty="0"/>
-          </a:p>
-        </p:txBody>
-      </p:sp>
-      <p:sp>
-        <p:nvSpPr>
-          <p:cNvPr id="3" name="Tijdelijke aanduiding voor tekst 2">
-            <a:extLst>
-              <a:ext uri="{FF2B5EF4-FFF2-40B4-BE49-F238E27FC236}">
-                <a16:creationId xmlns:a16="http://schemas.microsoft.com/office/drawing/2014/main" id="{8B3F77EB-4E55-4CD2-91C4-1539E78AB8B6}"/>
-              </a:ext>
-            </a:extLst>
-          </p:cNvPr>
-          <p:cNvSpPr>
-            <a:spLocks noGrp="1"/>
-          </p:cNvSpPr>
-          <p:nvPr>
-            <p:ph type="body" sz="quarter" idx="10"/>
-          </p:nvPr>
-        </p:nvSpPr>
-        <p:spPr>
-          <a:xfrm>
-            <a:off x="1295999" y="3506569"/>
-            <a:ext cx="9864000" cy="2709415"/>
-          </a:xfrm>
-        </p:spPr>
-        <p:txBody>
-          <a:bodyPr>
-            <a:normAutofit/>
-          </a:bodyPr>
-          <a:lstStyle/>
-          <a:p>
-            <a:pPr marL="0" indent="0">
-              <a:buNone/>
-            </a:pPr>
-            <a:r>
-              <a:rPr lang="nl-BE" sz="1800" dirty="0"/>
-              <a:t>More info: </a:t>
-            </a:r>
-            <a:endParaRPr lang="nl-BE" sz="1800" b="1" dirty="0">
-              <a:highlight>
-                <a:srgbClr val="FFFF00"/>
-              </a:highlight>
-            </a:endParaRPr>
-          </a:p>
-          <a:p>
-            <a:pPr lvl="1"/>
-            <a:r>
-              <a:rPr lang="nl-BE" sz="1800" dirty="0">
-                <a:hlinkClick r:id="rId3"/>
-              </a:rPr>
-              <a:t>https://jakarta.ee/specifications/persistence/3.0/jakarta-persistence-spec-3.0.html#a4931</a:t>
-            </a:r>
-            <a:endParaRPr lang="nl-BE" sz="1800" dirty="0"/>
-          </a:p>
-          <a:p>
-            <a:pPr lvl="1"/>
-            <a:r>
-              <a:rPr lang="nl-BE" sz="1800" dirty="0">
-                <a:hlinkClick r:id="rId4"/>
-              </a:rPr>
-              <a:t>https://developer.jboss.org/docs/DOC-15782#jive_content_id_Hibernate_does_not_return_distinct_results_for_a_query_with_outer_join_fetching_enabled_for_a_collection_even_if_I_use_the_distinct_keyword</a:t>
-            </a:r>
-            <a:endParaRPr lang="nl-BE" sz="1800" dirty="0"/>
-          </a:p>
-          <a:p>
-            <a:pPr lvl="1"/>
-            <a:r>
-              <a:rPr lang="nl-BE" sz="1800" dirty="0">
-                <a:hlinkClick r:id="rId5"/>
-              </a:rPr>
-              <a:t>https://vladmihalcea.com/jpql-distinct-jpa-hibernate/</a:t>
-            </a:r>
-            <a:endParaRPr lang="nl-BE" sz="1800" dirty="0"/>
-          </a:p>
-          <a:p>
-            <a:pPr lvl="1"/>
-            <a:r>
-              <a:rPr lang="nl-BE" sz="1800" dirty="0">
-                <a:hlinkClick r:id="rId6"/>
-              </a:rPr>
-              <a:t>https://in.relation.to/2016/08/04/introducing-distinct-pass-through-query-hint/</a:t>
-            </a:r>
-            <a:endParaRPr lang="nl-BE" sz="1800" dirty="0"/>
-          </a:p>
-          <a:p>
-            <a:pPr lvl="1"/>
-            <a:r>
-              <a:rPr lang="nl-BE" sz="1800" dirty="0">
-                <a:hlinkClick r:id="rId7"/>
-              </a:rPr>
-              <a:t>https://thorben-janssen.com/hibernate-tips-apply-distinct-to-jpql-but-not-sql-query/</a:t>
-            </a:r>
-            <a:endParaRPr lang="nl-BE" sz="1800" dirty="0"/>
-          </a:p>
-        </p:txBody>
-      </p:sp>
-      <p:pic>
-        <p:nvPicPr>
-          <p:cNvPr id="7" name="Afbeelding 6">
-            <a:extLst>
-              <a:ext uri="{FF2B5EF4-FFF2-40B4-BE49-F238E27FC236}">
-                <a16:creationId xmlns:a16="http://schemas.microsoft.com/office/drawing/2014/main" id="{852748A4-766B-4D58-8E95-3421775E2523}"/>
-              </a:ext>
-            </a:extLst>
-          </p:cNvPr>
-          <p:cNvPicPr>
-            <a:picLocks noChangeAspect="1"/>
-          </p:cNvPicPr>
-          <p:nvPr/>
-        </p:nvPicPr>
-        <p:blipFill>
-          <a:blip r:embed="rId8"/>
-          <a:stretch>
-            <a:fillRect/>
-          </a:stretch>
-        </p:blipFill>
-        <p:spPr>
-          <a:xfrm>
-            <a:off x="1178414" y="2047261"/>
-            <a:ext cx="10099171" cy="1304171"/>
-          </a:xfrm>
-          <a:prstGeom prst="rect">
-            <a:avLst/>
-          </a:prstGeom>
-        </p:spPr>
-      </p:pic>
-    </p:spTree>
-    <p:extLst>
-      <p:ext uri="{BB962C8B-B14F-4D97-AF65-F5344CB8AC3E}">
-        <p14:creationId xmlns:p14="http://schemas.microsoft.com/office/powerpoint/2010/main" val="3090134708"/>
-      </p:ext>
-    </p:extLst>
-  </p:cSld>
-  <p:clrMapOvr>
-    <a:masterClrMapping/>
-  </p:clrMapOvr>
-</p:sld>
-</file>
-
-<file path=ppt/slides/slide43.xml><?xml version="1.0" encoding="utf-8"?>
 <p:sld xmlns:a="http://schemas.openxmlformats.org/drawingml/2006/main" xmlns:r="http://schemas.openxmlformats.org/officeDocument/2006/relationships" xmlns:p="http://schemas.openxmlformats.org/presentationml/2006/main">
   <p:cSld>
     <p:spTree>
@@ -34337,6 +33894,111 @@
     <p:extLst>
       <p:ext uri="{BB962C8B-B14F-4D97-AF65-F5344CB8AC3E}">
         <p14:creationId xmlns:p14="http://schemas.microsoft.com/office/powerpoint/2010/main" val="1036875611"/>
+      </p:ext>
+    </p:extLst>
+  </p:cSld>
+  <p:clrMapOvr>
+    <a:masterClrMapping/>
+  </p:clrMapOvr>
+</p:sld>
+</file>
+
+<file path=ppt/slides/slide43.xml><?xml version="1.0" encoding="utf-8"?>
+<p:sld xmlns:a="http://schemas.openxmlformats.org/drawingml/2006/main" xmlns:r="http://schemas.openxmlformats.org/officeDocument/2006/relationships" xmlns:p="http://schemas.openxmlformats.org/presentationml/2006/main">
+  <p:cSld>
+    <p:spTree>
+      <p:nvGrpSpPr>
+        <p:cNvPr id="1" name=""/>
+        <p:cNvGrpSpPr/>
+        <p:nvPr/>
+      </p:nvGrpSpPr>
+      <p:grpSpPr>
+        <a:xfrm>
+          <a:off x="0" y="0"/>
+          <a:ext cx="0" cy="0"/>
+          <a:chOff x="0" y="0"/>
+          <a:chExt cx="0" cy="0"/>
+        </a:xfrm>
+      </p:grpSpPr>
+      <p:sp>
+        <p:nvSpPr>
+          <p:cNvPr id="11" name="Title 1">
+            <a:extLst>
+              <a:ext uri="{FF2B5EF4-FFF2-40B4-BE49-F238E27FC236}">
+                <a16:creationId xmlns:a16="http://schemas.microsoft.com/office/drawing/2014/main" id="{51612DA1-DB43-7E72-A4EA-4B95C807605F}"/>
+              </a:ext>
+            </a:extLst>
+          </p:cNvPr>
+          <p:cNvSpPr>
+            <a:spLocks noGrp="1"/>
+          </p:cNvSpPr>
+          <p:nvPr>
+            <p:ph type="title"/>
+          </p:nvPr>
+        </p:nvSpPr>
+        <p:spPr>
+          <a:xfrm>
+            <a:off x="1296000" y="719999"/>
+            <a:ext cx="9864000" cy="1259407"/>
+          </a:xfrm>
+        </p:spPr>
+        <p:txBody>
+          <a:bodyPr anchor="t">
+            <a:normAutofit/>
+          </a:bodyPr>
+          <a:lstStyle/>
+          <a:p>
+            <a:r>
+              <a:rPr lang="en-US" dirty="0"/>
+              <a:t>Tip 1: Avoid entity overhead</a:t>
+            </a:r>
+          </a:p>
+        </p:txBody>
+      </p:sp>
+      <p:sp>
+        <p:nvSpPr>
+          <p:cNvPr id="13" name="Text Placeholder 2">
+            <a:extLst>
+              <a:ext uri="{FF2B5EF4-FFF2-40B4-BE49-F238E27FC236}">
+                <a16:creationId xmlns:a16="http://schemas.microsoft.com/office/drawing/2014/main" id="{5AFACC08-6E7F-14DD-D1E6-54973126E7AF}"/>
+              </a:ext>
+            </a:extLst>
+          </p:cNvPr>
+          <p:cNvSpPr>
+            <a:spLocks noGrp="1"/>
+          </p:cNvSpPr>
+          <p:nvPr>
+            <p:ph type="body" sz="quarter" idx="10"/>
+          </p:nvPr>
+        </p:nvSpPr>
+        <p:spPr>
+          <a:xfrm>
+            <a:off x="1296000" y="2398955"/>
+            <a:ext cx="9864000" cy="3338904"/>
+          </a:xfrm>
+        </p:spPr>
+        <p:txBody>
+          <a:bodyPr>
+            <a:normAutofit/>
+          </a:bodyPr>
+          <a:lstStyle/>
+          <a:p>
+            <a:pPr>
+              <a:spcAft>
+                <a:spcPts val="600"/>
+              </a:spcAft>
+            </a:pPr>
+            <a:r>
+              <a:rPr lang="en-US" sz="2800" dirty="0"/>
+              <a:t>Entities come with a lot of overhead (dirty checking, persistence context)</a:t>
+            </a:r>
+          </a:p>
+        </p:txBody>
+      </p:sp>
+    </p:spTree>
+    <p:extLst>
+      <p:ext uri="{BB962C8B-B14F-4D97-AF65-F5344CB8AC3E}">
+        <p14:creationId xmlns:p14="http://schemas.microsoft.com/office/powerpoint/2010/main" val="613316660"/>
       </p:ext>
     </p:extLst>
   </p:cSld>
@@ -34381,8 +34043,8 @@
         </p:nvSpPr>
         <p:spPr>
           <a:xfrm>
-            <a:off x="1296000" y="719999"/>
-            <a:ext cx="9864000" cy="1259407"/>
+            <a:off x="1296000" y="720000"/>
+            <a:ext cx="9864000" cy="681480"/>
           </a:xfrm>
         </p:spPr>
         <p:txBody>
@@ -34395,6 +34057,11 @@
               <a:rPr lang="en-US" dirty="0"/>
               <a:t>Tip 1: Avoid entity overhead</a:t>
             </a:r>
+            <a:endParaRPr lang="en-US" dirty="0">
+              <a:solidFill>
+                <a:srgbClr val="FF0000"/>
+              </a:solidFill>
+            </a:endParaRPr>
           </a:p>
         </p:txBody>
       </p:sp>
@@ -34416,8 +34083,8 @@
         </p:nvSpPr>
         <p:spPr>
           <a:xfrm>
-            <a:off x="1296000" y="2398955"/>
-            <a:ext cx="9864000" cy="3338904"/>
+            <a:off x="1296000" y="2105696"/>
+            <a:ext cx="9864000" cy="3632163"/>
           </a:xfrm>
         </p:spPr>
         <p:txBody>
@@ -34433,7 +34100,51 @@
             </a:pPr>
             <a:r>
               <a:rPr lang="en-US" sz="2800" dirty="0"/>
-              <a:t>Entities come with a lot of overhead (dirty checking, persistence context)</a:t>
+              <a:t>If your use-case doesn’t require propagating changes to the database, use </a:t>
+            </a:r>
+            <a:r>
+              <a:rPr lang="en-US" sz="2800" b="1" dirty="0"/>
+              <a:t>read-only transactions</a:t>
+            </a:r>
+            <a:r>
+              <a:rPr lang="en-US" sz="2800" dirty="0"/>
+              <a:t>.</a:t>
+            </a:r>
+          </a:p>
+          <a:p>
+            <a:pPr>
+              <a:spcAft>
+                <a:spcPts val="600"/>
+              </a:spcAft>
+            </a:pPr>
+            <a:r>
+              <a:rPr lang="en-US" sz="2800" dirty="0">
+                <a:latin typeface="Courier New" panose="02070309020205020404" pitchFamily="49" charset="0"/>
+                <a:cs typeface="Courier New" panose="02070309020205020404" pitchFamily="49" charset="0"/>
+              </a:rPr>
+              <a:t>@Transactional(readOnly=true)</a:t>
+            </a:r>
+          </a:p>
+          <a:p>
+            <a:pPr>
+              <a:spcAft>
+                <a:spcPts val="600"/>
+              </a:spcAft>
+            </a:pPr>
+            <a:r>
+              <a:rPr lang="en-US" sz="2800" dirty="0"/>
+              <a:t>It eliminates dirty-checking.</a:t>
+            </a:r>
+          </a:p>
+          <a:p>
+            <a:pPr>
+              <a:spcAft>
+                <a:spcPts val="600"/>
+              </a:spcAft>
+            </a:pPr>
+            <a:r>
+              <a:rPr lang="en-US" sz="2800" dirty="0"/>
+              <a:t>It eliminates loading the entity in the persistence context.</a:t>
             </a:r>
           </a:p>
         </p:txBody>
@@ -34441,7 +34152,7 @@
     </p:spTree>
     <p:extLst>
       <p:ext uri="{BB962C8B-B14F-4D97-AF65-F5344CB8AC3E}">
-        <p14:creationId xmlns:p14="http://schemas.microsoft.com/office/powerpoint/2010/main" val="613316660"/>
+        <p14:creationId xmlns:p14="http://schemas.microsoft.com/office/powerpoint/2010/main" val="2389961084"/>
       </p:ext>
     </p:extLst>
   </p:cSld>
@@ -34543,11 +34254,11 @@
             </a:pPr>
             <a:r>
               <a:rPr lang="en-US" sz="2800" dirty="0"/>
-              <a:t>If your use-case doesn’t require propagating changes to the database, use </a:t>
+              <a:t>You can also eliminate entities by using </a:t>
             </a:r>
             <a:r>
               <a:rPr lang="en-US" sz="2800" b="1" dirty="0"/>
-              <a:t>read-only transactions</a:t>
+              <a:t>DTO projections</a:t>
             </a:r>
             <a:r>
               <a:rPr lang="en-US" sz="2800" dirty="0"/>
@@ -34561,33 +34272,22 @@
               </a:spcAft>
             </a:pPr>
             <a:r>
+              <a:rPr lang="en-US" sz="2800" dirty="0"/>
+              <a:t>Same result as using </a:t>
+            </a:r>
+            <a:r>
               <a:rPr lang="en-US" sz="2800" dirty="0">
                 <a:latin typeface="Courier New" panose="02070309020205020404" pitchFamily="49" charset="0"/>
                 <a:cs typeface="Courier New" panose="02070309020205020404" pitchFamily="49" charset="0"/>
               </a:rPr>
               <a:t>@Transactional(readOnly=true)</a:t>
             </a:r>
-          </a:p>
-          <a:p>
-            <a:pPr>
-              <a:spcAft>
-                <a:spcPts val="600"/>
-              </a:spcAft>
-            </a:pPr>
-            <a:r>
-              <a:rPr lang="en-US" sz="2800" dirty="0"/>
-              <a:t>It eliminates dirty-checking.</a:t>
-            </a:r>
-          </a:p>
-          <a:p>
-            <a:pPr>
-              <a:spcAft>
-                <a:spcPts val="600"/>
-              </a:spcAft>
-            </a:pPr>
-            <a:r>
-              <a:rPr lang="en-US" sz="2800" dirty="0"/>
-              <a:t>It eliminates loading the entity in the persistence context.</a:t>
+            <a:r>
+              <a:rPr lang="en-US" sz="2800" dirty="0">
+                <a:latin typeface="+mj-lt"/>
+                <a:cs typeface="Courier New" panose="02070309020205020404" pitchFamily="49" charset="0"/>
+              </a:rPr>
+              <a:t> but allows you to only extract fields that are required.</a:t>
             </a:r>
           </a:p>
         </p:txBody>
@@ -34595,7 +34295,7 @@
     </p:spTree>
     <p:extLst>
       <p:ext uri="{BB962C8B-B14F-4D97-AF65-F5344CB8AC3E}">
-        <p14:creationId xmlns:p14="http://schemas.microsoft.com/office/powerpoint/2010/main" val="2389961084"/>
+        <p14:creationId xmlns:p14="http://schemas.microsoft.com/office/powerpoint/2010/main" val="3366337949"/>
       </p:ext>
     </p:extLst>
   </p:cSld>
@@ -34651,13 +34351,12 @@
           <a:lstStyle/>
           <a:p>
             <a:r>
-              <a:rPr lang="en-US" dirty="0"/>
-              <a:t>Tip 1: Avoid entity overhead</a:t>
-            </a:r>
-            <a:endParaRPr lang="en-US" dirty="0">
-              <a:solidFill>
-                <a:srgbClr val="FF0000"/>
-              </a:solidFill>
+              <a:rPr lang="en-US" sz="3600" dirty="0"/>
+              <a:t>Tip 2: Read SQL logs</a:t>
+            </a:r>
+            <a:endParaRPr lang="en-US" sz="3600" dirty="0">
+              <a:latin typeface="Courier New" panose="02070309020205020404" pitchFamily="49" charset="0"/>
+              <a:cs typeface="Courier New" panose="02070309020205020404" pitchFamily="49" charset="0"/>
             </a:endParaRPr>
           </a:p>
         </p:txBody>
@@ -34686,7 +34385,7 @@
         </p:spPr>
         <p:txBody>
           <a:bodyPr>
-            <a:normAutofit/>
+            <a:normAutofit lnSpcReduction="10000"/>
           </a:bodyPr>
           <a:lstStyle/>
           <a:p>
@@ -34697,15 +34396,29 @@
             </a:pPr>
             <a:r>
               <a:rPr lang="en-US" sz="2800" dirty="0"/>
-              <a:t>You can also eliminate entities by using </a:t>
-            </a:r>
-            <a:r>
-              <a:rPr lang="en-US" sz="2800" b="1" dirty="0"/>
-              <a:t>DTO projections</a:t>
-            </a:r>
-            <a:r>
-              <a:rPr lang="en-US" sz="2800" dirty="0"/>
-              <a:t>.</a:t>
+              <a:t>Don’t use </a:t>
+            </a:r>
+            <a:r>
+              <a:rPr lang="en-US" sz="2800" dirty="0" err="1">
+                <a:latin typeface="Courier New" panose="02070309020205020404" pitchFamily="49" charset="0"/>
+                <a:cs typeface="Courier New" panose="02070309020205020404" pitchFamily="49" charset="0"/>
+              </a:rPr>
+              <a:t>hibernate.show_sql</a:t>
+            </a:r>
+            <a:endParaRPr lang="en-US" sz="2800" dirty="0">
+              <a:latin typeface="Courier New" panose="02070309020205020404" pitchFamily="49" charset="0"/>
+              <a:cs typeface="Courier New" panose="02070309020205020404" pitchFamily="49" charset="0"/>
+            </a:endParaRPr>
+          </a:p>
+          <a:p>
+            <a:pPr lvl="1">
+              <a:spcAft>
+                <a:spcPts val="600"/>
+              </a:spcAft>
+            </a:pPr>
+            <a:r>
+              <a:rPr lang="en-US" sz="2400" dirty="0"/>
+              <a:t>Statements are always logged to console.</a:t>
             </a:r>
           </a:p>
           <a:p>
@@ -34716,21 +34429,95 @@
             </a:pPr>
             <a:r>
               <a:rPr lang="en-US" sz="2800" dirty="0"/>
-              <a:t>Same result as using </a:t>
-            </a:r>
-            <a:r>
-              <a:rPr lang="en-US" sz="2800" dirty="0">
+              <a:t>Use the logging framework instead:</a:t>
+            </a:r>
+          </a:p>
+          <a:p>
+            <a:pPr marL="252000" lvl="1" indent="0">
+              <a:spcAft>
+                <a:spcPts val="600"/>
+              </a:spcAft>
+              <a:buNone/>
+            </a:pPr>
+            <a:r>
+              <a:rPr lang="en-US" sz="2400" dirty="0">
                 <a:latin typeface="Courier New" panose="02070309020205020404" pitchFamily="49" charset="0"/>
                 <a:cs typeface="Courier New" panose="02070309020205020404" pitchFamily="49" charset="0"/>
               </a:rPr>
-              <a:t>@Transactional(readOnly=true)</a:t>
-            </a:r>
-            <a:r>
-              <a:rPr lang="en-US" sz="2800" dirty="0">
-                <a:latin typeface="+mj-lt"/>
+              <a:t>logging:</a:t>
+            </a:r>
+          </a:p>
+          <a:p>
+            <a:pPr marL="252000" lvl="1" indent="0">
+              <a:spcAft>
+                <a:spcPts val="600"/>
+              </a:spcAft>
+              <a:buNone/>
+            </a:pPr>
+            <a:r>
+              <a:rPr lang="en-US" sz="2400" dirty="0">
+                <a:latin typeface="Courier New" panose="02070309020205020404" pitchFamily="49" charset="0"/>
                 <a:cs typeface="Courier New" panose="02070309020205020404" pitchFamily="49" charset="0"/>
               </a:rPr>
-              <a:t> but allows you to only extract fields that are required.</a:t>
+              <a:t>  level:</a:t>
+            </a:r>
+          </a:p>
+          <a:p>
+            <a:pPr marL="252000" lvl="1" indent="0">
+              <a:spcAft>
+                <a:spcPts val="600"/>
+              </a:spcAft>
+              <a:buNone/>
+            </a:pPr>
+            <a:r>
+              <a:rPr lang="en-US" sz="2400" dirty="0">
+                <a:latin typeface="Courier New" panose="02070309020205020404" pitchFamily="49" charset="0"/>
+                <a:cs typeface="Courier New" panose="02070309020205020404" pitchFamily="49" charset="0"/>
+              </a:rPr>
+              <a:t>    </a:t>
+            </a:r>
+            <a:r>
+              <a:rPr lang="en-US" sz="2400" dirty="0" err="1">
+                <a:latin typeface="Courier New" panose="02070309020205020404" pitchFamily="49" charset="0"/>
+                <a:cs typeface="Courier New" panose="02070309020205020404" pitchFamily="49" charset="0"/>
+              </a:rPr>
+              <a:t>org.hibernate.SQL</a:t>
+            </a:r>
+            <a:r>
+              <a:rPr lang="en-US" sz="2400" dirty="0">
+                <a:latin typeface="Courier New" panose="02070309020205020404" pitchFamily="49" charset="0"/>
+                <a:cs typeface="Courier New" panose="02070309020205020404" pitchFamily="49" charset="0"/>
+              </a:rPr>
+              <a:t>: debug</a:t>
+            </a:r>
+          </a:p>
+          <a:p>
+            <a:pPr marL="252000" lvl="1" indent="0">
+              <a:spcAft>
+                <a:spcPts val="600"/>
+              </a:spcAft>
+              <a:buNone/>
+            </a:pPr>
+            <a:r>
+              <a:rPr lang="en-US" sz="2400" dirty="0">
+                <a:latin typeface="Courier New" panose="02070309020205020404" pitchFamily="49" charset="0"/>
+                <a:cs typeface="Courier New" panose="02070309020205020404" pitchFamily="49" charset="0"/>
+              </a:rPr>
+              <a:t>    </a:t>
+            </a:r>
+            <a:r>
+              <a:rPr lang="en-US" sz="2400" dirty="0" err="1">
+                <a:latin typeface="Courier New" panose="02070309020205020404" pitchFamily="49" charset="0"/>
+                <a:cs typeface="Courier New" panose="02070309020205020404" pitchFamily="49" charset="0"/>
+              </a:rPr>
+              <a:t>org.hibernate.type.descriptor.sql</a:t>
+            </a:r>
+            <a:r>
+              <a:rPr lang="en-US" sz="2400" dirty="0">
+                <a:latin typeface="Courier New" panose="02070309020205020404" pitchFamily="49" charset="0"/>
+                <a:cs typeface="Courier New" panose="02070309020205020404" pitchFamily="49" charset="0"/>
+              </a:rPr>
+              <a:t>: trace</a:t>
             </a:r>
           </a:p>
         </p:txBody>
@@ -34738,7 +34525,7 @@
     </p:spTree>
     <p:extLst>
       <p:ext uri="{BB962C8B-B14F-4D97-AF65-F5344CB8AC3E}">
-        <p14:creationId xmlns:p14="http://schemas.microsoft.com/office/powerpoint/2010/main" val="3366337949"/>
+        <p14:creationId xmlns:p14="http://schemas.microsoft.com/office/powerpoint/2010/main" val="36027474"/>
       </p:ext>
     </p:extLst>
   </p:cSld>
@@ -34794,10 +34581,21 @@
           <a:lstStyle/>
           <a:p>
             <a:r>
-              <a:rPr lang="en-US" sz="3600" dirty="0"/>
-              <a:t>Tip 2: Read SQL logs</a:t>
-            </a:r>
-            <a:endParaRPr lang="en-US" sz="3600" dirty="0">
+              <a:rPr lang="en-US" dirty="0"/>
+              <a:t>Tip 3: Don’t use </a:t>
+            </a:r>
+            <a:r>
+              <a:rPr lang="en-US" dirty="0">
+                <a:latin typeface="Courier New" panose="02070309020205020404" pitchFamily="49" charset="0"/>
+                <a:cs typeface="Courier New" panose="02070309020205020404" pitchFamily="49" charset="0"/>
+              </a:rPr>
+              <a:t>@Transactional </a:t>
+            </a:r>
+            <a:r>
+              <a:rPr lang="en-US" dirty="0"/>
+              <a:t>in tests</a:t>
+            </a:r>
+            <a:endParaRPr lang="en-US" dirty="0">
               <a:latin typeface="Courier New" panose="02070309020205020404" pitchFamily="49" charset="0"/>
               <a:cs typeface="Courier New" panose="02070309020205020404" pitchFamily="49" charset="0"/>
             </a:endParaRPr>
@@ -34823,12 +34621,12 @@
         <p:spPr>
           <a:xfrm>
             <a:off x="1296000" y="2105696"/>
-            <a:ext cx="9864000" cy="3632163"/>
+            <a:ext cx="9864000" cy="4279473"/>
           </a:xfrm>
         </p:spPr>
         <p:txBody>
           <a:bodyPr>
-            <a:normAutofit lnSpcReduction="10000"/>
+            <a:normAutofit/>
           </a:bodyPr>
           <a:lstStyle/>
           <a:p>
@@ -34838,20 +34636,20 @@
               </a:spcAft>
             </a:pPr>
             <a:r>
-              <a:rPr lang="en-US" sz="2800" dirty="0"/>
-              <a:t>Don’t use </a:t>
-            </a:r>
-            <a:r>
-              <a:rPr lang="en-US" sz="2800" dirty="0" err="1">
+              <a:rPr lang="en-US" dirty="0"/>
+              <a:t>Why would you use </a:t>
+            </a:r>
+            <a:r>
+              <a:rPr lang="en-US" dirty="0">
                 <a:latin typeface="Courier New" panose="02070309020205020404" pitchFamily="49" charset="0"/>
                 <a:cs typeface="Courier New" panose="02070309020205020404" pitchFamily="49" charset="0"/>
               </a:rPr>
-              <a:t>hibernate.show_sql</a:t>
-            </a:r>
-            <a:endParaRPr lang="en-US" sz="2800" dirty="0">
-              <a:latin typeface="Courier New" panose="02070309020205020404" pitchFamily="49" charset="0"/>
-              <a:cs typeface="Courier New" panose="02070309020205020404" pitchFamily="49" charset="0"/>
-            </a:endParaRPr>
+              <a:t>@Transactional </a:t>
+            </a:r>
+            <a:r>
+              <a:rPr lang="en-US" dirty="0"/>
+              <a:t>in a test?</a:t>
+            </a:r>
           </a:p>
           <a:p>
             <a:pPr lvl="1">
@@ -34860,8 +34658,60 @@
               </a:spcAft>
             </a:pPr>
             <a:r>
-              <a:rPr lang="en-US" sz="2400" dirty="0"/>
-              <a:t>Statements are always logged to console.</a:t>
+              <a:rPr lang="en-US" dirty="0"/>
+              <a:t>To clean up data and ensure a deterministic test suite.</a:t>
+            </a:r>
+          </a:p>
+          <a:p>
+            <a:pPr lvl="1">
+              <a:spcAft>
+                <a:spcPts val="600"/>
+              </a:spcAft>
+            </a:pPr>
+            <a:r>
+              <a:rPr lang="en-US" dirty="0"/>
+              <a:t>Behavior of </a:t>
+            </a:r>
+            <a:r>
+              <a:rPr lang="en-US" dirty="0">
+                <a:latin typeface="Courier New" panose="02070309020205020404" pitchFamily="49" charset="0"/>
+                <a:cs typeface="Courier New" panose="02070309020205020404" pitchFamily="49" charset="0"/>
+              </a:rPr>
+              <a:t>@Transactional </a:t>
+            </a:r>
+            <a:r>
+              <a:rPr lang="en-US" dirty="0"/>
+              <a:t>in tests = rollback</a:t>
+            </a:r>
+          </a:p>
+          <a:p>
+            <a:pPr lvl="2">
+              <a:spcAft>
+                <a:spcPts val="600"/>
+              </a:spcAft>
+            </a:pPr>
+            <a:r>
+              <a:rPr lang="en-US" dirty="0"/>
+              <a:t>In the Spring </a:t>
+            </a:r>
+            <a:r>
+              <a:rPr lang="en-US" dirty="0" err="1"/>
+              <a:t>TestContext</a:t>
+            </a:r>
+            <a:r>
+              <a:rPr lang="en-US" dirty="0"/>
+              <a:t> framework, transactions are managed by the </a:t>
+            </a:r>
+            <a:r>
+              <a:rPr lang="en-US" dirty="0" err="1">
+                <a:latin typeface="Courier New" panose="02070309020205020404" pitchFamily="49" charset="0"/>
+                <a:cs typeface="Courier New" panose="02070309020205020404" pitchFamily="49" charset="0"/>
+              </a:rPr>
+              <a:t>TransactionalTestExecutionListener</a:t>
+            </a:r>
+            <a:r>
+              <a:rPr lang="en-US" dirty="0"/>
+              <a:t>.</a:t>
             </a:r>
           </a:p>
           <a:p>
@@ -34871,104 +34721,126 @@
               </a:spcAft>
             </a:pPr>
             <a:r>
-              <a:rPr lang="en-US" sz="2800" dirty="0"/>
-              <a:t>Use the logging framework instead:</a:t>
-            </a:r>
-          </a:p>
-          <a:p>
-            <a:pPr marL="252000" lvl="1" indent="0">
+              <a:rPr lang="en-US" dirty="0"/>
+              <a:t>What is the biggest problem when doing this?</a:t>
+            </a:r>
+          </a:p>
+          <a:p>
+            <a:pPr lvl="1">
               <a:spcAft>
                 <a:spcPts val="600"/>
               </a:spcAft>
-              <a:buNone/>
-            </a:pPr>
-            <a:r>
-              <a:rPr lang="en-US" sz="2400" dirty="0">
+            </a:pPr>
+            <a:r>
+              <a:rPr lang="en-US" dirty="0"/>
+              <a:t>Using </a:t>
+            </a:r>
+            <a:r>
+              <a:rPr lang="en-US" dirty="0">
                 <a:latin typeface="Courier New" panose="02070309020205020404" pitchFamily="49" charset="0"/>
                 <a:cs typeface="Courier New" panose="02070309020205020404" pitchFamily="49" charset="0"/>
               </a:rPr>
-              <a:t>logging:</a:t>
-            </a:r>
-          </a:p>
-          <a:p>
-            <a:pPr marL="252000" lvl="1" indent="0">
+              <a:t>@Transactional </a:t>
+            </a:r>
+            <a:r>
+              <a:rPr lang="en-US" dirty="0"/>
+              <a:t>in tests is dangerous as it can hide production issues.</a:t>
+            </a:r>
+          </a:p>
+          <a:p>
+            <a:pPr>
               <a:spcAft>
                 <a:spcPts val="600"/>
               </a:spcAft>
-              <a:buNone/>
-            </a:pPr>
-            <a:r>
-              <a:rPr lang="en-US" sz="2400" dirty="0">
-                <a:latin typeface="Courier New" panose="02070309020205020404" pitchFamily="49" charset="0"/>
-                <a:cs typeface="Courier New" panose="02070309020205020404" pitchFamily="49" charset="0"/>
-              </a:rPr>
-              <a:t>  level:</a:t>
-            </a:r>
-          </a:p>
-          <a:p>
-            <a:pPr marL="252000" lvl="1" indent="0">
+            </a:pPr>
+            <a:r>
+              <a:rPr lang="en-US" dirty="0"/>
+              <a:t>Solution:</a:t>
+            </a:r>
+          </a:p>
+          <a:p>
+            <a:pPr lvl="1">
               <a:spcAft>
                 <a:spcPts val="600"/>
               </a:spcAft>
-              <a:buNone/>
-            </a:pPr>
-            <a:r>
-              <a:rPr lang="en-US" sz="2400" dirty="0">
+            </a:pPr>
+            <a:r>
+              <a:rPr lang="en-US" dirty="0"/>
+              <a:t>Clean up manually (</a:t>
+            </a:r>
+            <a:r>
+              <a:rPr lang="en-US" dirty="0">
                 <a:latin typeface="Courier New" panose="02070309020205020404" pitchFamily="49" charset="0"/>
                 <a:cs typeface="Courier New" panose="02070309020205020404" pitchFamily="49" charset="0"/>
               </a:rPr>
-              <a:t>    </a:t>
-            </a:r>
-            <a:r>
-              <a:rPr lang="en-US" sz="2400" dirty="0" err="1">
-                <a:latin typeface="Courier New" panose="02070309020205020404" pitchFamily="49" charset="0"/>
-                <a:cs typeface="Courier New" panose="02070309020205020404" pitchFamily="49" charset="0"/>
-              </a:rPr>
-              <a:t>org.hibernate.SQL</a:t>
-            </a:r>
-            <a:r>
-              <a:rPr lang="en-US" sz="2400" dirty="0">
-                <a:latin typeface="Courier New" panose="02070309020205020404" pitchFamily="49" charset="0"/>
-                <a:cs typeface="Courier New" panose="02070309020205020404" pitchFamily="49" charset="0"/>
-              </a:rPr>
-              <a:t>: debug</a:t>
-            </a:r>
-          </a:p>
-          <a:p>
-            <a:pPr marL="252000" lvl="1" indent="0">
+              <a:t>@AfterEach</a:t>
+            </a:r>
+            <a:r>
+              <a:rPr lang="en-US" dirty="0"/>
+              <a:t>).</a:t>
+            </a:r>
+          </a:p>
+          <a:p>
+            <a:pPr>
               <a:spcAft>
                 <a:spcPts val="600"/>
               </a:spcAft>
-              <a:buNone/>
-            </a:pPr>
-            <a:r>
-              <a:rPr lang="en-US" sz="2400" dirty="0">
-                <a:latin typeface="Courier New" panose="02070309020205020404" pitchFamily="49" charset="0"/>
-                <a:cs typeface="Courier New" panose="02070309020205020404" pitchFamily="49" charset="0"/>
-              </a:rPr>
-              <a:t>    </a:t>
-            </a:r>
-            <a:r>
-              <a:rPr lang="en-US" sz="2400" dirty="0" err="1">
-                <a:latin typeface="Courier New" panose="02070309020205020404" pitchFamily="49" charset="0"/>
-                <a:cs typeface="Courier New" panose="02070309020205020404" pitchFamily="49" charset="0"/>
-              </a:rPr>
-              <a:t>org.hibernate.type.descriptor.sql</a:t>
-            </a:r>
-            <a:r>
-              <a:rPr lang="en-US" sz="2400" dirty="0">
-                <a:latin typeface="Courier New" panose="02070309020205020404" pitchFamily="49" charset="0"/>
-                <a:cs typeface="Courier New" panose="02070309020205020404" pitchFamily="49" charset="0"/>
-              </a:rPr>
-              <a:t>: trace</a:t>
-            </a:r>
+            </a:pPr>
+            <a:endParaRPr lang="en-US" dirty="0"/>
           </a:p>
         </p:txBody>
       </p:sp>
+      <p:pic>
+        <p:nvPicPr>
+          <p:cNvPr id="4" name="Picture 2" descr="22,947 Demo Foto's, Afbeeldingen en Stock Fotografie - 123RF">
+            <a:extLst>
+              <a:ext uri="{FF2B5EF4-FFF2-40B4-BE49-F238E27FC236}">
+                <a16:creationId xmlns:a16="http://schemas.microsoft.com/office/drawing/2014/main" id="{3078C261-1290-4C96-B0F3-7F5867671363}"/>
+              </a:ext>
+            </a:extLst>
+          </p:cNvPr>
+          <p:cNvPicPr>
+            <a:picLocks noChangeAspect="1" noChangeArrowheads="1"/>
+          </p:cNvPicPr>
+          <p:nvPr/>
+        </p:nvPicPr>
+        <p:blipFill>
+          <a:blip r:embed="rId2">
+            <a:extLst>
+              <a:ext uri="{28A0092B-C50C-407E-A947-70E740481C1C}">
+                <a14:useLocalDpi xmlns:a14="http://schemas.microsoft.com/office/drawing/2010/main" val="0"/>
+              </a:ext>
+            </a:extLst>
+          </a:blip>
+          <a:srcRect/>
+          <a:stretch>
+            <a:fillRect/>
+          </a:stretch>
+        </p:blipFill>
+        <p:spPr bwMode="auto">
+          <a:xfrm>
+            <a:off x="10059668" y="5661520"/>
+            <a:ext cx="1923011" cy="952959"/>
+          </a:xfrm>
+          <a:prstGeom prst="rect">
+            <a:avLst/>
+          </a:prstGeom>
+          <a:noFill/>
+          <a:extLst>
+            <a:ext uri="{909E8E84-426E-40DD-AFC4-6F175D3DCCD1}">
+              <a14:hiddenFill xmlns:a14="http://schemas.microsoft.com/office/drawing/2010/main">
+                <a:solidFill>
+                  <a:srgbClr val="FFFFFF"/>
+                </a:solidFill>
+              </a14:hiddenFill>
+            </a:ext>
+          </a:extLst>
+        </p:spPr>
+      </p:pic>
     </p:spTree>
     <p:extLst>
       <p:ext uri="{BB962C8B-B14F-4D97-AF65-F5344CB8AC3E}">
-        <p14:creationId xmlns:p14="http://schemas.microsoft.com/office/powerpoint/2010/main" val="36027474"/>
+        <p14:creationId xmlns:p14="http://schemas.microsoft.com/office/powerpoint/2010/main" val="3022796713"/>
       </p:ext>
     </p:extLst>
   </p:cSld>
@@ -35013,8 +34885,8 @@
         </p:nvSpPr>
         <p:spPr>
           <a:xfrm>
-            <a:off x="1296000" y="720000"/>
-            <a:ext cx="9864000" cy="681480"/>
+            <a:off x="1296000" y="719999"/>
+            <a:ext cx="9864000" cy="1057285"/>
           </a:xfrm>
         </p:spPr>
         <p:txBody>
@@ -35025,20 +34897,12 @@
           <a:p>
             <a:r>
               <a:rPr lang="en-US" dirty="0"/>
-              <a:t>Tip 3: Don’t use </a:t>
-            </a:r>
-            <a:r>
-              <a:rPr lang="en-US" dirty="0">
-                <a:latin typeface="Courier New" panose="02070309020205020404" pitchFamily="49" charset="0"/>
-                <a:cs typeface="Courier New" panose="02070309020205020404" pitchFamily="49" charset="0"/>
-              </a:rPr>
-              <a:t>@Transactional </a:t>
-            </a:r>
-            <a:r>
-              <a:rPr lang="en-US" dirty="0"/>
-              <a:t>in tests</a:t>
+              <a:t>Tip 4: Use bulk operations</a:t>
             </a:r>
             <a:endParaRPr lang="en-US" dirty="0">
+              <a:solidFill>
+                <a:srgbClr val="FF0000"/>
+              </a:solidFill>
               <a:latin typeface="Courier New" panose="02070309020205020404" pitchFamily="49" charset="0"/>
               <a:cs typeface="Courier New" panose="02070309020205020404" pitchFamily="49" charset="0"/>
             </a:endParaRPr>
@@ -35064,7 +34928,7 @@
         <p:spPr>
           <a:xfrm>
             <a:off x="1296000" y="2105696"/>
-            <a:ext cx="9864000" cy="4279473"/>
+            <a:ext cx="9864000" cy="3632163"/>
           </a:xfrm>
         </p:spPr>
         <p:txBody>
@@ -35080,18 +34944,29 @@
             </a:pPr>
             <a:r>
               <a:rPr lang="en-US" dirty="0"/>
-              <a:t>Why would you use </a:t>
-            </a:r>
-            <a:r>
-              <a:rPr lang="en-US" dirty="0">
-                <a:latin typeface="Courier New" panose="02070309020205020404" pitchFamily="49" charset="0"/>
-                <a:cs typeface="Courier New" panose="02070309020205020404" pitchFamily="49" charset="0"/>
-              </a:rPr>
-              <a:t>@Transactional </a:t>
-            </a:r>
+              <a:t>Anti-pattern: retrieving entities and updating/deleting them one by one.</a:t>
+            </a:r>
+          </a:p>
+          <a:p>
+            <a:pPr>
+              <a:spcAft>
+                <a:spcPts val="600"/>
+              </a:spcAft>
+            </a:pPr>
             <a:r>
               <a:rPr lang="en-US" dirty="0"/>
-              <a:t>in a test?</a:t>
+              <a:t>Try to create an update/delete query for all relevant rows.</a:t>
+            </a:r>
+          </a:p>
+          <a:p>
+            <a:pPr>
+              <a:spcAft>
+                <a:spcPts val="600"/>
+              </a:spcAft>
+            </a:pPr>
+            <a:r>
+              <a:rPr lang="en-US" dirty="0"/>
+              <a:t>If not possible to write a general query: think about batch processing and Hibernate memory usage.</a:t>
             </a:r>
           </a:p>
           <a:p>
@@ -35101,189 +34976,19 @@
               </a:spcAft>
             </a:pPr>
             <a:r>
-              <a:rPr lang="en-US" dirty="0"/>
-              <a:t>To clean up data and ensure a deterministic test suite.</a:t>
-            </a:r>
-          </a:p>
-          <a:p>
-            <a:pPr lvl="1">
-              <a:spcAft>
-                <a:spcPts val="600"/>
-              </a:spcAft>
-            </a:pPr>
-            <a:r>
-              <a:rPr lang="en-US" dirty="0"/>
-              <a:t>Behavior of </a:t>
-            </a:r>
-            <a:r>
               <a:rPr lang="en-US" dirty="0">
-                <a:latin typeface="Courier New" panose="02070309020205020404" pitchFamily="49" charset="0"/>
-                <a:cs typeface="Courier New" panose="02070309020205020404" pitchFamily="49" charset="0"/>
-              </a:rPr>
-              <a:t>@Transactional </a:t>
-            </a:r>
-            <a:r>
-              <a:rPr lang="en-US" dirty="0"/>
-              <a:t>in tests = rollback</a:t>
-            </a:r>
-          </a:p>
-          <a:p>
-            <a:pPr lvl="2">
-              <a:spcAft>
-                <a:spcPts val="600"/>
-              </a:spcAft>
-            </a:pPr>
-            <a:r>
-              <a:rPr lang="en-US" dirty="0"/>
-              <a:t>In the Spring </a:t>
-            </a:r>
-            <a:r>
-              <a:rPr lang="en-US" dirty="0" err="1"/>
-              <a:t>TestContext</a:t>
-            </a:r>
-            <a:r>
-              <a:rPr lang="en-US" dirty="0"/>
-              <a:t> framework, transactions are managed by the </a:t>
-            </a:r>
-            <a:r>
-              <a:rPr lang="en-US" dirty="0" err="1">
-                <a:latin typeface="Courier New" panose="02070309020205020404" pitchFamily="49" charset="0"/>
-                <a:cs typeface="Courier New" panose="02070309020205020404" pitchFamily="49" charset="0"/>
-              </a:rPr>
-              <a:t>TransactionalTestExecutionListener</a:t>
-            </a:r>
-            <a:r>
-              <a:rPr lang="en-US" dirty="0"/>
-              <a:t>.</a:t>
-            </a:r>
-          </a:p>
-          <a:p>
-            <a:pPr>
-              <a:spcAft>
-                <a:spcPts val="600"/>
-              </a:spcAft>
-            </a:pPr>
-            <a:r>
-              <a:rPr lang="en-US" dirty="0"/>
-              <a:t>What is the biggest problem when doing this?</a:t>
-            </a:r>
-          </a:p>
-          <a:p>
-            <a:pPr lvl="1">
-              <a:spcAft>
-                <a:spcPts val="600"/>
-              </a:spcAft>
-            </a:pPr>
-            <a:r>
-              <a:rPr lang="en-US" dirty="0"/>
-              <a:t>Using </a:t>
-            </a:r>
-            <a:r>
-              <a:rPr lang="en-US" dirty="0">
-                <a:latin typeface="Courier New" panose="02070309020205020404" pitchFamily="49" charset="0"/>
-                <a:cs typeface="Courier New" panose="02070309020205020404" pitchFamily="49" charset="0"/>
-              </a:rPr>
-              <a:t>@Transactional </a:t>
-            </a:r>
-            <a:r>
-              <a:rPr lang="en-US" dirty="0"/>
-              <a:t>in tests is dangerous as it can hide production issues.</a:t>
-            </a:r>
-          </a:p>
-          <a:p>
-            <a:pPr>
-              <a:spcAft>
-                <a:spcPts val="600"/>
-              </a:spcAft>
-            </a:pPr>
-            <a:r>
-              <a:rPr lang="en-US" dirty="0"/>
-              <a:t>Solution:</a:t>
-            </a:r>
-          </a:p>
-          <a:p>
-            <a:pPr lvl="1">
-              <a:spcAft>
-                <a:spcPts val="600"/>
-              </a:spcAft>
-            </a:pPr>
-            <a:r>
-              <a:rPr lang="en-US" dirty="0"/>
-              <a:t>Clean up manually (</a:t>
-            </a:r>
-            <a:r>
-              <a:rPr lang="en-US" dirty="0">
-                <a:latin typeface="Courier New" panose="02070309020205020404" pitchFamily="49" charset="0"/>
-                <a:cs typeface="Courier New" panose="02070309020205020404" pitchFamily="49" charset="0"/>
-              </a:rPr>
-              <a:t>@AfterEach</a:t>
-            </a:r>
-            <a:r>
-              <a:rPr lang="en-US" dirty="0"/>
-              <a:t>).</a:t>
-            </a:r>
-          </a:p>
-          <a:p>
-            <a:pPr>
-              <a:spcAft>
-                <a:spcPts val="600"/>
-              </a:spcAft>
-            </a:pPr>
+                <a:hlinkClick r:id="rId2"/>
+              </a:rPr>
+              <a:t>https://docs.jboss.org/hibernate/core/3.6/reference/en-US/html_single/#batch</a:t>
+            </a:r>
             <a:endParaRPr lang="en-US" dirty="0"/>
           </a:p>
         </p:txBody>
       </p:sp>
-      <p:pic>
-        <p:nvPicPr>
-          <p:cNvPr id="4" name="Picture 2" descr="22,947 Demo Foto's, Afbeeldingen en Stock Fotografie - 123RF">
-            <a:extLst>
-              <a:ext uri="{FF2B5EF4-FFF2-40B4-BE49-F238E27FC236}">
-                <a16:creationId xmlns:a16="http://schemas.microsoft.com/office/drawing/2014/main" id="{3078C261-1290-4C96-B0F3-7F5867671363}"/>
-              </a:ext>
-            </a:extLst>
-          </p:cNvPr>
-          <p:cNvPicPr>
-            <a:picLocks noChangeAspect="1" noChangeArrowheads="1"/>
-          </p:cNvPicPr>
-          <p:nvPr/>
-        </p:nvPicPr>
-        <p:blipFill>
-          <a:blip r:embed="rId2">
-            <a:extLst>
-              <a:ext uri="{28A0092B-C50C-407E-A947-70E740481C1C}">
-                <a14:useLocalDpi xmlns:a14="http://schemas.microsoft.com/office/drawing/2010/main" val="0"/>
-              </a:ext>
-            </a:extLst>
-          </a:blip>
-          <a:srcRect/>
-          <a:stretch>
-            <a:fillRect/>
-          </a:stretch>
-        </p:blipFill>
-        <p:spPr bwMode="auto">
-          <a:xfrm>
-            <a:off x="10059668" y="5661520"/>
-            <a:ext cx="1923011" cy="952959"/>
-          </a:xfrm>
-          <a:prstGeom prst="rect">
-            <a:avLst/>
-          </a:prstGeom>
-          <a:noFill/>
-          <a:extLst>
-            <a:ext uri="{909E8E84-426E-40DD-AFC4-6F175D3DCCD1}">
-              <a14:hiddenFill xmlns:a14="http://schemas.microsoft.com/office/drawing/2010/main">
-                <a:solidFill>
-                  <a:srgbClr val="FFFFFF"/>
-                </a:solidFill>
-              </a14:hiddenFill>
-            </a:ext>
-          </a:extLst>
-        </p:spPr>
-      </p:pic>
     </p:spTree>
     <p:extLst>
       <p:ext uri="{BB962C8B-B14F-4D97-AF65-F5344CB8AC3E}">
-        <p14:creationId xmlns:p14="http://schemas.microsoft.com/office/powerpoint/2010/main" val="3022796713"/>
+        <p14:creationId xmlns:p14="http://schemas.microsoft.com/office/powerpoint/2010/main" val="3338901119"/>
       </p:ext>
     </p:extLst>
   </p:cSld>
@@ -35328,27 +35033,20 @@
         </p:nvSpPr>
         <p:spPr>
           <a:xfrm>
-            <a:off x="1296000" y="719999"/>
-            <a:ext cx="9864000" cy="1057285"/>
+            <a:off x="1296000" y="720000"/>
+            <a:ext cx="9864000" cy="681480"/>
           </a:xfrm>
         </p:spPr>
         <p:txBody>
           <a:bodyPr anchor="t">
-            <a:normAutofit/>
+            <a:normAutofit fontScale="90000"/>
           </a:bodyPr>
           <a:lstStyle/>
           <a:p>
             <a:r>
               <a:rPr lang="en-US" dirty="0"/>
-              <a:t>Tip 4: Use bulk operations</a:t>
-            </a:r>
-            <a:endParaRPr lang="en-US" dirty="0">
-              <a:solidFill>
-                <a:srgbClr val="FF0000"/>
-              </a:solidFill>
-              <a:latin typeface="Courier New" panose="02070309020205020404" pitchFamily="49" charset="0"/>
-              <a:cs typeface="Courier New" panose="02070309020205020404" pitchFamily="49" charset="0"/>
-            </a:endParaRPr>
+              <a:t>Tip 5: Avoid association fetching anti-patterns</a:t>
+            </a:r>
           </a:p>
         </p:txBody>
       </p:sp>
@@ -35386,9 +35084,13 @@
               </a:spcAft>
             </a:pPr>
             <a:r>
-              <a:rPr lang="en-US" dirty="0"/>
-              <a:t>Anti-pattern: retrieving entities and updating/deleting them one by one.</a:t>
-            </a:r>
+              <a:rPr lang="en-US" sz="2800" dirty="0"/>
+              <a:t>Open session in view</a:t>
+            </a:r>
+            <a:endParaRPr lang="en-US" sz="2800" dirty="0">
+              <a:latin typeface="Courier New" panose="02070309020205020404" pitchFamily="49" charset="0"/>
+              <a:cs typeface="Courier New" panose="02070309020205020404" pitchFamily="49" charset="0"/>
+            </a:endParaRPr>
           </a:p>
           <a:p>
             <a:pPr>
@@ -35397,9 +35099,16 @@
               </a:spcAft>
             </a:pPr>
             <a:r>
-              <a:rPr lang="en-US" dirty="0"/>
-              <a:t>Try to create an update/delete query for all relevant rows.</a:t>
-            </a:r>
+              <a:rPr lang="en-US" sz="2800" dirty="0" err="1">
+                <a:latin typeface="Courier New" panose="02070309020205020404" pitchFamily="49" charset="0"/>
+                <a:cs typeface="Courier New" panose="02070309020205020404" pitchFamily="49" charset="0"/>
+              </a:rPr>
+              <a:t>enable_lazy_load_no_trans</a:t>
+            </a:r>
+            <a:endParaRPr lang="en-US" sz="2800" dirty="0">
+              <a:latin typeface="Courier New" panose="02070309020205020404" pitchFamily="49" charset="0"/>
+              <a:cs typeface="Courier New" panose="02070309020205020404" pitchFamily="49" charset="0"/>
+            </a:endParaRPr>
           </a:p>
           <a:p>
             <a:pPr>
@@ -35408,30 +35117,45 @@
               </a:spcAft>
             </a:pPr>
             <a:r>
-              <a:rPr lang="en-US" dirty="0"/>
-              <a:t>If not possible to write a general query: think about batch processing and Hibernate memory usage.</a:t>
-            </a:r>
-          </a:p>
-          <a:p>
-            <a:pPr lvl="1">
+              <a:rPr lang="en-US" sz="2800" dirty="0" err="1">
+                <a:latin typeface="Courier New" panose="02070309020205020404" pitchFamily="49" charset="0"/>
+                <a:cs typeface="Courier New" panose="02070309020205020404" pitchFamily="49" charset="0"/>
+              </a:rPr>
+              <a:t>FetchType.EAGER</a:t>
+            </a:r>
+            <a:endParaRPr lang="en-US" sz="2800" dirty="0">
+              <a:latin typeface="Courier New" panose="02070309020205020404" pitchFamily="49" charset="0"/>
+              <a:cs typeface="Courier New" panose="02070309020205020404" pitchFamily="49" charset="0"/>
+            </a:endParaRPr>
+          </a:p>
+          <a:p>
+            <a:pPr>
               <a:spcAft>
                 <a:spcPts val="600"/>
               </a:spcAft>
             </a:pPr>
             <a:r>
-              <a:rPr lang="en-US" dirty="0">
-                <a:hlinkClick r:id="rId2"/>
-              </a:rPr>
-              <a:t>https://docs.jboss.org/hibernate/core/3.6/reference/en-US/html_single/#batch</a:t>
-            </a:r>
-            <a:endParaRPr lang="en-US" dirty="0"/>
+              <a:rPr lang="en-US" sz="2800" dirty="0"/>
+              <a:t>Not using </a:t>
+            </a:r>
+            <a:r>
+              <a:rPr lang="en-US" sz="2800" dirty="0">
+                <a:latin typeface="Courier New" panose="02070309020205020404" pitchFamily="49" charset="0"/>
+                <a:cs typeface="Courier New" panose="02070309020205020404" pitchFamily="49" charset="0"/>
+              </a:rPr>
+              <a:t>JOIN FETCH </a:t>
+            </a:r>
+            <a:r>
+              <a:rPr lang="en-US" sz="2800" dirty="0"/>
+              <a:t>directive if necessary to avoid the N+1 problem.</a:t>
+            </a:r>
           </a:p>
         </p:txBody>
       </p:sp>
     </p:spTree>
     <p:extLst>
       <p:ext uri="{BB962C8B-B14F-4D97-AF65-F5344CB8AC3E}">
-        <p14:creationId xmlns:p14="http://schemas.microsoft.com/office/powerpoint/2010/main" val="3338901119"/>
+        <p14:creationId xmlns:p14="http://schemas.microsoft.com/office/powerpoint/2010/main" val="865283392"/>
       </p:ext>
     </p:extLst>
   </p:cSld>
@@ -35671,7 +35395,7 @@
         <p:spPr>
           <a:xfrm>
             <a:off x="1296000" y="720000"/>
-            <a:ext cx="9864000" cy="681480"/>
+            <a:ext cx="9864000" cy="1165950"/>
           </a:xfrm>
         </p:spPr>
         <p:txBody>
@@ -35682,7 +35406,7 @@
           <a:p>
             <a:r>
               <a:rPr lang="en-US" dirty="0"/>
-              <a:t>Tip 5: Avoid association fetching anti-patterns</a:t>
+              <a:t>Tip 6: Use the same database system in your tests</a:t>
             </a:r>
           </a:p>
         </p:txBody>
@@ -35722,12 +35446,16 @@
             </a:pPr>
             <a:r>
               <a:rPr lang="en-US" sz="2800" dirty="0"/>
-              <a:t>Open session in view</a:t>
-            </a:r>
-            <a:endParaRPr lang="en-US" sz="2800" dirty="0">
-              <a:latin typeface="Courier New" panose="02070309020205020404" pitchFamily="49" charset="0"/>
-              <a:cs typeface="Courier New" panose="02070309020205020404" pitchFamily="49" charset="0"/>
-            </a:endParaRPr>
+              <a:t>No need for H2, use </a:t>
+            </a:r>
+            <a:r>
+              <a:rPr lang="en-US" sz="2800" i="1" dirty="0" err="1"/>
+              <a:t>Testcontainers</a:t>
+            </a:r>
+            <a:r>
+              <a:rPr lang="en-US" sz="2800" dirty="0"/>
+              <a:t> for integration tests.</a:t>
+            </a:r>
           </a:p>
           <a:p>
             <a:pPr>
@@ -35736,16 +35464,9 @@
               </a:spcAft>
             </a:pPr>
             <a:r>
-              <a:rPr lang="en-US" sz="2800" dirty="0" err="1">
-                <a:latin typeface="Courier New" panose="02070309020205020404" pitchFamily="49" charset="0"/>
-                <a:cs typeface="Courier New" panose="02070309020205020404" pitchFamily="49" charset="0"/>
-              </a:rPr>
-              <a:t>enable_lazy_load_no_trans</a:t>
-            </a:r>
-            <a:endParaRPr lang="en-US" sz="2800" dirty="0">
-              <a:latin typeface="Courier New" panose="02070309020205020404" pitchFamily="49" charset="0"/>
-              <a:cs typeface="Courier New" panose="02070309020205020404" pitchFamily="49" charset="0"/>
-            </a:endParaRPr>
+              <a:rPr lang="en-US" sz="2800" dirty="0"/>
+              <a:t>Ensures that your tests are representative for production.</a:t>
+            </a:r>
           </a:p>
           <a:p>
             <a:pPr>
@@ -35754,45 +35475,25 @@
               </a:spcAft>
             </a:pPr>
             <a:r>
-              <a:rPr lang="en-US" sz="2800" dirty="0" err="1">
-                <a:latin typeface="Courier New" panose="02070309020205020404" pitchFamily="49" charset="0"/>
-                <a:cs typeface="Courier New" panose="02070309020205020404" pitchFamily="49" charset="0"/>
-              </a:rPr>
-              <a:t>FetchType.EAGER</a:t>
-            </a:r>
-            <a:endParaRPr lang="en-US" sz="2800" dirty="0">
-              <a:latin typeface="Courier New" panose="02070309020205020404" pitchFamily="49" charset="0"/>
-              <a:cs typeface="Courier New" panose="02070309020205020404" pitchFamily="49" charset="0"/>
-            </a:endParaRPr>
-          </a:p>
-          <a:p>
-            <a:pPr>
+              <a:rPr lang="en-US" sz="2800" dirty="0"/>
+              <a:t>Allows you to use more database specific features.</a:t>
+            </a:r>
+          </a:p>
+          <a:p>
+            <a:pPr marL="0" indent="0">
               <a:spcAft>
                 <a:spcPts val="600"/>
               </a:spcAft>
-            </a:pPr>
-            <a:r>
-              <a:rPr lang="en-US" sz="2800" dirty="0"/>
-              <a:t>Not using </a:t>
-            </a:r>
-            <a:r>
-              <a:rPr lang="en-US" sz="2800" dirty="0">
-                <a:latin typeface="Courier New" panose="02070309020205020404" pitchFamily="49" charset="0"/>
-                <a:cs typeface="Courier New" panose="02070309020205020404" pitchFamily="49" charset="0"/>
-              </a:rPr>
-              <a:t>JOIN FETCH </a:t>
-            </a:r>
-            <a:r>
-              <a:rPr lang="en-US" sz="2800" dirty="0"/>
-              <a:t>directive if necessary to avoid the N+1 problem.</a:t>
-            </a:r>
+              <a:buNone/>
+            </a:pPr>
+            <a:endParaRPr lang="en-US" sz="2800" dirty="0"/>
           </a:p>
         </p:txBody>
       </p:sp>
     </p:spTree>
     <p:extLst>
       <p:ext uri="{BB962C8B-B14F-4D97-AF65-F5344CB8AC3E}">
-        <p14:creationId xmlns:p14="http://schemas.microsoft.com/office/powerpoint/2010/main" val="865283392"/>
+        <p14:creationId xmlns:p14="http://schemas.microsoft.com/office/powerpoint/2010/main" val="2812624236"/>
       </p:ext>
     </p:extLst>
   </p:cSld>
@@ -35838,7 +35539,7 @@
         <p:spPr>
           <a:xfrm>
             <a:off x="1296000" y="720000"/>
-            <a:ext cx="9864000" cy="1165950"/>
+            <a:ext cx="9864000" cy="681480"/>
           </a:xfrm>
         </p:spPr>
         <p:txBody>
@@ -35849,7 +35550,18 @@
           <a:p>
             <a:r>
               <a:rPr lang="en-US" dirty="0"/>
-              <a:t>Tip 6: Use the same database system in your tests</a:t>
+              <a:t>Tip 7: Understand </a:t>
+            </a:r>
+            <a:r>
+              <a:rPr lang="en-US" dirty="0">
+                <a:latin typeface="Courier New" panose="02070309020205020404" pitchFamily="49" charset="0"/>
+                <a:cs typeface="Courier New" panose="02070309020205020404" pitchFamily="49" charset="0"/>
+              </a:rPr>
+              <a:t>@Transactional </a:t>
+            </a:r>
+            <a:r>
+              <a:rPr lang="en-US" dirty="0"/>
+              <a:t>semantics</a:t>
             </a:r>
           </a:p>
         </p:txBody>
@@ -35889,54 +35601,89 @@
             </a:pPr>
             <a:r>
               <a:rPr lang="en-US" sz="2800" dirty="0"/>
-              <a:t>No need for H2, use </a:t>
-            </a:r>
-            <a:r>
-              <a:rPr lang="en-US" sz="2800" i="1" dirty="0" err="1"/>
-              <a:t>Testcontainers</a:t>
-            </a:r>
-            <a:r>
-              <a:rPr lang="en-US" sz="2800" dirty="0"/>
-              <a:t> for integration tests.</a:t>
-            </a:r>
-          </a:p>
-          <a:p>
-            <a:pPr>
+              <a:t>Spot the problems:</a:t>
+            </a:r>
+          </a:p>
+          <a:p>
+            <a:pPr lvl="1">
               <a:spcAft>
                 <a:spcPts val="600"/>
               </a:spcAft>
             </a:pPr>
             <a:r>
-              <a:rPr lang="en-US" sz="2800" dirty="0"/>
-              <a:t>Ensures that your tests are representative for production.</a:t>
-            </a:r>
-          </a:p>
-          <a:p>
-            <a:pPr>
+              <a:rPr lang="en-US" sz="2400" dirty="0"/>
+              <a:t>Demo: retrieve all comments</a:t>
+            </a:r>
+          </a:p>
+          <a:p>
+            <a:pPr lvl="1">
               <a:spcAft>
                 <a:spcPts val="600"/>
               </a:spcAft>
             </a:pPr>
             <a:r>
-              <a:rPr lang="en-US" sz="2800" dirty="0"/>
-              <a:t>Allows you to use more database specific features.</a:t>
-            </a:r>
-          </a:p>
-          <a:p>
-            <a:pPr marL="0" indent="0">
-              <a:spcAft>
-                <a:spcPts val="600"/>
-              </a:spcAft>
-              <a:buNone/>
-            </a:pPr>
-            <a:endParaRPr lang="en-US" sz="2800" dirty="0"/>
+              <a:rPr lang="en-US" sz="2400" dirty="0"/>
+              <a:t>Demo: give managers a raise</a:t>
+            </a:r>
+            <a:endParaRPr lang="en-US" sz="2400" dirty="0">
+              <a:solidFill>
+                <a:srgbClr val="FF0000"/>
+              </a:solidFill>
+            </a:endParaRPr>
           </a:p>
         </p:txBody>
       </p:sp>
+      <p:pic>
+        <p:nvPicPr>
+          <p:cNvPr id="4" name="Picture 2" descr="22,947 Demo Foto's, Afbeeldingen en Stock Fotografie - 123RF">
+            <a:extLst>
+              <a:ext uri="{FF2B5EF4-FFF2-40B4-BE49-F238E27FC236}">
+                <a16:creationId xmlns:a16="http://schemas.microsoft.com/office/drawing/2014/main" id="{87FF1B22-1B3E-4538-B78C-F1254AD75764}"/>
+              </a:ext>
+            </a:extLst>
+          </p:cNvPr>
+          <p:cNvPicPr>
+            <a:picLocks noChangeAspect="1" noChangeArrowheads="1"/>
+          </p:cNvPicPr>
+          <p:nvPr/>
+        </p:nvPicPr>
+        <p:blipFill>
+          <a:blip r:embed="rId2">
+            <a:extLst>
+              <a:ext uri="{28A0092B-C50C-407E-A947-70E740481C1C}">
+                <a14:useLocalDpi xmlns:a14="http://schemas.microsoft.com/office/drawing/2010/main" val="0"/>
+              </a:ext>
+            </a:extLst>
+          </a:blip>
+          <a:srcRect/>
+          <a:stretch>
+            <a:fillRect/>
+          </a:stretch>
+        </p:blipFill>
+        <p:spPr bwMode="auto">
+          <a:xfrm>
+            <a:off x="10059668" y="5661520"/>
+            <a:ext cx="1923011" cy="952959"/>
+          </a:xfrm>
+          <a:prstGeom prst="rect">
+            <a:avLst/>
+          </a:prstGeom>
+          <a:noFill/>
+          <a:extLst>
+            <a:ext uri="{909E8E84-426E-40DD-AFC4-6F175D3DCCD1}">
+              <a14:hiddenFill xmlns:a14="http://schemas.microsoft.com/office/drawing/2010/main">
+                <a:solidFill>
+                  <a:srgbClr val="FFFFFF"/>
+                </a:solidFill>
+              </a14:hiddenFill>
+            </a:ext>
+          </a:extLst>
+        </p:spPr>
+      </p:pic>
     </p:spTree>
     <p:extLst>
       <p:ext uri="{BB962C8B-B14F-4D97-AF65-F5344CB8AC3E}">
-        <p14:creationId xmlns:p14="http://schemas.microsoft.com/office/powerpoint/2010/main" val="2812624236"/>
+        <p14:creationId xmlns:p14="http://schemas.microsoft.com/office/powerpoint/2010/main" val="730571193"/>
       </p:ext>
     </p:extLst>
   </p:cSld>
@@ -36009,79 +35756,12 @@
           </a:p>
         </p:txBody>
       </p:sp>
-      <p:sp>
-        <p:nvSpPr>
-          <p:cNvPr id="13" name="Text Placeholder 2">
+      <p:pic>
+        <p:nvPicPr>
+          <p:cNvPr id="2050" name="Picture 2" descr="A beginner's guide to entity state transitions with JPA and Hibernate -  Vlad Mihalcea">
             <a:extLst>
               <a:ext uri="{FF2B5EF4-FFF2-40B4-BE49-F238E27FC236}">
-                <a16:creationId xmlns:a16="http://schemas.microsoft.com/office/drawing/2014/main" id="{5AFACC08-6E7F-14DD-D1E6-54973126E7AF}"/>
-              </a:ext>
-            </a:extLst>
-          </p:cNvPr>
-          <p:cNvSpPr>
-            <a:spLocks noGrp="1"/>
-          </p:cNvSpPr>
-          <p:nvPr>
-            <p:ph type="body" sz="quarter" idx="10"/>
-          </p:nvPr>
-        </p:nvSpPr>
-        <p:spPr>
-          <a:xfrm>
-            <a:off x="1296000" y="2105696"/>
-            <a:ext cx="9864000" cy="3632163"/>
-          </a:xfrm>
-        </p:spPr>
-        <p:txBody>
-          <a:bodyPr>
-            <a:normAutofit/>
-          </a:bodyPr>
-          <a:lstStyle/>
-          <a:p>
-            <a:pPr>
-              <a:spcAft>
-                <a:spcPts val="600"/>
-              </a:spcAft>
-            </a:pPr>
-            <a:r>
-              <a:rPr lang="en-US" sz="2800" dirty="0"/>
-              <a:t>Spot the problems:</a:t>
-            </a:r>
-          </a:p>
-          <a:p>
-            <a:pPr lvl="1">
-              <a:spcAft>
-                <a:spcPts val="600"/>
-              </a:spcAft>
-            </a:pPr>
-            <a:r>
-              <a:rPr lang="en-US" sz="2400" dirty="0"/>
-              <a:t>Demo: retrieve all comments</a:t>
-            </a:r>
-          </a:p>
-          <a:p>
-            <a:pPr lvl="1">
-              <a:spcAft>
-                <a:spcPts val="600"/>
-              </a:spcAft>
-            </a:pPr>
-            <a:r>
-              <a:rPr lang="en-US" sz="2400" dirty="0"/>
-              <a:t>Demo: give managers a raise</a:t>
-            </a:r>
-            <a:endParaRPr lang="en-US" sz="2400" dirty="0">
-              <a:solidFill>
-                <a:srgbClr val="FF0000"/>
-              </a:solidFill>
-            </a:endParaRPr>
-          </a:p>
-        </p:txBody>
-      </p:sp>
-      <p:pic>
-        <p:nvPicPr>
-          <p:cNvPr id="4" name="Picture 2" descr="22,947 Demo Foto's, Afbeeldingen en Stock Fotografie - 123RF">
-            <a:extLst>
-              <a:ext uri="{FF2B5EF4-FFF2-40B4-BE49-F238E27FC236}">
-                <a16:creationId xmlns:a16="http://schemas.microsoft.com/office/drawing/2014/main" id="{87FF1B22-1B3E-4538-B78C-F1254AD75764}"/>
+                <a16:creationId xmlns:a16="http://schemas.microsoft.com/office/drawing/2014/main" id="{381D251D-9E80-43FA-9B7D-273D35E1892C}"/>
               </a:ext>
             </a:extLst>
           </p:cNvPr>
@@ -36105,8 +35785,8 @@
         </p:blipFill>
         <p:spPr bwMode="auto">
           <a:xfrm>
-            <a:off x="10059668" y="5661520"/>
-            <a:ext cx="1923011" cy="952959"/>
+            <a:off x="2690812" y="2108869"/>
+            <a:ext cx="6810375" cy="4333875"/>
           </a:xfrm>
           <a:prstGeom prst="rect">
             <a:avLst/>
@@ -36126,7 +35806,7 @@
     </p:spTree>
     <p:extLst>
       <p:ext uri="{BB962C8B-B14F-4D97-AF65-F5344CB8AC3E}">
-        <p14:creationId xmlns:p14="http://schemas.microsoft.com/office/powerpoint/2010/main" val="730571193"/>
+        <p14:creationId xmlns:p14="http://schemas.microsoft.com/office/powerpoint/2010/main" val="1820933201"/>
       </p:ext>
     </p:extLst>
   </p:cSld>
@@ -36183,73 +35863,74 @@
           <a:p>
             <a:r>
               <a:rPr lang="en-US" dirty="0"/>
-              <a:t>Tip 7: Understand </a:t>
-            </a:r>
-            <a:r>
-              <a:rPr lang="en-US" dirty="0">
-                <a:latin typeface="Courier New" panose="02070309020205020404" pitchFamily="49" charset="0"/>
-                <a:cs typeface="Courier New" panose="02070309020205020404" pitchFamily="49" charset="0"/>
-              </a:rPr>
-              <a:t>@Transactional </a:t>
-            </a:r>
-            <a:r>
-              <a:rPr lang="en-US" dirty="0"/>
-              <a:t>semantics</a:t>
+              <a:t>Tip 8: Use DTOs in the web layer, not entities</a:t>
             </a:r>
           </a:p>
         </p:txBody>
       </p:sp>
-      <p:pic>
-        <p:nvPicPr>
-          <p:cNvPr id="2050" name="Picture 2" descr="A beginner's guide to entity state transitions with JPA and Hibernate -  Vlad Mihalcea">
+      <p:sp>
+        <p:nvSpPr>
+          <p:cNvPr id="13" name="Text Placeholder 2">
             <a:extLst>
               <a:ext uri="{FF2B5EF4-FFF2-40B4-BE49-F238E27FC236}">
-                <a16:creationId xmlns:a16="http://schemas.microsoft.com/office/drawing/2014/main" id="{381D251D-9E80-43FA-9B7D-273D35E1892C}"/>
+                <a16:creationId xmlns:a16="http://schemas.microsoft.com/office/drawing/2014/main" id="{5AFACC08-6E7F-14DD-D1E6-54973126E7AF}"/>
               </a:ext>
             </a:extLst>
           </p:cNvPr>
-          <p:cNvPicPr>
-            <a:picLocks noChangeAspect="1" noChangeArrowheads="1"/>
-          </p:cNvPicPr>
-          <p:nvPr/>
-        </p:nvPicPr>
-        <p:blipFill>
-          <a:blip r:embed="rId2">
-            <a:extLst>
-              <a:ext uri="{28A0092B-C50C-407E-A947-70E740481C1C}">
-                <a14:useLocalDpi xmlns:a14="http://schemas.microsoft.com/office/drawing/2010/main" val="0"/>
-              </a:ext>
-            </a:extLst>
-          </a:blip>
-          <a:srcRect/>
-          <a:stretch>
-            <a:fillRect/>
-          </a:stretch>
-        </p:blipFill>
-        <p:spPr bwMode="auto">
+          <p:cNvSpPr>
+            <a:spLocks noGrp="1"/>
+          </p:cNvSpPr>
+          <p:nvPr>
+            <p:ph type="body" sz="quarter" idx="10"/>
+          </p:nvPr>
+        </p:nvSpPr>
+        <p:spPr>
           <a:xfrm>
-            <a:off x="2690812" y="2108869"/>
-            <a:ext cx="6810375" cy="4333875"/>
+            <a:off x="1296000" y="2105696"/>
+            <a:ext cx="9864000" cy="3632163"/>
           </a:xfrm>
-          <a:prstGeom prst="rect">
-            <a:avLst/>
-          </a:prstGeom>
-          <a:noFill/>
-          <a:extLst>
-            <a:ext uri="{909E8E84-426E-40DD-AFC4-6F175D3DCCD1}">
-              <a14:hiddenFill xmlns:a14="http://schemas.microsoft.com/office/drawing/2010/main">
-                <a:solidFill>
-                  <a:srgbClr val="FFFFFF"/>
-                </a:solidFill>
-              </a14:hiddenFill>
-            </a:ext>
-          </a:extLst>
         </p:spPr>
-      </p:pic>
+        <p:txBody>
+          <a:bodyPr>
+            <a:normAutofit/>
+          </a:bodyPr>
+          <a:lstStyle/>
+          <a:p>
+            <a:pPr>
+              <a:spcAft>
+                <a:spcPts val="600"/>
+              </a:spcAft>
+            </a:pPr>
+            <a:r>
+              <a:rPr lang="en-US" dirty="0"/>
+              <a:t>Always map entities to a </a:t>
+            </a:r>
+            <a:r>
+              <a:rPr lang="en-US" i="1" dirty="0"/>
+              <a:t>data transfer object </a:t>
+            </a:r>
+            <a:r>
+              <a:rPr lang="en-US" dirty="0"/>
+              <a:t>(DTO).</a:t>
+            </a:r>
+          </a:p>
+          <a:p>
+            <a:pPr>
+              <a:spcAft>
+                <a:spcPts val="600"/>
+              </a:spcAft>
+            </a:pPr>
+            <a:r>
+              <a:rPr lang="en-US" dirty="0"/>
+              <a:t>Avoid security leaks and have a separation between the database model and the web model.</a:t>
+            </a:r>
+          </a:p>
+        </p:txBody>
+      </p:sp>
     </p:spTree>
     <p:extLst>
       <p:ext uri="{BB962C8B-B14F-4D97-AF65-F5344CB8AC3E}">
-        <p14:creationId xmlns:p14="http://schemas.microsoft.com/office/powerpoint/2010/main" val="1820933201"/>
+        <p14:creationId xmlns:p14="http://schemas.microsoft.com/office/powerpoint/2010/main" val="3288774039"/>
       </p:ext>
     </p:extLst>
   </p:cSld>
@@ -36294,8 +35975,8 @@
         </p:nvSpPr>
         <p:spPr>
           <a:xfrm>
-            <a:off x="1296000" y="720000"/>
-            <a:ext cx="9864000" cy="681480"/>
+            <a:off x="1296000" y="719999"/>
+            <a:ext cx="9864000" cy="1226031"/>
           </a:xfrm>
         </p:spPr>
         <p:txBody>
@@ -36306,8 +35987,34 @@
           <a:p>
             <a:r>
               <a:rPr lang="en-US" dirty="0"/>
-              <a:t>Tip 8: Use DTOs in the web layer, not entities</a:t>
-            </a:r>
+              <a:t>Tip 9: Use </a:t>
+            </a:r>
+            <a:r>
+              <a:rPr lang="en-US" dirty="0" err="1">
+                <a:latin typeface="Courier New" panose="02070309020205020404" pitchFamily="49" charset="0"/>
+                <a:cs typeface="Courier New" panose="02070309020205020404" pitchFamily="49" charset="0"/>
+              </a:rPr>
+              <a:t>getById</a:t>
+            </a:r>
+            <a:r>
+              <a:rPr lang="en-US" dirty="0"/>
+              <a:t> instead of </a:t>
+            </a:r>
+            <a:r>
+              <a:rPr lang="en-US" dirty="0" err="1">
+                <a:latin typeface="Courier New" panose="02070309020205020404" pitchFamily="49" charset="0"/>
+                <a:cs typeface="Courier New" panose="02070309020205020404" pitchFamily="49" charset="0"/>
+              </a:rPr>
+              <a:t>findById</a:t>
+            </a:r>
+            <a:r>
+              <a:rPr lang="en-US" dirty="0"/>
+              <a:t> if you don’t need the entity contents</a:t>
+            </a:r>
+            <a:endParaRPr lang="en-US" dirty="0">
+              <a:latin typeface="Courier New" panose="02070309020205020404" pitchFamily="49" charset="0"/>
+              <a:cs typeface="Courier New" panose="02070309020205020404" pitchFamily="49" charset="0"/>
+            </a:endParaRPr>
           </a:p>
         </p:txBody>
       </p:sp>
@@ -36345,16 +36052,23 @@
               </a:spcAft>
             </a:pPr>
             <a:r>
+              <a:rPr lang="en-US" dirty="0" err="1">
+                <a:latin typeface="Courier New" panose="02070309020205020404" pitchFamily="49" charset="0"/>
+                <a:cs typeface="Courier New" panose="02070309020205020404" pitchFamily="49" charset="0"/>
+              </a:rPr>
+              <a:t>getById</a:t>
+            </a:r>
+            <a:r>
               <a:rPr lang="en-US" dirty="0"/>
-              <a:t>Always map entities to a </a:t>
+              <a:t> returns a proxied </a:t>
             </a:r>
             <a:r>
               <a:rPr lang="en-US" i="1" dirty="0"/>
-              <a:t>data transfer object </a:t>
+              <a:t>reference</a:t>
             </a:r>
             <a:r>
               <a:rPr lang="en-US" dirty="0"/>
-              <a:t>(DTO).</a:t>
+              <a:t> to an entity, it doesn’t go to the database.</a:t>
             </a:r>
           </a:p>
           <a:p>
@@ -36365,15 +36079,106 @@
             </a:pPr>
             <a:r>
               <a:rPr lang="en-US" dirty="0"/>
-              <a:t>Avoid security leaks and have a separation between the database model and the web model.</a:t>
+              <a:t>You can use getters on the proxied reference, but this triggers lazy loading.</a:t>
+            </a:r>
+          </a:p>
+          <a:p>
+            <a:pPr>
+              <a:spcAft>
+                <a:spcPts val="600"/>
+              </a:spcAft>
+            </a:pPr>
+            <a:r>
+              <a:rPr lang="en-US" dirty="0"/>
+              <a:t>Perfect when you only need the entity for establishing a relationship.</a:t>
+            </a:r>
+          </a:p>
+          <a:p>
+            <a:pPr lvl="1">
+              <a:spcAft>
+                <a:spcPts val="600"/>
+              </a:spcAft>
+            </a:pPr>
+            <a:r>
+              <a:rPr lang="en-US" dirty="0"/>
+              <a:t>Example: Inserting a </a:t>
+            </a:r>
+            <a:r>
+              <a:rPr lang="en-US" dirty="0" err="1">
+                <a:latin typeface="Courier New" panose="02070309020205020404" pitchFamily="49" charset="0"/>
+                <a:cs typeface="Courier New" panose="02070309020205020404" pitchFamily="49" charset="0"/>
+              </a:rPr>
+              <a:t>PostComment</a:t>
+            </a:r>
+            <a:r>
+              <a:rPr lang="en-US" dirty="0"/>
+              <a:t> for a </a:t>
+            </a:r>
+            <a:r>
+              <a:rPr lang="en-US" dirty="0">
+                <a:latin typeface="Courier New" panose="02070309020205020404" pitchFamily="49" charset="0"/>
+                <a:cs typeface="Courier New" panose="02070309020205020404" pitchFamily="49" charset="0"/>
+              </a:rPr>
+              <a:t>Post</a:t>
+            </a:r>
+            <a:r>
+              <a:rPr lang="en-US" dirty="0"/>
+              <a:t>.</a:t>
             </a:r>
           </a:p>
         </p:txBody>
       </p:sp>
+      <p:pic>
+        <p:nvPicPr>
+          <p:cNvPr id="2" name="Picture 2" descr="22,947 Demo Foto's, Afbeeldingen en Stock Fotografie - 123RF">
+            <a:extLst>
+              <a:ext uri="{FF2B5EF4-FFF2-40B4-BE49-F238E27FC236}">
+                <a16:creationId xmlns:a16="http://schemas.microsoft.com/office/drawing/2014/main" id="{91D385B1-3DE8-9E8A-3E89-F4FC39CE1F93}"/>
+              </a:ext>
+            </a:extLst>
+          </p:cNvPr>
+          <p:cNvPicPr>
+            <a:picLocks noChangeAspect="1" noChangeArrowheads="1"/>
+          </p:cNvPicPr>
+          <p:nvPr/>
+        </p:nvPicPr>
+        <p:blipFill>
+          <a:blip r:embed="rId3">
+            <a:extLst>
+              <a:ext uri="{28A0092B-C50C-407E-A947-70E740481C1C}">
+                <a14:useLocalDpi xmlns:a14="http://schemas.microsoft.com/office/drawing/2010/main" val="0"/>
+              </a:ext>
+            </a:extLst>
+          </a:blip>
+          <a:srcRect/>
+          <a:stretch>
+            <a:fillRect/>
+          </a:stretch>
+        </p:blipFill>
+        <p:spPr bwMode="auto">
+          <a:xfrm>
+            <a:off x="10059668" y="5661520"/>
+            <a:ext cx="1923011" cy="952959"/>
+          </a:xfrm>
+          <a:prstGeom prst="rect">
+            <a:avLst/>
+          </a:prstGeom>
+          <a:noFill/>
+          <a:extLst>
+            <a:ext uri="{909E8E84-426E-40DD-AFC4-6F175D3DCCD1}">
+              <a14:hiddenFill xmlns:a14="http://schemas.microsoft.com/office/drawing/2010/main">
+                <a:solidFill>
+                  <a:srgbClr val="FFFFFF"/>
+                </a:solidFill>
+              </a14:hiddenFill>
+            </a:ext>
+          </a:extLst>
+        </p:spPr>
+      </p:pic>
     </p:spTree>
     <p:extLst>
       <p:ext uri="{BB962C8B-B14F-4D97-AF65-F5344CB8AC3E}">
-        <p14:creationId xmlns:p14="http://schemas.microsoft.com/office/powerpoint/2010/main" val="3288774039"/>
+        <p14:creationId xmlns:p14="http://schemas.microsoft.com/office/powerpoint/2010/main" val="2468397319"/>
       </p:ext>
     </p:extLst>
   </p:cSld>
@@ -36418,165 +36223,29 @@
         </p:nvSpPr>
         <p:spPr>
           <a:xfrm>
-            <a:off x="1296000" y="719999"/>
-            <a:ext cx="9864000" cy="1226031"/>
+            <a:off x="1296000" y="720000"/>
+            <a:ext cx="9864000" cy="681480"/>
           </a:xfrm>
         </p:spPr>
         <p:txBody>
           <a:bodyPr anchor="t">
-            <a:normAutofit fontScale="90000"/>
-          </a:bodyPr>
-          <a:lstStyle/>
-          <a:p>
-            <a:r>
-              <a:rPr lang="en-US" dirty="0"/>
-              <a:t>Tip 9: Use </a:t>
-            </a:r>
-            <a:r>
-              <a:rPr lang="en-US" dirty="0" err="1">
-                <a:latin typeface="Courier New" panose="02070309020205020404" pitchFamily="49" charset="0"/>
-                <a:cs typeface="Courier New" panose="02070309020205020404" pitchFamily="49" charset="0"/>
-              </a:rPr>
-              <a:t>getById</a:t>
-            </a:r>
-            <a:r>
-              <a:rPr lang="en-US" dirty="0"/>
-              <a:t> instead of </a:t>
-            </a:r>
-            <a:r>
-              <a:rPr lang="en-US" dirty="0" err="1">
-                <a:latin typeface="Courier New" panose="02070309020205020404" pitchFamily="49" charset="0"/>
-                <a:cs typeface="Courier New" panose="02070309020205020404" pitchFamily="49" charset="0"/>
-              </a:rPr>
-              <a:t>findById</a:t>
-            </a:r>
-            <a:r>
-              <a:rPr lang="en-US" dirty="0"/>
-              <a:t> if you don’t need the entity contents</a:t>
-            </a:r>
-            <a:endParaRPr lang="en-US" dirty="0">
-              <a:latin typeface="Courier New" panose="02070309020205020404" pitchFamily="49" charset="0"/>
-              <a:cs typeface="Courier New" panose="02070309020205020404" pitchFamily="49" charset="0"/>
-            </a:endParaRPr>
-          </a:p>
-        </p:txBody>
-      </p:sp>
-      <p:sp>
-        <p:nvSpPr>
-          <p:cNvPr id="13" name="Text Placeholder 2">
-            <a:extLst>
-              <a:ext uri="{FF2B5EF4-FFF2-40B4-BE49-F238E27FC236}">
-                <a16:creationId xmlns:a16="http://schemas.microsoft.com/office/drawing/2014/main" id="{5AFACC08-6E7F-14DD-D1E6-54973126E7AF}"/>
-              </a:ext>
-            </a:extLst>
-          </p:cNvPr>
-          <p:cNvSpPr>
-            <a:spLocks noGrp="1"/>
-          </p:cNvSpPr>
-          <p:nvPr>
-            <p:ph type="body" sz="quarter" idx="10"/>
-          </p:nvPr>
-        </p:nvSpPr>
-        <p:spPr>
-          <a:xfrm>
-            <a:off x="1296000" y="2105696"/>
-            <a:ext cx="9864000" cy="3632163"/>
-          </a:xfrm>
-        </p:spPr>
-        <p:txBody>
-          <a:bodyPr>
             <a:normAutofit/>
           </a:bodyPr>
           <a:lstStyle/>
           <a:p>
-            <a:pPr>
-              <a:spcAft>
-                <a:spcPts val="600"/>
-              </a:spcAft>
-            </a:pPr>
-            <a:r>
-              <a:rPr lang="en-US" dirty="0" err="1">
-                <a:latin typeface="Courier New" panose="02070309020205020404" pitchFamily="49" charset="0"/>
-                <a:cs typeface="Courier New" panose="02070309020205020404" pitchFamily="49" charset="0"/>
-              </a:rPr>
-              <a:t>getById</a:t>
-            </a:r>
             <a:r>
               <a:rPr lang="en-US" dirty="0"/>
-              <a:t> returns a proxied </a:t>
-            </a:r>
-            <a:r>
-              <a:rPr lang="en-US" i="1" dirty="0"/>
-              <a:t>reference</a:t>
-            </a:r>
-            <a:r>
-              <a:rPr lang="en-US" dirty="0"/>
-              <a:t> to an entity, it doesn’t go to the database.</a:t>
-            </a:r>
-          </a:p>
-          <a:p>
-            <a:pPr>
-              <a:spcAft>
-                <a:spcPts val="600"/>
-              </a:spcAft>
-            </a:pPr>
-            <a:r>
-              <a:rPr lang="en-US" dirty="0"/>
-              <a:t>You can use getters on the proxied reference, but this triggers lazy loading.</a:t>
-            </a:r>
-          </a:p>
-          <a:p>
-            <a:pPr>
-              <a:spcAft>
-                <a:spcPts val="600"/>
-              </a:spcAft>
-            </a:pPr>
-            <a:r>
-              <a:rPr lang="en-US" dirty="0"/>
-              <a:t>Perfect when you only need the entity for establishing a relationship.</a:t>
-            </a:r>
-          </a:p>
-          <a:p>
-            <a:pPr lvl="1">
-              <a:spcAft>
-                <a:spcPts val="600"/>
-              </a:spcAft>
-            </a:pPr>
-            <a:r>
-              <a:rPr lang="en-US" dirty="0"/>
-              <a:t>Example: Inserting a </a:t>
-            </a:r>
-            <a:r>
-              <a:rPr lang="en-US" dirty="0" err="1">
-                <a:latin typeface="Courier New" panose="02070309020205020404" pitchFamily="49" charset="0"/>
-                <a:cs typeface="Courier New" panose="02070309020205020404" pitchFamily="49" charset="0"/>
-              </a:rPr>
-              <a:t>PostComment</a:t>
-            </a:r>
-            <a:r>
-              <a:rPr lang="en-US" dirty="0"/>
-              <a:t> for a </a:t>
-            </a:r>
-            <a:r>
-              <a:rPr lang="en-US" dirty="0">
-                <a:latin typeface="Courier New" panose="02070309020205020404" pitchFamily="49" charset="0"/>
-                <a:cs typeface="Courier New" panose="02070309020205020404" pitchFamily="49" charset="0"/>
-              </a:rPr>
-              <a:t>Post</a:t>
-            </a:r>
-            <a:r>
-              <a:rPr lang="en-US" dirty="0"/>
-              <a:t>.</a:t>
+              <a:t>Tip 10: Don’t trust Stack Overflow blindly</a:t>
             </a:r>
           </a:p>
         </p:txBody>
       </p:sp>
       <p:pic>
         <p:nvPicPr>
-          <p:cNvPr id="2" name="Picture 2" descr="22,947 Demo Foto's, Afbeeldingen en Stock Fotografie - 123RF">
+          <p:cNvPr id="1026" name="Picture 2" descr="25 More StackOverflow Programming Memes That All Devs Can Relate To | by  Sheetal | JavaScript in Plain English">
             <a:extLst>
               <a:ext uri="{FF2B5EF4-FFF2-40B4-BE49-F238E27FC236}">
-                <a16:creationId xmlns:a16="http://schemas.microsoft.com/office/drawing/2014/main" id="{91D385B1-3DE8-9E8A-3E89-F4FC39CE1F93}"/>
+                <a16:creationId xmlns:a16="http://schemas.microsoft.com/office/drawing/2014/main" id="{7E158610-EAEB-45B5-58B8-E63CBFCCC40C}"/>
               </a:ext>
             </a:extLst>
           </p:cNvPr>
@@ -36586,7 +36255,7 @@
           <p:nvPr/>
         </p:nvPicPr>
         <p:blipFill>
-          <a:blip r:embed="rId3">
+          <a:blip r:embed="rId2">
             <a:extLst>
               <a:ext uri="{28A0092B-C50C-407E-A947-70E740481C1C}">
                 <a14:useLocalDpi xmlns:a14="http://schemas.microsoft.com/office/drawing/2010/main" val="0"/>
@@ -36600,8 +36269,8 @@
         </p:blipFill>
         <p:spPr bwMode="auto">
           <a:xfrm>
-            <a:off x="10059668" y="5661520"/>
-            <a:ext cx="1923011" cy="952959"/>
+            <a:off x="4125156" y="1734397"/>
+            <a:ext cx="3941687" cy="4403603"/>
           </a:xfrm>
           <a:prstGeom prst="rect">
             <a:avLst/>
@@ -36621,7 +36290,7 @@
     </p:spTree>
     <p:extLst>
       <p:ext uri="{BB962C8B-B14F-4D97-AF65-F5344CB8AC3E}">
-        <p14:creationId xmlns:p14="http://schemas.microsoft.com/office/powerpoint/2010/main" val="2468397319"/>
+        <p14:creationId xmlns:p14="http://schemas.microsoft.com/office/powerpoint/2010/main" val="3263293339"/>
       </p:ext>
     </p:extLst>
   </p:cSld>
@@ -36678,62 +36347,88 @@
           <a:p>
             <a:r>
               <a:rPr lang="en-US" dirty="0"/>
-              <a:t>Tip 10: Don’t trust Stack Overflow blindly</a:t>
+              <a:t>In conclusion…</a:t>
             </a:r>
           </a:p>
         </p:txBody>
       </p:sp>
-      <p:pic>
-        <p:nvPicPr>
-          <p:cNvPr id="1026" name="Picture 2" descr="25 More StackOverflow Programming Memes That All Devs Can Relate To | by  Sheetal | JavaScript in Plain English">
+      <p:sp>
+        <p:nvSpPr>
+          <p:cNvPr id="2" name="Text Placeholder 2">
             <a:extLst>
               <a:ext uri="{FF2B5EF4-FFF2-40B4-BE49-F238E27FC236}">
-                <a16:creationId xmlns:a16="http://schemas.microsoft.com/office/drawing/2014/main" id="{7E158610-EAEB-45B5-58B8-E63CBFCCC40C}"/>
+                <a16:creationId xmlns:a16="http://schemas.microsoft.com/office/drawing/2014/main" id="{E76B2B10-35AE-700A-1739-C269C75E032B}"/>
               </a:ext>
             </a:extLst>
           </p:cNvPr>
-          <p:cNvPicPr>
-            <a:picLocks noChangeAspect="1" noChangeArrowheads="1"/>
-          </p:cNvPicPr>
-          <p:nvPr/>
-        </p:nvPicPr>
-        <p:blipFill>
-          <a:blip r:embed="rId2">
-            <a:extLst>
-              <a:ext uri="{28A0092B-C50C-407E-A947-70E740481C1C}">
-                <a14:useLocalDpi xmlns:a14="http://schemas.microsoft.com/office/drawing/2010/main" val="0"/>
-              </a:ext>
-            </a:extLst>
-          </a:blip>
-          <a:srcRect/>
-          <a:stretch>
-            <a:fillRect/>
-          </a:stretch>
-        </p:blipFill>
-        <p:spPr bwMode="auto">
+          <p:cNvSpPr>
+            <a:spLocks noGrp="1"/>
+          </p:cNvSpPr>
+          <p:nvPr>
+            <p:ph type="body" sz="quarter" idx="10"/>
+          </p:nvPr>
+        </p:nvSpPr>
+        <p:spPr>
           <a:xfrm>
-            <a:off x="4125156" y="1734397"/>
-            <a:ext cx="3941687" cy="4403603"/>
+            <a:off x="753036" y="1734397"/>
+            <a:ext cx="11037346" cy="4494281"/>
           </a:xfrm>
-          <a:prstGeom prst="rect">
-            <a:avLst/>
-          </a:prstGeom>
-          <a:noFill/>
-          <a:extLst>
-            <a:ext uri="{909E8E84-426E-40DD-AFC4-6F175D3DCCD1}">
-              <a14:hiddenFill xmlns:a14="http://schemas.microsoft.com/office/drawing/2010/main">
-                <a:solidFill>
-                  <a:srgbClr val="FFFFFF"/>
-                </a:solidFill>
-              </a14:hiddenFill>
-            </a:ext>
-          </a:extLst>
         </p:spPr>
-      </p:pic>
+        <p:txBody>
+          <a:bodyPr>
+            <a:normAutofit/>
+          </a:bodyPr>
+          <a:lstStyle/>
+          <a:p>
+            <a:pPr>
+              <a:spcAft>
+                <a:spcPts val="600"/>
+              </a:spcAft>
+            </a:pPr>
+            <a:r>
+              <a:rPr lang="en-US" sz="2800" dirty="0"/>
+              <a:t>All my advice is a nuanced story…</a:t>
+            </a:r>
+          </a:p>
+          <a:p>
+            <a:pPr>
+              <a:spcAft>
+                <a:spcPts val="600"/>
+              </a:spcAft>
+            </a:pPr>
+            <a:r>
+              <a:rPr lang="en-US" sz="2800" dirty="0"/>
+              <a:t>Important to realize that using JPA comes with a performance impact.</a:t>
+            </a:r>
+          </a:p>
+          <a:p>
+            <a:pPr>
+              <a:spcAft>
+                <a:spcPts val="600"/>
+              </a:spcAft>
+            </a:pPr>
+            <a:r>
+              <a:rPr lang="en-US" sz="2800" dirty="0"/>
+              <a:t>Don’t be afraid to utilize JPA!</a:t>
+            </a:r>
+          </a:p>
+          <a:p>
+            <a:pPr>
+              <a:spcAft>
+                <a:spcPts val="600"/>
+              </a:spcAft>
+            </a:pPr>
+            <a:r>
+              <a:rPr lang="en-US" sz="2800" dirty="0"/>
+              <a:t>Awareness is the most important: know what JPA does for you behind the scenes.</a:t>
+            </a:r>
+          </a:p>
+        </p:txBody>
+      </p:sp>
     </p:spTree>
     <p:extLst>
       <p:ext uri="{BB962C8B-B14F-4D97-AF65-F5344CB8AC3E}">
-        <p14:creationId xmlns:p14="http://schemas.microsoft.com/office/powerpoint/2010/main" val="3263293339"/>
+        <p14:creationId xmlns:p14="http://schemas.microsoft.com/office/powerpoint/2010/main" val="658915625"/>
       </p:ext>
     </p:extLst>
   </p:cSld>
@@ -36744,6 +36439,75 @@
 </file>
 
 <file path=ppt/slides/slide57.xml><?xml version="1.0" encoding="utf-8"?>
+<p:sld xmlns:a="http://schemas.openxmlformats.org/drawingml/2006/main" xmlns:r="http://schemas.openxmlformats.org/officeDocument/2006/relationships" xmlns:p="http://schemas.openxmlformats.org/presentationml/2006/main">
+  <p:cSld>
+    <p:spTree>
+      <p:nvGrpSpPr>
+        <p:cNvPr id="1" name=""/>
+        <p:cNvGrpSpPr/>
+        <p:nvPr/>
+      </p:nvGrpSpPr>
+      <p:grpSpPr>
+        <a:xfrm>
+          <a:off x="0" y="0"/>
+          <a:ext cx="0" cy="0"/>
+          <a:chOff x="0" y="0"/>
+          <a:chExt cx="0" cy="0"/>
+        </a:xfrm>
+      </p:grpSpPr>
+      <p:sp>
+        <p:nvSpPr>
+          <p:cNvPr id="10" name="Title 2">
+            <a:extLst>
+              <a:ext uri="{FF2B5EF4-FFF2-40B4-BE49-F238E27FC236}">
+                <a16:creationId xmlns:a16="http://schemas.microsoft.com/office/drawing/2014/main" id="{49AB3702-1810-764C-3BE9-C338CDB6A62F}"/>
+              </a:ext>
+            </a:extLst>
+          </p:cNvPr>
+          <p:cNvSpPr>
+            <a:spLocks noGrp="1"/>
+          </p:cNvSpPr>
+          <p:nvPr>
+            <p:ph type="title"/>
+          </p:nvPr>
+        </p:nvSpPr>
+        <p:spPr>
+          <a:xfrm>
+            <a:off x="792000" y="1324801"/>
+            <a:ext cx="10165560" cy="2358200"/>
+          </a:xfrm>
+        </p:spPr>
+        <p:txBody>
+          <a:bodyPr anchor="t">
+            <a:normAutofit/>
+          </a:bodyPr>
+          <a:lstStyle/>
+          <a:p>
+            <a:r>
+              <a:rPr lang="en-US" dirty="0"/>
+              <a:t>Further resources</a:t>
+            </a:r>
+            <a:endParaRPr lang="en-US" dirty="0">
+              <a:latin typeface="Courier New" panose="02070309020205020404" pitchFamily="49" charset="0"/>
+              <a:cs typeface="Courier New" panose="02070309020205020404" pitchFamily="49" charset="0"/>
+            </a:endParaRPr>
+          </a:p>
+        </p:txBody>
+      </p:sp>
+    </p:spTree>
+    <p:extLst>
+      <p:ext uri="{BB962C8B-B14F-4D97-AF65-F5344CB8AC3E}">
+        <p14:creationId xmlns:p14="http://schemas.microsoft.com/office/powerpoint/2010/main" val="540281930"/>
+      </p:ext>
+    </p:extLst>
+  </p:cSld>
+  <p:clrMapOvr>
+    <a:masterClrMapping/>
+  </p:clrMapOvr>
+</p:sld>
+</file>
+
+<file path=ppt/slides/slide58.xml><?xml version="1.0" encoding="utf-8"?>
 <p:sld xmlns:a="http://schemas.openxmlformats.org/drawingml/2006/main" xmlns:r="http://schemas.openxmlformats.org/officeDocument/2006/relationships" xmlns:p="http://schemas.openxmlformats.org/presentationml/2006/main">
   <p:cSld>
     <p:spTree>
@@ -36790,7 +36554,7 @@
           <a:p>
             <a:r>
               <a:rPr lang="en-US" dirty="0"/>
-              <a:t>In conclusion…</a:t>
+              <a:t>Slides and demos</a:t>
             </a:r>
           </a:p>
         </p:txBody>
@@ -36830,7 +36594,7 @@
             </a:pPr>
             <a:r>
               <a:rPr lang="en-US" sz="2800" dirty="0"/>
-              <a:t>All my advice is a nuanced story…</a:t>
+              <a:t>Slides and demos are available on GitHub.</a:t>
             </a:r>
           </a:p>
           <a:p>
@@ -36840,107 +36604,19 @@
               </a:spcAft>
             </a:pPr>
             <a:r>
-              <a:rPr lang="en-US" sz="2800" dirty="0"/>
-              <a:t>Important to realize that using JPA comes with a performance impact.</a:t>
-            </a:r>
-          </a:p>
-          <a:p>
-            <a:pPr>
-              <a:spcAft>
-                <a:spcPts val="600"/>
-              </a:spcAft>
-            </a:pPr>
-            <a:r>
-              <a:rPr lang="en-US" sz="2800" dirty="0"/>
-              <a:t>Don’t be afraid to utilize JPA!</a:t>
-            </a:r>
-          </a:p>
-          <a:p>
-            <a:pPr>
-              <a:spcAft>
-                <a:spcPts val="600"/>
-              </a:spcAft>
-            </a:pPr>
-            <a:r>
-              <a:rPr lang="en-US" sz="2800" dirty="0"/>
-              <a:t>Awareness is the most important: know what JPA does for you behind the scenes.</a:t>
-            </a:r>
+              <a:rPr lang="en-US" sz="2800" dirty="0">
+                <a:hlinkClick r:id="rId2"/>
+              </a:rPr>
+              <a:t>https://github.com/raoulvdberge/jpa-with-hibernate</a:t>
+            </a:r>
+            <a:endParaRPr lang="en-US" sz="2800" dirty="0"/>
           </a:p>
         </p:txBody>
       </p:sp>
     </p:spTree>
     <p:extLst>
       <p:ext uri="{BB962C8B-B14F-4D97-AF65-F5344CB8AC3E}">
-        <p14:creationId xmlns:p14="http://schemas.microsoft.com/office/powerpoint/2010/main" val="658915625"/>
-      </p:ext>
-    </p:extLst>
-  </p:cSld>
-  <p:clrMapOvr>
-    <a:masterClrMapping/>
-  </p:clrMapOvr>
-</p:sld>
-</file>
-
-<file path=ppt/slides/slide58.xml><?xml version="1.0" encoding="utf-8"?>
-<p:sld xmlns:a="http://schemas.openxmlformats.org/drawingml/2006/main" xmlns:r="http://schemas.openxmlformats.org/officeDocument/2006/relationships" xmlns:p="http://schemas.openxmlformats.org/presentationml/2006/main">
-  <p:cSld>
-    <p:spTree>
-      <p:nvGrpSpPr>
-        <p:cNvPr id="1" name=""/>
-        <p:cNvGrpSpPr/>
-        <p:nvPr/>
-      </p:nvGrpSpPr>
-      <p:grpSpPr>
-        <a:xfrm>
-          <a:off x="0" y="0"/>
-          <a:ext cx="0" cy="0"/>
-          <a:chOff x="0" y="0"/>
-          <a:chExt cx="0" cy="0"/>
-        </a:xfrm>
-      </p:grpSpPr>
-      <p:sp>
-        <p:nvSpPr>
-          <p:cNvPr id="10" name="Title 2">
-            <a:extLst>
-              <a:ext uri="{FF2B5EF4-FFF2-40B4-BE49-F238E27FC236}">
-                <a16:creationId xmlns:a16="http://schemas.microsoft.com/office/drawing/2014/main" id="{49AB3702-1810-764C-3BE9-C338CDB6A62F}"/>
-              </a:ext>
-            </a:extLst>
-          </p:cNvPr>
-          <p:cNvSpPr>
-            <a:spLocks noGrp="1"/>
-          </p:cNvSpPr>
-          <p:nvPr>
-            <p:ph type="title"/>
-          </p:nvPr>
-        </p:nvSpPr>
-        <p:spPr>
-          <a:xfrm>
-            <a:off x="792000" y="1324801"/>
-            <a:ext cx="10165560" cy="2358200"/>
-          </a:xfrm>
-        </p:spPr>
-        <p:txBody>
-          <a:bodyPr anchor="t">
-            <a:normAutofit/>
-          </a:bodyPr>
-          <a:lstStyle/>
-          <a:p>
-            <a:r>
-              <a:rPr lang="en-US" dirty="0"/>
-              <a:t>Further resources</a:t>
-            </a:r>
-            <a:endParaRPr lang="en-US" dirty="0">
-              <a:latin typeface="Courier New" panose="02070309020205020404" pitchFamily="49" charset="0"/>
-              <a:cs typeface="Courier New" panose="02070309020205020404" pitchFamily="49" charset="0"/>
-            </a:endParaRPr>
-          </a:p>
-        </p:txBody>
-      </p:sp>
-    </p:spTree>
-    <p:extLst>
-      <p:ext uri="{BB962C8B-B14F-4D97-AF65-F5344CB8AC3E}">
-        <p14:creationId xmlns:p14="http://schemas.microsoft.com/office/powerpoint/2010/main" val="540281930"/>
+        <p14:creationId xmlns:p14="http://schemas.microsoft.com/office/powerpoint/2010/main" val="4123513284"/>
       </p:ext>
     </p:extLst>
   </p:cSld>
@@ -36969,10 +36645,10 @@
       </p:grpSpPr>
       <p:sp>
         <p:nvSpPr>
-          <p:cNvPr id="11" name="Title 1">
+          <p:cNvPr id="8" name="Title 1">
             <a:extLst>
               <a:ext uri="{FF2B5EF4-FFF2-40B4-BE49-F238E27FC236}">
-                <a16:creationId xmlns:a16="http://schemas.microsoft.com/office/drawing/2014/main" id="{51612DA1-DB43-7E72-A4EA-4B95C807605F}"/>
+                <a16:creationId xmlns:a16="http://schemas.microsoft.com/office/drawing/2014/main" id="{280C1126-AE06-6F45-5C34-548D61239155}"/>
               </a:ext>
             </a:extLst>
           </p:cNvPr>
@@ -36983,31 +36659,24 @@
             <p:ph type="title"/>
           </p:nvPr>
         </p:nvSpPr>
-        <p:spPr>
-          <a:xfrm>
-            <a:off x="1296000" y="720000"/>
-            <a:ext cx="9864000" cy="681480"/>
-          </a:xfrm>
-        </p:spPr>
+        <p:spPr/>
         <p:txBody>
-          <a:bodyPr anchor="t">
-            <a:normAutofit/>
-          </a:bodyPr>
+          <a:bodyPr/>
           <a:lstStyle/>
           <a:p>
             <a:r>
               <a:rPr lang="en-US" dirty="0"/>
-              <a:t>Slides and demos</a:t>
+              <a:t>Further resources</a:t>
             </a:r>
           </a:p>
         </p:txBody>
       </p:sp>
       <p:sp>
         <p:nvSpPr>
-          <p:cNvPr id="2" name="Text Placeholder 2">
+          <p:cNvPr id="10" name="Text Placeholder 2">
             <a:extLst>
               <a:ext uri="{FF2B5EF4-FFF2-40B4-BE49-F238E27FC236}">
-                <a16:creationId xmlns:a16="http://schemas.microsoft.com/office/drawing/2014/main" id="{E76B2B10-35AE-700A-1739-C269C75E032B}"/>
+                <a16:creationId xmlns:a16="http://schemas.microsoft.com/office/drawing/2014/main" id="{7A69C3A1-EA48-682D-2DD6-89FB1C344D1E}"/>
               </a:ext>
             </a:extLst>
           </p:cNvPr>
@@ -37020,46 +36689,129 @@
         </p:nvSpPr>
         <p:spPr>
           <a:xfrm>
-            <a:off x="753036" y="1734397"/>
-            <a:ext cx="11037346" cy="4494281"/>
+            <a:off x="1296000" y="1612154"/>
+            <a:ext cx="9864000" cy="4541108"/>
           </a:xfrm>
         </p:spPr>
         <p:txBody>
           <a:bodyPr>
-            <a:normAutofit/>
+            <a:normAutofit fontScale="92500" lnSpcReduction="10000"/>
           </a:bodyPr>
           <a:lstStyle/>
           <a:p>
-            <a:pPr>
-              <a:spcAft>
-                <a:spcPts val="600"/>
-              </a:spcAft>
-            </a:pPr>
-            <a:r>
-              <a:rPr lang="en-US" sz="2800" dirty="0"/>
-              <a:t>Slides and demos are available on GitHub.</a:t>
-            </a:r>
-          </a:p>
-          <a:p>
-            <a:pPr>
-              <a:spcAft>
-                <a:spcPts val="600"/>
-              </a:spcAft>
-            </a:pPr>
-            <a:r>
-              <a:rPr lang="en-US" sz="2800" dirty="0">
+            <a:r>
+              <a:rPr lang="en-US" dirty="0"/>
+              <a:t>Vlad </a:t>
+            </a:r>
+            <a:r>
+              <a:rPr lang="en-US" dirty="0" err="1"/>
+              <a:t>Micalcea</a:t>
+            </a:r>
+            <a:r>
+              <a:rPr lang="en-US" dirty="0"/>
+              <a:t> (Hibernate contributor and expert)</a:t>
+            </a:r>
+          </a:p>
+          <a:p>
+            <a:pPr lvl="1"/>
+            <a:r>
+              <a:rPr lang="en-US" dirty="0">
                 <a:hlinkClick r:id="rId2"/>
               </a:rPr>
-              <a:t>https://github.com/raoulvdberge/jpa-with-hibernate</a:t>
-            </a:r>
-            <a:endParaRPr lang="en-US" sz="2800" dirty="0"/>
+              <a:t>https://vladmihalcea.com/</a:t>
+            </a:r>
+            <a:endParaRPr lang="en-US" dirty="0"/>
+          </a:p>
+          <a:p>
+            <a:pPr lvl="1"/>
+            <a:r>
+              <a:rPr lang="en-US" dirty="0">
+                <a:hlinkClick r:id="rId3"/>
+              </a:rPr>
+              <a:t>https://vladmihalcea.com/the-open-session-in-view-anti-pattern/</a:t>
+            </a:r>
+            <a:endParaRPr lang="en-US" dirty="0"/>
+          </a:p>
+          <a:p>
+            <a:pPr lvl="1"/>
+            <a:r>
+              <a:rPr lang="en-US" dirty="0">
+                <a:hlinkClick r:id="rId4"/>
+              </a:rPr>
+              <a:t>https://vladmihalcea.com/eager-fetching-is-a-code-smell/</a:t>
+            </a:r>
+            <a:endParaRPr lang="en-US" dirty="0"/>
+          </a:p>
+          <a:p>
+            <a:r>
+              <a:rPr lang="en-US" dirty="0"/>
+              <a:t>Hibernate User Guide</a:t>
+            </a:r>
+          </a:p>
+          <a:p>
+            <a:pPr lvl="1"/>
+            <a:r>
+              <a:rPr lang="en-US" dirty="0">
+                <a:hlinkClick r:id="rId5"/>
+              </a:rPr>
+              <a:t>https://docs.jboss.org/hibernate/orm/current/userguide/html_single/Hibernate_User_Guide.html</a:t>
+            </a:r>
+            <a:endParaRPr lang="en-US" dirty="0"/>
+          </a:p>
+          <a:p>
+            <a:r>
+              <a:rPr lang="en-US" dirty="0"/>
+              <a:t>JPA specification</a:t>
+            </a:r>
+          </a:p>
+          <a:p>
+            <a:pPr lvl="1"/>
+            <a:r>
+              <a:rPr lang="en-US" dirty="0">
+                <a:hlinkClick r:id="rId6"/>
+              </a:rPr>
+              <a:t>https://jakarta.ee/specifications/persistence/3.0/jakarta-persistence-spec-3.0.html</a:t>
+            </a:r>
+            <a:endParaRPr lang="en-US" dirty="0"/>
+          </a:p>
+          <a:p>
+            <a:r>
+              <a:rPr lang="en-US" dirty="0"/>
+              <a:t>How does Spring Transactional work?</a:t>
+            </a:r>
+          </a:p>
+          <a:p>
+            <a:pPr lvl="1"/>
+            <a:r>
+              <a:rPr lang="en-US" dirty="0">
+                <a:hlinkClick r:id="rId7"/>
+              </a:rPr>
+              <a:t>https://dzone.com/articles/how-does-spring-transactional</a:t>
+            </a:r>
+            <a:endParaRPr lang="en-US" dirty="0"/>
+          </a:p>
+          <a:p>
+            <a:r>
+              <a:rPr lang="en-US" dirty="0"/>
+              <a:t>JPA Join Types</a:t>
+            </a:r>
+          </a:p>
+          <a:p>
+            <a:pPr lvl="1"/>
+            <a:r>
+              <a:rPr lang="en-US" dirty="0">
+                <a:hlinkClick r:id="rId8"/>
+              </a:rPr>
+              <a:t>https://www.baeldung.com/jpa-join-types</a:t>
+            </a:r>
+            <a:endParaRPr lang="en-US" dirty="0"/>
           </a:p>
         </p:txBody>
       </p:sp>
     </p:spTree>
     <p:extLst>
       <p:ext uri="{BB962C8B-B14F-4D97-AF65-F5344CB8AC3E}">
-        <p14:creationId xmlns:p14="http://schemas.microsoft.com/office/powerpoint/2010/main" val="4123513284"/>
+        <p14:creationId xmlns:p14="http://schemas.microsoft.com/office/powerpoint/2010/main" val="2889387521"/>
       </p:ext>
     </p:extLst>
   </p:cSld>
@@ -37162,201 +36914,6 @@
     <p:extLst>
       <p:ext uri="{BB962C8B-B14F-4D97-AF65-F5344CB8AC3E}">
         <p14:creationId xmlns:p14="http://schemas.microsoft.com/office/powerpoint/2010/main" val="492372422"/>
-      </p:ext>
-    </p:extLst>
-  </p:cSld>
-  <p:clrMapOvr>
-    <a:masterClrMapping/>
-  </p:clrMapOvr>
-</p:sld>
-</file>
-
-<file path=ppt/slides/slide60.xml><?xml version="1.0" encoding="utf-8"?>
-<p:sld xmlns:a="http://schemas.openxmlformats.org/drawingml/2006/main" xmlns:r="http://schemas.openxmlformats.org/officeDocument/2006/relationships" xmlns:p="http://schemas.openxmlformats.org/presentationml/2006/main">
-  <p:cSld>
-    <p:spTree>
-      <p:nvGrpSpPr>
-        <p:cNvPr id="1" name=""/>
-        <p:cNvGrpSpPr/>
-        <p:nvPr/>
-      </p:nvGrpSpPr>
-      <p:grpSpPr>
-        <a:xfrm>
-          <a:off x="0" y="0"/>
-          <a:ext cx="0" cy="0"/>
-          <a:chOff x="0" y="0"/>
-          <a:chExt cx="0" cy="0"/>
-        </a:xfrm>
-      </p:grpSpPr>
-      <p:sp>
-        <p:nvSpPr>
-          <p:cNvPr id="8" name="Title 1">
-            <a:extLst>
-              <a:ext uri="{FF2B5EF4-FFF2-40B4-BE49-F238E27FC236}">
-                <a16:creationId xmlns:a16="http://schemas.microsoft.com/office/drawing/2014/main" id="{280C1126-AE06-6F45-5C34-548D61239155}"/>
-              </a:ext>
-            </a:extLst>
-          </p:cNvPr>
-          <p:cNvSpPr>
-            <a:spLocks noGrp="1"/>
-          </p:cNvSpPr>
-          <p:nvPr>
-            <p:ph type="title"/>
-          </p:nvPr>
-        </p:nvSpPr>
-        <p:spPr/>
-        <p:txBody>
-          <a:bodyPr/>
-          <a:lstStyle/>
-          <a:p>
-            <a:r>
-              <a:rPr lang="en-US" dirty="0"/>
-              <a:t>Further resources</a:t>
-            </a:r>
-          </a:p>
-        </p:txBody>
-      </p:sp>
-      <p:sp>
-        <p:nvSpPr>
-          <p:cNvPr id="10" name="Text Placeholder 2">
-            <a:extLst>
-              <a:ext uri="{FF2B5EF4-FFF2-40B4-BE49-F238E27FC236}">
-                <a16:creationId xmlns:a16="http://schemas.microsoft.com/office/drawing/2014/main" id="{7A69C3A1-EA48-682D-2DD6-89FB1C344D1E}"/>
-              </a:ext>
-            </a:extLst>
-          </p:cNvPr>
-          <p:cNvSpPr>
-            <a:spLocks noGrp="1"/>
-          </p:cNvSpPr>
-          <p:nvPr>
-            <p:ph type="body" sz="quarter" idx="10"/>
-          </p:nvPr>
-        </p:nvSpPr>
-        <p:spPr>
-          <a:xfrm>
-            <a:off x="1296000" y="1612154"/>
-            <a:ext cx="9864000" cy="4541108"/>
-          </a:xfrm>
-        </p:spPr>
-        <p:txBody>
-          <a:bodyPr>
-            <a:normAutofit fontScale="92500" lnSpcReduction="10000"/>
-          </a:bodyPr>
-          <a:lstStyle/>
-          <a:p>
-            <a:r>
-              <a:rPr lang="en-US" dirty="0"/>
-              <a:t>Vlad </a:t>
-            </a:r>
-            <a:r>
-              <a:rPr lang="en-US" dirty="0" err="1"/>
-              <a:t>Micalcea</a:t>
-            </a:r>
-            <a:r>
-              <a:rPr lang="en-US" dirty="0"/>
-              <a:t> (Hibernate contributor and expert)</a:t>
-            </a:r>
-          </a:p>
-          <a:p>
-            <a:pPr lvl="1"/>
-            <a:r>
-              <a:rPr lang="en-US" dirty="0">
-                <a:hlinkClick r:id="rId2"/>
-              </a:rPr>
-              <a:t>https://vladmihalcea.com/</a:t>
-            </a:r>
-            <a:endParaRPr lang="en-US" dirty="0"/>
-          </a:p>
-          <a:p>
-            <a:pPr lvl="1"/>
-            <a:r>
-              <a:rPr lang="en-US" dirty="0">
-                <a:hlinkClick r:id="rId3"/>
-              </a:rPr>
-              <a:t>https://vladmihalcea.com/the-open-session-in-view-anti-pattern/</a:t>
-            </a:r>
-            <a:endParaRPr lang="en-US" dirty="0"/>
-          </a:p>
-          <a:p>
-            <a:pPr lvl="1"/>
-            <a:r>
-              <a:rPr lang="en-US" dirty="0">
-                <a:hlinkClick r:id="rId4"/>
-              </a:rPr>
-              <a:t>https://vladmihalcea.com/eager-fetching-is-a-code-smell/</a:t>
-            </a:r>
-            <a:endParaRPr lang="en-US" dirty="0"/>
-          </a:p>
-          <a:p>
-            <a:r>
-              <a:rPr lang="en-US" dirty="0"/>
-              <a:t>Hibernate User Guide</a:t>
-            </a:r>
-          </a:p>
-          <a:p>
-            <a:pPr lvl="1"/>
-            <a:r>
-              <a:rPr lang="en-US" dirty="0">
-                <a:hlinkClick r:id="rId5"/>
-              </a:rPr>
-              <a:t>https://docs.jboss.org/hibernate/orm/current/userguide/html_single/Hibernate_User_Guide.html</a:t>
-            </a:r>
-            <a:endParaRPr lang="en-US" dirty="0"/>
-          </a:p>
-          <a:p>
-            <a:r>
-              <a:rPr lang="en-US" dirty="0"/>
-              <a:t>JPA specification</a:t>
-            </a:r>
-          </a:p>
-          <a:p>
-            <a:pPr lvl="1"/>
-            <a:r>
-              <a:rPr lang="en-US" dirty="0">
-                <a:hlinkClick r:id="rId6"/>
-              </a:rPr>
-              <a:t>https://jakarta.ee/specifications/persistence/3.0/jakarta-persistence-spec-3.0.html</a:t>
-            </a:r>
-            <a:endParaRPr lang="en-US" dirty="0"/>
-          </a:p>
-          <a:p>
-            <a:r>
-              <a:rPr lang="en-US" dirty="0"/>
-              <a:t>How does Spring Transactional work?</a:t>
-            </a:r>
-          </a:p>
-          <a:p>
-            <a:pPr lvl="1"/>
-            <a:r>
-              <a:rPr lang="en-US" dirty="0">
-                <a:hlinkClick r:id="rId7"/>
-              </a:rPr>
-              <a:t>https://dzone.com/articles/how-does-spring-transactional</a:t>
-            </a:r>
-            <a:endParaRPr lang="en-US" dirty="0"/>
-          </a:p>
-          <a:p>
-            <a:r>
-              <a:rPr lang="en-US" dirty="0"/>
-              <a:t>JPA Join Types</a:t>
-            </a:r>
-          </a:p>
-          <a:p>
-            <a:pPr lvl="1"/>
-            <a:r>
-              <a:rPr lang="en-US" dirty="0">
-                <a:hlinkClick r:id="rId8"/>
-              </a:rPr>
-              <a:t>https://www.baeldung.com/jpa-join-types</a:t>
-            </a:r>
-            <a:endParaRPr lang="en-US" dirty="0"/>
-          </a:p>
-        </p:txBody>
-      </p:sp>
-    </p:spTree>
-    <p:extLst>
-      <p:ext uri="{BB962C8B-B14F-4D97-AF65-F5344CB8AC3E}">
-        <p14:creationId xmlns:p14="http://schemas.microsoft.com/office/powerpoint/2010/main" val="2889387521"/>
       </p:ext>
     </p:extLst>
   </p:cSld>
@@ -39565,6 +39122,21 @@
 </file>
 
 <file path=customXml/item1.xml><?xml version="1.0" encoding="utf-8"?>
+<?mso-contentType ?>
+<FormTemplates xmlns="http://schemas.microsoft.com/sharepoint/v3/contenttype/forms">
+  <Display>DocumentLibraryForm</Display>
+  <Edit>DocumentLibraryForm</Edit>
+  <New>DocumentLibraryForm</New>
+</FormTemplates>
+</file>
+
+<file path=customXml/item2.xml><?xml version="1.0" encoding="utf-8"?>
+<p:properties xmlns:p="http://schemas.microsoft.com/office/2006/metadata/properties" xmlns:xsi="http://www.w3.org/2001/XMLSchema-instance" xmlns:pc="http://schemas.microsoft.com/office/infopath/2007/PartnerControls">
+  <documentManagement/>
+</p:properties>
+</file>
+
+<file path=customXml/item3.xml><?xml version="1.0" encoding="utf-8"?>
 <ct:contentTypeSchema xmlns:ct="http://schemas.microsoft.com/office/2006/metadata/contentType" xmlns:ma="http://schemas.microsoft.com/office/2006/metadata/properties/metaAttributes" ct:_="" ma:_="" ma:contentTypeName="Document" ma:contentTypeID="0x0101000858805C9A31ED4698AA5994F7540466" ma:contentTypeVersion="1" ma:contentTypeDescription="Een nieuw document maken." ma:contentTypeScope="" ma:versionID="5cab34e6f8d54d32c51f192539e9981c">
   <xsd:schema xmlns:xsd="http://www.w3.org/2001/XMLSchema" xmlns:xs="http://www.w3.org/2001/XMLSchema" xmlns:p="http://schemas.microsoft.com/office/2006/metadata/properties" xmlns:ns2="a73fd6a0-a740-4ca0-a47f-6beba88ccc77" targetNamespace="http://schemas.microsoft.com/office/2006/metadata/properties" ma:root="true" ma:fieldsID="10b3ae9c115bae24efdfd9076c93080b" ns2:_="">
     <xsd:import namespace="a73fd6a0-a740-4ca0-a47f-6beba88ccc77"/>
@@ -39704,22 +39276,31 @@
 </ct:contentTypeSchema>
 </file>
 
-<file path=customXml/item2.xml><?xml version="1.0" encoding="utf-8"?>
-<?mso-contentType ?>
-<FormTemplates xmlns="http://schemas.microsoft.com/sharepoint/v3/contenttype/forms">
-  <Display>DocumentLibraryForm</Display>
-  <Edit>DocumentLibraryForm</Edit>
-  <New>DocumentLibraryForm</New>
-</FormTemplates>
+<file path=customXml/itemProps1.xml><?xml version="1.0" encoding="utf-8"?>
+<ds:datastoreItem xmlns:ds="http://schemas.openxmlformats.org/officeDocument/2006/customXml" ds:itemID="{4522A51C-073F-4C45-9170-ECE5951F4DEA}">
+  <ds:schemaRefs>
+    <ds:schemaRef ds:uri="http://schemas.microsoft.com/sharepoint/v3/contenttype/forms"/>
+  </ds:schemaRefs>
+</ds:datastoreItem>
 </file>
 
-<file path=customXml/item3.xml><?xml version="1.0" encoding="utf-8"?>
-<p:properties xmlns:p="http://schemas.microsoft.com/office/2006/metadata/properties" xmlns:xsi="http://www.w3.org/2001/XMLSchema-instance" xmlns:pc="http://schemas.microsoft.com/office/infopath/2007/PartnerControls">
-  <documentManagement/>
-</p:properties>
+<file path=customXml/itemProps2.xml><?xml version="1.0" encoding="utf-8"?>
+<ds:datastoreItem xmlns:ds="http://schemas.openxmlformats.org/officeDocument/2006/customXml" ds:itemID="{F8AE8C2F-0717-4D42-B44A-CAECCF122A1A}">
+  <ds:schemaRefs>
+    <ds:schemaRef ds:uri="http://www.w3.org/XML/1998/namespace"/>
+    <ds:schemaRef ds:uri="http://purl.org/dc/dcmitype/"/>
+    <ds:schemaRef ds:uri="http://purl.org/dc/terms/"/>
+    <ds:schemaRef ds:uri="http://schemas.microsoft.com/office/2006/metadata/properties"/>
+    <ds:schemaRef ds:uri="http://schemas.microsoft.com/office/infopath/2007/PartnerControls"/>
+    <ds:schemaRef ds:uri="http://purl.org/dc/elements/1.1/"/>
+    <ds:schemaRef ds:uri="http://schemas.microsoft.com/office/2006/documentManagement/types"/>
+    <ds:schemaRef ds:uri="http://schemas.openxmlformats.org/package/2006/metadata/core-properties"/>
+    <ds:schemaRef ds:uri="a73fd6a0-a740-4ca0-a47f-6beba88ccc77"/>
+  </ds:schemaRefs>
+</ds:datastoreItem>
 </file>
 
-<file path=customXml/itemProps1.xml><?xml version="1.0" encoding="utf-8"?>
+<file path=customXml/itemProps3.xml><?xml version="1.0" encoding="utf-8"?>
 <ds:datastoreItem xmlns:ds="http://schemas.openxmlformats.org/officeDocument/2006/customXml" ds:itemID="{9AC0CDE9-3E35-44FD-A63A-9795CF527D47}">
   <ds:schemaRefs>
     <ds:schemaRef ds:uri="http://schemas.microsoft.com/office/2006/metadata/contentType"/>
@@ -39735,28 +39316,4 @@
     <ds:schemaRef ds:uri="http://schemas.microsoft.com/internal/obd"/>
   </ds:schemaRefs>
 </ds:datastoreItem>
-</file>
-
-<file path=customXml/itemProps2.xml><?xml version="1.0" encoding="utf-8"?>
-<ds:datastoreItem xmlns:ds="http://schemas.openxmlformats.org/officeDocument/2006/customXml" ds:itemID="{4522A51C-073F-4C45-9170-ECE5951F4DEA}">
-  <ds:schemaRefs>
-    <ds:schemaRef ds:uri="http://schemas.microsoft.com/sharepoint/v3/contenttype/forms"/>
-  </ds:schemaRefs>
-</ds:datastoreItem>
-</file>
-
-<file path=customXml/itemProps3.xml><?xml version="1.0" encoding="utf-8"?>
-<ds:datastoreItem xmlns:ds="http://schemas.openxmlformats.org/officeDocument/2006/customXml" ds:itemID="{F8AE8C2F-0717-4D42-B44A-CAECCF122A1A}">
-  <ds:schemaRefs>
-    <ds:schemaRef ds:uri="http://www.w3.org/XML/1998/namespace"/>
-    <ds:schemaRef ds:uri="http://purl.org/dc/dcmitype/"/>
-    <ds:schemaRef ds:uri="http://purl.org/dc/terms/"/>
-    <ds:schemaRef ds:uri="http://schemas.microsoft.com/office/2006/metadata/properties"/>
-    <ds:schemaRef ds:uri="http://schemas.microsoft.com/office/infopath/2007/PartnerControls"/>
-    <ds:schemaRef ds:uri="http://purl.org/dc/elements/1.1/"/>
-    <ds:schemaRef ds:uri="http://schemas.microsoft.com/office/2006/documentManagement/types"/>
-    <ds:schemaRef ds:uri="http://schemas.openxmlformats.org/package/2006/metadata/core-properties"/>
-    <ds:schemaRef ds:uri="a73fd6a0-a740-4ca0-a47f-6beba88ccc77"/>
-  </ds:schemaRefs>
-</ds:datastoreItem>
 </file>
</xml_diff>

<commit_message>
Use getReferenceById as getById is deprecated.
</commit_message>
<xml_diff>
--- a/slides.pptx
+++ b/slides.pptx
@@ -26947,6 +26947,17 @@
             </a:pPr>
             <a:r>
               <a:rPr lang="en-US" dirty="0"/>
+              <a:t>Maven, Spring 3, Hibernate 6</a:t>
+            </a:r>
+          </a:p>
+          <a:p>
+            <a:pPr>
+              <a:spcAft>
+                <a:spcPts val="600"/>
+              </a:spcAft>
+            </a:pPr>
+            <a:r>
+              <a:rPr lang="en-US" dirty="0"/>
               <a:t>Primarily using tests</a:t>
             </a:r>
           </a:p>
@@ -35994,7 +36005,7 @@
                 <a:latin typeface="Courier New" panose="02070309020205020404" pitchFamily="49" charset="0"/>
                 <a:cs typeface="Courier New" panose="02070309020205020404" pitchFamily="49" charset="0"/>
               </a:rPr>
-              <a:t>getById</a:t>
+              <a:t>getReferenceById</a:t>
             </a:r>
             <a:r>
               <a:rPr lang="en-US" dirty="0"/>
@@ -36056,7 +36067,7 @@
                 <a:latin typeface="Courier New" panose="02070309020205020404" pitchFamily="49" charset="0"/>
                 <a:cs typeface="Courier New" panose="02070309020205020404" pitchFamily="49" charset="0"/>
               </a:rPr>
-              <a:t>getById</a:t>
+              <a:t>getReferenceById</a:t>
             </a:r>
             <a:r>
               <a:rPr lang="en-US" dirty="0"/>
@@ -39122,21 +39133,12 @@
 </file>
 
 <file path=customXml/item1.xml><?xml version="1.0" encoding="utf-8"?>
-<?mso-contentType ?>
-<FormTemplates xmlns="http://schemas.microsoft.com/sharepoint/v3/contenttype/forms">
-  <Display>DocumentLibraryForm</Display>
-  <Edit>DocumentLibraryForm</Edit>
-  <New>DocumentLibraryForm</New>
-</FormTemplates>
-</file>
-
-<file path=customXml/item2.xml><?xml version="1.0" encoding="utf-8"?>
 <p:properties xmlns:p="http://schemas.microsoft.com/office/2006/metadata/properties" xmlns:xsi="http://www.w3.org/2001/XMLSchema-instance" xmlns:pc="http://schemas.microsoft.com/office/infopath/2007/PartnerControls">
   <documentManagement/>
 </p:properties>
 </file>
 
-<file path=customXml/item3.xml><?xml version="1.0" encoding="utf-8"?>
+<file path=customXml/item2.xml><?xml version="1.0" encoding="utf-8"?>
 <ct:contentTypeSchema xmlns:ct="http://schemas.microsoft.com/office/2006/metadata/contentType" xmlns:ma="http://schemas.microsoft.com/office/2006/metadata/properties/metaAttributes" ct:_="" ma:_="" ma:contentTypeName="Document" ma:contentTypeID="0x0101000858805C9A31ED4698AA5994F7540466" ma:contentTypeVersion="1" ma:contentTypeDescription="Een nieuw document maken." ma:contentTypeScope="" ma:versionID="5cab34e6f8d54d32c51f192539e9981c">
   <xsd:schema xmlns:xsd="http://www.w3.org/2001/XMLSchema" xmlns:xs="http://www.w3.org/2001/XMLSchema" xmlns:p="http://schemas.microsoft.com/office/2006/metadata/properties" xmlns:ns2="a73fd6a0-a740-4ca0-a47f-6beba88ccc77" targetNamespace="http://schemas.microsoft.com/office/2006/metadata/properties" ma:root="true" ma:fieldsID="10b3ae9c115bae24efdfd9076c93080b" ns2:_="">
     <xsd:import namespace="a73fd6a0-a740-4ca0-a47f-6beba88ccc77"/>
@@ -39276,31 +39278,32 @@
 </ct:contentTypeSchema>
 </file>
 
+<file path=customXml/item3.xml><?xml version="1.0" encoding="utf-8"?>
+<?mso-contentType ?>
+<FormTemplates xmlns="http://schemas.microsoft.com/sharepoint/v3/contenttype/forms">
+  <Display>DocumentLibraryForm</Display>
+  <Edit>DocumentLibraryForm</Edit>
+  <New>DocumentLibraryForm</New>
+</FormTemplates>
+</file>
+
 <file path=customXml/itemProps1.xml><?xml version="1.0" encoding="utf-8"?>
-<ds:datastoreItem xmlns:ds="http://schemas.openxmlformats.org/officeDocument/2006/customXml" ds:itemID="{4522A51C-073F-4C45-9170-ECE5951F4DEA}">
+<ds:datastoreItem xmlns:ds="http://schemas.openxmlformats.org/officeDocument/2006/customXml" ds:itemID="{F8AE8C2F-0717-4D42-B44A-CAECCF122A1A}">
   <ds:schemaRefs>
-    <ds:schemaRef ds:uri="http://schemas.microsoft.com/sharepoint/v3/contenttype/forms"/>
+    <ds:schemaRef ds:uri="http://schemas.microsoft.com/office/infopath/2007/PartnerControls"/>
+    <ds:schemaRef ds:uri="http://www.w3.org/XML/1998/namespace"/>
+    <ds:schemaRef ds:uri="http://purl.org/dc/terms/"/>
+    <ds:schemaRef ds:uri="http://purl.org/dc/elements/1.1/"/>
+    <ds:schemaRef ds:uri="http://purl.org/dc/dcmitype/"/>
+    <ds:schemaRef ds:uri="http://schemas.microsoft.com/office/2006/documentManagement/types"/>
+    <ds:schemaRef ds:uri="http://schemas.openxmlformats.org/package/2006/metadata/core-properties"/>
+    <ds:schemaRef ds:uri="a73fd6a0-a740-4ca0-a47f-6beba88ccc77"/>
+    <ds:schemaRef ds:uri="http://schemas.microsoft.com/office/2006/metadata/properties"/>
   </ds:schemaRefs>
 </ds:datastoreItem>
 </file>
 
 <file path=customXml/itemProps2.xml><?xml version="1.0" encoding="utf-8"?>
-<ds:datastoreItem xmlns:ds="http://schemas.openxmlformats.org/officeDocument/2006/customXml" ds:itemID="{F8AE8C2F-0717-4D42-B44A-CAECCF122A1A}">
-  <ds:schemaRefs>
-    <ds:schemaRef ds:uri="http://www.w3.org/XML/1998/namespace"/>
-    <ds:schemaRef ds:uri="http://purl.org/dc/dcmitype/"/>
-    <ds:schemaRef ds:uri="http://purl.org/dc/terms/"/>
-    <ds:schemaRef ds:uri="http://schemas.microsoft.com/office/2006/metadata/properties"/>
-    <ds:schemaRef ds:uri="http://schemas.microsoft.com/office/infopath/2007/PartnerControls"/>
-    <ds:schemaRef ds:uri="http://purl.org/dc/elements/1.1/"/>
-    <ds:schemaRef ds:uri="http://schemas.microsoft.com/office/2006/documentManagement/types"/>
-    <ds:schemaRef ds:uri="http://schemas.openxmlformats.org/package/2006/metadata/core-properties"/>
-    <ds:schemaRef ds:uri="a73fd6a0-a740-4ca0-a47f-6beba88ccc77"/>
-  </ds:schemaRefs>
-</ds:datastoreItem>
-</file>
-
-<file path=customXml/itemProps3.xml><?xml version="1.0" encoding="utf-8"?>
 <ds:datastoreItem xmlns:ds="http://schemas.openxmlformats.org/officeDocument/2006/customXml" ds:itemID="{9AC0CDE9-3E35-44FD-A63A-9795CF527D47}">
   <ds:schemaRefs>
     <ds:schemaRef ds:uri="http://schemas.microsoft.com/office/2006/metadata/contentType"/>
@@ -39316,4 +39319,12 @@
     <ds:schemaRef ds:uri="http://schemas.microsoft.com/internal/obd"/>
   </ds:schemaRefs>
 </ds:datastoreItem>
+</file>
+
+<file path=customXml/itemProps3.xml><?xml version="1.0" encoding="utf-8"?>
+<ds:datastoreItem xmlns:ds="http://schemas.openxmlformats.org/officeDocument/2006/customXml" ds:itemID="{4522A51C-073F-4C45-9170-ECE5951F4DEA}">
+  <ds:schemaRefs>
+    <ds:schemaRef ds:uri="http://schemas.microsoft.com/sharepoint/v3/contenttype/forms"/>
+  </ds:schemaRefs>
+</ds:datastoreItem>
 </file>
</xml_diff>

<commit_message>
Add tags to demonstrate MultipleBagFetchException. Fixes #3
</commit_message>
<xml_diff>
--- a/slides.pptx
+++ b/slides.pptx
@@ -6,10 +6,10 @@
     <p:sldMasterId id="2147483669" r:id="rId5"/>
   </p:sldMasterIdLst>
   <p:notesMasterIdLst>
-    <p:notesMasterId r:id="rId65"/>
+    <p:notesMasterId r:id="rId67"/>
   </p:notesMasterIdLst>
   <p:handoutMasterIdLst>
-    <p:handoutMasterId r:id="rId66"/>
+    <p:handoutMasterId r:id="rId68"/>
   </p:handoutMasterIdLst>
   <p:sldIdLst>
     <p:sldId id="256" r:id="rId6"/>
@@ -53,24 +53,26 @@
     <p:sldId id="287" r:id="rId44"/>
     <p:sldId id="289" r:id="rId45"/>
     <p:sldId id="336" r:id="rId46"/>
-    <p:sldId id="291" r:id="rId47"/>
-    <p:sldId id="293" r:id="rId48"/>
-    <p:sldId id="300" r:id="rId49"/>
-    <p:sldId id="334" r:id="rId50"/>
-    <p:sldId id="294" r:id="rId51"/>
-    <p:sldId id="295" r:id="rId52"/>
-    <p:sldId id="296" r:id="rId53"/>
-    <p:sldId id="297" r:id="rId54"/>
-    <p:sldId id="299" r:id="rId55"/>
-    <p:sldId id="302" r:id="rId56"/>
-    <p:sldId id="303" r:id="rId57"/>
-    <p:sldId id="309" r:id="rId58"/>
-    <p:sldId id="324" r:id="rId59"/>
-    <p:sldId id="305" r:id="rId60"/>
-    <p:sldId id="335" r:id="rId61"/>
-    <p:sldId id="318" r:id="rId62"/>
-    <p:sldId id="340" r:id="rId63"/>
-    <p:sldId id="319" r:id="rId64"/>
+    <p:sldId id="342" r:id="rId47"/>
+    <p:sldId id="341" r:id="rId48"/>
+    <p:sldId id="291" r:id="rId49"/>
+    <p:sldId id="293" r:id="rId50"/>
+    <p:sldId id="300" r:id="rId51"/>
+    <p:sldId id="334" r:id="rId52"/>
+    <p:sldId id="294" r:id="rId53"/>
+    <p:sldId id="295" r:id="rId54"/>
+    <p:sldId id="296" r:id="rId55"/>
+    <p:sldId id="297" r:id="rId56"/>
+    <p:sldId id="299" r:id="rId57"/>
+    <p:sldId id="302" r:id="rId58"/>
+    <p:sldId id="303" r:id="rId59"/>
+    <p:sldId id="309" r:id="rId60"/>
+    <p:sldId id="324" r:id="rId61"/>
+    <p:sldId id="305" r:id="rId62"/>
+    <p:sldId id="335" r:id="rId63"/>
+    <p:sldId id="318" r:id="rId64"/>
+    <p:sldId id="340" r:id="rId65"/>
+    <p:sldId id="319" r:id="rId66"/>
   </p:sldIdLst>
   <p:sldSz cx="12192000" cy="6858000"/>
   <p:notesSz cx="6858000" cy="9144000"/>
@@ -813,6 +815,90 @@
 </p:notes>
 </file>
 
+<file path=ppt/notesSlides/notesSlide10.xml><?xml version="1.0" encoding="utf-8"?>
+<p:notes xmlns:a="http://schemas.openxmlformats.org/drawingml/2006/main" xmlns:r="http://schemas.openxmlformats.org/officeDocument/2006/relationships" xmlns:p="http://schemas.openxmlformats.org/presentationml/2006/main">
+  <p:cSld>
+    <p:spTree>
+      <p:nvGrpSpPr>
+        <p:cNvPr id="1" name=""/>
+        <p:cNvGrpSpPr/>
+        <p:nvPr/>
+      </p:nvGrpSpPr>
+      <p:grpSpPr>
+        <a:xfrm>
+          <a:off x="0" y="0"/>
+          <a:ext cx="0" cy="0"/>
+          <a:chOff x="0" y="0"/>
+          <a:chExt cx="0" cy="0"/>
+        </a:xfrm>
+      </p:grpSpPr>
+      <p:sp>
+        <p:nvSpPr>
+          <p:cNvPr id="2" name="Tijdelijke aanduiding voor dia-afbeelding 1"/>
+          <p:cNvSpPr>
+            <a:spLocks noGrp="1" noRot="1" noChangeAspect="1"/>
+          </p:cNvSpPr>
+          <p:nvPr>
+            <p:ph type="sldImg"/>
+          </p:nvPr>
+        </p:nvSpPr>
+        <p:spPr/>
+      </p:sp>
+      <p:sp>
+        <p:nvSpPr>
+          <p:cNvPr id="3" name="Tijdelijke aanduiding voor notities 2"/>
+          <p:cNvSpPr>
+            <a:spLocks noGrp="1"/>
+          </p:cNvSpPr>
+          <p:nvPr>
+            <p:ph type="body" idx="1"/>
+          </p:nvPr>
+        </p:nvSpPr>
+        <p:spPr/>
+        <p:txBody>
+          <a:bodyPr/>
+          <a:lstStyle/>
+          <a:p>
+            <a:endParaRPr lang="nl-NL" dirty="0"/>
+          </a:p>
+        </p:txBody>
+      </p:sp>
+      <p:sp>
+        <p:nvSpPr>
+          <p:cNvPr id="4" name="Tijdelijke aanduiding voor dianummer 3"/>
+          <p:cNvSpPr>
+            <a:spLocks noGrp="1"/>
+          </p:cNvSpPr>
+          <p:nvPr>
+            <p:ph type="sldNum" sz="quarter" idx="5"/>
+          </p:nvPr>
+        </p:nvSpPr>
+        <p:spPr/>
+        <p:txBody>
+          <a:bodyPr/>
+          <a:lstStyle/>
+          <a:p>
+            <a:fld id="{4970B036-1422-4C36-8158-C30E1C0769EB}" type="slidenum">
+              <a:rPr lang="nl-NL" smtClean="0"/>
+              <a:t>56</a:t>
+            </a:fld>
+            <a:endParaRPr lang="nl-NL"/>
+          </a:p>
+        </p:txBody>
+      </p:sp>
+    </p:spTree>
+    <p:extLst>
+      <p:ext uri="{BB962C8B-B14F-4D97-AF65-F5344CB8AC3E}">
+        <p14:creationId xmlns:p14="http://schemas.microsoft.com/office/powerpoint/2010/main" val="2321177061"/>
+      </p:ext>
+    </p:extLst>
+  </p:cSld>
+  <p:clrMapOvr>
+    <a:masterClrMapping/>
+  </p:clrMapOvr>
+</p:notes>
+</file>
+
 <file path=ppt/notesSlides/notesSlide2.xml><?xml version="1.0" encoding="utf-8"?>
 <p:notes xmlns:a="http://schemas.openxmlformats.org/drawingml/2006/main" xmlns:r="http://schemas.openxmlformats.org/officeDocument/2006/relationships" xmlns:p="http://schemas.openxmlformats.org/presentationml/2006/main">
   <p:cSld>
@@ -1501,7 +1587,7 @@
           <a:p>
             <a:fld id="{4970B036-1422-4C36-8158-C30E1C0769EB}" type="slidenum">
               <a:rPr lang="nl-NL" smtClean="0"/>
-              <a:t>54</a:t>
+              <a:t>42</a:t>
             </a:fld>
             <a:endParaRPr lang="nl-NL"/>
           </a:p>
@@ -1510,7 +1596,91 @@
     </p:spTree>
     <p:extLst>
       <p:ext uri="{BB962C8B-B14F-4D97-AF65-F5344CB8AC3E}">
-        <p14:creationId xmlns:p14="http://schemas.microsoft.com/office/powerpoint/2010/main" val="2321177061"/>
+        <p14:creationId xmlns:p14="http://schemas.microsoft.com/office/powerpoint/2010/main" val="1098139067"/>
+      </p:ext>
+    </p:extLst>
+  </p:cSld>
+  <p:clrMapOvr>
+    <a:masterClrMapping/>
+  </p:clrMapOvr>
+</p:notes>
+</file>
+
+<file path=ppt/notesSlides/notesSlide9.xml><?xml version="1.0" encoding="utf-8"?>
+<p:notes xmlns:a="http://schemas.openxmlformats.org/drawingml/2006/main" xmlns:r="http://schemas.openxmlformats.org/officeDocument/2006/relationships" xmlns:p="http://schemas.openxmlformats.org/presentationml/2006/main">
+  <p:cSld>
+    <p:spTree>
+      <p:nvGrpSpPr>
+        <p:cNvPr id="1" name=""/>
+        <p:cNvGrpSpPr/>
+        <p:nvPr/>
+      </p:nvGrpSpPr>
+      <p:grpSpPr>
+        <a:xfrm>
+          <a:off x="0" y="0"/>
+          <a:ext cx="0" cy="0"/>
+          <a:chOff x="0" y="0"/>
+          <a:chExt cx="0" cy="0"/>
+        </a:xfrm>
+      </p:grpSpPr>
+      <p:sp>
+        <p:nvSpPr>
+          <p:cNvPr id="2" name="Tijdelijke aanduiding voor dia-afbeelding 1"/>
+          <p:cNvSpPr>
+            <a:spLocks noGrp="1" noRot="1" noChangeAspect="1"/>
+          </p:cNvSpPr>
+          <p:nvPr>
+            <p:ph type="sldImg"/>
+          </p:nvPr>
+        </p:nvSpPr>
+        <p:spPr/>
+      </p:sp>
+      <p:sp>
+        <p:nvSpPr>
+          <p:cNvPr id="3" name="Tijdelijke aanduiding voor notities 2"/>
+          <p:cNvSpPr>
+            <a:spLocks noGrp="1"/>
+          </p:cNvSpPr>
+          <p:nvPr>
+            <p:ph type="body" idx="1"/>
+          </p:nvPr>
+        </p:nvSpPr>
+        <p:spPr/>
+        <p:txBody>
+          <a:bodyPr/>
+          <a:lstStyle/>
+          <a:p>
+            <a:endParaRPr lang="nl-NL" dirty="0"/>
+          </a:p>
+        </p:txBody>
+      </p:sp>
+      <p:sp>
+        <p:nvSpPr>
+          <p:cNvPr id="4" name="Tijdelijke aanduiding voor dianummer 3"/>
+          <p:cNvSpPr>
+            <a:spLocks noGrp="1"/>
+          </p:cNvSpPr>
+          <p:nvPr>
+            <p:ph type="sldNum" sz="quarter" idx="5"/>
+          </p:nvPr>
+        </p:nvSpPr>
+        <p:spPr/>
+        <p:txBody>
+          <a:bodyPr/>
+          <a:lstStyle/>
+          <a:p>
+            <a:fld id="{4970B036-1422-4C36-8158-C30E1C0769EB}" type="slidenum">
+              <a:rPr lang="nl-NL" smtClean="0"/>
+              <a:t>43</a:t>
+            </a:fld>
+            <a:endParaRPr lang="nl-NL"/>
+          </a:p>
+        </p:txBody>
+      </p:sp>
+    </p:spTree>
+    <p:extLst>
+      <p:ext uri="{BB962C8B-B14F-4D97-AF65-F5344CB8AC3E}">
+        <p14:creationId xmlns:p14="http://schemas.microsoft.com/office/powerpoint/2010/main" val="1610032977"/>
       </p:ext>
     </p:extLst>
   </p:cSld>
@@ -33691,11 +33861,98 @@
             </a:pPr>
             <a:r>
               <a:rPr lang="en-US" sz="2800" dirty="0"/>
+              <a:t>Reading and parsing a big dataset from the database takes some time.</a:t>
+            </a:r>
+          </a:p>
+          <a:p>
+            <a:pPr>
+              <a:spcAft>
+                <a:spcPts val="600"/>
+              </a:spcAft>
+            </a:pPr>
+            <a:r>
+              <a:rPr lang="en-US" sz="2800" dirty="0"/>
               <a:t>Hibernate needs to de-duplicate in-memory: could cause performance issues.</a:t>
             </a:r>
           </a:p>
         </p:txBody>
       </p:sp>
+      <p:pic>
+        <p:nvPicPr>
+          <p:cNvPr id="4" name="Afbeelding 3">
+            <a:extLst>
+              <a:ext uri="{FF2B5EF4-FFF2-40B4-BE49-F238E27FC236}">
+                <a16:creationId xmlns:a16="http://schemas.microsoft.com/office/drawing/2014/main" id="{B3161C80-5E00-2986-28E5-390198D7B903}"/>
+              </a:ext>
+            </a:extLst>
+          </p:cNvPr>
+          <p:cNvPicPr>
+            <a:picLocks noChangeAspect="1"/>
+          </p:cNvPicPr>
+          <p:nvPr/>
+        </p:nvPicPr>
+        <p:blipFill rotWithShape="1">
+          <a:blip r:embed="rId3"/>
+          <a:srcRect l="6311" t="7601" r="5430" b="16819"/>
+          <a:stretch/>
+        </p:blipFill>
+        <p:spPr>
+          <a:xfrm>
+            <a:off x="5221996" y="3835633"/>
+            <a:ext cx="3756752" cy="2826396"/>
+          </a:xfrm>
+          <a:prstGeom prst="rect">
+            <a:avLst/>
+          </a:prstGeom>
+        </p:spPr>
+      </p:pic>
+      <p:pic>
+        <p:nvPicPr>
+          <p:cNvPr id="5" name="Picture 2" descr="22,947 Demo Foto's, Afbeeldingen en Stock Fotografie - 123RF">
+            <a:extLst>
+              <a:ext uri="{FF2B5EF4-FFF2-40B4-BE49-F238E27FC236}">
+                <a16:creationId xmlns:a16="http://schemas.microsoft.com/office/drawing/2014/main" id="{11A9FDB3-C44A-3191-9B36-BDAD0A391031}"/>
+              </a:ext>
+            </a:extLst>
+          </p:cNvPr>
+          <p:cNvPicPr>
+            <a:picLocks noChangeAspect="1" noChangeArrowheads="1"/>
+          </p:cNvPicPr>
+          <p:nvPr/>
+        </p:nvPicPr>
+        <p:blipFill>
+          <a:blip r:embed="rId4">
+            <a:extLst>
+              <a:ext uri="{28A0092B-C50C-407E-A947-70E740481C1C}">
+                <a14:useLocalDpi xmlns:a14="http://schemas.microsoft.com/office/drawing/2010/main" val="0"/>
+              </a:ext>
+            </a:extLst>
+          </a:blip>
+          <a:srcRect/>
+          <a:stretch>
+            <a:fillRect/>
+          </a:stretch>
+        </p:blipFill>
+        <p:spPr bwMode="auto">
+          <a:xfrm>
+            <a:off x="10059668" y="5661520"/>
+            <a:ext cx="1923011" cy="952959"/>
+          </a:xfrm>
+          <a:prstGeom prst="rect">
+            <a:avLst/>
+          </a:prstGeom>
+          <a:noFill/>
+          <a:extLst>
+            <a:ext uri="{909E8E84-426E-40DD-AFC4-6F175D3DCCD1}">
+              <a14:hiddenFill xmlns:a14="http://schemas.microsoft.com/office/drawing/2010/main">
+                <a:solidFill>
+                  <a:srgbClr val="FFFFFF"/>
+                </a:solidFill>
+              </a14:hiddenFill>
+            </a:ext>
+          </a:extLst>
+        </p:spPr>
+      </p:pic>
     </p:spTree>
     <p:extLst>
       <p:ext uri="{BB962C8B-B14F-4D97-AF65-F5344CB8AC3E}">
@@ -33807,7 +34064,18 @@
             </a:pPr>
             <a:r>
               <a:rPr lang="en-US" sz="2800" dirty="0"/>
-              <a:t>Could avoid the JOIN and use lazy loading.</a:t>
+              <a:t>Could avoid the </a:t>
+            </a:r>
+            <a:r>
+              <a:rPr lang="en-US" sz="2800" dirty="0">
+                <a:latin typeface="Courier New" panose="02070309020205020404" pitchFamily="49" charset="0"/>
+                <a:cs typeface="Courier New" panose="02070309020205020404" pitchFamily="49" charset="0"/>
+              </a:rPr>
+              <a:t>JOIN</a:t>
+            </a:r>
+            <a:r>
+              <a:rPr lang="en-US" sz="2800" dirty="0"/>
+              <a:t> and use lazy loading.</a:t>
             </a:r>
           </a:p>
           <a:p>
@@ -33826,7 +34094,7 @@
             </a:r>
             <a:r>
               <a:rPr lang="en-US" sz="2800" dirty="0"/>
-              <a:t> be faster than deduplicating a massive result set.</a:t>
+              <a:t> be faster than loading and deduplicating a massive result set.</a:t>
             </a:r>
             <a:endParaRPr lang="en-US" sz="2400" dirty="0"/>
           </a:p>
@@ -33864,10 +34132,10 @@
       </p:grpSpPr>
       <p:sp>
         <p:nvSpPr>
-          <p:cNvPr id="10" name="Title 2">
+          <p:cNvPr id="11" name="Title 1">
             <a:extLst>
               <a:ext uri="{FF2B5EF4-FFF2-40B4-BE49-F238E27FC236}">
-                <a16:creationId xmlns:a16="http://schemas.microsoft.com/office/drawing/2014/main" id="{49AB3702-1810-764C-3BE9-C338CDB6A62F}"/>
+                <a16:creationId xmlns:a16="http://schemas.microsoft.com/office/drawing/2014/main" id="{51612DA1-DB43-7E72-A4EA-4B95C807605F}"/>
               </a:ext>
             </a:extLst>
           </p:cNvPr>
@@ -33880,8 +34148,8 @@
         </p:nvSpPr>
         <p:spPr>
           <a:xfrm>
-            <a:off x="792000" y="1324801"/>
-            <a:ext cx="10165560" cy="2358200"/>
+            <a:off x="1296000" y="720000"/>
+            <a:ext cx="9864000" cy="681480"/>
           </a:xfrm>
         </p:spPr>
         <p:txBody>
@@ -33891,8 +34159,11 @@
           <a:lstStyle/>
           <a:p>
             <a:r>
-              <a:rPr lang="en-US" dirty="0"/>
-              <a:t>Performance tips and common mistakes</a:t>
+              <a:rPr lang="en-US" dirty="0" err="1">
+                <a:latin typeface="Courier New" panose="02070309020205020404" pitchFamily="49" charset="0"/>
+                <a:cs typeface="Courier New" panose="02070309020205020404" pitchFamily="49" charset="0"/>
+              </a:rPr>
+              <a:t>MultipleBagFetchException</a:t>
             </a:r>
             <a:endParaRPr lang="en-US" dirty="0">
               <a:latin typeface="Courier New" panose="02070309020205020404" pitchFamily="49" charset="0"/>
@@ -33901,10 +34172,157 @@
           </a:p>
         </p:txBody>
       </p:sp>
+      <p:sp>
+        <p:nvSpPr>
+          <p:cNvPr id="13" name="Text Placeholder 2">
+            <a:extLst>
+              <a:ext uri="{FF2B5EF4-FFF2-40B4-BE49-F238E27FC236}">
+                <a16:creationId xmlns:a16="http://schemas.microsoft.com/office/drawing/2014/main" id="{5AFACC08-6E7F-14DD-D1E6-54973126E7AF}"/>
+              </a:ext>
+            </a:extLst>
+          </p:cNvPr>
+          <p:cNvSpPr>
+            <a:spLocks noGrp="1"/>
+          </p:cNvSpPr>
+          <p:nvPr>
+            <p:ph type="body" sz="quarter" idx="10"/>
+          </p:nvPr>
+        </p:nvSpPr>
+        <p:spPr>
+          <a:xfrm>
+            <a:off x="1296000" y="1566420"/>
+            <a:ext cx="9864000" cy="4571580"/>
+          </a:xfrm>
+        </p:spPr>
+        <p:txBody>
+          <a:bodyPr>
+            <a:normAutofit/>
+          </a:bodyPr>
+          <a:lstStyle/>
+          <a:p>
+            <a:pPr>
+              <a:spcAft>
+                <a:spcPts val="600"/>
+              </a:spcAft>
+            </a:pPr>
+            <a:r>
+              <a:rPr lang="en-US" sz="2800" dirty="0"/>
+              <a:t>Hibernate can no longer differentiate between </a:t>
+            </a:r>
+            <a:r>
+              <a:rPr lang="en-US" sz="2800" i="1" dirty="0"/>
+              <a:t>information that is supposed to be duplicated </a:t>
+            </a:r>
+            <a:r>
+              <a:rPr lang="en-US" sz="2800" dirty="0"/>
+              <a:t>and </a:t>
+            </a:r>
+            <a:r>
+              <a:rPr lang="en-US" sz="2800" i="1" dirty="0"/>
+              <a:t>information that was duplicated by the cartesian product</a:t>
+            </a:r>
+            <a:r>
+              <a:rPr lang="en-US" sz="2800" dirty="0"/>
+              <a:t>.</a:t>
+            </a:r>
+          </a:p>
+          <a:p>
+            <a:pPr>
+              <a:spcAft>
+                <a:spcPts val="600"/>
+              </a:spcAft>
+            </a:pPr>
+            <a:r>
+              <a:rPr lang="en-US" sz="2800" dirty="0"/>
+              <a:t>Solution 1: Use </a:t>
+            </a:r>
+            <a:r>
+              <a:rPr lang="en-US" sz="2800" dirty="0">
+                <a:latin typeface="Courier New" panose="02070309020205020404" pitchFamily="49" charset="0"/>
+                <a:cs typeface="Courier New" panose="02070309020205020404" pitchFamily="49" charset="0"/>
+              </a:rPr>
+              <a:t>Set</a:t>
+            </a:r>
+            <a:r>
+              <a:rPr lang="en-US" sz="2800" dirty="0"/>
+              <a:t> instead of </a:t>
+            </a:r>
+            <a:r>
+              <a:rPr lang="en-US" sz="2800" dirty="0">
+                <a:latin typeface="Courier New" panose="02070309020205020404" pitchFamily="49" charset="0"/>
+                <a:cs typeface="Courier New" panose="02070309020205020404" pitchFamily="49" charset="0"/>
+              </a:rPr>
+              <a:t>List</a:t>
+            </a:r>
+            <a:r>
+              <a:rPr lang="en-US" sz="2800" dirty="0"/>
+              <a:t> (small datasets only)</a:t>
+            </a:r>
+          </a:p>
+          <a:p>
+            <a:pPr>
+              <a:spcAft>
+                <a:spcPts val="600"/>
+              </a:spcAft>
+            </a:pPr>
+            <a:r>
+              <a:rPr lang="en-US" sz="2800" dirty="0"/>
+              <a:t>Solution 2: Use lazy loading.</a:t>
+            </a:r>
+          </a:p>
+        </p:txBody>
+      </p:sp>
+      <p:pic>
+        <p:nvPicPr>
+          <p:cNvPr id="2" name="Picture 2" descr="22,947 Demo Foto's, Afbeeldingen en Stock Fotografie - 123RF">
+            <a:extLst>
+              <a:ext uri="{FF2B5EF4-FFF2-40B4-BE49-F238E27FC236}">
+                <a16:creationId xmlns:a16="http://schemas.microsoft.com/office/drawing/2014/main" id="{D8F00C67-08D8-3EEF-D395-221C71F4A846}"/>
+              </a:ext>
+            </a:extLst>
+          </p:cNvPr>
+          <p:cNvPicPr>
+            <a:picLocks noChangeAspect="1" noChangeArrowheads="1"/>
+          </p:cNvPicPr>
+          <p:nvPr/>
+        </p:nvPicPr>
+        <p:blipFill>
+          <a:blip r:embed="rId3">
+            <a:extLst>
+              <a:ext uri="{28A0092B-C50C-407E-A947-70E740481C1C}">
+                <a14:useLocalDpi xmlns:a14="http://schemas.microsoft.com/office/drawing/2010/main" val="0"/>
+              </a:ext>
+            </a:extLst>
+          </a:blip>
+          <a:srcRect/>
+          <a:stretch>
+            <a:fillRect/>
+          </a:stretch>
+        </p:blipFill>
+        <p:spPr bwMode="auto">
+          <a:xfrm>
+            <a:off x="10059668" y="5661520"/>
+            <a:ext cx="1923011" cy="952959"/>
+          </a:xfrm>
+          <a:prstGeom prst="rect">
+            <a:avLst/>
+          </a:prstGeom>
+          <a:noFill/>
+          <a:extLst>
+            <a:ext uri="{909E8E84-426E-40DD-AFC4-6F175D3DCCD1}">
+              <a14:hiddenFill xmlns:a14="http://schemas.microsoft.com/office/drawing/2010/main">
+                <a:solidFill>
+                  <a:srgbClr val="FFFFFF"/>
+                </a:solidFill>
+              </a14:hiddenFill>
+            </a:ext>
+          </a:extLst>
+        </p:spPr>
+      </p:pic>
     </p:spTree>
     <p:extLst>
       <p:ext uri="{BB962C8B-B14F-4D97-AF65-F5344CB8AC3E}">
-        <p14:creationId xmlns:p14="http://schemas.microsoft.com/office/powerpoint/2010/main" val="1036875611"/>
+        <p14:creationId xmlns:p14="http://schemas.microsoft.com/office/powerpoint/2010/main" val="4055510022"/>
       </p:ext>
     </p:extLst>
   </p:cSld>
@@ -33950,18 +34368,29 @@
         <p:spPr>
           <a:xfrm>
             <a:off x="1296000" y="719999"/>
-            <a:ext cx="9864000" cy="1259407"/>
+            <a:ext cx="9864000" cy="1119817"/>
           </a:xfrm>
         </p:spPr>
         <p:txBody>
           <a:bodyPr anchor="t">
-            <a:normAutofit/>
+            <a:normAutofit fontScale="90000"/>
           </a:bodyPr>
           <a:lstStyle/>
           <a:p>
             <a:r>
               <a:rPr lang="en-US" dirty="0"/>
-              <a:t>Tip 1: Avoid entity overhead</a:t>
+              <a:t>Difference between </a:t>
+            </a:r>
+            <a:r>
+              <a:rPr lang="en-US" dirty="0">
+                <a:latin typeface="Courier New" panose="02070309020205020404" pitchFamily="49" charset="0"/>
+                <a:cs typeface="Courier New" panose="02070309020205020404" pitchFamily="49" charset="0"/>
+              </a:rPr>
+              <a:t>JOIN FETCH </a:t>
+            </a:r>
+            <a:r>
+              <a:rPr lang="en-US" dirty="0"/>
+              <a:t>and eager loading</a:t>
             </a:r>
           </a:p>
         </p:txBody>
@@ -33984,8 +34413,8 @@
         </p:nvSpPr>
         <p:spPr>
           <a:xfrm>
-            <a:off x="1296000" y="2398955"/>
-            <a:ext cx="9864000" cy="3338904"/>
+            <a:off x="1296000" y="2108498"/>
+            <a:ext cx="9864000" cy="4029501"/>
           </a:xfrm>
         </p:spPr>
         <p:txBody>
@@ -34000,16 +34429,54 @@
               </a:spcAft>
             </a:pPr>
             <a:r>
-              <a:rPr lang="en-US" sz="2800" dirty="0"/>
-              <a:t>Entities come with a lot of overhead (dirty checking, persistence context)</a:t>
-            </a:r>
+              <a:rPr lang="en-US" sz="2400" dirty="0">
+                <a:latin typeface="Courier New" panose="02070309020205020404" pitchFamily="49" charset="0"/>
+                <a:cs typeface="Courier New" panose="02070309020205020404" pitchFamily="49" charset="0"/>
+              </a:rPr>
+              <a:t>JOIN FETCH </a:t>
+            </a:r>
+            <a:r>
+              <a:rPr lang="en-US" sz="2400" b="1" dirty="0"/>
+              <a:t>affects the query </a:t>
+            </a:r>
+            <a:r>
+              <a:rPr lang="en-US" sz="2400" dirty="0"/>
+              <a:t>(will use a JOIN operation)</a:t>
+            </a:r>
+          </a:p>
+          <a:p>
+            <a:pPr>
+              <a:spcAft>
+                <a:spcPts val="600"/>
+              </a:spcAft>
+            </a:pPr>
+            <a:r>
+              <a:rPr lang="en-US" dirty="0"/>
+              <a:t>Eager loading </a:t>
+            </a:r>
+            <a:r>
+              <a:rPr lang="en-US" b="1" dirty="0"/>
+              <a:t>affects the point in time </a:t>
+            </a:r>
+            <a:r>
+              <a:rPr lang="en-US" dirty="0"/>
+              <a:t>when a collection is loaded (just like lazy loading, will perform an additional query, but when loading the “parent” entity, not lazily)</a:t>
+            </a:r>
+          </a:p>
+          <a:p>
+            <a:pPr>
+              <a:spcAft>
+                <a:spcPts val="600"/>
+              </a:spcAft>
+            </a:pPr>
+            <a:endParaRPr lang="en-US" sz="2400" dirty="0"/>
           </a:p>
         </p:txBody>
       </p:sp>
     </p:spTree>
     <p:extLst>
       <p:ext uri="{BB962C8B-B14F-4D97-AF65-F5344CB8AC3E}">
-        <p14:creationId xmlns:p14="http://schemas.microsoft.com/office/powerpoint/2010/main" val="613316660"/>
+        <p14:creationId xmlns:p14="http://schemas.microsoft.com/office/powerpoint/2010/main" val="1397448448"/>
       </p:ext>
     </p:extLst>
   </p:cSld>
@@ -34038,10 +34505,10 @@
       </p:grpSpPr>
       <p:sp>
         <p:nvSpPr>
-          <p:cNvPr id="11" name="Title 1">
+          <p:cNvPr id="10" name="Title 2">
             <a:extLst>
               <a:ext uri="{FF2B5EF4-FFF2-40B4-BE49-F238E27FC236}">
-                <a16:creationId xmlns:a16="http://schemas.microsoft.com/office/drawing/2014/main" id="{51612DA1-DB43-7E72-A4EA-4B95C807605F}"/>
+                <a16:creationId xmlns:a16="http://schemas.microsoft.com/office/drawing/2014/main" id="{49AB3702-1810-764C-3BE9-C338CDB6A62F}"/>
               </a:ext>
             </a:extLst>
           </p:cNvPr>
@@ -34054,8 +34521,8 @@
         </p:nvSpPr>
         <p:spPr>
           <a:xfrm>
-            <a:off x="1296000" y="720000"/>
-            <a:ext cx="9864000" cy="681480"/>
+            <a:off x="792000" y="1324801"/>
+            <a:ext cx="10165560" cy="2358200"/>
           </a:xfrm>
         </p:spPr>
         <p:txBody>
@@ -34066,104 +34533,19 @@
           <a:p>
             <a:r>
               <a:rPr lang="en-US" dirty="0"/>
-              <a:t>Tip 1: Avoid entity overhead</a:t>
+              <a:t>Performance tips and common mistakes</a:t>
             </a:r>
             <a:endParaRPr lang="en-US" dirty="0">
-              <a:solidFill>
-                <a:srgbClr val="FF0000"/>
-              </a:solidFill>
+              <a:latin typeface="Courier New" panose="02070309020205020404" pitchFamily="49" charset="0"/>
+              <a:cs typeface="Courier New" panose="02070309020205020404" pitchFamily="49" charset="0"/>
             </a:endParaRPr>
-          </a:p>
-        </p:txBody>
-      </p:sp>
-      <p:sp>
-        <p:nvSpPr>
-          <p:cNvPr id="13" name="Text Placeholder 2">
-            <a:extLst>
-              <a:ext uri="{FF2B5EF4-FFF2-40B4-BE49-F238E27FC236}">
-                <a16:creationId xmlns:a16="http://schemas.microsoft.com/office/drawing/2014/main" id="{5AFACC08-6E7F-14DD-D1E6-54973126E7AF}"/>
-              </a:ext>
-            </a:extLst>
-          </p:cNvPr>
-          <p:cNvSpPr>
-            <a:spLocks noGrp="1"/>
-          </p:cNvSpPr>
-          <p:nvPr>
-            <p:ph type="body" sz="quarter" idx="10"/>
-          </p:nvPr>
-        </p:nvSpPr>
-        <p:spPr>
-          <a:xfrm>
-            <a:off x="1296000" y="2105696"/>
-            <a:ext cx="9864000" cy="3632163"/>
-          </a:xfrm>
-        </p:spPr>
-        <p:txBody>
-          <a:bodyPr>
-            <a:normAutofit/>
-          </a:bodyPr>
-          <a:lstStyle/>
-          <a:p>
-            <a:pPr>
-              <a:spcAft>
-                <a:spcPts val="600"/>
-              </a:spcAft>
-            </a:pPr>
-            <a:r>
-              <a:rPr lang="en-US" sz="2800" dirty="0"/>
-              <a:t>If your use-case doesn’t require propagating changes to the database, use </a:t>
-            </a:r>
-            <a:r>
-              <a:rPr lang="en-US" sz="2800" b="1" dirty="0"/>
-              <a:t>read-only transactions</a:t>
-            </a:r>
-            <a:r>
-              <a:rPr lang="en-US" sz="2800" dirty="0"/>
-              <a:t>.</a:t>
-            </a:r>
-          </a:p>
-          <a:p>
-            <a:pPr>
-              <a:spcAft>
-                <a:spcPts val="600"/>
-              </a:spcAft>
-            </a:pPr>
-            <a:r>
-              <a:rPr lang="en-US" sz="2800" dirty="0">
-                <a:latin typeface="Courier New" panose="02070309020205020404" pitchFamily="49" charset="0"/>
-                <a:cs typeface="Courier New" panose="02070309020205020404" pitchFamily="49" charset="0"/>
-              </a:rPr>
-              <a:t>@Transactional(readOnly=true)</a:t>
-            </a:r>
-          </a:p>
-          <a:p>
-            <a:pPr>
-              <a:spcAft>
-                <a:spcPts val="600"/>
-              </a:spcAft>
-            </a:pPr>
-            <a:r>
-              <a:rPr lang="en-US" sz="2800" dirty="0"/>
-              <a:t>It eliminates dirty-checking.</a:t>
-            </a:r>
-          </a:p>
-          <a:p>
-            <a:pPr>
-              <a:spcAft>
-                <a:spcPts val="600"/>
-              </a:spcAft>
-            </a:pPr>
-            <a:r>
-              <a:rPr lang="en-US" sz="2800" dirty="0"/>
-              <a:t>It eliminates loading the entity in the persistence context.</a:t>
-            </a:r>
           </a:p>
         </p:txBody>
       </p:sp>
     </p:spTree>
     <p:extLst>
       <p:ext uri="{BB962C8B-B14F-4D97-AF65-F5344CB8AC3E}">
-        <p14:creationId xmlns:p14="http://schemas.microsoft.com/office/powerpoint/2010/main" val="2389961084"/>
+        <p14:creationId xmlns:p14="http://schemas.microsoft.com/office/powerpoint/2010/main" val="1036875611"/>
       </p:ext>
     </p:extLst>
   </p:cSld>
@@ -34208,8 +34590,8 @@
         </p:nvSpPr>
         <p:spPr>
           <a:xfrm>
-            <a:off x="1296000" y="720000"/>
-            <a:ext cx="9864000" cy="681480"/>
+            <a:off x="1296000" y="719999"/>
+            <a:ext cx="9864000" cy="1259407"/>
           </a:xfrm>
         </p:spPr>
         <p:txBody>
@@ -34222,11 +34604,6 @@
               <a:rPr lang="en-US" dirty="0"/>
               <a:t>Tip 1: Avoid entity overhead</a:t>
             </a:r>
-            <a:endParaRPr lang="en-US" dirty="0">
-              <a:solidFill>
-                <a:srgbClr val="FF0000"/>
-              </a:solidFill>
-            </a:endParaRPr>
           </a:p>
         </p:txBody>
       </p:sp>
@@ -34248,8 +34625,8 @@
         </p:nvSpPr>
         <p:spPr>
           <a:xfrm>
-            <a:off x="1296000" y="2105696"/>
-            <a:ext cx="9864000" cy="3632163"/>
+            <a:off x="1296000" y="2398955"/>
+            <a:ext cx="9864000" cy="3338904"/>
           </a:xfrm>
         </p:spPr>
         <p:txBody>
@@ -34265,40 +34642,7 @@
             </a:pPr>
             <a:r>
               <a:rPr lang="en-US" sz="2800" dirty="0"/>
-              <a:t>You can also eliminate entities by using </a:t>
-            </a:r>
-            <a:r>
-              <a:rPr lang="en-US" sz="2800" b="1" dirty="0"/>
-              <a:t>DTO projections</a:t>
-            </a:r>
-            <a:r>
-              <a:rPr lang="en-US" sz="2800" dirty="0"/>
-              <a:t>.</a:t>
-            </a:r>
-          </a:p>
-          <a:p>
-            <a:pPr>
-              <a:spcAft>
-                <a:spcPts val="600"/>
-              </a:spcAft>
-            </a:pPr>
-            <a:r>
-              <a:rPr lang="en-US" sz="2800" dirty="0"/>
-              <a:t>Same result as using </a:t>
-            </a:r>
-            <a:r>
-              <a:rPr lang="en-US" sz="2800" dirty="0">
-                <a:latin typeface="Courier New" panose="02070309020205020404" pitchFamily="49" charset="0"/>
-                <a:cs typeface="Courier New" panose="02070309020205020404" pitchFamily="49" charset="0"/>
-              </a:rPr>
-              <a:t>@Transactional(readOnly=true)</a:t>
-            </a:r>
-            <a:r>
-              <a:rPr lang="en-US" sz="2800" dirty="0">
-                <a:latin typeface="+mj-lt"/>
-                <a:cs typeface="Courier New" panose="02070309020205020404" pitchFamily="49" charset="0"/>
-              </a:rPr>
-              <a:t> but allows you to only extract fields that are required.</a:t>
+              <a:t>Entities come with a lot of overhead (dirty checking, persistence context)</a:t>
             </a:r>
           </a:p>
         </p:txBody>
@@ -34306,7 +34650,7 @@
     </p:spTree>
     <p:extLst>
       <p:ext uri="{BB962C8B-B14F-4D97-AF65-F5344CB8AC3E}">
-        <p14:creationId xmlns:p14="http://schemas.microsoft.com/office/powerpoint/2010/main" val="3366337949"/>
+        <p14:creationId xmlns:p14="http://schemas.microsoft.com/office/powerpoint/2010/main" val="613316660"/>
       </p:ext>
     </p:extLst>
   </p:cSld>
@@ -34362,12 +34706,13 @@
           <a:lstStyle/>
           <a:p>
             <a:r>
-              <a:rPr lang="en-US" sz="3600" dirty="0"/>
-              <a:t>Tip 2: Read SQL logs</a:t>
-            </a:r>
-            <a:endParaRPr lang="en-US" sz="3600" dirty="0">
-              <a:latin typeface="Courier New" panose="02070309020205020404" pitchFamily="49" charset="0"/>
-              <a:cs typeface="Courier New" panose="02070309020205020404" pitchFamily="49" charset="0"/>
+              <a:rPr lang="en-US" dirty="0"/>
+              <a:t>Tip 1: Avoid entity overhead</a:t>
+            </a:r>
+            <a:endParaRPr lang="en-US" dirty="0">
+              <a:solidFill>
+                <a:srgbClr val="FF0000"/>
+              </a:solidFill>
             </a:endParaRPr>
           </a:p>
         </p:txBody>
@@ -34396,7 +34741,7 @@
         </p:spPr>
         <p:txBody>
           <a:bodyPr>
-            <a:normAutofit lnSpcReduction="10000"/>
+            <a:normAutofit/>
           </a:bodyPr>
           <a:lstStyle/>
           <a:p>
@@ -34407,29 +34752,15 @@
             </a:pPr>
             <a:r>
               <a:rPr lang="en-US" sz="2800" dirty="0"/>
-              <a:t>Don’t use </a:t>
-            </a:r>
-            <a:r>
-              <a:rPr lang="en-US" sz="2800" dirty="0" err="1">
-                <a:latin typeface="Courier New" panose="02070309020205020404" pitchFamily="49" charset="0"/>
-                <a:cs typeface="Courier New" panose="02070309020205020404" pitchFamily="49" charset="0"/>
-              </a:rPr>
-              <a:t>hibernate.show_sql</a:t>
-            </a:r>
-            <a:endParaRPr lang="en-US" sz="2800" dirty="0">
-              <a:latin typeface="Courier New" panose="02070309020205020404" pitchFamily="49" charset="0"/>
-              <a:cs typeface="Courier New" panose="02070309020205020404" pitchFamily="49" charset="0"/>
-            </a:endParaRPr>
-          </a:p>
-          <a:p>
-            <a:pPr lvl="1">
-              <a:spcAft>
-                <a:spcPts val="600"/>
-              </a:spcAft>
-            </a:pPr>
-            <a:r>
-              <a:rPr lang="en-US" sz="2400" dirty="0"/>
-              <a:t>Statements are always logged to console.</a:t>
+              <a:t>If your use-case doesn’t require propagating changes to the database, use </a:t>
+            </a:r>
+            <a:r>
+              <a:rPr lang="en-US" sz="2800" b="1" dirty="0"/>
+              <a:t>read-only transactions</a:t>
+            </a:r>
+            <a:r>
+              <a:rPr lang="en-US" sz="2800" dirty="0"/>
+              <a:t>.</a:t>
             </a:r>
           </a:p>
           <a:p>
@@ -34439,96 +34770,33 @@
               </a:spcAft>
             </a:pPr>
             <a:r>
-              <a:rPr lang="en-US" sz="2800" dirty="0"/>
-              <a:t>Use the logging framework instead:</a:t>
-            </a:r>
-          </a:p>
-          <a:p>
-            <a:pPr marL="252000" lvl="1" indent="0">
+              <a:rPr lang="en-US" sz="2800" dirty="0">
+                <a:latin typeface="Courier New" panose="02070309020205020404" pitchFamily="49" charset="0"/>
+                <a:cs typeface="Courier New" panose="02070309020205020404" pitchFamily="49" charset="0"/>
+              </a:rPr>
+              <a:t>@Transactional(readOnly=true)</a:t>
+            </a:r>
+          </a:p>
+          <a:p>
+            <a:pPr>
               <a:spcAft>
                 <a:spcPts val="600"/>
               </a:spcAft>
-              <a:buNone/>
-            </a:pPr>
-            <a:r>
-              <a:rPr lang="en-US" sz="2400" dirty="0">
-                <a:latin typeface="Courier New" panose="02070309020205020404" pitchFamily="49" charset="0"/>
-                <a:cs typeface="Courier New" panose="02070309020205020404" pitchFamily="49" charset="0"/>
-              </a:rPr>
-              <a:t>logging:</a:t>
-            </a:r>
-          </a:p>
-          <a:p>
-            <a:pPr marL="252000" lvl="1" indent="0">
+            </a:pPr>
+            <a:r>
+              <a:rPr lang="en-US" sz="2800" dirty="0"/>
+              <a:t>It eliminates dirty-checking.</a:t>
+            </a:r>
+          </a:p>
+          <a:p>
+            <a:pPr>
               <a:spcAft>
                 <a:spcPts val="600"/>
               </a:spcAft>
-              <a:buNone/>
-            </a:pPr>
-            <a:r>
-              <a:rPr lang="en-US" sz="2400" dirty="0">
-                <a:latin typeface="Courier New" panose="02070309020205020404" pitchFamily="49" charset="0"/>
-                <a:cs typeface="Courier New" panose="02070309020205020404" pitchFamily="49" charset="0"/>
-              </a:rPr>
-              <a:t>  level:</a:t>
-            </a:r>
-          </a:p>
-          <a:p>
-            <a:pPr marL="252000" lvl="1" indent="0">
-              <a:spcAft>
-                <a:spcPts val="600"/>
-              </a:spcAft>
-              <a:buNone/>
-            </a:pPr>
-            <a:r>
-              <a:rPr lang="en-US" sz="2400" dirty="0">
-                <a:latin typeface="Courier New" panose="02070309020205020404" pitchFamily="49" charset="0"/>
-                <a:cs typeface="Courier New" panose="02070309020205020404" pitchFamily="49" charset="0"/>
-              </a:rPr>
-              <a:t>    </a:t>
-            </a:r>
-            <a:r>
-              <a:rPr lang="en-US" sz="2400" dirty="0" err="1">
-                <a:latin typeface="Courier New" panose="02070309020205020404" pitchFamily="49" charset="0"/>
-                <a:cs typeface="Courier New" panose="02070309020205020404" pitchFamily="49" charset="0"/>
-              </a:rPr>
-              <a:t>org.hibernate.SQL</a:t>
-            </a:r>
-            <a:r>
-              <a:rPr lang="en-US" sz="2400" dirty="0">
-                <a:latin typeface="Courier New" panose="02070309020205020404" pitchFamily="49" charset="0"/>
-                <a:cs typeface="Courier New" panose="02070309020205020404" pitchFamily="49" charset="0"/>
-              </a:rPr>
-              <a:t>: debug</a:t>
-            </a:r>
-          </a:p>
-          <a:p>
-            <a:pPr marL="252000" lvl="1" indent="0">
-              <a:spcAft>
-                <a:spcPts val="600"/>
-              </a:spcAft>
-              <a:buNone/>
-            </a:pPr>
-            <a:r>
-              <a:rPr lang="en-US" sz="2400" dirty="0">
-                <a:latin typeface="Courier New" panose="02070309020205020404" pitchFamily="49" charset="0"/>
-                <a:cs typeface="Courier New" panose="02070309020205020404" pitchFamily="49" charset="0"/>
-              </a:rPr>
-              <a:t>    </a:t>
-            </a:r>
-            <a:r>
-              <a:rPr lang="en-US" sz="2400" dirty="0" err="1">
-                <a:latin typeface="Courier New" panose="02070309020205020404" pitchFamily="49" charset="0"/>
-                <a:cs typeface="Courier New" panose="02070309020205020404" pitchFamily="49" charset="0"/>
-              </a:rPr>
-              <a:t>org.hibernate.type.descriptor.sql</a:t>
-            </a:r>
-            <a:r>
-              <a:rPr lang="en-US" sz="2400" dirty="0">
-                <a:latin typeface="Courier New" panose="02070309020205020404" pitchFamily="49" charset="0"/>
-                <a:cs typeface="Courier New" panose="02070309020205020404" pitchFamily="49" charset="0"/>
-              </a:rPr>
-              <a:t>: trace</a:t>
+            </a:pPr>
+            <a:r>
+              <a:rPr lang="en-US" sz="2800" dirty="0"/>
+              <a:t>It eliminates loading the entity in the persistence context.</a:t>
             </a:r>
           </a:p>
         </p:txBody>
@@ -34536,7 +34804,7 @@
     </p:spTree>
     <p:extLst>
       <p:ext uri="{BB962C8B-B14F-4D97-AF65-F5344CB8AC3E}">
-        <p14:creationId xmlns:p14="http://schemas.microsoft.com/office/powerpoint/2010/main" val="36027474"/>
+        <p14:creationId xmlns:p14="http://schemas.microsoft.com/office/powerpoint/2010/main" val="2389961084"/>
       </p:ext>
     </p:extLst>
   </p:cSld>
@@ -34593,22 +34861,12 @@
           <a:p>
             <a:r>
               <a:rPr lang="en-US" dirty="0"/>
-              <a:t>Tip 3: Don’t use </a:t>
-            </a:r>
-            <a:r>
-              <a:rPr lang="en-US" dirty="0">
-                <a:latin typeface="Courier New" panose="02070309020205020404" pitchFamily="49" charset="0"/>
-                <a:cs typeface="Courier New" panose="02070309020205020404" pitchFamily="49" charset="0"/>
-              </a:rPr>
-              <a:t>@Transactional </a:t>
-            </a:r>
-            <a:r>
-              <a:rPr lang="en-US" dirty="0"/>
-              <a:t>in tests</a:t>
+              <a:t>Tip 1: Avoid entity overhead</a:t>
             </a:r>
             <a:endParaRPr lang="en-US" dirty="0">
-              <a:latin typeface="Courier New" panose="02070309020205020404" pitchFamily="49" charset="0"/>
-              <a:cs typeface="Courier New" panose="02070309020205020404" pitchFamily="49" charset="0"/>
+              <a:solidFill>
+                <a:srgbClr val="FF0000"/>
+              </a:solidFill>
             </a:endParaRPr>
           </a:p>
         </p:txBody>
@@ -34632,7 +34890,7 @@
         <p:spPr>
           <a:xfrm>
             <a:off x="1296000" y="2105696"/>
-            <a:ext cx="9864000" cy="4279473"/>
+            <a:ext cx="9864000" cy="3632163"/>
           </a:xfrm>
         </p:spPr>
         <p:txBody>
@@ -34647,81 +34905,15 @@
               </a:spcAft>
             </a:pPr>
             <a:r>
-              <a:rPr lang="en-US" dirty="0"/>
-              <a:t>Why would you use </a:t>
-            </a:r>
-            <a:r>
-              <a:rPr lang="en-US" dirty="0">
-                <a:latin typeface="Courier New" panose="02070309020205020404" pitchFamily="49" charset="0"/>
-                <a:cs typeface="Courier New" panose="02070309020205020404" pitchFamily="49" charset="0"/>
-              </a:rPr>
-              <a:t>@Transactional </a:t>
-            </a:r>
-            <a:r>
-              <a:rPr lang="en-US" dirty="0"/>
-              <a:t>in a test?</a:t>
-            </a:r>
-          </a:p>
-          <a:p>
-            <a:pPr lvl="1">
-              <a:spcAft>
-                <a:spcPts val="600"/>
-              </a:spcAft>
-            </a:pPr>
-            <a:r>
-              <a:rPr lang="en-US" dirty="0"/>
-              <a:t>To clean up data and ensure a deterministic test suite.</a:t>
-            </a:r>
-          </a:p>
-          <a:p>
-            <a:pPr lvl="1">
-              <a:spcAft>
-                <a:spcPts val="600"/>
-              </a:spcAft>
-            </a:pPr>
-            <a:r>
-              <a:rPr lang="en-US" dirty="0"/>
-              <a:t>Behavior of </a:t>
-            </a:r>
-            <a:r>
-              <a:rPr lang="en-US" dirty="0">
-                <a:latin typeface="Courier New" panose="02070309020205020404" pitchFamily="49" charset="0"/>
-                <a:cs typeface="Courier New" panose="02070309020205020404" pitchFamily="49" charset="0"/>
-              </a:rPr>
-              <a:t>@Transactional </a:t>
-            </a:r>
-            <a:r>
-              <a:rPr lang="en-US" dirty="0"/>
-              <a:t>in tests = rollback</a:t>
-            </a:r>
-          </a:p>
-          <a:p>
-            <a:pPr lvl="2">
-              <a:spcAft>
-                <a:spcPts val="600"/>
-              </a:spcAft>
-            </a:pPr>
-            <a:r>
-              <a:rPr lang="en-US" dirty="0"/>
-              <a:t>In the Spring </a:t>
-            </a:r>
-            <a:r>
-              <a:rPr lang="en-US" dirty="0" err="1"/>
-              <a:t>TestContext</a:t>
-            </a:r>
-            <a:r>
-              <a:rPr lang="en-US" dirty="0"/>
-              <a:t> framework, transactions are managed by the </a:t>
-            </a:r>
-            <a:r>
-              <a:rPr lang="en-US" dirty="0" err="1">
-                <a:latin typeface="Courier New" panose="02070309020205020404" pitchFamily="49" charset="0"/>
-                <a:cs typeface="Courier New" panose="02070309020205020404" pitchFamily="49" charset="0"/>
-              </a:rPr>
-              <a:t>TransactionalTestExecutionListener</a:t>
-            </a:r>
-            <a:r>
-              <a:rPr lang="en-US" dirty="0"/>
+              <a:rPr lang="en-US" sz="2800" dirty="0"/>
+              <a:t>You can also eliminate entities by using </a:t>
+            </a:r>
+            <a:r>
+              <a:rPr lang="en-US" sz="2800" b="1" dirty="0"/>
+              <a:t>DTO projections</a:t>
+            </a:r>
+            <a:r>
+              <a:rPr lang="en-US" sz="2800" dirty="0"/>
               <a:t>.</a:t>
             </a:r>
           </a:p>
@@ -34732,126 +34924,30 @@
               </a:spcAft>
             </a:pPr>
             <a:r>
-              <a:rPr lang="en-US" dirty="0"/>
-              <a:t>What is the biggest problem when doing this?</a:t>
-            </a:r>
-          </a:p>
-          <a:p>
-            <a:pPr lvl="1">
-              <a:spcAft>
-                <a:spcPts val="600"/>
-              </a:spcAft>
-            </a:pPr>
-            <a:r>
-              <a:rPr lang="en-US" dirty="0"/>
-              <a:t>Using </a:t>
-            </a:r>
-            <a:r>
-              <a:rPr lang="en-US" dirty="0">
+              <a:rPr lang="en-US" sz="2800" dirty="0"/>
+              <a:t>Same result as using </a:t>
+            </a:r>
+            <a:r>
+              <a:rPr lang="en-US" sz="2800" dirty="0">
                 <a:latin typeface="Courier New" panose="02070309020205020404" pitchFamily="49" charset="0"/>
                 <a:cs typeface="Courier New" panose="02070309020205020404" pitchFamily="49" charset="0"/>
               </a:rPr>
-              <a:t>@Transactional </a:t>
-            </a:r>
-            <a:r>
-              <a:rPr lang="en-US" dirty="0"/>
-              <a:t>in tests is dangerous as it can hide production issues.</a:t>
-            </a:r>
-          </a:p>
-          <a:p>
-            <a:pPr>
-              <a:spcAft>
-                <a:spcPts val="600"/>
-              </a:spcAft>
-            </a:pPr>
-            <a:r>
-              <a:rPr lang="en-US" dirty="0"/>
-              <a:t>Solution:</a:t>
-            </a:r>
-          </a:p>
-          <a:p>
-            <a:pPr lvl="1">
-              <a:spcAft>
-                <a:spcPts val="600"/>
-              </a:spcAft>
-            </a:pPr>
-            <a:r>
-              <a:rPr lang="en-US" dirty="0"/>
-              <a:t>Clean up manually (</a:t>
-            </a:r>
-            <a:r>
-              <a:rPr lang="en-US" dirty="0">
-                <a:latin typeface="Courier New" panose="02070309020205020404" pitchFamily="49" charset="0"/>
+              <a:t>@Transactional(readOnly=true)</a:t>
+            </a:r>
+            <a:r>
+              <a:rPr lang="en-US" sz="2800" dirty="0">
+                <a:latin typeface="+mj-lt"/>
                 <a:cs typeface="Courier New" panose="02070309020205020404" pitchFamily="49" charset="0"/>
               </a:rPr>
-              <a:t>@AfterEach</a:t>
-            </a:r>
-            <a:r>
-              <a:rPr lang="en-US" dirty="0"/>
-              <a:t>).</a:t>
-            </a:r>
-          </a:p>
-          <a:p>
-            <a:pPr>
-              <a:spcAft>
-                <a:spcPts val="600"/>
-              </a:spcAft>
-            </a:pPr>
-            <a:endParaRPr lang="en-US" dirty="0"/>
+              <a:t> but allows you to only extract fields that are required.</a:t>
+            </a:r>
           </a:p>
         </p:txBody>
       </p:sp>
-      <p:pic>
-        <p:nvPicPr>
-          <p:cNvPr id="4" name="Picture 2" descr="22,947 Demo Foto's, Afbeeldingen en Stock Fotografie - 123RF">
-            <a:extLst>
-              <a:ext uri="{FF2B5EF4-FFF2-40B4-BE49-F238E27FC236}">
-                <a16:creationId xmlns:a16="http://schemas.microsoft.com/office/drawing/2014/main" id="{3078C261-1290-4C96-B0F3-7F5867671363}"/>
-              </a:ext>
-            </a:extLst>
-          </p:cNvPr>
-          <p:cNvPicPr>
-            <a:picLocks noChangeAspect="1" noChangeArrowheads="1"/>
-          </p:cNvPicPr>
-          <p:nvPr/>
-        </p:nvPicPr>
-        <p:blipFill>
-          <a:blip r:embed="rId2">
-            <a:extLst>
-              <a:ext uri="{28A0092B-C50C-407E-A947-70E740481C1C}">
-                <a14:useLocalDpi xmlns:a14="http://schemas.microsoft.com/office/drawing/2010/main" val="0"/>
-              </a:ext>
-            </a:extLst>
-          </a:blip>
-          <a:srcRect/>
-          <a:stretch>
-            <a:fillRect/>
-          </a:stretch>
-        </p:blipFill>
-        <p:spPr bwMode="auto">
-          <a:xfrm>
-            <a:off x="10059668" y="5661520"/>
-            <a:ext cx="1923011" cy="952959"/>
-          </a:xfrm>
-          <a:prstGeom prst="rect">
-            <a:avLst/>
-          </a:prstGeom>
-          <a:noFill/>
-          <a:extLst>
-            <a:ext uri="{909E8E84-426E-40DD-AFC4-6F175D3DCCD1}">
-              <a14:hiddenFill xmlns:a14="http://schemas.microsoft.com/office/drawing/2010/main">
-                <a:solidFill>
-                  <a:srgbClr val="FFFFFF"/>
-                </a:solidFill>
-              </a14:hiddenFill>
-            </a:ext>
-          </a:extLst>
-        </p:spPr>
-      </p:pic>
     </p:spTree>
     <p:extLst>
       <p:ext uri="{BB962C8B-B14F-4D97-AF65-F5344CB8AC3E}">
-        <p14:creationId xmlns:p14="http://schemas.microsoft.com/office/powerpoint/2010/main" val="3022796713"/>
+        <p14:creationId xmlns:p14="http://schemas.microsoft.com/office/powerpoint/2010/main" val="3366337949"/>
       </p:ext>
     </p:extLst>
   </p:cSld>
@@ -34896,8 +34992,8 @@
         </p:nvSpPr>
         <p:spPr>
           <a:xfrm>
-            <a:off x="1296000" y="719999"/>
-            <a:ext cx="9864000" cy="1057285"/>
+            <a:off x="1296000" y="720000"/>
+            <a:ext cx="9864000" cy="681480"/>
           </a:xfrm>
         </p:spPr>
         <p:txBody>
@@ -34907,13 +35003,10 @@
           <a:lstStyle/>
           <a:p>
             <a:r>
-              <a:rPr lang="en-US" dirty="0"/>
-              <a:t>Tip 4: Use bulk operations</a:t>
-            </a:r>
-            <a:endParaRPr lang="en-US" dirty="0">
-              <a:solidFill>
-                <a:srgbClr val="FF0000"/>
-              </a:solidFill>
+              <a:rPr lang="en-US" sz="3600" dirty="0"/>
+              <a:t>Tip 2: Read SQL logs</a:t>
+            </a:r>
+            <a:endParaRPr lang="en-US" sz="3600" dirty="0">
               <a:latin typeface="Courier New" panose="02070309020205020404" pitchFamily="49" charset="0"/>
               <a:cs typeface="Courier New" panose="02070309020205020404" pitchFamily="49" charset="0"/>
             </a:endParaRPr>
@@ -34944,7 +35037,7 @@
         </p:spPr>
         <p:txBody>
           <a:bodyPr>
-            <a:normAutofit/>
+            <a:normAutofit lnSpcReduction="10000"/>
           </a:bodyPr>
           <a:lstStyle/>
           <a:p>
@@ -34954,8 +35047,30 @@
               </a:spcAft>
             </a:pPr>
             <a:r>
-              <a:rPr lang="en-US" dirty="0"/>
-              <a:t>Anti-pattern: retrieving entities and updating/deleting them one by one.</a:t>
+              <a:rPr lang="en-US" sz="2800" dirty="0"/>
+              <a:t>Don’t use </a:t>
+            </a:r>
+            <a:r>
+              <a:rPr lang="en-US" sz="2800" dirty="0" err="1">
+                <a:latin typeface="Courier New" panose="02070309020205020404" pitchFamily="49" charset="0"/>
+                <a:cs typeface="Courier New" panose="02070309020205020404" pitchFamily="49" charset="0"/>
+              </a:rPr>
+              <a:t>hibernate.show_sql</a:t>
+            </a:r>
+            <a:endParaRPr lang="en-US" sz="2800" dirty="0">
+              <a:latin typeface="Courier New" panose="02070309020205020404" pitchFamily="49" charset="0"/>
+              <a:cs typeface="Courier New" panose="02070309020205020404" pitchFamily="49" charset="0"/>
+            </a:endParaRPr>
+          </a:p>
+          <a:p>
+            <a:pPr lvl="1">
+              <a:spcAft>
+                <a:spcPts val="600"/>
+              </a:spcAft>
+            </a:pPr>
+            <a:r>
+              <a:rPr lang="en-US" sz="2400" dirty="0"/>
+              <a:t>Statements are always logged to console.</a:t>
             </a:r>
           </a:p>
           <a:p>
@@ -34965,41 +35080,104 @@
               </a:spcAft>
             </a:pPr>
             <a:r>
-              <a:rPr lang="en-US" dirty="0"/>
-              <a:t>Try to create an update/delete query for all relevant rows.</a:t>
-            </a:r>
-          </a:p>
-          <a:p>
-            <a:pPr>
+              <a:rPr lang="en-US" sz="2800" dirty="0"/>
+              <a:t>Use the logging framework instead:</a:t>
+            </a:r>
+          </a:p>
+          <a:p>
+            <a:pPr marL="252000" lvl="1" indent="0">
               <a:spcAft>
                 <a:spcPts val="600"/>
               </a:spcAft>
-            </a:pPr>
-            <a:r>
-              <a:rPr lang="en-US" dirty="0"/>
-              <a:t>If not possible to write a general query: think about batch processing and Hibernate memory usage.</a:t>
-            </a:r>
-          </a:p>
-          <a:p>
-            <a:pPr lvl="1">
+              <a:buNone/>
+            </a:pPr>
+            <a:r>
+              <a:rPr lang="en-US" sz="2400" dirty="0">
+                <a:latin typeface="Courier New" panose="02070309020205020404" pitchFamily="49" charset="0"/>
+                <a:cs typeface="Courier New" panose="02070309020205020404" pitchFamily="49" charset="0"/>
+              </a:rPr>
+              <a:t>logging:</a:t>
+            </a:r>
+          </a:p>
+          <a:p>
+            <a:pPr marL="252000" lvl="1" indent="0">
               <a:spcAft>
                 <a:spcPts val="600"/>
               </a:spcAft>
-            </a:pPr>
-            <a:r>
-              <a:rPr lang="en-US" dirty="0">
-                <a:hlinkClick r:id="rId2"/>
-              </a:rPr>
-              <a:t>https://docs.jboss.org/hibernate/core/3.6/reference/en-US/html_single/#batch</a:t>
-            </a:r>
-            <a:endParaRPr lang="en-US" dirty="0"/>
+              <a:buNone/>
+            </a:pPr>
+            <a:r>
+              <a:rPr lang="en-US" sz="2400" dirty="0">
+                <a:latin typeface="Courier New" panose="02070309020205020404" pitchFamily="49" charset="0"/>
+                <a:cs typeface="Courier New" panose="02070309020205020404" pitchFamily="49" charset="0"/>
+              </a:rPr>
+              <a:t>  level:</a:t>
+            </a:r>
+          </a:p>
+          <a:p>
+            <a:pPr marL="252000" lvl="1" indent="0">
+              <a:spcAft>
+                <a:spcPts val="600"/>
+              </a:spcAft>
+              <a:buNone/>
+            </a:pPr>
+            <a:r>
+              <a:rPr lang="en-US" sz="2400" dirty="0">
+                <a:latin typeface="Courier New" panose="02070309020205020404" pitchFamily="49" charset="0"/>
+                <a:cs typeface="Courier New" panose="02070309020205020404" pitchFamily="49" charset="0"/>
+              </a:rPr>
+              <a:t>    </a:t>
+            </a:r>
+            <a:r>
+              <a:rPr lang="en-US" sz="2400" dirty="0" err="1">
+                <a:latin typeface="Courier New" panose="02070309020205020404" pitchFamily="49" charset="0"/>
+                <a:cs typeface="Courier New" panose="02070309020205020404" pitchFamily="49" charset="0"/>
+              </a:rPr>
+              <a:t>org.hibernate.SQL</a:t>
+            </a:r>
+            <a:r>
+              <a:rPr lang="en-US" sz="2400" dirty="0">
+                <a:latin typeface="Courier New" panose="02070309020205020404" pitchFamily="49" charset="0"/>
+                <a:cs typeface="Courier New" panose="02070309020205020404" pitchFamily="49" charset="0"/>
+              </a:rPr>
+              <a:t>: debug</a:t>
+            </a:r>
+          </a:p>
+          <a:p>
+            <a:pPr marL="252000" lvl="1" indent="0">
+              <a:spcAft>
+                <a:spcPts val="600"/>
+              </a:spcAft>
+              <a:buNone/>
+            </a:pPr>
+            <a:r>
+              <a:rPr lang="en-US" sz="2400" dirty="0">
+                <a:latin typeface="Courier New" panose="02070309020205020404" pitchFamily="49" charset="0"/>
+                <a:cs typeface="Courier New" panose="02070309020205020404" pitchFamily="49" charset="0"/>
+              </a:rPr>
+              <a:t>    </a:t>
+            </a:r>
+            <a:r>
+              <a:rPr lang="en-US" sz="2400" dirty="0" err="1">
+                <a:latin typeface="Courier New" panose="02070309020205020404" pitchFamily="49" charset="0"/>
+                <a:cs typeface="Courier New" panose="02070309020205020404" pitchFamily="49" charset="0"/>
+              </a:rPr>
+              <a:t>org.hibernate.type.descriptor.sql</a:t>
+            </a:r>
+            <a:r>
+              <a:rPr lang="en-US" sz="2400" dirty="0">
+                <a:latin typeface="Courier New" panose="02070309020205020404" pitchFamily="49" charset="0"/>
+                <a:cs typeface="Courier New" panose="02070309020205020404" pitchFamily="49" charset="0"/>
+              </a:rPr>
+              <a:t>: trace</a:t>
+            </a:r>
           </a:p>
         </p:txBody>
       </p:sp>
     </p:spTree>
     <p:extLst>
       <p:ext uri="{BB962C8B-B14F-4D97-AF65-F5344CB8AC3E}">
-        <p14:creationId xmlns:p14="http://schemas.microsoft.com/office/powerpoint/2010/main" val="3338901119"/>
+        <p14:creationId xmlns:p14="http://schemas.microsoft.com/office/powerpoint/2010/main" val="36027474"/>
       </p:ext>
     </p:extLst>
   </p:cSld>
@@ -35050,14 +35228,29 @@
         </p:spPr>
         <p:txBody>
           <a:bodyPr anchor="t">
-            <a:normAutofit fontScale="90000"/>
+            <a:normAutofit/>
           </a:bodyPr>
           <a:lstStyle/>
           <a:p>
             <a:r>
               <a:rPr lang="en-US" dirty="0"/>
-              <a:t>Tip 5: Avoid association fetching anti-patterns</a:t>
-            </a:r>
+              <a:t>Tip 3: Don’t use </a:t>
+            </a:r>
+            <a:r>
+              <a:rPr lang="en-US" dirty="0">
+                <a:latin typeface="Courier New" panose="02070309020205020404" pitchFamily="49" charset="0"/>
+                <a:cs typeface="Courier New" panose="02070309020205020404" pitchFamily="49" charset="0"/>
+              </a:rPr>
+              <a:t>@Transactional </a:t>
+            </a:r>
+            <a:r>
+              <a:rPr lang="en-US" dirty="0"/>
+              <a:t>in tests</a:t>
+            </a:r>
+            <a:endParaRPr lang="en-US" dirty="0">
+              <a:latin typeface="Courier New" panose="02070309020205020404" pitchFamily="49" charset="0"/>
+              <a:cs typeface="Courier New" panose="02070309020205020404" pitchFamily="49" charset="0"/>
+            </a:endParaRPr>
           </a:p>
         </p:txBody>
       </p:sp>
@@ -35080,7 +35273,7 @@
         <p:spPr>
           <a:xfrm>
             <a:off x="1296000" y="2105696"/>
-            <a:ext cx="9864000" cy="3632163"/>
+            <a:ext cx="9864000" cy="4279473"/>
           </a:xfrm>
         </p:spPr>
         <p:txBody>
@@ -35095,13 +35288,83 @@
               </a:spcAft>
             </a:pPr>
             <a:r>
-              <a:rPr lang="en-US" sz="2800" dirty="0"/>
-              <a:t>Open session in view</a:t>
-            </a:r>
-            <a:endParaRPr lang="en-US" sz="2800" dirty="0">
-              <a:latin typeface="Courier New" panose="02070309020205020404" pitchFamily="49" charset="0"/>
-              <a:cs typeface="Courier New" panose="02070309020205020404" pitchFamily="49" charset="0"/>
-            </a:endParaRPr>
+              <a:rPr lang="en-US" dirty="0"/>
+              <a:t>Why would you use </a:t>
+            </a:r>
+            <a:r>
+              <a:rPr lang="en-US" dirty="0">
+                <a:latin typeface="Courier New" panose="02070309020205020404" pitchFamily="49" charset="0"/>
+                <a:cs typeface="Courier New" panose="02070309020205020404" pitchFamily="49" charset="0"/>
+              </a:rPr>
+              <a:t>@Transactional </a:t>
+            </a:r>
+            <a:r>
+              <a:rPr lang="en-US" dirty="0"/>
+              <a:t>in a test?</a:t>
+            </a:r>
+          </a:p>
+          <a:p>
+            <a:pPr lvl="1">
+              <a:spcAft>
+                <a:spcPts val="600"/>
+              </a:spcAft>
+            </a:pPr>
+            <a:r>
+              <a:rPr lang="en-US" dirty="0"/>
+              <a:t>To clean up data and ensure a deterministic test suite.</a:t>
+            </a:r>
+          </a:p>
+          <a:p>
+            <a:pPr lvl="1">
+              <a:spcAft>
+                <a:spcPts val="600"/>
+              </a:spcAft>
+            </a:pPr>
+            <a:r>
+              <a:rPr lang="en-US" dirty="0"/>
+              <a:t>Behavior of </a:t>
+            </a:r>
+            <a:r>
+              <a:rPr lang="en-US" dirty="0">
+                <a:latin typeface="Courier New" panose="02070309020205020404" pitchFamily="49" charset="0"/>
+                <a:cs typeface="Courier New" panose="02070309020205020404" pitchFamily="49" charset="0"/>
+              </a:rPr>
+              <a:t>@Transactional </a:t>
+            </a:r>
+            <a:r>
+              <a:rPr lang="en-US" dirty="0"/>
+              <a:t>in tests = rollback</a:t>
+            </a:r>
+          </a:p>
+          <a:p>
+            <a:pPr lvl="2">
+              <a:spcAft>
+                <a:spcPts val="600"/>
+              </a:spcAft>
+            </a:pPr>
+            <a:r>
+              <a:rPr lang="en-US" dirty="0"/>
+              <a:t>In the Spring </a:t>
+            </a:r>
+            <a:r>
+              <a:rPr lang="en-US" dirty="0" err="1"/>
+              <a:t>TestContext</a:t>
+            </a:r>
+            <a:r>
+              <a:rPr lang="en-US" dirty="0"/>
+              <a:t> framework, transactions are managed by the </a:t>
+            </a:r>
+            <a:r>
+              <a:rPr lang="en-US" dirty="0" err="1">
+                <a:latin typeface="Courier New" panose="02070309020205020404" pitchFamily="49" charset="0"/>
+                <a:cs typeface="Courier New" panose="02070309020205020404" pitchFamily="49" charset="0"/>
+              </a:rPr>
+              <a:t>TransactionalTestExecutionListener</a:t>
+            </a:r>
+            <a:r>
+              <a:rPr lang="en-US" dirty="0"/>
+              <a:t>.</a:t>
+            </a:r>
           </a:p>
           <a:p>
             <a:pPr>
@@ -35110,16 +35373,31 @@
               </a:spcAft>
             </a:pPr>
             <a:r>
-              <a:rPr lang="en-US" sz="2800" dirty="0" err="1">
+              <a:rPr lang="en-US" dirty="0"/>
+              <a:t>What is the biggest problem when doing this?</a:t>
+            </a:r>
+          </a:p>
+          <a:p>
+            <a:pPr lvl="1">
+              <a:spcAft>
+                <a:spcPts val="600"/>
+              </a:spcAft>
+            </a:pPr>
+            <a:r>
+              <a:rPr lang="en-US" dirty="0"/>
+              <a:t>Using </a:t>
+            </a:r>
+            <a:r>
+              <a:rPr lang="en-US" dirty="0">
                 <a:latin typeface="Courier New" panose="02070309020205020404" pitchFamily="49" charset="0"/>
                 <a:cs typeface="Courier New" panose="02070309020205020404" pitchFamily="49" charset="0"/>
               </a:rPr>
-              <a:t>enable_lazy_load_no_trans</a:t>
-            </a:r>
-            <a:endParaRPr lang="en-US" sz="2800" dirty="0">
-              <a:latin typeface="Courier New" panose="02070309020205020404" pitchFamily="49" charset="0"/>
-              <a:cs typeface="Courier New" panose="02070309020205020404" pitchFamily="49" charset="0"/>
-            </a:endParaRPr>
+              <a:t>@Transactional </a:t>
+            </a:r>
+            <a:r>
+              <a:rPr lang="en-US" dirty="0"/>
+              <a:t>in tests is dangerous as it can hide production issues.</a:t>
+            </a:r>
           </a:p>
           <a:p>
             <a:pPr>
@@ -35128,16 +35406,31 @@
               </a:spcAft>
             </a:pPr>
             <a:r>
-              <a:rPr lang="en-US" sz="2800" dirty="0" err="1">
+              <a:rPr lang="en-US" dirty="0"/>
+              <a:t>Solution:</a:t>
+            </a:r>
+          </a:p>
+          <a:p>
+            <a:pPr lvl="1">
+              <a:spcAft>
+                <a:spcPts val="600"/>
+              </a:spcAft>
+            </a:pPr>
+            <a:r>
+              <a:rPr lang="en-US" dirty="0"/>
+              <a:t>Clean up manually (</a:t>
+            </a:r>
+            <a:r>
+              <a:rPr lang="en-US" dirty="0">
                 <a:latin typeface="Courier New" panose="02070309020205020404" pitchFamily="49" charset="0"/>
                 <a:cs typeface="Courier New" panose="02070309020205020404" pitchFamily="49" charset="0"/>
               </a:rPr>
-              <a:t>FetchType.EAGER</a:t>
-            </a:r>
-            <a:endParaRPr lang="en-US" sz="2800" dirty="0">
-              <a:latin typeface="Courier New" panose="02070309020205020404" pitchFamily="49" charset="0"/>
-              <a:cs typeface="Courier New" panose="02070309020205020404" pitchFamily="49" charset="0"/>
-            </a:endParaRPr>
+              <a:t>@AfterEach</a:t>
+            </a:r>
+            <a:r>
+              <a:rPr lang="en-US" dirty="0"/>
+              <a:t>).</a:t>
+            </a:r>
           </a:p>
           <a:p>
             <a:pPr>
@@ -35145,28 +35438,61 @@
                 <a:spcPts val="600"/>
               </a:spcAft>
             </a:pPr>
-            <a:r>
-              <a:rPr lang="en-US" sz="2800" dirty="0"/>
-              <a:t>Not using </a:t>
-            </a:r>
-            <a:r>
-              <a:rPr lang="en-US" sz="2800" dirty="0">
-                <a:latin typeface="Courier New" panose="02070309020205020404" pitchFamily="49" charset="0"/>
-                <a:cs typeface="Courier New" panose="02070309020205020404" pitchFamily="49" charset="0"/>
-              </a:rPr>
-              <a:t>JOIN FETCH </a:t>
-            </a:r>
-            <a:r>
-              <a:rPr lang="en-US" sz="2800" dirty="0"/>
-              <a:t>directive if necessary to avoid the N+1 problem.</a:t>
-            </a:r>
+            <a:endParaRPr lang="en-US" dirty="0"/>
           </a:p>
         </p:txBody>
       </p:sp>
+      <p:pic>
+        <p:nvPicPr>
+          <p:cNvPr id="4" name="Picture 2" descr="22,947 Demo Foto's, Afbeeldingen en Stock Fotografie - 123RF">
+            <a:extLst>
+              <a:ext uri="{FF2B5EF4-FFF2-40B4-BE49-F238E27FC236}">
+                <a16:creationId xmlns:a16="http://schemas.microsoft.com/office/drawing/2014/main" id="{3078C261-1290-4C96-B0F3-7F5867671363}"/>
+              </a:ext>
+            </a:extLst>
+          </p:cNvPr>
+          <p:cNvPicPr>
+            <a:picLocks noChangeAspect="1" noChangeArrowheads="1"/>
+          </p:cNvPicPr>
+          <p:nvPr/>
+        </p:nvPicPr>
+        <p:blipFill>
+          <a:blip r:embed="rId2">
+            <a:extLst>
+              <a:ext uri="{28A0092B-C50C-407E-A947-70E740481C1C}">
+                <a14:useLocalDpi xmlns:a14="http://schemas.microsoft.com/office/drawing/2010/main" val="0"/>
+              </a:ext>
+            </a:extLst>
+          </a:blip>
+          <a:srcRect/>
+          <a:stretch>
+            <a:fillRect/>
+          </a:stretch>
+        </p:blipFill>
+        <p:spPr bwMode="auto">
+          <a:xfrm>
+            <a:off x="10059668" y="5661520"/>
+            <a:ext cx="1923011" cy="952959"/>
+          </a:xfrm>
+          <a:prstGeom prst="rect">
+            <a:avLst/>
+          </a:prstGeom>
+          <a:noFill/>
+          <a:extLst>
+            <a:ext uri="{909E8E84-426E-40DD-AFC4-6F175D3DCCD1}">
+              <a14:hiddenFill xmlns:a14="http://schemas.microsoft.com/office/drawing/2010/main">
+                <a:solidFill>
+                  <a:srgbClr val="FFFFFF"/>
+                </a:solidFill>
+              </a14:hiddenFill>
+            </a:ext>
+          </a:extLst>
+        </p:spPr>
+      </p:pic>
     </p:spTree>
     <p:extLst>
       <p:ext uri="{BB962C8B-B14F-4D97-AF65-F5344CB8AC3E}">
-        <p14:creationId xmlns:p14="http://schemas.microsoft.com/office/powerpoint/2010/main" val="865283392"/>
+        <p14:creationId xmlns:p14="http://schemas.microsoft.com/office/powerpoint/2010/main" val="3022796713"/>
       </p:ext>
     </p:extLst>
   </p:cSld>
@@ -35405,20 +35731,27 @@
         </p:nvSpPr>
         <p:spPr>
           <a:xfrm>
-            <a:off x="1296000" y="720000"/>
-            <a:ext cx="9864000" cy="1165950"/>
+            <a:off x="1296000" y="719999"/>
+            <a:ext cx="9864000" cy="1057285"/>
           </a:xfrm>
         </p:spPr>
         <p:txBody>
           <a:bodyPr anchor="t">
-            <a:normAutofit fontScale="90000"/>
+            <a:normAutofit/>
           </a:bodyPr>
           <a:lstStyle/>
           <a:p>
             <a:r>
               <a:rPr lang="en-US" dirty="0"/>
-              <a:t>Tip 6: Use the same database system in your tests</a:t>
-            </a:r>
+              <a:t>Tip 4: Use bulk operations</a:t>
+            </a:r>
+            <a:endParaRPr lang="en-US" dirty="0">
+              <a:solidFill>
+                <a:srgbClr val="FF0000"/>
+              </a:solidFill>
+              <a:latin typeface="Courier New" panose="02070309020205020404" pitchFamily="49" charset="0"/>
+              <a:cs typeface="Courier New" panose="02070309020205020404" pitchFamily="49" charset="0"/>
+            </a:endParaRPr>
           </a:p>
         </p:txBody>
       </p:sp>
@@ -35456,16 +35789,8 @@
               </a:spcAft>
             </a:pPr>
             <a:r>
-              <a:rPr lang="en-US" sz="2800" dirty="0"/>
-              <a:t>No need for H2, use </a:t>
-            </a:r>
-            <a:r>
-              <a:rPr lang="en-US" sz="2800" i="1" dirty="0" err="1"/>
-              <a:t>Testcontainers</a:t>
-            </a:r>
-            <a:r>
-              <a:rPr lang="en-US" sz="2800" dirty="0"/>
-              <a:t> for integration tests.</a:t>
+              <a:rPr lang="en-US" dirty="0"/>
+              <a:t>Anti-pattern: retrieving entities and updating/deleting them one by one.</a:t>
             </a:r>
           </a:p>
           <a:p>
@@ -35475,8 +35800,8 @@
               </a:spcAft>
             </a:pPr>
             <a:r>
-              <a:rPr lang="en-US" sz="2800" dirty="0"/>
-              <a:t>Ensures that your tests are representative for production.</a:t>
+              <a:rPr lang="en-US" dirty="0"/>
+              <a:t>Try to create an update/delete query for all relevant rows.</a:t>
             </a:r>
           </a:p>
           <a:p>
@@ -35486,25 +35811,30 @@
               </a:spcAft>
             </a:pPr>
             <a:r>
-              <a:rPr lang="en-US" sz="2800" dirty="0"/>
-              <a:t>Allows you to use more database specific features.</a:t>
-            </a:r>
-          </a:p>
-          <a:p>
-            <a:pPr marL="0" indent="0">
+              <a:rPr lang="en-US" dirty="0"/>
+              <a:t>If not possible to write a general query: think about batch processing and Hibernate memory usage.</a:t>
+            </a:r>
+          </a:p>
+          <a:p>
+            <a:pPr lvl="1">
               <a:spcAft>
                 <a:spcPts val="600"/>
               </a:spcAft>
-              <a:buNone/>
-            </a:pPr>
-            <a:endParaRPr lang="en-US" sz="2800" dirty="0"/>
+            </a:pPr>
+            <a:r>
+              <a:rPr lang="en-US" dirty="0">
+                <a:hlinkClick r:id="rId2"/>
+              </a:rPr>
+              <a:t>https://docs.jboss.org/hibernate/core/3.6/reference/en-US/html_single/#batch</a:t>
+            </a:r>
+            <a:endParaRPr lang="en-US" dirty="0"/>
           </a:p>
         </p:txBody>
       </p:sp>
     </p:spTree>
     <p:extLst>
       <p:ext uri="{BB962C8B-B14F-4D97-AF65-F5344CB8AC3E}">
-        <p14:creationId xmlns:p14="http://schemas.microsoft.com/office/powerpoint/2010/main" val="2812624236"/>
+        <p14:creationId xmlns:p14="http://schemas.microsoft.com/office/powerpoint/2010/main" val="3338901119"/>
       </p:ext>
     </p:extLst>
   </p:cSld>
@@ -35561,18 +35891,7 @@
           <a:p>
             <a:r>
               <a:rPr lang="en-US" dirty="0"/>
-              <a:t>Tip 7: Understand </a:t>
-            </a:r>
-            <a:r>
-              <a:rPr lang="en-US" dirty="0">
-                <a:latin typeface="Courier New" panose="02070309020205020404" pitchFamily="49" charset="0"/>
-                <a:cs typeface="Courier New" panose="02070309020205020404" pitchFamily="49" charset="0"/>
-              </a:rPr>
-              <a:t>@Transactional </a:t>
-            </a:r>
-            <a:r>
-              <a:rPr lang="en-US" dirty="0"/>
-              <a:t>semantics</a:t>
+              <a:t>Tip 5: Avoid association fetching anti-patterns</a:t>
             </a:r>
           </a:p>
         </p:txBody>
@@ -35612,89 +35931,77 @@
             </a:pPr>
             <a:r>
               <a:rPr lang="en-US" sz="2800" dirty="0"/>
-              <a:t>Spot the problems:</a:t>
-            </a:r>
-          </a:p>
-          <a:p>
-            <a:pPr lvl="1">
+              <a:t>Open session in view</a:t>
+            </a:r>
+            <a:endParaRPr lang="en-US" sz="2800" dirty="0">
+              <a:latin typeface="Courier New" panose="02070309020205020404" pitchFamily="49" charset="0"/>
+              <a:cs typeface="Courier New" panose="02070309020205020404" pitchFamily="49" charset="0"/>
+            </a:endParaRPr>
+          </a:p>
+          <a:p>
+            <a:pPr>
               <a:spcAft>
                 <a:spcPts val="600"/>
               </a:spcAft>
             </a:pPr>
             <a:r>
-              <a:rPr lang="en-US" sz="2400" dirty="0"/>
-              <a:t>Demo: retrieve all comments</a:t>
-            </a:r>
-          </a:p>
-          <a:p>
-            <a:pPr lvl="1">
+              <a:rPr lang="en-US" sz="2800" dirty="0" err="1">
+                <a:latin typeface="Courier New" panose="02070309020205020404" pitchFamily="49" charset="0"/>
+                <a:cs typeface="Courier New" panose="02070309020205020404" pitchFamily="49" charset="0"/>
+              </a:rPr>
+              <a:t>enable_lazy_load_no_trans</a:t>
+            </a:r>
+            <a:endParaRPr lang="en-US" sz="2800" dirty="0">
+              <a:latin typeface="Courier New" panose="02070309020205020404" pitchFamily="49" charset="0"/>
+              <a:cs typeface="Courier New" panose="02070309020205020404" pitchFamily="49" charset="0"/>
+            </a:endParaRPr>
+          </a:p>
+          <a:p>
+            <a:pPr>
               <a:spcAft>
                 <a:spcPts val="600"/>
               </a:spcAft>
             </a:pPr>
             <a:r>
-              <a:rPr lang="en-US" sz="2400" dirty="0"/>
-              <a:t>Demo: give managers a raise</a:t>
-            </a:r>
-            <a:endParaRPr lang="en-US" sz="2400" dirty="0">
-              <a:solidFill>
-                <a:srgbClr val="FF0000"/>
-              </a:solidFill>
+              <a:rPr lang="en-US" sz="2800" dirty="0" err="1">
+                <a:latin typeface="Courier New" panose="02070309020205020404" pitchFamily="49" charset="0"/>
+                <a:cs typeface="Courier New" panose="02070309020205020404" pitchFamily="49" charset="0"/>
+              </a:rPr>
+              <a:t>FetchType.EAGER</a:t>
+            </a:r>
+            <a:endParaRPr lang="en-US" sz="2800" dirty="0">
+              <a:latin typeface="Courier New" panose="02070309020205020404" pitchFamily="49" charset="0"/>
+              <a:cs typeface="Courier New" panose="02070309020205020404" pitchFamily="49" charset="0"/>
             </a:endParaRPr>
+          </a:p>
+          <a:p>
+            <a:pPr>
+              <a:spcAft>
+                <a:spcPts val="600"/>
+              </a:spcAft>
+            </a:pPr>
+            <a:r>
+              <a:rPr lang="en-US" sz="2800" dirty="0"/>
+              <a:t>Not using </a:t>
+            </a:r>
+            <a:r>
+              <a:rPr lang="en-US" sz="2800" dirty="0">
+                <a:latin typeface="Courier New" panose="02070309020205020404" pitchFamily="49" charset="0"/>
+                <a:cs typeface="Courier New" panose="02070309020205020404" pitchFamily="49" charset="0"/>
+              </a:rPr>
+              <a:t>JOIN FETCH </a:t>
+            </a:r>
+            <a:r>
+              <a:rPr lang="en-US" sz="2800" dirty="0"/>
+              <a:t>directive if necessary to avoid the N+1 problem.</a:t>
+            </a:r>
           </a:p>
         </p:txBody>
       </p:sp>
-      <p:pic>
-        <p:nvPicPr>
-          <p:cNvPr id="4" name="Picture 2" descr="22,947 Demo Foto's, Afbeeldingen en Stock Fotografie - 123RF">
-            <a:extLst>
-              <a:ext uri="{FF2B5EF4-FFF2-40B4-BE49-F238E27FC236}">
-                <a16:creationId xmlns:a16="http://schemas.microsoft.com/office/drawing/2014/main" id="{87FF1B22-1B3E-4538-B78C-F1254AD75764}"/>
-              </a:ext>
-            </a:extLst>
-          </p:cNvPr>
-          <p:cNvPicPr>
-            <a:picLocks noChangeAspect="1" noChangeArrowheads="1"/>
-          </p:cNvPicPr>
-          <p:nvPr/>
-        </p:nvPicPr>
-        <p:blipFill>
-          <a:blip r:embed="rId2">
-            <a:extLst>
-              <a:ext uri="{28A0092B-C50C-407E-A947-70E740481C1C}">
-                <a14:useLocalDpi xmlns:a14="http://schemas.microsoft.com/office/drawing/2010/main" val="0"/>
-              </a:ext>
-            </a:extLst>
-          </a:blip>
-          <a:srcRect/>
-          <a:stretch>
-            <a:fillRect/>
-          </a:stretch>
-        </p:blipFill>
-        <p:spPr bwMode="auto">
-          <a:xfrm>
-            <a:off x="10059668" y="5661520"/>
-            <a:ext cx="1923011" cy="952959"/>
-          </a:xfrm>
-          <a:prstGeom prst="rect">
-            <a:avLst/>
-          </a:prstGeom>
-          <a:noFill/>
-          <a:extLst>
-            <a:ext uri="{909E8E84-426E-40DD-AFC4-6F175D3DCCD1}">
-              <a14:hiddenFill xmlns:a14="http://schemas.microsoft.com/office/drawing/2010/main">
-                <a:solidFill>
-                  <a:srgbClr val="FFFFFF"/>
-                </a:solidFill>
-              </a14:hiddenFill>
-            </a:ext>
-          </a:extLst>
-        </p:spPr>
-      </p:pic>
     </p:spTree>
     <p:extLst>
       <p:ext uri="{BB962C8B-B14F-4D97-AF65-F5344CB8AC3E}">
-        <p14:creationId xmlns:p14="http://schemas.microsoft.com/office/powerpoint/2010/main" val="730571193"/>
+        <p14:creationId xmlns:p14="http://schemas.microsoft.com/office/powerpoint/2010/main" val="865283392"/>
       </p:ext>
     </p:extLst>
   </p:cSld>
@@ -35740,7 +36047,7 @@
         <p:spPr>
           <a:xfrm>
             <a:off x="1296000" y="720000"/>
-            <a:ext cx="9864000" cy="681480"/>
+            <a:ext cx="9864000" cy="1165950"/>
           </a:xfrm>
         </p:spPr>
         <p:txBody>
@@ -35751,73 +36058,94 @@
           <a:p>
             <a:r>
               <a:rPr lang="en-US" dirty="0"/>
-              <a:t>Tip 7: Understand </a:t>
-            </a:r>
-            <a:r>
-              <a:rPr lang="en-US" dirty="0">
-                <a:latin typeface="Courier New" panose="02070309020205020404" pitchFamily="49" charset="0"/>
-                <a:cs typeface="Courier New" panose="02070309020205020404" pitchFamily="49" charset="0"/>
-              </a:rPr>
-              <a:t>@Transactional </a:t>
-            </a:r>
-            <a:r>
-              <a:rPr lang="en-US" dirty="0"/>
-              <a:t>semantics</a:t>
+              <a:t>Tip 6: Use the same database system in your tests</a:t>
             </a:r>
           </a:p>
         </p:txBody>
       </p:sp>
-      <p:pic>
-        <p:nvPicPr>
-          <p:cNvPr id="2050" name="Picture 2" descr="A beginner's guide to entity state transitions with JPA and Hibernate -  Vlad Mihalcea">
+      <p:sp>
+        <p:nvSpPr>
+          <p:cNvPr id="13" name="Text Placeholder 2">
             <a:extLst>
               <a:ext uri="{FF2B5EF4-FFF2-40B4-BE49-F238E27FC236}">
-                <a16:creationId xmlns:a16="http://schemas.microsoft.com/office/drawing/2014/main" id="{381D251D-9E80-43FA-9B7D-273D35E1892C}"/>
+                <a16:creationId xmlns:a16="http://schemas.microsoft.com/office/drawing/2014/main" id="{5AFACC08-6E7F-14DD-D1E6-54973126E7AF}"/>
               </a:ext>
             </a:extLst>
           </p:cNvPr>
-          <p:cNvPicPr>
-            <a:picLocks noChangeAspect="1" noChangeArrowheads="1"/>
-          </p:cNvPicPr>
-          <p:nvPr/>
-        </p:nvPicPr>
-        <p:blipFill>
-          <a:blip r:embed="rId2">
-            <a:extLst>
-              <a:ext uri="{28A0092B-C50C-407E-A947-70E740481C1C}">
-                <a14:useLocalDpi xmlns:a14="http://schemas.microsoft.com/office/drawing/2010/main" val="0"/>
-              </a:ext>
-            </a:extLst>
-          </a:blip>
-          <a:srcRect/>
-          <a:stretch>
-            <a:fillRect/>
-          </a:stretch>
-        </p:blipFill>
-        <p:spPr bwMode="auto">
+          <p:cNvSpPr>
+            <a:spLocks noGrp="1"/>
+          </p:cNvSpPr>
+          <p:nvPr>
+            <p:ph type="body" sz="quarter" idx="10"/>
+          </p:nvPr>
+        </p:nvSpPr>
+        <p:spPr>
           <a:xfrm>
-            <a:off x="2690812" y="2108869"/>
-            <a:ext cx="6810375" cy="4333875"/>
+            <a:off x="1296000" y="2105696"/>
+            <a:ext cx="9864000" cy="3632163"/>
           </a:xfrm>
-          <a:prstGeom prst="rect">
-            <a:avLst/>
-          </a:prstGeom>
-          <a:noFill/>
-          <a:extLst>
-            <a:ext uri="{909E8E84-426E-40DD-AFC4-6F175D3DCCD1}">
-              <a14:hiddenFill xmlns:a14="http://schemas.microsoft.com/office/drawing/2010/main">
-                <a:solidFill>
-                  <a:srgbClr val="FFFFFF"/>
-                </a:solidFill>
-              </a14:hiddenFill>
-            </a:ext>
-          </a:extLst>
         </p:spPr>
-      </p:pic>
+        <p:txBody>
+          <a:bodyPr>
+            <a:normAutofit/>
+          </a:bodyPr>
+          <a:lstStyle/>
+          <a:p>
+            <a:pPr>
+              <a:spcAft>
+                <a:spcPts val="600"/>
+              </a:spcAft>
+            </a:pPr>
+            <a:r>
+              <a:rPr lang="en-US" sz="2800" dirty="0"/>
+              <a:t>No need for H2, use </a:t>
+            </a:r>
+            <a:r>
+              <a:rPr lang="en-US" sz="2800" i="1" dirty="0" err="1"/>
+              <a:t>Testcontainers</a:t>
+            </a:r>
+            <a:r>
+              <a:rPr lang="en-US" sz="2800" dirty="0"/>
+              <a:t> for integration tests.</a:t>
+            </a:r>
+          </a:p>
+          <a:p>
+            <a:pPr>
+              <a:spcAft>
+                <a:spcPts val="600"/>
+              </a:spcAft>
+            </a:pPr>
+            <a:r>
+              <a:rPr lang="en-US" sz="2800" dirty="0"/>
+              <a:t>Ensures that your tests are representative for production.</a:t>
+            </a:r>
+          </a:p>
+          <a:p>
+            <a:pPr>
+              <a:spcAft>
+                <a:spcPts val="600"/>
+              </a:spcAft>
+            </a:pPr>
+            <a:r>
+              <a:rPr lang="en-US" sz="2800" dirty="0"/>
+              <a:t>Allows you to use more database specific features.</a:t>
+            </a:r>
+          </a:p>
+          <a:p>
+            <a:pPr marL="0" indent="0">
+              <a:spcAft>
+                <a:spcPts val="600"/>
+              </a:spcAft>
+              <a:buNone/>
+            </a:pPr>
+            <a:endParaRPr lang="en-US" sz="2800" dirty="0"/>
+          </a:p>
+        </p:txBody>
+      </p:sp>
     </p:spTree>
     <p:extLst>
       <p:ext uri="{BB962C8B-B14F-4D97-AF65-F5344CB8AC3E}">
-        <p14:creationId xmlns:p14="http://schemas.microsoft.com/office/powerpoint/2010/main" val="1820933201"/>
+        <p14:creationId xmlns:p14="http://schemas.microsoft.com/office/powerpoint/2010/main" val="2812624236"/>
       </p:ext>
     </p:extLst>
   </p:cSld>
@@ -35874,7 +36202,18 @@
           <a:p>
             <a:r>
               <a:rPr lang="en-US" dirty="0"/>
-              <a:t>Tip 8: Use DTOs in the web layer, not entities</a:t>
+              <a:t>Tip 7: Understand </a:t>
+            </a:r>
+            <a:r>
+              <a:rPr lang="en-US" dirty="0">
+                <a:latin typeface="Courier New" panose="02070309020205020404" pitchFamily="49" charset="0"/>
+                <a:cs typeface="Courier New" panose="02070309020205020404" pitchFamily="49" charset="0"/>
+              </a:rPr>
+              <a:t>@Transactional </a:t>
+            </a:r>
+            <a:r>
+              <a:rPr lang="en-US" dirty="0"/>
+              <a:t>semantics</a:t>
             </a:r>
           </a:p>
         </p:txBody>
@@ -35913,35 +36252,90 @@
               </a:spcAft>
             </a:pPr>
             <a:r>
-              <a:rPr lang="en-US" dirty="0"/>
-              <a:t>Always map entities to a </a:t>
-            </a:r>
-            <a:r>
-              <a:rPr lang="en-US" i="1" dirty="0"/>
-              <a:t>data transfer object </a:t>
-            </a:r>
-            <a:r>
-              <a:rPr lang="en-US" dirty="0"/>
-              <a:t>(DTO).</a:t>
-            </a:r>
-          </a:p>
-          <a:p>
-            <a:pPr>
+              <a:rPr lang="en-US" sz="2800" dirty="0"/>
+              <a:t>Spot the problems:</a:t>
+            </a:r>
+          </a:p>
+          <a:p>
+            <a:pPr lvl="1">
               <a:spcAft>
                 <a:spcPts val="600"/>
               </a:spcAft>
             </a:pPr>
             <a:r>
-              <a:rPr lang="en-US" dirty="0"/>
-              <a:t>Avoid security leaks and have a separation between the database model and the web model.</a:t>
-            </a:r>
+              <a:rPr lang="en-US" sz="2400" dirty="0"/>
+              <a:t>Demo: retrieve all comments</a:t>
+            </a:r>
+          </a:p>
+          <a:p>
+            <a:pPr lvl="1">
+              <a:spcAft>
+                <a:spcPts val="600"/>
+              </a:spcAft>
+            </a:pPr>
+            <a:r>
+              <a:rPr lang="en-US" sz="2400" dirty="0"/>
+              <a:t>Demo: give managers a raise</a:t>
+            </a:r>
+            <a:endParaRPr lang="en-US" sz="2400" dirty="0">
+              <a:solidFill>
+                <a:srgbClr val="FF0000"/>
+              </a:solidFill>
+            </a:endParaRPr>
           </a:p>
         </p:txBody>
       </p:sp>
+      <p:pic>
+        <p:nvPicPr>
+          <p:cNvPr id="4" name="Picture 2" descr="22,947 Demo Foto's, Afbeeldingen en Stock Fotografie - 123RF">
+            <a:extLst>
+              <a:ext uri="{FF2B5EF4-FFF2-40B4-BE49-F238E27FC236}">
+                <a16:creationId xmlns:a16="http://schemas.microsoft.com/office/drawing/2014/main" id="{87FF1B22-1B3E-4538-B78C-F1254AD75764}"/>
+              </a:ext>
+            </a:extLst>
+          </p:cNvPr>
+          <p:cNvPicPr>
+            <a:picLocks noChangeAspect="1" noChangeArrowheads="1"/>
+          </p:cNvPicPr>
+          <p:nvPr/>
+        </p:nvPicPr>
+        <p:blipFill>
+          <a:blip r:embed="rId2">
+            <a:extLst>
+              <a:ext uri="{28A0092B-C50C-407E-A947-70E740481C1C}">
+                <a14:useLocalDpi xmlns:a14="http://schemas.microsoft.com/office/drawing/2010/main" val="0"/>
+              </a:ext>
+            </a:extLst>
+          </a:blip>
+          <a:srcRect/>
+          <a:stretch>
+            <a:fillRect/>
+          </a:stretch>
+        </p:blipFill>
+        <p:spPr bwMode="auto">
+          <a:xfrm>
+            <a:off x="10059668" y="5661520"/>
+            <a:ext cx="1923011" cy="952959"/>
+          </a:xfrm>
+          <a:prstGeom prst="rect">
+            <a:avLst/>
+          </a:prstGeom>
+          <a:noFill/>
+          <a:extLst>
+            <a:ext uri="{909E8E84-426E-40DD-AFC4-6F175D3DCCD1}">
+              <a14:hiddenFill xmlns:a14="http://schemas.microsoft.com/office/drawing/2010/main">
+                <a:solidFill>
+                  <a:srgbClr val="FFFFFF"/>
+                </a:solidFill>
+              </a14:hiddenFill>
+            </a:ext>
+          </a:extLst>
+        </p:spPr>
+      </p:pic>
     </p:spTree>
     <p:extLst>
       <p:ext uri="{BB962C8B-B14F-4D97-AF65-F5344CB8AC3E}">
-        <p14:creationId xmlns:p14="http://schemas.microsoft.com/office/powerpoint/2010/main" val="3288774039"/>
+        <p14:creationId xmlns:p14="http://schemas.microsoft.com/office/powerpoint/2010/main" val="730571193"/>
       </p:ext>
     </p:extLst>
   </p:cSld>
@@ -35986,8 +36380,8 @@
         </p:nvSpPr>
         <p:spPr>
           <a:xfrm>
-            <a:off x="1296000" y="719999"/>
-            <a:ext cx="9864000" cy="1226031"/>
+            <a:off x="1296000" y="720000"/>
+            <a:ext cx="9864000" cy="681480"/>
           </a:xfrm>
         </p:spPr>
         <p:txBody>
@@ -35998,153 +36392,28 @@
           <a:p>
             <a:r>
               <a:rPr lang="en-US" dirty="0"/>
-              <a:t>Tip 9: Use </a:t>
-            </a:r>
-            <a:r>
-              <a:rPr lang="en-US" dirty="0" err="1">
-                <a:latin typeface="Courier New" panose="02070309020205020404" pitchFamily="49" charset="0"/>
-                <a:cs typeface="Courier New" panose="02070309020205020404" pitchFamily="49" charset="0"/>
-              </a:rPr>
-              <a:t>getReferenceById</a:t>
-            </a:r>
-            <a:r>
-              <a:rPr lang="en-US" dirty="0"/>
-              <a:t> instead of </a:t>
-            </a:r>
-            <a:r>
-              <a:rPr lang="en-US" dirty="0" err="1">
-                <a:latin typeface="Courier New" panose="02070309020205020404" pitchFamily="49" charset="0"/>
-                <a:cs typeface="Courier New" panose="02070309020205020404" pitchFamily="49" charset="0"/>
-              </a:rPr>
-              <a:t>findById</a:t>
-            </a:r>
-            <a:r>
-              <a:rPr lang="en-US" dirty="0"/>
-              <a:t> if you don’t need the entity contents</a:t>
-            </a:r>
-            <a:endParaRPr lang="en-US" dirty="0">
-              <a:latin typeface="Courier New" panose="02070309020205020404" pitchFamily="49" charset="0"/>
-              <a:cs typeface="Courier New" panose="02070309020205020404" pitchFamily="49" charset="0"/>
-            </a:endParaRPr>
-          </a:p>
-        </p:txBody>
-      </p:sp>
-      <p:sp>
-        <p:nvSpPr>
-          <p:cNvPr id="13" name="Text Placeholder 2">
-            <a:extLst>
-              <a:ext uri="{FF2B5EF4-FFF2-40B4-BE49-F238E27FC236}">
-                <a16:creationId xmlns:a16="http://schemas.microsoft.com/office/drawing/2014/main" id="{5AFACC08-6E7F-14DD-D1E6-54973126E7AF}"/>
-              </a:ext>
-            </a:extLst>
-          </p:cNvPr>
-          <p:cNvSpPr>
-            <a:spLocks noGrp="1"/>
-          </p:cNvSpPr>
-          <p:nvPr>
-            <p:ph type="body" sz="quarter" idx="10"/>
-          </p:nvPr>
-        </p:nvSpPr>
-        <p:spPr>
-          <a:xfrm>
-            <a:off x="1296000" y="2105696"/>
-            <a:ext cx="9864000" cy="3632163"/>
-          </a:xfrm>
-        </p:spPr>
-        <p:txBody>
-          <a:bodyPr>
-            <a:normAutofit/>
-          </a:bodyPr>
-          <a:lstStyle/>
-          <a:p>
-            <a:pPr>
-              <a:spcAft>
-                <a:spcPts val="600"/>
-              </a:spcAft>
-            </a:pPr>
-            <a:r>
-              <a:rPr lang="en-US" dirty="0" err="1">
-                <a:latin typeface="Courier New" panose="02070309020205020404" pitchFamily="49" charset="0"/>
-                <a:cs typeface="Courier New" panose="02070309020205020404" pitchFamily="49" charset="0"/>
-              </a:rPr>
-              <a:t>getReferenceById</a:t>
-            </a:r>
-            <a:r>
-              <a:rPr lang="en-US" dirty="0"/>
-              <a:t> returns a proxied </a:t>
-            </a:r>
-            <a:r>
-              <a:rPr lang="en-US" i="1" dirty="0"/>
-              <a:t>reference</a:t>
-            </a:r>
-            <a:r>
-              <a:rPr lang="en-US" dirty="0"/>
-              <a:t> to an entity, it doesn’t go to the database.</a:t>
-            </a:r>
-          </a:p>
-          <a:p>
-            <a:pPr>
-              <a:spcAft>
-                <a:spcPts val="600"/>
-              </a:spcAft>
-            </a:pPr>
-            <a:r>
-              <a:rPr lang="en-US" dirty="0"/>
-              <a:t>You can use getters on the proxied reference, but this triggers lazy loading.</a:t>
-            </a:r>
-          </a:p>
-          <a:p>
-            <a:pPr>
-              <a:spcAft>
-                <a:spcPts val="600"/>
-              </a:spcAft>
-            </a:pPr>
-            <a:r>
-              <a:rPr lang="en-US" dirty="0"/>
-              <a:t>Perfect when you only need the entity for establishing a relationship.</a:t>
-            </a:r>
-          </a:p>
-          <a:p>
-            <a:pPr lvl="1">
-              <a:spcAft>
-                <a:spcPts val="600"/>
-              </a:spcAft>
-            </a:pPr>
-            <a:r>
-              <a:rPr lang="en-US" dirty="0"/>
-              <a:t>Example: Inserting a </a:t>
-            </a:r>
-            <a:r>
-              <a:rPr lang="en-US" dirty="0" err="1">
-                <a:latin typeface="Courier New" panose="02070309020205020404" pitchFamily="49" charset="0"/>
-                <a:cs typeface="Courier New" panose="02070309020205020404" pitchFamily="49" charset="0"/>
-              </a:rPr>
-              <a:t>PostComment</a:t>
-            </a:r>
-            <a:r>
-              <a:rPr lang="en-US" dirty="0"/>
-              <a:t> for a </a:t>
+              <a:t>Tip 7: Understand </a:t>
             </a:r>
             <a:r>
               <a:rPr lang="en-US" dirty="0">
                 <a:latin typeface="Courier New" panose="02070309020205020404" pitchFamily="49" charset="0"/>
                 <a:cs typeface="Courier New" panose="02070309020205020404" pitchFamily="49" charset="0"/>
               </a:rPr>
-              <a:t>Post</a:t>
+              <a:t>@Transactional </a:t>
             </a:r>
             <a:r>
               <a:rPr lang="en-US" dirty="0"/>
-              <a:t>.</a:t>
+              <a:t>semantics</a:t>
             </a:r>
           </a:p>
         </p:txBody>
       </p:sp>
       <p:pic>
         <p:nvPicPr>
-          <p:cNvPr id="2" name="Picture 2" descr="22,947 Demo Foto's, Afbeeldingen en Stock Fotografie - 123RF">
+          <p:cNvPr id="2050" name="Picture 2" descr="A beginner's guide to entity state transitions with JPA and Hibernate -  Vlad Mihalcea">
             <a:extLst>
               <a:ext uri="{FF2B5EF4-FFF2-40B4-BE49-F238E27FC236}">
-                <a16:creationId xmlns:a16="http://schemas.microsoft.com/office/drawing/2014/main" id="{91D385B1-3DE8-9E8A-3E89-F4FC39CE1F93}"/>
+                <a16:creationId xmlns:a16="http://schemas.microsoft.com/office/drawing/2014/main" id="{381D251D-9E80-43FA-9B7D-273D35E1892C}"/>
               </a:ext>
             </a:extLst>
           </p:cNvPr>
@@ -36154,7 +36423,7 @@
           <p:nvPr/>
         </p:nvPicPr>
         <p:blipFill>
-          <a:blip r:embed="rId3">
+          <a:blip r:embed="rId2">
             <a:extLst>
               <a:ext uri="{28A0092B-C50C-407E-A947-70E740481C1C}">
                 <a14:useLocalDpi xmlns:a14="http://schemas.microsoft.com/office/drawing/2010/main" val="0"/>
@@ -36168,8 +36437,8 @@
         </p:blipFill>
         <p:spPr bwMode="auto">
           <a:xfrm>
-            <a:off x="10059668" y="5661520"/>
-            <a:ext cx="1923011" cy="952959"/>
+            <a:off x="2690812" y="2108869"/>
+            <a:ext cx="6810375" cy="4333875"/>
           </a:xfrm>
           <a:prstGeom prst="rect">
             <a:avLst/>
@@ -36189,7 +36458,7 @@
     </p:spTree>
     <p:extLst>
       <p:ext uri="{BB962C8B-B14F-4D97-AF65-F5344CB8AC3E}">
-        <p14:creationId xmlns:p14="http://schemas.microsoft.com/office/powerpoint/2010/main" val="2468397319"/>
+        <p14:creationId xmlns:p14="http://schemas.microsoft.com/office/powerpoint/2010/main" val="1820933201"/>
       </p:ext>
     </p:extLst>
   </p:cSld>
@@ -36240,68 +36509,80 @@
         </p:spPr>
         <p:txBody>
           <a:bodyPr anchor="t">
+            <a:normAutofit fontScale="90000"/>
+          </a:bodyPr>
+          <a:lstStyle/>
+          <a:p>
+            <a:r>
+              <a:rPr lang="en-US" dirty="0"/>
+              <a:t>Tip 8: Use DTOs in the web layer, not entities</a:t>
+            </a:r>
+          </a:p>
+        </p:txBody>
+      </p:sp>
+      <p:sp>
+        <p:nvSpPr>
+          <p:cNvPr id="13" name="Text Placeholder 2">
+            <a:extLst>
+              <a:ext uri="{FF2B5EF4-FFF2-40B4-BE49-F238E27FC236}">
+                <a16:creationId xmlns:a16="http://schemas.microsoft.com/office/drawing/2014/main" id="{5AFACC08-6E7F-14DD-D1E6-54973126E7AF}"/>
+              </a:ext>
+            </a:extLst>
+          </p:cNvPr>
+          <p:cNvSpPr>
+            <a:spLocks noGrp="1"/>
+          </p:cNvSpPr>
+          <p:nvPr>
+            <p:ph type="body" sz="quarter" idx="10"/>
+          </p:nvPr>
+        </p:nvSpPr>
+        <p:spPr>
+          <a:xfrm>
+            <a:off x="1296000" y="2105696"/>
+            <a:ext cx="9864000" cy="3632163"/>
+          </a:xfrm>
+        </p:spPr>
+        <p:txBody>
+          <a:bodyPr>
             <a:normAutofit/>
           </a:bodyPr>
           <a:lstStyle/>
           <a:p>
+            <a:pPr>
+              <a:spcAft>
+                <a:spcPts val="600"/>
+              </a:spcAft>
+            </a:pPr>
             <a:r>
               <a:rPr lang="en-US" dirty="0"/>
-              <a:t>Tip 10: Don’t trust Stack Overflow blindly</a:t>
+              <a:t>Always map entities to a </a:t>
+            </a:r>
+            <a:r>
+              <a:rPr lang="en-US" i="1" dirty="0"/>
+              <a:t>data transfer object </a:t>
+            </a:r>
+            <a:r>
+              <a:rPr lang="en-US" dirty="0"/>
+              <a:t>(DTO).</a:t>
+            </a:r>
+          </a:p>
+          <a:p>
+            <a:pPr>
+              <a:spcAft>
+                <a:spcPts val="600"/>
+              </a:spcAft>
+            </a:pPr>
+            <a:r>
+              <a:rPr lang="en-US" dirty="0"/>
+              <a:t>Avoid security leaks and have a separation between the database model and the web model.</a:t>
             </a:r>
           </a:p>
         </p:txBody>
       </p:sp>
-      <p:pic>
-        <p:nvPicPr>
-          <p:cNvPr id="1026" name="Picture 2" descr="25 More StackOverflow Programming Memes That All Devs Can Relate To | by  Sheetal | JavaScript in Plain English">
-            <a:extLst>
-              <a:ext uri="{FF2B5EF4-FFF2-40B4-BE49-F238E27FC236}">
-                <a16:creationId xmlns:a16="http://schemas.microsoft.com/office/drawing/2014/main" id="{7E158610-EAEB-45B5-58B8-E63CBFCCC40C}"/>
-              </a:ext>
-            </a:extLst>
-          </p:cNvPr>
-          <p:cNvPicPr>
-            <a:picLocks noChangeAspect="1" noChangeArrowheads="1"/>
-          </p:cNvPicPr>
-          <p:nvPr/>
-        </p:nvPicPr>
-        <p:blipFill>
-          <a:blip r:embed="rId2">
-            <a:extLst>
-              <a:ext uri="{28A0092B-C50C-407E-A947-70E740481C1C}">
-                <a14:useLocalDpi xmlns:a14="http://schemas.microsoft.com/office/drawing/2010/main" val="0"/>
-              </a:ext>
-            </a:extLst>
-          </a:blip>
-          <a:srcRect/>
-          <a:stretch>
-            <a:fillRect/>
-          </a:stretch>
-        </p:blipFill>
-        <p:spPr bwMode="auto">
-          <a:xfrm>
-            <a:off x="4125156" y="1734397"/>
-            <a:ext cx="3941687" cy="4403603"/>
-          </a:xfrm>
-          <a:prstGeom prst="rect">
-            <a:avLst/>
-          </a:prstGeom>
-          <a:noFill/>
-          <a:extLst>
-            <a:ext uri="{909E8E84-426E-40DD-AFC4-6F175D3DCCD1}">
-              <a14:hiddenFill xmlns:a14="http://schemas.microsoft.com/office/drawing/2010/main">
-                <a:solidFill>
-                  <a:srgbClr val="FFFFFF"/>
-                </a:solidFill>
-              </a14:hiddenFill>
-            </a:ext>
-          </a:extLst>
-        </p:spPr>
-      </p:pic>
     </p:spTree>
     <p:extLst>
       <p:ext uri="{BB962C8B-B14F-4D97-AF65-F5344CB8AC3E}">
-        <p14:creationId xmlns:p14="http://schemas.microsoft.com/office/powerpoint/2010/main" val="3263293339"/>
+        <p14:creationId xmlns:p14="http://schemas.microsoft.com/office/powerpoint/2010/main" val="3288774039"/>
       </p:ext>
     </p:extLst>
   </p:cSld>
@@ -36346,29 +36627,55 @@
         </p:nvSpPr>
         <p:spPr>
           <a:xfrm>
-            <a:off x="1296000" y="720000"/>
-            <a:ext cx="9864000" cy="681480"/>
+            <a:off x="1296000" y="719999"/>
+            <a:ext cx="9864000" cy="1226031"/>
           </a:xfrm>
         </p:spPr>
         <p:txBody>
           <a:bodyPr anchor="t">
-            <a:normAutofit/>
+            <a:normAutofit fontScale="90000"/>
           </a:bodyPr>
           <a:lstStyle/>
           <a:p>
             <a:r>
               <a:rPr lang="en-US" dirty="0"/>
-              <a:t>In conclusion…</a:t>
-            </a:r>
+              <a:t>Tip 9: Use </a:t>
+            </a:r>
+            <a:r>
+              <a:rPr lang="en-US" dirty="0" err="1">
+                <a:latin typeface="Courier New" panose="02070309020205020404" pitchFamily="49" charset="0"/>
+                <a:cs typeface="Courier New" panose="02070309020205020404" pitchFamily="49" charset="0"/>
+              </a:rPr>
+              <a:t>getReferenceById</a:t>
+            </a:r>
+            <a:r>
+              <a:rPr lang="en-US" dirty="0"/>
+              <a:t> instead of </a:t>
+            </a:r>
+            <a:r>
+              <a:rPr lang="en-US" dirty="0" err="1">
+                <a:latin typeface="Courier New" panose="02070309020205020404" pitchFamily="49" charset="0"/>
+                <a:cs typeface="Courier New" panose="02070309020205020404" pitchFamily="49" charset="0"/>
+              </a:rPr>
+              <a:t>findById</a:t>
+            </a:r>
+            <a:r>
+              <a:rPr lang="en-US" dirty="0"/>
+              <a:t> if you don’t need the entity contents</a:t>
+            </a:r>
+            <a:endParaRPr lang="en-US" dirty="0">
+              <a:latin typeface="Courier New" panose="02070309020205020404" pitchFamily="49" charset="0"/>
+              <a:cs typeface="Courier New" panose="02070309020205020404" pitchFamily="49" charset="0"/>
+            </a:endParaRPr>
           </a:p>
         </p:txBody>
       </p:sp>
       <p:sp>
         <p:nvSpPr>
-          <p:cNvPr id="2" name="Text Placeholder 2">
+          <p:cNvPr id="13" name="Text Placeholder 2">
             <a:extLst>
               <a:ext uri="{FF2B5EF4-FFF2-40B4-BE49-F238E27FC236}">
-                <a16:creationId xmlns:a16="http://schemas.microsoft.com/office/drawing/2014/main" id="{E76B2B10-35AE-700A-1739-C269C75E032B}"/>
+                <a16:creationId xmlns:a16="http://schemas.microsoft.com/office/drawing/2014/main" id="{5AFACC08-6E7F-14DD-D1E6-54973126E7AF}"/>
               </a:ext>
             </a:extLst>
           </p:cNvPr>
@@ -36381,8 +36688,8 @@
         </p:nvSpPr>
         <p:spPr>
           <a:xfrm>
-            <a:off x="753036" y="1734397"/>
-            <a:ext cx="11037346" cy="4494281"/>
+            <a:off x="1296000" y="2105696"/>
+            <a:ext cx="9864000" cy="3632163"/>
           </a:xfrm>
         </p:spPr>
         <p:txBody>
@@ -36397,8 +36704,23 @@
               </a:spcAft>
             </a:pPr>
             <a:r>
-              <a:rPr lang="en-US" sz="2800" dirty="0"/>
-              <a:t>All my advice is a nuanced story…</a:t>
+              <a:rPr lang="en-US" dirty="0" err="1">
+                <a:latin typeface="Courier New" panose="02070309020205020404" pitchFamily="49" charset="0"/>
+                <a:cs typeface="Courier New" panose="02070309020205020404" pitchFamily="49" charset="0"/>
+              </a:rPr>
+              <a:t>getReferenceById</a:t>
+            </a:r>
+            <a:r>
+              <a:rPr lang="en-US" dirty="0"/>
+              <a:t> returns a proxied </a:t>
+            </a:r>
+            <a:r>
+              <a:rPr lang="en-US" i="1" dirty="0"/>
+              <a:t>reference</a:t>
+            </a:r>
+            <a:r>
+              <a:rPr lang="en-US" dirty="0"/>
+              <a:t> to an entity, it doesn’t go to the database.</a:t>
             </a:r>
           </a:p>
           <a:p>
@@ -36408,8 +36730,8 @@
               </a:spcAft>
             </a:pPr>
             <a:r>
-              <a:rPr lang="en-US" sz="2800" dirty="0"/>
-              <a:t>Important to realize that using JPA comes with a performance impact.</a:t>
+              <a:rPr lang="en-US" dirty="0"/>
+              <a:t>You can use getters on the proxied reference, but this triggers lazy loading.</a:t>
             </a:r>
           </a:p>
           <a:p>
@@ -36419,27 +36741,96 @@
               </a:spcAft>
             </a:pPr>
             <a:r>
-              <a:rPr lang="en-US" sz="2800" dirty="0"/>
-              <a:t>Don’t be afraid to utilize JPA!</a:t>
-            </a:r>
-          </a:p>
-          <a:p>
-            <a:pPr>
+              <a:rPr lang="en-US" dirty="0"/>
+              <a:t>Perfect when you only need the entity for establishing a relationship.</a:t>
+            </a:r>
+          </a:p>
+          <a:p>
+            <a:pPr lvl="1">
               <a:spcAft>
                 <a:spcPts val="600"/>
               </a:spcAft>
             </a:pPr>
             <a:r>
-              <a:rPr lang="en-US" sz="2800" dirty="0"/>
-              <a:t>Awareness is the most important: know what JPA does for you behind the scenes.</a:t>
+              <a:rPr lang="en-US" dirty="0"/>
+              <a:t>Example: Inserting a </a:t>
+            </a:r>
+            <a:r>
+              <a:rPr lang="en-US" dirty="0" err="1">
+                <a:latin typeface="Courier New" panose="02070309020205020404" pitchFamily="49" charset="0"/>
+                <a:cs typeface="Courier New" panose="02070309020205020404" pitchFamily="49" charset="0"/>
+              </a:rPr>
+              <a:t>PostComment</a:t>
+            </a:r>
+            <a:r>
+              <a:rPr lang="en-US" dirty="0"/>
+              <a:t> for a </a:t>
+            </a:r>
+            <a:r>
+              <a:rPr lang="en-US" dirty="0">
+                <a:latin typeface="Courier New" panose="02070309020205020404" pitchFamily="49" charset="0"/>
+                <a:cs typeface="Courier New" panose="02070309020205020404" pitchFamily="49" charset="0"/>
+              </a:rPr>
+              <a:t>Post</a:t>
+            </a:r>
+            <a:r>
+              <a:rPr lang="en-US" dirty="0"/>
+              <a:t>.</a:t>
             </a:r>
           </a:p>
         </p:txBody>
       </p:sp>
+      <p:pic>
+        <p:nvPicPr>
+          <p:cNvPr id="2" name="Picture 2" descr="22,947 Demo Foto's, Afbeeldingen en Stock Fotografie - 123RF">
+            <a:extLst>
+              <a:ext uri="{FF2B5EF4-FFF2-40B4-BE49-F238E27FC236}">
+                <a16:creationId xmlns:a16="http://schemas.microsoft.com/office/drawing/2014/main" id="{91D385B1-3DE8-9E8A-3E89-F4FC39CE1F93}"/>
+              </a:ext>
+            </a:extLst>
+          </p:cNvPr>
+          <p:cNvPicPr>
+            <a:picLocks noChangeAspect="1" noChangeArrowheads="1"/>
+          </p:cNvPicPr>
+          <p:nvPr/>
+        </p:nvPicPr>
+        <p:blipFill>
+          <a:blip r:embed="rId3">
+            <a:extLst>
+              <a:ext uri="{28A0092B-C50C-407E-A947-70E740481C1C}">
+                <a14:useLocalDpi xmlns:a14="http://schemas.microsoft.com/office/drawing/2010/main" val="0"/>
+              </a:ext>
+            </a:extLst>
+          </a:blip>
+          <a:srcRect/>
+          <a:stretch>
+            <a:fillRect/>
+          </a:stretch>
+        </p:blipFill>
+        <p:spPr bwMode="auto">
+          <a:xfrm>
+            <a:off x="10059668" y="5661520"/>
+            <a:ext cx="1923011" cy="952959"/>
+          </a:xfrm>
+          <a:prstGeom prst="rect">
+            <a:avLst/>
+          </a:prstGeom>
+          <a:noFill/>
+          <a:extLst>
+            <a:ext uri="{909E8E84-426E-40DD-AFC4-6F175D3DCCD1}">
+              <a14:hiddenFill xmlns:a14="http://schemas.microsoft.com/office/drawing/2010/main">
+                <a:solidFill>
+                  <a:srgbClr val="FFFFFF"/>
+                </a:solidFill>
+              </a14:hiddenFill>
+            </a:ext>
+          </a:extLst>
+        </p:spPr>
+      </p:pic>
     </p:spTree>
     <p:extLst>
       <p:ext uri="{BB962C8B-B14F-4D97-AF65-F5344CB8AC3E}">
-        <p14:creationId xmlns:p14="http://schemas.microsoft.com/office/powerpoint/2010/main" val="658915625"/>
+        <p14:creationId xmlns:p14="http://schemas.microsoft.com/office/powerpoint/2010/main" val="2468397319"/>
       </p:ext>
     </p:extLst>
   </p:cSld>
@@ -36468,10 +36859,10 @@
       </p:grpSpPr>
       <p:sp>
         <p:nvSpPr>
-          <p:cNvPr id="10" name="Title 2">
+          <p:cNvPr id="11" name="Title 1">
             <a:extLst>
               <a:ext uri="{FF2B5EF4-FFF2-40B4-BE49-F238E27FC236}">
-                <a16:creationId xmlns:a16="http://schemas.microsoft.com/office/drawing/2014/main" id="{49AB3702-1810-764C-3BE9-C338CDB6A62F}"/>
+                <a16:creationId xmlns:a16="http://schemas.microsoft.com/office/drawing/2014/main" id="{51612DA1-DB43-7E72-A4EA-4B95C807605F}"/>
               </a:ext>
             </a:extLst>
           </p:cNvPr>
@@ -36484,8 +36875,8 @@
         </p:nvSpPr>
         <p:spPr>
           <a:xfrm>
-            <a:off x="792000" y="1324801"/>
-            <a:ext cx="10165560" cy="2358200"/>
+            <a:off x="1296000" y="720000"/>
+            <a:ext cx="9864000" cy="681480"/>
           </a:xfrm>
         </p:spPr>
         <p:txBody>
@@ -36496,19 +36887,62 @@
           <a:p>
             <a:r>
               <a:rPr lang="en-US" dirty="0"/>
-              <a:t>Further resources</a:t>
-            </a:r>
-            <a:endParaRPr lang="en-US" dirty="0">
-              <a:latin typeface="Courier New" panose="02070309020205020404" pitchFamily="49" charset="0"/>
-              <a:cs typeface="Courier New" panose="02070309020205020404" pitchFamily="49" charset="0"/>
-            </a:endParaRPr>
+              <a:t>Tip 10: Don’t trust Stack Overflow blindly</a:t>
+            </a:r>
           </a:p>
         </p:txBody>
       </p:sp>
+      <p:pic>
+        <p:nvPicPr>
+          <p:cNvPr id="1026" name="Picture 2" descr="25 More StackOverflow Programming Memes That All Devs Can Relate To | by  Sheetal | JavaScript in Plain English">
+            <a:extLst>
+              <a:ext uri="{FF2B5EF4-FFF2-40B4-BE49-F238E27FC236}">
+                <a16:creationId xmlns:a16="http://schemas.microsoft.com/office/drawing/2014/main" id="{7E158610-EAEB-45B5-58B8-E63CBFCCC40C}"/>
+              </a:ext>
+            </a:extLst>
+          </p:cNvPr>
+          <p:cNvPicPr>
+            <a:picLocks noChangeAspect="1" noChangeArrowheads="1"/>
+          </p:cNvPicPr>
+          <p:nvPr/>
+        </p:nvPicPr>
+        <p:blipFill>
+          <a:blip r:embed="rId2">
+            <a:extLst>
+              <a:ext uri="{28A0092B-C50C-407E-A947-70E740481C1C}">
+                <a14:useLocalDpi xmlns:a14="http://schemas.microsoft.com/office/drawing/2010/main" val="0"/>
+              </a:ext>
+            </a:extLst>
+          </a:blip>
+          <a:srcRect/>
+          <a:stretch>
+            <a:fillRect/>
+          </a:stretch>
+        </p:blipFill>
+        <p:spPr bwMode="auto">
+          <a:xfrm>
+            <a:off x="4125156" y="1734397"/>
+            <a:ext cx="3941687" cy="4403603"/>
+          </a:xfrm>
+          <a:prstGeom prst="rect">
+            <a:avLst/>
+          </a:prstGeom>
+          <a:noFill/>
+          <a:extLst>
+            <a:ext uri="{909E8E84-426E-40DD-AFC4-6F175D3DCCD1}">
+              <a14:hiddenFill xmlns:a14="http://schemas.microsoft.com/office/drawing/2010/main">
+                <a:solidFill>
+                  <a:srgbClr val="FFFFFF"/>
+                </a:solidFill>
+              </a14:hiddenFill>
+            </a:ext>
+          </a:extLst>
+        </p:spPr>
+      </p:pic>
     </p:spTree>
     <p:extLst>
       <p:ext uri="{BB962C8B-B14F-4D97-AF65-F5344CB8AC3E}">
-        <p14:creationId xmlns:p14="http://schemas.microsoft.com/office/powerpoint/2010/main" val="540281930"/>
+        <p14:creationId xmlns:p14="http://schemas.microsoft.com/office/powerpoint/2010/main" val="3263293339"/>
       </p:ext>
     </p:extLst>
   </p:cSld>
@@ -36565,7 +36999,7 @@
           <a:p>
             <a:r>
               <a:rPr lang="en-US" dirty="0"/>
-              <a:t>Slides and demos</a:t>
+              <a:t>In conclusion…</a:t>
             </a:r>
           </a:p>
         </p:txBody>
@@ -36605,7 +37039,7 @@
             </a:pPr>
             <a:r>
               <a:rPr lang="en-US" sz="2800" dirty="0"/>
-              <a:t>Slides and demos are available on GitHub.</a:t>
+              <a:t>All my advice is a nuanced story…</a:t>
             </a:r>
           </a:p>
           <a:p>
@@ -36615,19 +37049,38 @@
               </a:spcAft>
             </a:pPr>
             <a:r>
-              <a:rPr lang="en-US" sz="2800" dirty="0">
-                <a:hlinkClick r:id="rId2"/>
-              </a:rPr>
-              <a:t>https://github.com/raoulvdberge/jpa-with-hibernate</a:t>
-            </a:r>
-            <a:endParaRPr lang="en-US" sz="2800" dirty="0"/>
+              <a:rPr lang="en-US" sz="2800" dirty="0"/>
+              <a:t>Important to realize that using JPA comes with a performance impact.</a:t>
+            </a:r>
+          </a:p>
+          <a:p>
+            <a:pPr>
+              <a:spcAft>
+                <a:spcPts val="600"/>
+              </a:spcAft>
+            </a:pPr>
+            <a:r>
+              <a:rPr lang="en-US" sz="2800" dirty="0"/>
+              <a:t>Don’t be afraid to utilize JPA!</a:t>
+            </a:r>
+          </a:p>
+          <a:p>
+            <a:pPr>
+              <a:spcAft>
+                <a:spcPts val="600"/>
+              </a:spcAft>
+            </a:pPr>
+            <a:r>
+              <a:rPr lang="en-US" sz="2800" dirty="0"/>
+              <a:t>Awareness is the most important: know what JPA does for you behind the scenes.</a:t>
+            </a:r>
           </a:p>
         </p:txBody>
       </p:sp>
     </p:spTree>
     <p:extLst>
       <p:ext uri="{BB962C8B-B14F-4D97-AF65-F5344CB8AC3E}">
-        <p14:creationId xmlns:p14="http://schemas.microsoft.com/office/powerpoint/2010/main" val="4123513284"/>
+        <p14:creationId xmlns:p14="http://schemas.microsoft.com/office/powerpoint/2010/main" val="658915625"/>
       </p:ext>
     </p:extLst>
   </p:cSld>
@@ -36656,10 +37109,10 @@
       </p:grpSpPr>
       <p:sp>
         <p:nvSpPr>
-          <p:cNvPr id="8" name="Title 1">
+          <p:cNvPr id="10" name="Title 2">
             <a:extLst>
               <a:ext uri="{FF2B5EF4-FFF2-40B4-BE49-F238E27FC236}">
-                <a16:creationId xmlns:a16="http://schemas.microsoft.com/office/drawing/2014/main" id="{280C1126-AE06-6F45-5C34-548D61239155}"/>
+                <a16:creationId xmlns:a16="http://schemas.microsoft.com/office/drawing/2014/main" id="{49AB3702-1810-764C-3BE9-C338CDB6A62F}"/>
               </a:ext>
             </a:extLst>
           </p:cNvPr>
@@ -36670,159 +37123,33 @@
             <p:ph type="title"/>
           </p:nvPr>
         </p:nvSpPr>
-        <p:spPr/>
-        <p:txBody>
-          <a:bodyPr/>
-          <a:lstStyle/>
-          <a:p>
-            <a:r>
-              <a:rPr lang="en-US" dirty="0"/>
-              <a:t>Further resources</a:t>
-            </a:r>
-          </a:p>
-        </p:txBody>
-      </p:sp>
-      <p:sp>
-        <p:nvSpPr>
-          <p:cNvPr id="10" name="Text Placeholder 2">
-            <a:extLst>
-              <a:ext uri="{FF2B5EF4-FFF2-40B4-BE49-F238E27FC236}">
-                <a16:creationId xmlns:a16="http://schemas.microsoft.com/office/drawing/2014/main" id="{7A69C3A1-EA48-682D-2DD6-89FB1C344D1E}"/>
-              </a:ext>
-            </a:extLst>
-          </p:cNvPr>
-          <p:cNvSpPr>
-            <a:spLocks noGrp="1"/>
-          </p:cNvSpPr>
-          <p:nvPr>
-            <p:ph type="body" sz="quarter" idx="10"/>
-          </p:nvPr>
-        </p:nvSpPr>
         <p:spPr>
           <a:xfrm>
-            <a:off x="1296000" y="1612154"/>
-            <a:ext cx="9864000" cy="4541108"/>
+            <a:off x="792000" y="1324801"/>
+            <a:ext cx="10165560" cy="2358200"/>
           </a:xfrm>
         </p:spPr>
         <p:txBody>
-          <a:bodyPr>
-            <a:normAutofit fontScale="92500" lnSpcReduction="10000"/>
+          <a:bodyPr anchor="t">
+            <a:normAutofit/>
           </a:bodyPr>
           <a:lstStyle/>
           <a:p>
             <a:r>
               <a:rPr lang="en-US" dirty="0"/>
-              <a:t>Vlad </a:t>
-            </a:r>
-            <a:r>
-              <a:rPr lang="en-US" dirty="0" err="1"/>
-              <a:t>Micalcea</a:t>
-            </a:r>
-            <a:r>
-              <a:rPr lang="en-US" dirty="0"/>
-              <a:t> (Hibernate contributor and expert)</a:t>
-            </a:r>
-          </a:p>
-          <a:p>
-            <a:pPr lvl="1"/>
-            <a:r>
-              <a:rPr lang="en-US" dirty="0">
-                <a:hlinkClick r:id="rId2"/>
-              </a:rPr>
-              <a:t>https://vladmihalcea.com/</a:t>
-            </a:r>
-            <a:endParaRPr lang="en-US" dirty="0"/>
-          </a:p>
-          <a:p>
-            <a:pPr lvl="1"/>
-            <a:r>
-              <a:rPr lang="en-US" dirty="0">
-                <a:hlinkClick r:id="rId3"/>
-              </a:rPr>
-              <a:t>https://vladmihalcea.com/the-open-session-in-view-anti-pattern/</a:t>
-            </a:r>
-            <a:endParaRPr lang="en-US" dirty="0"/>
-          </a:p>
-          <a:p>
-            <a:pPr lvl="1"/>
-            <a:r>
-              <a:rPr lang="en-US" dirty="0">
-                <a:hlinkClick r:id="rId4"/>
-              </a:rPr>
-              <a:t>https://vladmihalcea.com/eager-fetching-is-a-code-smell/</a:t>
-            </a:r>
-            <a:endParaRPr lang="en-US" dirty="0"/>
-          </a:p>
-          <a:p>
-            <a:r>
-              <a:rPr lang="en-US" dirty="0"/>
-              <a:t>Hibernate User Guide</a:t>
-            </a:r>
-          </a:p>
-          <a:p>
-            <a:pPr lvl="1"/>
-            <a:r>
-              <a:rPr lang="en-US" dirty="0">
-                <a:hlinkClick r:id="rId5"/>
-              </a:rPr>
-              <a:t>https://docs.jboss.org/hibernate/orm/current/userguide/html_single/Hibernate_User_Guide.html</a:t>
-            </a:r>
-            <a:endParaRPr lang="en-US" dirty="0"/>
-          </a:p>
-          <a:p>
-            <a:r>
-              <a:rPr lang="en-US" dirty="0"/>
-              <a:t>JPA specification</a:t>
-            </a:r>
-          </a:p>
-          <a:p>
-            <a:pPr lvl="1"/>
-            <a:r>
-              <a:rPr lang="en-US" dirty="0">
-                <a:hlinkClick r:id="rId6"/>
-              </a:rPr>
-              <a:t>https://jakarta.ee/specifications/persistence/3.0/jakarta-persistence-spec-3.0.html</a:t>
-            </a:r>
-            <a:endParaRPr lang="en-US" dirty="0"/>
-          </a:p>
-          <a:p>
-            <a:r>
-              <a:rPr lang="en-US" dirty="0"/>
-              <a:t>How does Spring Transactional work?</a:t>
-            </a:r>
-          </a:p>
-          <a:p>
-            <a:pPr lvl="1"/>
-            <a:r>
-              <a:rPr lang="en-US" dirty="0">
-                <a:hlinkClick r:id="rId7"/>
-              </a:rPr>
-              <a:t>https://dzone.com/articles/how-does-spring-transactional</a:t>
-            </a:r>
-            <a:endParaRPr lang="en-US" dirty="0"/>
-          </a:p>
-          <a:p>
-            <a:r>
-              <a:rPr lang="en-US" dirty="0"/>
-              <a:t>JPA Join Types</a:t>
-            </a:r>
-          </a:p>
-          <a:p>
-            <a:pPr lvl="1"/>
-            <a:r>
-              <a:rPr lang="en-US" dirty="0">
-                <a:hlinkClick r:id="rId8"/>
-              </a:rPr>
-              <a:t>https://www.baeldung.com/jpa-join-types</a:t>
-            </a:r>
-            <a:endParaRPr lang="en-US" dirty="0"/>
+              <a:t>Further resources</a:t>
+            </a:r>
+            <a:endParaRPr lang="en-US" dirty="0">
+              <a:latin typeface="Courier New" panose="02070309020205020404" pitchFamily="49" charset="0"/>
+              <a:cs typeface="Courier New" panose="02070309020205020404" pitchFamily="49" charset="0"/>
+            </a:endParaRPr>
           </a:p>
         </p:txBody>
       </p:sp>
     </p:spTree>
     <p:extLst>
       <p:ext uri="{BB962C8B-B14F-4D97-AF65-F5344CB8AC3E}">
-        <p14:creationId xmlns:p14="http://schemas.microsoft.com/office/powerpoint/2010/main" val="2889387521"/>
+        <p14:creationId xmlns:p14="http://schemas.microsoft.com/office/powerpoint/2010/main" val="540281930"/>
       </p:ext>
     </p:extLst>
   </p:cSld>
@@ -36925,6 +37252,320 @@
     <p:extLst>
       <p:ext uri="{BB962C8B-B14F-4D97-AF65-F5344CB8AC3E}">
         <p14:creationId xmlns:p14="http://schemas.microsoft.com/office/powerpoint/2010/main" val="492372422"/>
+      </p:ext>
+    </p:extLst>
+  </p:cSld>
+  <p:clrMapOvr>
+    <a:masterClrMapping/>
+  </p:clrMapOvr>
+</p:sld>
+</file>
+
+<file path=ppt/slides/slide60.xml><?xml version="1.0" encoding="utf-8"?>
+<p:sld xmlns:a="http://schemas.openxmlformats.org/drawingml/2006/main" xmlns:r="http://schemas.openxmlformats.org/officeDocument/2006/relationships" xmlns:p="http://schemas.openxmlformats.org/presentationml/2006/main">
+  <p:cSld>
+    <p:spTree>
+      <p:nvGrpSpPr>
+        <p:cNvPr id="1" name=""/>
+        <p:cNvGrpSpPr/>
+        <p:nvPr/>
+      </p:nvGrpSpPr>
+      <p:grpSpPr>
+        <a:xfrm>
+          <a:off x="0" y="0"/>
+          <a:ext cx="0" cy="0"/>
+          <a:chOff x="0" y="0"/>
+          <a:chExt cx="0" cy="0"/>
+        </a:xfrm>
+      </p:grpSpPr>
+      <p:sp>
+        <p:nvSpPr>
+          <p:cNvPr id="11" name="Title 1">
+            <a:extLst>
+              <a:ext uri="{FF2B5EF4-FFF2-40B4-BE49-F238E27FC236}">
+                <a16:creationId xmlns:a16="http://schemas.microsoft.com/office/drawing/2014/main" id="{51612DA1-DB43-7E72-A4EA-4B95C807605F}"/>
+              </a:ext>
+            </a:extLst>
+          </p:cNvPr>
+          <p:cNvSpPr>
+            <a:spLocks noGrp="1"/>
+          </p:cNvSpPr>
+          <p:nvPr>
+            <p:ph type="title"/>
+          </p:nvPr>
+        </p:nvSpPr>
+        <p:spPr>
+          <a:xfrm>
+            <a:off x="1296000" y="720000"/>
+            <a:ext cx="9864000" cy="681480"/>
+          </a:xfrm>
+        </p:spPr>
+        <p:txBody>
+          <a:bodyPr anchor="t">
+            <a:normAutofit/>
+          </a:bodyPr>
+          <a:lstStyle/>
+          <a:p>
+            <a:r>
+              <a:rPr lang="en-US" dirty="0"/>
+              <a:t>Slides and demos</a:t>
+            </a:r>
+          </a:p>
+        </p:txBody>
+      </p:sp>
+      <p:sp>
+        <p:nvSpPr>
+          <p:cNvPr id="2" name="Text Placeholder 2">
+            <a:extLst>
+              <a:ext uri="{FF2B5EF4-FFF2-40B4-BE49-F238E27FC236}">
+                <a16:creationId xmlns:a16="http://schemas.microsoft.com/office/drawing/2014/main" id="{E76B2B10-35AE-700A-1739-C269C75E032B}"/>
+              </a:ext>
+            </a:extLst>
+          </p:cNvPr>
+          <p:cNvSpPr>
+            <a:spLocks noGrp="1"/>
+          </p:cNvSpPr>
+          <p:nvPr>
+            <p:ph type="body" sz="quarter" idx="10"/>
+          </p:nvPr>
+        </p:nvSpPr>
+        <p:spPr>
+          <a:xfrm>
+            <a:off x="753036" y="1734397"/>
+            <a:ext cx="11037346" cy="4494281"/>
+          </a:xfrm>
+        </p:spPr>
+        <p:txBody>
+          <a:bodyPr>
+            <a:normAutofit/>
+          </a:bodyPr>
+          <a:lstStyle/>
+          <a:p>
+            <a:pPr>
+              <a:spcAft>
+                <a:spcPts val="600"/>
+              </a:spcAft>
+            </a:pPr>
+            <a:r>
+              <a:rPr lang="en-US" sz="2800" dirty="0"/>
+              <a:t>Slides and demos are available on GitHub.</a:t>
+            </a:r>
+          </a:p>
+          <a:p>
+            <a:pPr>
+              <a:spcAft>
+                <a:spcPts val="600"/>
+              </a:spcAft>
+            </a:pPr>
+            <a:r>
+              <a:rPr lang="en-US" sz="2800" dirty="0">
+                <a:hlinkClick r:id="rId2"/>
+              </a:rPr>
+              <a:t>https://github.com/raoulvdberge/jpa-with-hibernate</a:t>
+            </a:r>
+            <a:endParaRPr lang="en-US" sz="2800" dirty="0"/>
+          </a:p>
+        </p:txBody>
+      </p:sp>
+    </p:spTree>
+    <p:extLst>
+      <p:ext uri="{BB962C8B-B14F-4D97-AF65-F5344CB8AC3E}">
+        <p14:creationId xmlns:p14="http://schemas.microsoft.com/office/powerpoint/2010/main" val="4123513284"/>
+      </p:ext>
+    </p:extLst>
+  </p:cSld>
+  <p:clrMapOvr>
+    <a:masterClrMapping/>
+  </p:clrMapOvr>
+</p:sld>
+</file>
+
+<file path=ppt/slides/slide61.xml><?xml version="1.0" encoding="utf-8"?>
+<p:sld xmlns:a="http://schemas.openxmlformats.org/drawingml/2006/main" xmlns:r="http://schemas.openxmlformats.org/officeDocument/2006/relationships" xmlns:p="http://schemas.openxmlformats.org/presentationml/2006/main">
+  <p:cSld>
+    <p:spTree>
+      <p:nvGrpSpPr>
+        <p:cNvPr id="1" name=""/>
+        <p:cNvGrpSpPr/>
+        <p:nvPr/>
+      </p:nvGrpSpPr>
+      <p:grpSpPr>
+        <a:xfrm>
+          <a:off x="0" y="0"/>
+          <a:ext cx="0" cy="0"/>
+          <a:chOff x="0" y="0"/>
+          <a:chExt cx="0" cy="0"/>
+        </a:xfrm>
+      </p:grpSpPr>
+      <p:sp>
+        <p:nvSpPr>
+          <p:cNvPr id="8" name="Title 1">
+            <a:extLst>
+              <a:ext uri="{FF2B5EF4-FFF2-40B4-BE49-F238E27FC236}">
+                <a16:creationId xmlns:a16="http://schemas.microsoft.com/office/drawing/2014/main" id="{280C1126-AE06-6F45-5C34-548D61239155}"/>
+              </a:ext>
+            </a:extLst>
+          </p:cNvPr>
+          <p:cNvSpPr>
+            <a:spLocks noGrp="1"/>
+          </p:cNvSpPr>
+          <p:nvPr>
+            <p:ph type="title"/>
+          </p:nvPr>
+        </p:nvSpPr>
+        <p:spPr/>
+        <p:txBody>
+          <a:bodyPr/>
+          <a:lstStyle/>
+          <a:p>
+            <a:r>
+              <a:rPr lang="en-US" dirty="0"/>
+              <a:t>Further resources</a:t>
+            </a:r>
+          </a:p>
+        </p:txBody>
+      </p:sp>
+      <p:sp>
+        <p:nvSpPr>
+          <p:cNvPr id="10" name="Text Placeholder 2">
+            <a:extLst>
+              <a:ext uri="{FF2B5EF4-FFF2-40B4-BE49-F238E27FC236}">
+                <a16:creationId xmlns:a16="http://schemas.microsoft.com/office/drawing/2014/main" id="{7A69C3A1-EA48-682D-2DD6-89FB1C344D1E}"/>
+              </a:ext>
+            </a:extLst>
+          </p:cNvPr>
+          <p:cNvSpPr>
+            <a:spLocks noGrp="1"/>
+          </p:cNvSpPr>
+          <p:nvPr>
+            <p:ph type="body" sz="quarter" idx="10"/>
+          </p:nvPr>
+        </p:nvSpPr>
+        <p:spPr>
+          <a:xfrm>
+            <a:off x="1296000" y="1612154"/>
+            <a:ext cx="9864000" cy="4541108"/>
+          </a:xfrm>
+        </p:spPr>
+        <p:txBody>
+          <a:bodyPr>
+            <a:normAutofit fontScale="92500" lnSpcReduction="10000"/>
+          </a:bodyPr>
+          <a:lstStyle/>
+          <a:p>
+            <a:r>
+              <a:rPr lang="en-US" dirty="0"/>
+              <a:t>Vlad </a:t>
+            </a:r>
+            <a:r>
+              <a:rPr lang="en-US" dirty="0" err="1"/>
+              <a:t>Micalcea</a:t>
+            </a:r>
+            <a:r>
+              <a:rPr lang="en-US" dirty="0"/>
+              <a:t> (Hibernate contributor and expert)</a:t>
+            </a:r>
+          </a:p>
+          <a:p>
+            <a:pPr lvl="1"/>
+            <a:r>
+              <a:rPr lang="en-US" dirty="0">
+                <a:hlinkClick r:id="rId2"/>
+              </a:rPr>
+              <a:t>https://vladmihalcea.com/</a:t>
+            </a:r>
+            <a:endParaRPr lang="en-US" dirty="0"/>
+          </a:p>
+          <a:p>
+            <a:pPr lvl="1"/>
+            <a:r>
+              <a:rPr lang="en-US" dirty="0">
+                <a:hlinkClick r:id="rId3"/>
+              </a:rPr>
+              <a:t>https://vladmihalcea.com/the-open-session-in-view-anti-pattern/</a:t>
+            </a:r>
+            <a:endParaRPr lang="en-US" dirty="0"/>
+          </a:p>
+          <a:p>
+            <a:pPr lvl="1"/>
+            <a:r>
+              <a:rPr lang="en-US" dirty="0">
+                <a:hlinkClick r:id="rId4"/>
+              </a:rPr>
+              <a:t>https://vladmihalcea.com/eager-fetching-is-a-code-smell/</a:t>
+            </a:r>
+            <a:endParaRPr lang="en-US" dirty="0"/>
+          </a:p>
+          <a:p>
+            <a:r>
+              <a:rPr lang="en-US" dirty="0"/>
+              <a:t>Hibernate User Guide</a:t>
+            </a:r>
+          </a:p>
+          <a:p>
+            <a:pPr lvl="1"/>
+            <a:r>
+              <a:rPr lang="en-US" dirty="0">
+                <a:hlinkClick r:id="rId5"/>
+              </a:rPr>
+              <a:t>https://docs.jboss.org/hibernate/orm/current/userguide/html_single/Hibernate_User_Guide.html</a:t>
+            </a:r>
+            <a:endParaRPr lang="en-US" dirty="0"/>
+          </a:p>
+          <a:p>
+            <a:r>
+              <a:rPr lang="en-US" dirty="0"/>
+              <a:t>JPA specification</a:t>
+            </a:r>
+          </a:p>
+          <a:p>
+            <a:pPr lvl="1"/>
+            <a:r>
+              <a:rPr lang="en-US" dirty="0">
+                <a:hlinkClick r:id="rId6"/>
+              </a:rPr>
+              <a:t>https://jakarta.ee/specifications/persistence/3.0/jakarta-persistence-spec-3.0.html</a:t>
+            </a:r>
+            <a:endParaRPr lang="en-US" dirty="0"/>
+          </a:p>
+          <a:p>
+            <a:r>
+              <a:rPr lang="en-US" dirty="0"/>
+              <a:t>How does Spring Transactional work?</a:t>
+            </a:r>
+          </a:p>
+          <a:p>
+            <a:pPr lvl="1"/>
+            <a:r>
+              <a:rPr lang="en-US" dirty="0">
+                <a:hlinkClick r:id="rId7"/>
+              </a:rPr>
+              <a:t>https://dzone.com/articles/how-does-spring-transactional</a:t>
+            </a:r>
+            <a:endParaRPr lang="en-US" dirty="0"/>
+          </a:p>
+          <a:p>
+            <a:r>
+              <a:rPr lang="en-US" dirty="0"/>
+              <a:t>JPA Join Types</a:t>
+            </a:r>
+          </a:p>
+          <a:p>
+            <a:pPr lvl="1"/>
+            <a:r>
+              <a:rPr lang="en-US" dirty="0">
+                <a:hlinkClick r:id="rId8"/>
+              </a:rPr>
+              <a:t>https://www.baeldung.com/jpa-join-types</a:t>
+            </a:r>
+            <a:endParaRPr lang="en-US" dirty="0"/>
+          </a:p>
+        </p:txBody>
+      </p:sp>
+    </p:spTree>
+    <p:extLst>
+      <p:ext uri="{BB962C8B-B14F-4D97-AF65-F5344CB8AC3E}">
+        <p14:creationId xmlns:p14="http://schemas.microsoft.com/office/powerpoint/2010/main" val="2889387521"/>
       </p:ext>
     </p:extLst>
   </p:cSld>
@@ -39133,12 +39774,6 @@
 </file>
 
 <file path=customXml/item1.xml><?xml version="1.0" encoding="utf-8"?>
-<p:properties xmlns:p="http://schemas.microsoft.com/office/2006/metadata/properties" xmlns:xsi="http://www.w3.org/2001/XMLSchema-instance" xmlns:pc="http://schemas.microsoft.com/office/infopath/2007/PartnerControls">
-  <documentManagement/>
-</p:properties>
-</file>
-
-<file path=customXml/item2.xml><?xml version="1.0" encoding="utf-8"?>
 <ct:contentTypeSchema xmlns:ct="http://schemas.microsoft.com/office/2006/metadata/contentType" xmlns:ma="http://schemas.microsoft.com/office/2006/metadata/properties/metaAttributes" ct:_="" ma:_="" ma:contentTypeName="Document" ma:contentTypeID="0x0101000858805C9A31ED4698AA5994F7540466" ma:contentTypeVersion="1" ma:contentTypeDescription="Een nieuw document maken." ma:contentTypeScope="" ma:versionID="5cab34e6f8d54d32c51f192539e9981c">
   <xsd:schema xmlns:xsd="http://www.w3.org/2001/XMLSchema" xmlns:xs="http://www.w3.org/2001/XMLSchema" xmlns:p="http://schemas.microsoft.com/office/2006/metadata/properties" xmlns:ns2="a73fd6a0-a740-4ca0-a47f-6beba88ccc77" targetNamespace="http://schemas.microsoft.com/office/2006/metadata/properties" ma:root="true" ma:fieldsID="10b3ae9c115bae24efdfd9076c93080b" ns2:_="">
     <xsd:import namespace="a73fd6a0-a740-4ca0-a47f-6beba88ccc77"/>
@@ -39278,7 +39913,7 @@
 </ct:contentTypeSchema>
 </file>
 
-<file path=customXml/item3.xml><?xml version="1.0" encoding="utf-8"?>
+<file path=customXml/item2.xml><?xml version="1.0" encoding="utf-8"?>
 <?mso-contentType ?>
 <FormTemplates xmlns="http://schemas.microsoft.com/sharepoint/v3/contenttype/forms">
   <Display>DocumentLibraryForm</Display>
@@ -39287,23 +39922,13 @@
 </FormTemplates>
 </file>
 
-<file path=customXml/itemProps1.xml><?xml version="1.0" encoding="utf-8"?>
-<ds:datastoreItem xmlns:ds="http://schemas.openxmlformats.org/officeDocument/2006/customXml" ds:itemID="{F8AE8C2F-0717-4D42-B44A-CAECCF122A1A}">
-  <ds:schemaRefs>
-    <ds:schemaRef ds:uri="http://schemas.microsoft.com/office/infopath/2007/PartnerControls"/>
-    <ds:schemaRef ds:uri="http://www.w3.org/XML/1998/namespace"/>
-    <ds:schemaRef ds:uri="http://purl.org/dc/terms/"/>
-    <ds:schemaRef ds:uri="http://purl.org/dc/elements/1.1/"/>
-    <ds:schemaRef ds:uri="http://purl.org/dc/dcmitype/"/>
-    <ds:schemaRef ds:uri="http://schemas.microsoft.com/office/2006/documentManagement/types"/>
-    <ds:schemaRef ds:uri="http://schemas.openxmlformats.org/package/2006/metadata/core-properties"/>
-    <ds:schemaRef ds:uri="a73fd6a0-a740-4ca0-a47f-6beba88ccc77"/>
-    <ds:schemaRef ds:uri="http://schemas.microsoft.com/office/2006/metadata/properties"/>
-  </ds:schemaRefs>
-</ds:datastoreItem>
+<file path=customXml/item3.xml><?xml version="1.0" encoding="utf-8"?>
+<p:properties xmlns:p="http://schemas.microsoft.com/office/2006/metadata/properties" xmlns:xsi="http://www.w3.org/2001/XMLSchema-instance" xmlns:pc="http://schemas.microsoft.com/office/infopath/2007/PartnerControls">
+  <documentManagement/>
+</p:properties>
 </file>
 
-<file path=customXml/itemProps2.xml><?xml version="1.0" encoding="utf-8"?>
+<file path=customXml/itemProps1.xml><?xml version="1.0" encoding="utf-8"?>
 <ds:datastoreItem xmlns:ds="http://schemas.openxmlformats.org/officeDocument/2006/customXml" ds:itemID="{9AC0CDE9-3E35-44FD-A63A-9795CF527D47}">
   <ds:schemaRefs>
     <ds:schemaRef ds:uri="http://schemas.microsoft.com/office/2006/metadata/contentType"/>
@@ -39321,10 +39946,26 @@
 </ds:datastoreItem>
 </file>
 
-<file path=customXml/itemProps3.xml><?xml version="1.0" encoding="utf-8"?>
+<file path=customXml/itemProps2.xml><?xml version="1.0" encoding="utf-8"?>
 <ds:datastoreItem xmlns:ds="http://schemas.openxmlformats.org/officeDocument/2006/customXml" ds:itemID="{4522A51C-073F-4C45-9170-ECE5951F4DEA}">
   <ds:schemaRefs>
     <ds:schemaRef ds:uri="http://schemas.microsoft.com/sharepoint/v3/contenttype/forms"/>
   </ds:schemaRefs>
 </ds:datastoreItem>
+</file>
+
+<file path=customXml/itemProps3.xml><?xml version="1.0" encoding="utf-8"?>
+<ds:datastoreItem xmlns:ds="http://schemas.openxmlformats.org/officeDocument/2006/customXml" ds:itemID="{F8AE8C2F-0717-4D42-B44A-CAECCF122A1A}">
+  <ds:schemaRefs>
+    <ds:schemaRef ds:uri="http://schemas.microsoft.com/office/infopath/2007/PartnerControls"/>
+    <ds:schemaRef ds:uri="http://www.w3.org/XML/1998/namespace"/>
+    <ds:schemaRef ds:uri="http://purl.org/dc/terms/"/>
+    <ds:schemaRef ds:uri="http://purl.org/dc/elements/1.1/"/>
+    <ds:schemaRef ds:uri="http://purl.org/dc/dcmitype/"/>
+    <ds:schemaRef ds:uri="http://schemas.microsoft.com/office/2006/documentManagement/types"/>
+    <ds:schemaRef ds:uri="http://schemas.openxmlformats.org/package/2006/metadata/core-properties"/>
+    <ds:schemaRef ds:uri="a73fd6a0-a740-4ca0-a47f-6beba88ccc77"/>
+    <ds:schemaRef ds:uri="http://schemas.microsoft.com/office/2006/metadata/properties"/>
+  </ds:schemaRefs>
+</ds:datastoreItem>
 </file>
</xml_diff>